<commit_message>
add: random rotate whole cube add: info text
change: ppt document

fix: texture for Windows bulid

TODO: Noise gen
</commit_message>
<xml_diff>
--- a/docs/OpenGLCubeDirect.pptx
+++ b/docs/OpenGLCubeDirect.pptx
@@ -1,18 +1,24 @@
 
 <file path=ppt/presentation.xml><?xml version="1.0" encoding="utf-8"?>
-<p:presentation xmlns:p="http://schemas.openxmlformats.org/presentationml/2006/main" xmlns:p14="http://schemas.microsoft.com/office/powerpoint/2010/main" xmlns:r="http://schemas.openxmlformats.org/officeDocument/2006/relationships" xmlns:a="http://schemas.openxmlformats.org/drawingml/2006/main">
+<p:presentation xmlns:a="http://schemas.openxmlformats.org/drawingml/2006/main" xmlns:r="http://schemas.openxmlformats.org/officeDocument/2006/relationships" xmlns:p="http://schemas.openxmlformats.org/presentationml/2006/main" saveSubsetFonts="1">
   <p:sldMasterIdLst>
-    <p:sldMasterId id="2147483648" r:id="rId5"/>
-    <p:sldMasterId id="2147483661" r:id="rId6"/>
+    <p:sldMasterId id="2147483648" r:id="rId1"/>
+    <p:sldMasterId id="2147483661" r:id="rId2"/>
   </p:sldMasterIdLst>
   <p:sldIdLst>
-    <p:sldId id="256" r:id="rId7"/>
-    <p:sldId id="257" r:id="rId8"/>
-    <p:sldId id="259" r:id="rId9"/>
-    <p:sldId id="258" r:id="rId10"/>
+    <p:sldId id="256" r:id="rId3"/>
+    <p:sldId id="265" r:id="rId4"/>
+    <p:sldId id="257" r:id="rId5"/>
+    <p:sldId id="262" r:id="rId6"/>
+    <p:sldId id="260" r:id="rId7"/>
+    <p:sldId id="261" r:id="rId8"/>
+    <p:sldId id="263" r:id="rId9"/>
+    <p:sldId id="264" r:id="rId10"/>
+    <p:sldId id="259" r:id="rId11"/>
+    <p:sldId id="258" r:id="rId12"/>
   </p:sldIdLst>
   <p:sldSz cx="10080625" cy="7559675"/>
-  <p:notesSz cx="7559675" cy="10691495"/>
+  <p:notesSz cx="7559675" cy="10691813"/>
   <p:defaultTextStyle>
     <a:lvl1pPr marL="0" marR="0" indent="0" algn="l" defTabSz="914400">
       <a:lnSpc>
@@ -213,11 +219,30 @@
       </a:defRPr>
     </a:lvl9pPr>
   </p:defaultTextStyle>
+  <p:extLst>
+    <p:ext uri="{EFAFB233-063F-42B5-8137-9DF3F51BA10A}">
+      <p15:sldGuideLst xmlns:p15="http://schemas.microsoft.com/office/powerpoint/2012/main">
+        <p15:guide id="1" orient="horz" pos="2381">
+          <p15:clr>
+            <a:srgbClr val="A4A3A4"/>
+          </p15:clr>
+        </p15:guide>
+        <p15:guide id="2" pos="3175">
+          <p15:clr>
+            <a:srgbClr val="A4A3A4"/>
+          </p15:clr>
+        </p15:guide>
+      </p15:sldGuideLst>
+    </p:ext>
+    <p:ext uri="{2D200454-40CA-4A62-9FC3-DE9A4176ACB9}">
+      <p15:notesGuideLst xmlns:p15="http://schemas.microsoft.com/office/powerpoint/2012/main"/>
+    </p:ext>
+  </p:extLst>
 </p:presentation>
 </file>
 
 <file path=ppt/slideLayouts/slideLayout1.xml><?xml version="1.0" encoding="utf-8"?>
-<p:sldLayout xmlns:p="http://schemas.openxmlformats.org/presentationml/2006/main" xmlns:p14="http://schemas.microsoft.com/office/powerpoint/2010/main" xmlns:r="http://schemas.openxmlformats.org/officeDocument/2006/relationships" xmlns:a="http://schemas.openxmlformats.org/drawingml/2006/main" type="blank" preserve="1">
+<p:sldLayout xmlns:a="http://schemas.openxmlformats.org/drawingml/2006/main" xmlns:r="http://schemas.openxmlformats.org/officeDocument/2006/relationships" xmlns:p="http://schemas.openxmlformats.org/presentationml/2006/main" type="blank" preserve="1">
   <p:cSld name="Blank Slide">
     <p:spTree>
       <p:nvGrpSpPr>
@@ -242,7 +267,7 @@
 </file>
 
 <file path=ppt/slideLayouts/slideLayout10.xml><?xml version="1.0" encoding="utf-8"?>
-<p:sldLayout xmlns:p="http://schemas.openxmlformats.org/presentationml/2006/main" xmlns:p14="http://schemas.microsoft.com/office/powerpoint/2010/main" xmlns:r="http://schemas.openxmlformats.org/officeDocument/2006/relationships" xmlns:a="http://schemas.openxmlformats.org/drawingml/2006/main" type="objOverTx" preserve="1">
+<p:sldLayout xmlns:a="http://schemas.openxmlformats.org/drawingml/2006/main" xmlns:r="http://schemas.openxmlformats.org/officeDocument/2006/relationships" xmlns:p="http://schemas.openxmlformats.org/presentationml/2006/main" type="objOverTx" preserve="1">
   <p:cSld name="Title, Content over Content">
     <p:spTree>
       <p:nvGrpSpPr>
@@ -265,7 +290,7 @@
             <a:spLocks noGrp="1" noChangeArrowheads="1"/>
             <a:extLst>
               <a:ext uri="smNativeData">
-                <pr:smNativeData xmlns:pr="smNativeData" val="SMDATA_13_47fkXxMAAAAlAAAAZAAAAA0AAAAAAAAAAAAAAAAAAAAAAAAAAAAAAAABAAAAAAAAAAEAAABQAAAAAAAAAAAA4D8AAAAAAADgPwAAAAAAAOA/AAAAAAAA4D8AAAAAAADgPwAAAAAAAOA/AAAAAAAA4D8AAAAAAADgPwAAAAAAAOA/AAAAAAAA4D8CAAAAjAAAAAAAAAAAAAAAT4G9DP///wgAAAAAAAAAAAAAAAAAAAAAAAAAAAAAAAAAAAAAZAAAAAEAAABAAAAAAAAAAAAAAAAAAAAAAAAAAAAAAAAAAAAAAAAAAAAAAAAAAAAAAAAAAAAAAAAAAAAAAAAAAAAAAAAAAAAAAAAAAAAAAAAAAAAAAAAAAAAAAAAAAAAAFAAAADwAAAAAAAAAAAAAAAAAAAkUAAAAAQAAABQAAAAUAAAAFAAAAAEAAAAAAAAAZAAAAGQAAAAAAAAAZAAAAGQAAAAVAAAAYAAAAAAAAAAAAAAADwAAACADAAAAAAAAAAAAAAEAAACgMgAAVgcAAKr4//8BAAAAf39/AAEAAABkAAAAAAAAABQAAABAHwAAAAAAACYAAAAAAAAAwOD//wAAAAAmAAAAZAAAABYAAABMAAAAAAAAAAAAAAAEAAAAAAAAAAEAAADu7OEKAAAAACgAAAAoAAAAZAAAAGQAAAAAAAAAzMzMAAAAAABQAAAAUAAAAGQAAABkAAAAAAAAABcAAAAUAAAAAAAAAAAAAAD/fwAA/38AAAAAAAAJAAAABAAAAAAAAAAMAAAAEAAAAAAAAAAAAAAAAAAAAAAAAAAeAAAAaAAAAAAAAAAAAAAAAAAAAAAAAAAAAAAAECcAABAnAAAAAAAAAAAAAAAAAAAAAAAAAAAAAAAAAAAAAAAAAAAAABQAAAAAAAAAwMD/AAAAAABkAAAAMgAAAAAAAABkAAAAAAAAAH9/fwAKAAAAHwAAAFQAAAAAAAAFAAAAAQAAAAAAAAAAAAAAAAAAAAAAAAAAAAAAAAAAAAAAAAAAAAAAAn9/fwAAAAADzMzMAMDA/wB/f38AAAAAAAAAAAAAAAAAAAAAAAAAAAAhAAAAGAAAABQAAAAaAwAApQYAAOg6AABGEQAAEAAAACYAAAAIAAAAPKAAAAAAAAA="/>
+                <pr:smNativeData xmlns="" xmlns:p14="http://schemas.microsoft.com/office/powerpoint/2010/main" xmlns:pr="smNativeData" val="SMDATA_13_47fkXxMAAAAlAAAAZAAAAA0AAAAAAAAAAAAAAAAAAAAAAAAAAAAAAAABAAAAAAAAAAEAAABQAAAAAAAAAAAA4D8AAAAAAADgPwAAAAAAAOA/AAAAAAAA4D8AAAAAAADgPwAAAAAAAOA/AAAAAAAA4D8AAAAAAADgPwAAAAAAAOA/AAAAAAAA4D8CAAAAjAAAAAAAAAAAAAAAT4G9DP///wgAAAAAAAAAAAAAAAAAAAAAAAAAAAAAAAAAAAAAZAAAAAEAAABAAAAAAAAAAAAAAAAAAAAAAAAAAAAAAAAAAAAAAAAAAAAAAAAAAAAAAAAAAAAAAAAAAAAAAAAAAAAAAAAAAAAAAAAAAAAAAAAAAAAAAAAAAAAAAAAAAAAAFAAAADwAAAAAAAAAAAAAAAAAAAkUAAAAAQAAABQAAAAUAAAAFAAAAAEAAAAAAAAAZAAAAGQAAAAAAAAAZAAAAGQAAAAVAAAAYAAAAAAAAAAAAAAADwAAACADAAAAAAAAAAAAAAEAAACgMgAAVgcAAKr4//8BAAAAf39/AAEAAABkAAAAAAAAABQAAABAHwAAAAAAACYAAAAAAAAAwOD//wAAAAAmAAAAZAAAABYAAABMAAAAAAAAAAAAAAAEAAAAAAAAAAEAAADu7OEKAAAAACgAAAAoAAAAZAAAAGQAAAAAAAAAzMzMAAAAAABQAAAAUAAAAGQAAABkAAAAAAAAABcAAAAUAAAAAAAAAAAAAAD/fwAA/38AAAAAAAAJAAAABAAAAAAAAAAMAAAAEAAAAAAAAAAAAAAAAAAAAAAAAAAeAAAAaAAAAAAAAAAAAAAAAAAAAAAAAAAAAAAAECcAABAnAAAAAAAAAAAAAAAAAAAAAAAAAAAAAAAAAAAAAAAAAAAAABQAAAAAAAAAwMD/AAAAAABkAAAAMgAAAAAAAABkAAAAAAAAAH9/fwAKAAAAHwAAAFQAAAAAAAAFAAAAAQAAAAAAAAAAAAAAAAAAAAAAAAAAAAAAAAAAAAAAAAAAAAAAAn9/fwAAAAADzMzMAMDA/wB/f38AAAAAAAAAAAAAAAAAAAAAAAAAAAAhAAAAGAAAABQAAAAaAwAApQYAAOg6AABGEQAAEAAAACYAAAAIAAAAPKAAAAAAAAA="/>
               </a:ext>
             </a:extLst>
           </p:cNvSpPr>
@@ -300,7 +325,7 @@
             <a:spLocks noGrp="1" noChangeArrowheads="1"/>
             <a:extLst>
               <a:ext uri="smNativeData">
-                <pr:smNativeData xmlns:pr="smNativeData" val="SMDATA_13_47fkXxMAAAAlAAAAZAAAAA0AAAAAAAAAAAAAAAAAAAAAAAAAAAAAAAAAAAAAAAAAAAEAAABQAAAAAAAAAAAA4D8AAAAAAADgPwAAAAAAAOA/AAAAAAAA4D8AAAAAAADgPwAAAAAAAOA/AAAAAAAA4D8AAAAAAADgPwAAAAAAAOA/AAAAAAAA4D8CAAAAjAAAAAAAAAAAAAAAT4G9DP///wgAAAAAAAAAAAAAAAAAAAAAAAAAAAAAAAAAAAAAZAAAAAEAAABAAAAAAAAAAAAAAAAAAAAAAAAAAAAAAAAAAAAAAAAAAAAAAAAAAAAAAAAAAAAAAAAAAAAAAAAAAAAAAAAAAAAAAAAAAAAAAAAAAAAAAAAAAAAAAAAAAAAAFAAAADwAAAAAAAAAAAAAAAAAAAkUAAAAAQAAABQAAAAUAAAAFAAAAAEAAAAAAAAAZAAAAGQAAAAAAAAAZAAAAGQAAAAVAAAAYAAAAAAAAAAAAAAADwAAACADAAAAAAAAAAAAAAEAAACgMgAAVgcAAKr4//8BAAAAf39/AAEAAABkAAAAAAAAABQAAABAHwAAAAAAACYAAAAAAAAAwOD//wAAAAAmAAAAZAAAABYAAABMAAAAAAAAAAAAAAAEAAAAAAAAAAEAAADu7OEKAAAAACgAAAAoAAAAZAAAAGQAAAAAAAAAzMzMAAAAAABQAAAAUAAAAGQAAABkAAAAAAAAABcAAAAUAAAAAAAAAAAAAAD/fwAA/38AAAAAAAAJAAAABAAAAAAAAAAMAAAAEAAAAAAAAAAAAAAAAAAAAAAAAAAeAAAAaAAAAAAAAAAAAAAAAAAAAAAAAAAAAAAAECcAABAnAAAAAAAAAAAAAAAAAAAAAAAAAAAAAAAAAAAAAAAAAAAAABQAAAAAAAAAwMD/AAAAAABkAAAAMgAAAAAAAABkAAAAAAAAAH9/fwAKAAAAHwAAAFQAAAAAAAAFAAAAAQAAAAAAAAAAAAAAAAAAAAAAAAAAAAAAAAAAAAAAAAAAAAAAAn9/fwAAAAADzMzMAMDA/wB/f38AAAAAAAAAAAAAAAAAAAAAAAAAAAAhAAAAGAAAABQAAAAaAwAAfRMAAOg6AABDHgAAEAAAACYAAAAIAAAAPaAAAAAAAAA="/>
+                <pr:smNativeData xmlns="" xmlns:p14="http://schemas.microsoft.com/office/powerpoint/2010/main" xmlns:pr="smNativeData" val="SMDATA_13_47fkXxMAAAAlAAAAZAAAAA0AAAAAAAAAAAAAAAAAAAAAAAAAAAAAAAAAAAAAAAAAAAEAAABQAAAAAAAAAAAA4D8AAAAAAADgPwAAAAAAAOA/AAAAAAAA4D8AAAAAAADgPwAAAAAAAOA/AAAAAAAA4D8AAAAAAADgPwAAAAAAAOA/AAAAAAAA4D8CAAAAjAAAAAAAAAAAAAAAT4G9DP///wgAAAAAAAAAAAAAAAAAAAAAAAAAAAAAAAAAAAAAZAAAAAEAAABAAAAAAAAAAAAAAAAAAAAAAAAAAAAAAAAAAAAAAAAAAAAAAAAAAAAAAAAAAAAAAAAAAAAAAAAAAAAAAAAAAAAAAAAAAAAAAAAAAAAAAAAAAAAAAAAAAAAAFAAAADwAAAAAAAAAAAAAAAAAAAkUAAAAAQAAABQAAAAUAAAAFAAAAAEAAAAAAAAAZAAAAGQAAAAAAAAAZAAAAGQAAAAVAAAAYAAAAAAAAAAAAAAADwAAACADAAAAAAAAAAAAAAEAAACgMgAAVgcAAKr4//8BAAAAf39/AAEAAABkAAAAAAAAABQAAABAHwAAAAAAACYAAAAAAAAAwOD//wAAAAAmAAAAZAAAABYAAABMAAAAAAAAAAAAAAAEAAAAAAAAAAEAAADu7OEKAAAAACgAAAAoAAAAZAAAAGQAAAAAAAAAzMzMAAAAAABQAAAAUAAAAGQAAABkAAAAAAAAABcAAAAUAAAAAAAAAAAAAAD/fwAA/38AAAAAAAAJAAAABAAAAAAAAAAMAAAAEAAAAAAAAAAAAAAAAAAAAAAAAAAeAAAAaAAAAAAAAAAAAAAAAAAAAAAAAAAAAAAAECcAABAnAAAAAAAAAAAAAAAAAAAAAAAAAAAAAAAAAAAAAAAAAAAAABQAAAAAAAAAwMD/AAAAAABkAAAAMgAAAAAAAABkAAAAAAAAAH9/fwAKAAAAHwAAAFQAAAAAAAAFAAAAAQAAAAAAAAAAAAAAAAAAAAAAAAAAAAAAAAAAAAAAAAAAAAAAAn9/fwAAAAADzMzMAMDA/wB/f38AAAAAAAAAAAAAAAAAAAAAAAAAAAAhAAAAGAAAABQAAAAaAwAAfRMAAOg6AABDHgAAEAAAACYAAAAIAAAAPaAAAAAAAAA="/>
               </a:ext>
             </a:extLst>
           </p:cNvSpPr>
@@ -358,7 +383,7 @@
             <a:spLocks noGrp="1" noChangeArrowheads="1"/>
             <a:extLst>
               <a:ext uri="smNativeData">
-                <pr:smNativeData xmlns:pr="smNativeData" val="SMDATA_13_47fkXxMAAAAlAAAAZAAAAA0AAAAAAAAAAAAAAAAAAAAAAAAAAAAAAAAAAAAAAAAAAAEAAABQAAAAAAAAAAAA4D8AAAAAAADgPwAAAAAAAOA/AAAAAAAA4D8AAAAAAADgPwAAAAAAAOA/AAAAAAAA4D8AAAAAAADgPwAAAAAAAOA/AAAAAAAA4D8CAAAAjAAAAAAAAAAAAAAAT4G9DP///wgAAAAAAAAAAAAAAAAAAAAAAAAAAAAAAAAAAAAAZAAAAAEAAABAAAAAAAAAAAAAAAAAAAAAAAAAAAAAAAAAAAAAAAAAAAAAAAAAAAAAAAAAAAAAAAAAAAAAAAAAAAAAAAAAAAAAAAAAAAAAAAAAAAAAAAAAAAAAAAAAAAAAFAAAADwAAAAAAAAAAAAAAAAAAAkUAAAAAQAAABQAAAAUAAAAFAAAAAEAAAAAAAAAZAAAAGQAAAAAAAAAZAAAAGQAAAAVAAAAYAAAAAAAAAAAAAAADwAAACADAAAAAAAAAAAAAAEAAACgMgAAVgcAAKr4//8BAAAAf39/AAEAAABkAAAAAAAAABQAAABAHwAAAAAAACYAAAAAAAAAwOD//wAAAAAmAAAAZAAAABYAAABMAAAAAAAAAAAAAAAEAAAAAAAAAAEAAADu7OEKAAAAACgAAAAoAAAAZAAAAGQAAAAAAAAAzMzMAAAAAABQAAAAUAAAAGQAAABkAAAAAAAAABcAAAAUAAAAAAAAAAAAAAD/fwAA/38AAAAAAAAJAAAABAAAAAAAAAAMAAAAEAAAAAAAAAAAAAAAAAAAAAAAAAAeAAAAaAAAAAAAAAAAAAAAAAAAAAAAAAAAAAAAECcAABAnAAAAAAAAAAAAAAAAAAAAAAAAAAAAAAAAAAAAAAAAAAAAABQAAAAAAAAAwMD/AAAAAABkAAAAMgAAAAAAAABkAAAAAAAAAH9/fwAKAAAAHwAAAFQAAAAAAAAFAAAAAQAAAAAAAAAAAAAAAAAAAAAAAAAAAAAAAAAAAAAAAAAAAAAAAn9/fwAAAAADzMzMAMDA/wB/f38AAAAAAAAAAAAAAAAAAAAAAAAAAAAhAAAAGAAAABQAAAAaAwAASh8AAOg6AAAQKgAAEAAAACYAAAAIAAAAPaAAAAAAAAA="/>
+                <pr:smNativeData xmlns="" xmlns:p14="http://schemas.microsoft.com/office/powerpoint/2010/main" xmlns:pr="smNativeData" val="SMDATA_13_47fkXxMAAAAlAAAAZAAAAA0AAAAAAAAAAAAAAAAAAAAAAAAAAAAAAAAAAAAAAAAAAAEAAABQAAAAAAAAAAAA4D8AAAAAAADgPwAAAAAAAOA/AAAAAAAA4D8AAAAAAADgPwAAAAAAAOA/AAAAAAAA4D8AAAAAAADgPwAAAAAAAOA/AAAAAAAA4D8CAAAAjAAAAAAAAAAAAAAAT4G9DP///wgAAAAAAAAAAAAAAAAAAAAAAAAAAAAAAAAAAAAAZAAAAAEAAABAAAAAAAAAAAAAAAAAAAAAAAAAAAAAAAAAAAAAAAAAAAAAAAAAAAAAAAAAAAAAAAAAAAAAAAAAAAAAAAAAAAAAAAAAAAAAAAAAAAAAAAAAAAAAAAAAAAAAFAAAADwAAAAAAAAAAAAAAAAAAAkUAAAAAQAAABQAAAAUAAAAFAAAAAEAAAAAAAAAZAAAAGQAAAAAAAAAZAAAAGQAAAAVAAAAYAAAAAAAAAAAAAAADwAAACADAAAAAAAAAAAAAAEAAACgMgAAVgcAAKr4//8BAAAAf39/AAEAAABkAAAAAAAAABQAAABAHwAAAAAAACYAAAAAAAAAwOD//wAAAAAmAAAAZAAAABYAAABMAAAAAAAAAAAAAAAEAAAAAAAAAAEAAADu7OEKAAAAACgAAAAoAAAAZAAAAGQAAAAAAAAAzMzMAAAAAABQAAAAUAAAAGQAAABkAAAAAAAAABcAAAAUAAAAAAAAAAAAAAD/fwAA/38AAAAAAAAJAAAABAAAAAAAAAAMAAAAEAAAAAAAAAAAAAAAAAAAAAAAAAAeAAAAaAAAAAAAAAAAAAAAAAAAAAAAAAAAAAAAECcAABAnAAAAAAAAAAAAAAAAAAAAAAAAAAAAAAAAAAAAAAAAAAAAABQAAAAAAAAAwMD/AAAAAABkAAAAMgAAAAAAAABkAAAAAAAAAH9/fwAKAAAAHwAAAFQAAAAAAAAFAAAAAQAAAAAAAAAAAAAAAAAAAAAAAAAAAAAAAAAAAAAAAAAAAAAAAn9/fwAAAAADzMzMAMDA/wB/f38AAAAAAAAAAAAAAAAAAAAAAAAAAAAhAAAAGAAAABQAAAAaAwAASh8AAOg6AAAQKgAAEAAAACYAAAAIAAAAPaAAAAAAAAA="/>
               </a:ext>
             </a:extLst>
           </p:cNvSpPr>
@@ -418,7 +443,7 @@
 </file>
 
 <file path=ppt/slideLayouts/slideLayout11.xml><?xml version="1.0" encoding="utf-8"?>
-<p:sldLayout xmlns:p="http://schemas.openxmlformats.org/presentationml/2006/main" xmlns:p14="http://schemas.microsoft.com/office/powerpoint/2010/main" xmlns:r="http://schemas.openxmlformats.org/officeDocument/2006/relationships" xmlns:a="http://schemas.openxmlformats.org/drawingml/2006/main" type="fourObj" preserve="1">
+<p:sldLayout xmlns:a="http://schemas.openxmlformats.org/drawingml/2006/main" xmlns:r="http://schemas.openxmlformats.org/officeDocument/2006/relationships" xmlns:p="http://schemas.openxmlformats.org/presentationml/2006/main" type="fourObj" preserve="1">
   <p:cSld name="Title, 4 Content">
     <p:spTree>
       <p:nvGrpSpPr>
@@ -441,7 +466,7 @@
             <a:spLocks noGrp="1" noChangeArrowheads="1"/>
             <a:extLst>
               <a:ext uri="smNativeData">
-                <pr:smNativeData xmlns:pr="smNativeData" val="SMDATA_13_47fkXxMAAAAlAAAAZAAAAA0AAAAAAAAAAAAAAAAAAAAAAAAAAAAAAAABAAAAAAAAAAEAAABQAAAAAAAAAAAA4D8AAAAAAADgPwAAAAAAAOA/AAAAAAAA4D8AAAAAAADgPwAAAAAAAOA/AAAAAAAA4D8AAAAAAADgPwAAAAAAAOA/AAAAAAAA4D8CAAAAjAAAAAAAAAAAAAAAT4G9DP///wgAAAAAAAAAAAAAAAAAAAAAAAAAAAAAAAAAAAAAZAAAAAEAAABAAAAAAAAAAAAAAAAAAAAAAAAAAAAAAAAAAAAAAAAAAAAAAAAAAAAAAAAAAAAAAAAAAAAAAAAAAAAAAAAAAAAAAAAAAAAAAAAAAAAAAAAAAAAAAAAAAAAAFAAAADwAAAAAAAAAAAAAAAAAAAkUAAAAAQAAABQAAAAUAAAAFAAAAAEAAAAAAAAAZAAAAGQAAAAAAAAAZAAAAGQAAAAVAAAAYAAAAAAAAAAAAAAADwAAACADAAAAAAAAAAAAAAEAAACgMgAAVgcAAKr4//8BAAAAf39/AAEAAABkAAAAAAAAABQAAABAHwAAAAAAACYAAAAAAAAAwOD//wAAAAAmAAAAZAAAABYAAABMAAAAAAAAAAAAAAAEAAAAAAAAAAEAAADu7OEKAAAAACgAAAAoAAAAZAAAAGQAAAAAAAAAzMzMAAAAAABQAAAAUAAAAGQAAABkAAAAAAAAABcAAAAUAAAAAAAAAAAAAAD/fwAA/38AAAAAAAAJAAAABAAAAAAAAAAMAAAAEAAAAAAAAAAAAAAAAAAAAAAAAAAeAAAAaAAAAAAAAAAAAAAAAAAAAAAAAAAAAAAAECcAABAnAAAAAAAAAAAAAAAAAAAAAAAAAAAAAAAAAAAAAAAAAAAAABQAAAAAAAAAwMD/AAAAAABkAAAAMgAAAAAAAABkAAAAAAAAAH9/fwAKAAAAHwAAAFQAAAAAAAAFAAAAAQAAAAAAAAAAAAAAAAAAAAAAAAAAAAAAAAAAAAAAAAAAAAAAAn9/fwAAAAADzMzMAMDA/wB/f38AAAAAAAAAAAAAAAAAAAAAAAAAAAAhAAAAGAAAABQAAAAaAwAApQYAAOg6AABGEQAAEAAAACYAAAAIAAAAPKAAAAAAAAA="/>
+                <pr:smNativeData xmlns="" xmlns:p14="http://schemas.microsoft.com/office/powerpoint/2010/main" xmlns:pr="smNativeData" val="SMDATA_13_47fkXxMAAAAlAAAAZAAAAA0AAAAAAAAAAAAAAAAAAAAAAAAAAAAAAAABAAAAAAAAAAEAAABQAAAAAAAAAAAA4D8AAAAAAADgPwAAAAAAAOA/AAAAAAAA4D8AAAAAAADgPwAAAAAAAOA/AAAAAAAA4D8AAAAAAADgPwAAAAAAAOA/AAAAAAAA4D8CAAAAjAAAAAAAAAAAAAAAT4G9DP///wgAAAAAAAAAAAAAAAAAAAAAAAAAAAAAAAAAAAAAZAAAAAEAAABAAAAAAAAAAAAAAAAAAAAAAAAAAAAAAAAAAAAAAAAAAAAAAAAAAAAAAAAAAAAAAAAAAAAAAAAAAAAAAAAAAAAAAAAAAAAAAAAAAAAAAAAAAAAAAAAAAAAAFAAAADwAAAAAAAAAAAAAAAAAAAkUAAAAAQAAABQAAAAUAAAAFAAAAAEAAAAAAAAAZAAAAGQAAAAAAAAAZAAAAGQAAAAVAAAAYAAAAAAAAAAAAAAADwAAACADAAAAAAAAAAAAAAEAAACgMgAAVgcAAKr4//8BAAAAf39/AAEAAABkAAAAAAAAABQAAABAHwAAAAAAACYAAAAAAAAAwOD//wAAAAAmAAAAZAAAABYAAABMAAAAAAAAAAAAAAAEAAAAAAAAAAEAAADu7OEKAAAAACgAAAAoAAAAZAAAAGQAAAAAAAAAzMzMAAAAAABQAAAAUAAAAGQAAABkAAAAAAAAABcAAAAUAAAAAAAAAAAAAAD/fwAA/38AAAAAAAAJAAAABAAAAAAAAAAMAAAAEAAAAAAAAAAAAAAAAAAAAAAAAAAeAAAAaAAAAAAAAAAAAAAAAAAAAAAAAAAAAAAAECcAABAnAAAAAAAAAAAAAAAAAAAAAAAAAAAAAAAAAAAAAAAAAAAAABQAAAAAAAAAwMD/AAAAAABkAAAAMgAAAAAAAABkAAAAAAAAAH9/fwAKAAAAHwAAAFQAAAAAAAAFAAAAAQAAAAAAAAAAAAAAAAAAAAAAAAAAAAAAAAAAAAAAAAAAAAAAAn9/fwAAAAADzMzMAMDA/wB/f38AAAAAAAAAAAAAAAAAAAAAAAAAAAAhAAAAGAAAABQAAAAaAwAApQYAAOg6AABGEQAAEAAAACYAAAAIAAAAPKAAAAAAAAA="/>
               </a:ext>
             </a:extLst>
           </p:cNvSpPr>
@@ -476,7 +501,7 @@
             <a:spLocks noGrp="1" noChangeArrowheads="1"/>
             <a:extLst>
               <a:ext uri="smNativeData">
-                <pr:smNativeData xmlns:pr="smNativeData" val="SMDATA_13_47fkXxMAAAAlAAAAZAAAAA0AAAAAAAAAAAAAAAAAAAAAAAAAAAAAAAAAAAAAAAAAAAEAAABQAAAAAAAAAAAA4D8AAAAAAADgPwAAAAAAAOA/AAAAAAAA4D8AAAAAAADgPwAAAAAAAOA/AAAAAAAA4D8AAAAAAADgPwAAAAAAAOA/AAAAAAAA4D8CAAAAjAAAAAAAAAAAAAAAT4G9DP///wgAAAAAAAAAAAAAAAAAAAAAAAAAAAAAAAAAAAAAZAAAAAEAAABAAAAAAAAAAAAAAAAAAAAAAAAAAAAAAAAAAAAAAAAAAAAAAAAAAAAAAAAAAAAAAAAAAAAAAAAAAAAAAAAAAAAAAAAAAAAAAAAAAAAAAAAAAAAAAAAAAAAAFAAAADwAAAAAAAAAAAAAAAAAAAkUAAAAAQAAABQAAAAUAAAAFAAAAAEAAAAAAAAAZAAAAGQAAAAAAAAAZAAAAGQAAAAVAAAAYAAAAAAAAAAAAAAADwAAACADAAAAAAAAAAAAAAEAAACgMgAAVgcAAKr4//8BAAAAf39/AAEAAABkAAAAAAAAABQAAABAHwAAAAAAACYAAAAAAAAAwOD//wAAAAAmAAAAZAAAABYAAABMAAAAAAAAAAAAAAAEAAAAAAAAAAEAAADu7OEKAAAAACgAAAAoAAAAZAAAAGQAAAAAAAAAzMzMAAAAAABQAAAAUAAAAGQAAABkAAAAAAAAABcAAAAUAAAAAAAAAAAAAAD/fwAA/38AAAAAAAAJAAAABAAAAAAAAAAMAAAAEAAAAAAAAAAAAAAAAAAAAAAAAAAeAAAAaAAAAAAAAAAAAAAAAAAAAAAAAAAAAAAAECcAABAnAAAAAAAAAAAAAAAAAAAAAAAAAAAAAAAAAAAAAAAAAAAAABQAAAAAAAAAwMD/AAAAAABkAAAAMgAAAAAAAABkAAAAAAAAAH9/fwAKAAAAHwAAAFQAAAAAAAAFAAAAAQAAAAAAAAAAAAAAAAAAAAAAAAAAAAAAAAAAAAAAAAAAAAAAAn9/fwAAAAADzMzMAMDA/wB/f38AAAAAAAAAAAAAAAAAAAAAAAAAAAAhAAAAGAAAABQAAAAaAwAAfRMAAFUeAABDHgAAEAAAACYAAAAIAAAAPaAAAAAAAAA="/>
+                <pr:smNativeData xmlns="" xmlns:p14="http://schemas.microsoft.com/office/powerpoint/2010/main" xmlns:pr="smNativeData" val="SMDATA_13_47fkXxMAAAAlAAAAZAAAAA0AAAAAAAAAAAAAAAAAAAAAAAAAAAAAAAAAAAAAAAAAAAEAAABQAAAAAAAAAAAA4D8AAAAAAADgPwAAAAAAAOA/AAAAAAAA4D8AAAAAAADgPwAAAAAAAOA/AAAAAAAA4D8AAAAAAADgPwAAAAAAAOA/AAAAAAAA4D8CAAAAjAAAAAAAAAAAAAAAT4G9DP///wgAAAAAAAAAAAAAAAAAAAAAAAAAAAAAAAAAAAAAZAAAAAEAAABAAAAAAAAAAAAAAAAAAAAAAAAAAAAAAAAAAAAAAAAAAAAAAAAAAAAAAAAAAAAAAAAAAAAAAAAAAAAAAAAAAAAAAAAAAAAAAAAAAAAAAAAAAAAAAAAAAAAAFAAAADwAAAAAAAAAAAAAAAAAAAkUAAAAAQAAABQAAAAUAAAAFAAAAAEAAAAAAAAAZAAAAGQAAAAAAAAAZAAAAGQAAAAVAAAAYAAAAAAAAAAAAAAADwAAACADAAAAAAAAAAAAAAEAAACgMgAAVgcAAKr4//8BAAAAf39/AAEAAABkAAAAAAAAABQAAABAHwAAAAAAACYAAAAAAAAAwOD//wAAAAAmAAAAZAAAABYAAABMAAAAAAAAAAAAAAAEAAAAAAAAAAEAAADu7OEKAAAAACgAAAAoAAAAZAAAAGQAAAAAAAAAzMzMAAAAAABQAAAAUAAAAGQAAABkAAAAAAAAABcAAAAUAAAAAAAAAAAAAAD/fwAA/38AAAAAAAAJAAAABAAAAAAAAAAMAAAAEAAAAAAAAAAAAAAAAAAAAAAAAAAeAAAAaAAAAAAAAAAAAAAAAAAAAAAAAAAAAAAAECcAABAnAAAAAAAAAAAAAAAAAAAAAAAAAAAAAAAAAAAAAAAAAAAAABQAAAAAAAAAwMD/AAAAAABkAAAAMgAAAAAAAABkAAAAAAAAAH9/fwAKAAAAHwAAAFQAAAAAAAAFAAAAAQAAAAAAAAAAAAAAAAAAAAAAAAAAAAAAAAAAAAAAAAAAAAAAAn9/fwAAAAADzMzMAMDA/wB/f38AAAAAAAAAAAAAAAAAAAAAAAAAAAAhAAAAGAAAABQAAAAaAwAAfRMAAFUeAABDHgAAEAAAACYAAAAIAAAAPaAAAAAAAAA="/>
               </a:ext>
             </a:extLst>
           </p:cNvSpPr>
@@ -534,7 +559,7 @@
             <a:spLocks noGrp="1" noChangeArrowheads="1"/>
             <a:extLst>
               <a:ext uri="smNativeData">
-                <pr:smNativeData xmlns:pr="smNativeData" val="SMDATA_13_47fkXxMAAAAlAAAAZAAAAA0AAAAAAAAAAAAAAAAAAAAAAAAAAAAAAAAAAAAAAAAAAAEAAABQAAAAAAAAAAAA4D8AAAAAAADgPwAAAAAAAOA/AAAAAAAA4D8AAAAAAADgPwAAAAAAAOA/AAAAAAAA4D8AAAAAAADgPwAAAAAAAOA/AAAAAAAA4D8CAAAAjAAAAAAAAAAAAAAAT4G9DP///wgAAAAAAAAAAAAAAAAAAAAAAAAAAAAAAAAAAAAAZAAAAAEAAABAAAAAAAAAAAAAAAAAAAAAAAAAAAAAAAAAAAAAAAAAAAAAAAAAAAAAAAAAAAAAAAAAAAAAAAAAAAAAAAAAAAAAAAAAAAAAAAAAAAAAAAAAAAAAAAAAAAAAFAAAADwAAAAAAAAAAAAAAAAAAAkUAAAAAQAAABQAAAAUAAAAFAAAAAEAAAAAAAAAZAAAAGQAAAAAAAAAZAAAAGQAAAAVAAAAYAAAAAAAAAAAAAAADwAAACADAAAAAAAAAAAAAAEAAACgMgAAVgcAAKr4//8BAAAAf39/AAEAAABkAAAAAAAAABQAAABAHwAAAAAAACYAAAAAAAAAwOD//wAAAAAmAAAAZAAAABYAAABMAAAAAAAAAAAAAAAEAAAAAAAAAAEAAADu7OEKAAAAACgAAAAoAAAAZAAAAGQAAAAAAAAAzMzMAAAAAABQAAAAUAAAAGQAAABkAAAAAAAAABcAAAAUAAAAAAAAAAAAAAD/fwAA/38AAAAAAAAJAAAABAAAAAAAAAAMAAAAEAAAAAAAAAAAAAAAAAAAAAAAAAAeAAAAaAAAAAAAAAAAAAAAAAAAAAAAAAAAAAAAECcAABAnAAAAAAAAAAAAAAAAAAAAAAAAAAAAAAAAAAAAAAAAAAAAABQAAAAAAAAAwMD/AAAAAABkAAAAMgAAAAAAAABkAAAAAAAAAH9/fwAKAAAAHwAAAFQAAAAAAAAFAAAAAQAAAAAAAAAAAAAAAAAAAAAAAAAAAAAAAAAAAAAAAAAAAAAAAn9/fwAAAAADzMzMAMDA/wB/f38AAAAAAAAAAAAAAAAAAAAAAAAAAAAhAAAAGAAAABQAAACyHwAAfRMAAO46AABDHgAAEAAAACYAAAAIAAAAPaAAAAAAAAA="/>
+                <pr:smNativeData xmlns="" xmlns:p14="http://schemas.microsoft.com/office/powerpoint/2010/main" xmlns:pr="smNativeData" val="SMDATA_13_47fkXxMAAAAlAAAAZAAAAA0AAAAAAAAAAAAAAAAAAAAAAAAAAAAAAAAAAAAAAAAAAAEAAABQAAAAAAAAAAAA4D8AAAAAAADgPwAAAAAAAOA/AAAAAAAA4D8AAAAAAADgPwAAAAAAAOA/AAAAAAAA4D8AAAAAAADgPwAAAAAAAOA/AAAAAAAA4D8CAAAAjAAAAAAAAAAAAAAAT4G9DP///wgAAAAAAAAAAAAAAAAAAAAAAAAAAAAAAAAAAAAAZAAAAAEAAABAAAAAAAAAAAAAAAAAAAAAAAAAAAAAAAAAAAAAAAAAAAAAAAAAAAAAAAAAAAAAAAAAAAAAAAAAAAAAAAAAAAAAAAAAAAAAAAAAAAAAAAAAAAAAAAAAAAAAFAAAADwAAAAAAAAAAAAAAAAAAAkUAAAAAQAAABQAAAAUAAAAFAAAAAEAAAAAAAAAZAAAAGQAAAAAAAAAZAAAAGQAAAAVAAAAYAAAAAAAAAAAAAAADwAAACADAAAAAAAAAAAAAAEAAACgMgAAVgcAAKr4//8BAAAAf39/AAEAAABkAAAAAAAAABQAAABAHwAAAAAAACYAAAAAAAAAwOD//wAAAAAmAAAAZAAAABYAAABMAAAAAAAAAAAAAAAEAAAAAAAAAAEAAADu7OEKAAAAACgAAAAoAAAAZAAAAGQAAAAAAAAAzMzMAAAAAABQAAAAUAAAAGQAAABkAAAAAAAAABcAAAAUAAAAAAAAAAAAAAD/fwAA/38AAAAAAAAJAAAABAAAAAAAAAAMAAAAEAAAAAAAAAAAAAAAAAAAAAAAAAAeAAAAaAAAAAAAAAAAAAAAAAAAAAAAAAAAAAAAECcAABAnAAAAAAAAAAAAAAAAAAAAAAAAAAAAAAAAAAAAAAAAAAAAABQAAAAAAAAAwMD/AAAAAABkAAAAMgAAAAAAAABkAAAAAAAAAH9/fwAKAAAAHwAAAFQAAAAAAAAFAAAAAQAAAAAAAAAAAAAAAAAAAAAAAAAAAAAAAAAAAAAAAAAAAAAAAn9/fwAAAAADzMzMAMDA/wB/f38AAAAAAAAAAAAAAAAAAAAAAAAAAAAhAAAAGAAAABQAAACyHwAAfRMAAO46AABDHgAAEAAAACYAAAAIAAAAPaAAAAAAAAA="/>
               </a:ext>
             </a:extLst>
           </p:cNvSpPr>
@@ -592,7 +617,7 @@
             <a:spLocks noGrp="1" noChangeArrowheads="1"/>
             <a:extLst>
               <a:ext uri="smNativeData">
-                <pr:smNativeData xmlns:pr="smNativeData" val="SMDATA_13_47fkXxMAAAAlAAAAZAAAAA0AAAAAAAAAAAAAAAAAAAAAAAAAAAAAAAAAAAAAAAAAAAEAAABQAAAAAAAAAAAA4D8AAAAAAADgPwAAAAAAAOA/AAAAAAAA4D8AAAAAAADgPwAAAAAAAOA/AAAAAAAA4D8AAAAAAADgPwAAAAAAAOA/AAAAAAAA4D8CAAAAjAAAAAAAAAAAAAAAT4G9DP///wgAAAAAAAAAAAAAAAAAAAAAAAAAAAAAAAAAAAAAZAAAAAEAAABAAAAAAAAAAAAAAAAAAAAAAAAAAAAAAAAAAAAAAAAAAAAAAAAAAAAAAAAAAAAAAAAAAAAAAAAAAAAAAAAAAAAAAAAAAAAAAAAAAAAAAAAAAAAAAAAAAAAAFAAAADwAAAAAAAAAAAAAAAAAAAkUAAAAAQAAABQAAAAUAAAAFAAAAAEAAAAAAAAAZAAAAGQAAAAAAAAAZAAAAGQAAAAVAAAAYAAAAAAAAAAAAAAADwAAACADAAAAAAAAAAAAAAEAAACgMgAAVgcAAKr4//8BAAAAf39/AAEAAABkAAAAAAAAABQAAABAHwAAAAAAACYAAAAAAAAAwOD//wAAAAAmAAAAZAAAABYAAABMAAAAAAAAAAAAAAAEAAAAAAAAAAEAAADu7OEKAAAAACgAAAAoAAAAZAAAAGQAAAAAAAAAzMzMAAAAAABQAAAAUAAAAGQAAABkAAAAAAAAABcAAAAUAAAAAAAAAAAAAAD/fwAA/38AAAAAAAAJAAAABAAAAAAAAAAMAAAAEAAAAAAAAAAAAAAAAAAAAAAAAAAeAAAAaAAAAAAAAAAAAAAAAAAAAAAAAAAAAAAAECcAABAnAAAAAAAAAAAAAAAAAAAAAAAAAAAAAAAAAAAAAAAAAAAAABQAAAAAAAAAwMD/AAAAAABkAAAAMgAAAAAAAABkAAAAAAAAAH9/fwAKAAAAHwAAAFQAAAAAAAAFAAAAAQAAAAAAAAAAAAAAAAAAAAAAAAAAAAAAAAAAAAAAAAAAAAAAAn9/fwAAAAADzMzMAMDA/wB/f38AAAAAAAAAAAAAAAAAAAAAAAAAAAAhAAAAGAAAABQAAAAaAwAASh8AAFUeAAAQKgAAEAAAACYAAAAIAAAAPaAAAAAAAAA="/>
+                <pr:smNativeData xmlns="" xmlns:p14="http://schemas.microsoft.com/office/powerpoint/2010/main" xmlns:pr="smNativeData" val="SMDATA_13_47fkXxMAAAAlAAAAZAAAAA0AAAAAAAAAAAAAAAAAAAAAAAAAAAAAAAAAAAAAAAAAAAEAAABQAAAAAAAAAAAA4D8AAAAAAADgPwAAAAAAAOA/AAAAAAAA4D8AAAAAAADgPwAAAAAAAOA/AAAAAAAA4D8AAAAAAADgPwAAAAAAAOA/AAAAAAAA4D8CAAAAjAAAAAAAAAAAAAAAT4G9DP///wgAAAAAAAAAAAAAAAAAAAAAAAAAAAAAAAAAAAAAZAAAAAEAAABAAAAAAAAAAAAAAAAAAAAAAAAAAAAAAAAAAAAAAAAAAAAAAAAAAAAAAAAAAAAAAAAAAAAAAAAAAAAAAAAAAAAAAAAAAAAAAAAAAAAAAAAAAAAAAAAAAAAAFAAAADwAAAAAAAAAAAAAAAAAAAkUAAAAAQAAABQAAAAUAAAAFAAAAAEAAAAAAAAAZAAAAGQAAAAAAAAAZAAAAGQAAAAVAAAAYAAAAAAAAAAAAAAADwAAACADAAAAAAAAAAAAAAEAAACgMgAAVgcAAKr4//8BAAAAf39/AAEAAABkAAAAAAAAABQAAABAHwAAAAAAACYAAAAAAAAAwOD//wAAAAAmAAAAZAAAABYAAABMAAAAAAAAAAAAAAAEAAAAAAAAAAEAAADu7OEKAAAAACgAAAAoAAAAZAAAAGQAAAAAAAAAzMzMAAAAAABQAAAAUAAAAGQAAABkAAAAAAAAABcAAAAUAAAAAAAAAAAAAAD/fwAA/38AAAAAAAAJAAAABAAAAAAAAAAMAAAAEAAAAAAAAAAAAAAAAAAAAAAAAAAeAAAAaAAAAAAAAAAAAAAAAAAAAAAAAAAAAAAAECcAABAnAAAAAAAAAAAAAAAAAAAAAAAAAAAAAAAAAAAAAAAAAAAAABQAAAAAAAAAwMD/AAAAAABkAAAAMgAAAAAAAABkAAAAAAAAAH9/fwAKAAAAHwAAAFQAAAAAAAAFAAAAAQAAAAAAAAAAAAAAAAAAAAAAAAAAAAAAAAAAAAAAAAAAAAAAAn9/fwAAAAADzMzMAMDA/wB/f38AAAAAAAAAAAAAAAAAAAAAAAAAAAAhAAAAGAAAABQAAAAaAwAASh8AAFUeAAAQKgAAEAAAACYAAAAIAAAAPaAAAAAAAAA="/>
               </a:ext>
             </a:extLst>
           </p:cNvSpPr>
@@ -650,7 +675,7 @@
             <a:spLocks noGrp="1" noChangeArrowheads="1"/>
             <a:extLst>
               <a:ext uri="smNativeData">
-                <pr:smNativeData xmlns:pr="smNativeData" val="SMDATA_13_47fkXxMAAAAlAAAAZAAAAA0AAAAAAAAAAAAAAAAAAAAAAAAAAAAAAAAAAAAAAAAAAAEAAABQAAAAAAAAAAAA4D8AAAAAAADgPwAAAAAAAOA/AAAAAAAA4D8AAAAAAADgPwAAAAAAAOA/AAAAAAAA4D8AAAAAAADgPwAAAAAAAOA/AAAAAAAA4D8CAAAAjAAAAAAAAAAAAAAAT4G9DP///wgAAAAAAAAAAAAAAAAAAAAAAAAAAAAAAAAAAAAAZAAAAAEAAABAAAAAAAAAAAAAAAAAAAAAAAAAAAAAAAAAAAAAAAAAAAAAAAAAAAAAAAAAAAAAAAAAAAAAAAAAAAAAAAAAAAAAAAAAAAAAAAAAAAAAAAAAAAAAAAAAAAAAFAAAADwAAAAAAAAAAAAAAAAAAAkUAAAAAQAAABQAAAAUAAAAFAAAAAEAAAAAAAAAZAAAAGQAAAAAAAAAZAAAAGQAAAAVAAAAYAAAAAAAAAAAAAAADwAAACADAAAAAAAAAAAAAAEAAACgMgAAVgcAAKr4//8BAAAAf39/AAEAAABkAAAAAAAAABQAAABAHwAAAAAAACYAAAAAAAAAwOD//wAAAAAmAAAAZAAAABYAAABMAAAAAAAAAAAAAAAEAAAAAAAAAAEAAADu7OEKAAAAACgAAAAoAAAAZAAAAGQAAAAAAAAAzMzMAAAAAABQAAAAUAAAAGQAAABkAAAAAAAAABcAAAAUAAAAAAAAAAAAAAD/fwAA/38AAAAAAAAJAAAABAAAAAAAAAAMAAAAEAAAAAAAAAAAAAAAAAAAAAAAAAAeAAAAaAAAAAAAAAAAAAAAAAAAAAAAAAAAAAAAECcAABAnAAAAAAAAAAAAAAAAAAAAAAAAAAAAAAAAAAAAAAAAAAAAABQAAAAAAAAAwMD/AAAAAABkAAAAMgAAAAAAAABkAAAAAAAAAH9/fwAKAAAAHwAAAFQAAAAAAAAFAAAAAQAAAAAAAAAAAAAAAAAAAAAAAAAAAAAAAAAAAAAAAAAAAAAAAn9/fwAAAAADzMzMAMDA/wB/f38AAAAAAAAAAAAAAAAAAAAAAAAAAAAhAAAAGAAAABQAAACyHwAASh8AAO46AAAQKgAAEAAAACYAAAAIAAAAPaAAAAAAAAA="/>
+                <pr:smNativeData xmlns="" xmlns:p14="http://schemas.microsoft.com/office/powerpoint/2010/main" xmlns:pr="smNativeData" val="SMDATA_13_47fkXxMAAAAlAAAAZAAAAA0AAAAAAAAAAAAAAAAAAAAAAAAAAAAAAAAAAAAAAAAAAAEAAABQAAAAAAAAAAAA4D8AAAAAAADgPwAAAAAAAOA/AAAAAAAA4D8AAAAAAADgPwAAAAAAAOA/AAAAAAAA4D8AAAAAAADgPwAAAAAAAOA/AAAAAAAA4D8CAAAAjAAAAAAAAAAAAAAAT4G9DP///wgAAAAAAAAAAAAAAAAAAAAAAAAAAAAAAAAAAAAAZAAAAAEAAABAAAAAAAAAAAAAAAAAAAAAAAAAAAAAAAAAAAAAAAAAAAAAAAAAAAAAAAAAAAAAAAAAAAAAAAAAAAAAAAAAAAAAAAAAAAAAAAAAAAAAAAAAAAAAAAAAAAAAFAAAADwAAAAAAAAAAAAAAAAAAAkUAAAAAQAAABQAAAAUAAAAFAAAAAEAAAAAAAAAZAAAAGQAAAAAAAAAZAAAAGQAAAAVAAAAYAAAAAAAAAAAAAAADwAAACADAAAAAAAAAAAAAAEAAACgMgAAVgcAAKr4//8BAAAAf39/AAEAAABkAAAAAAAAABQAAABAHwAAAAAAACYAAAAAAAAAwOD//wAAAAAmAAAAZAAAABYAAABMAAAAAAAAAAAAAAAEAAAAAAAAAAEAAADu7OEKAAAAACgAAAAoAAAAZAAAAGQAAAAAAAAAzMzMAAAAAABQAAAAUAAAAGQAAABkAAAAAAAAABcAAAAUAAAAAAAAAAAAAAD/fwAA/38AAAAAAAAJAAAABAAAAAAAAAAMAAAAEAAAAAAAAAAAAAAAAAAAAAAAAAAeAAAAaAAAAAAAAAAAAAAAAAAAAAAAAAAAAAAAECcAABAnAAAAAAAAAAAAAAAAAAAAAAAAAAAAAAAAAAAAAAAAAAAAABQAAAAAAAAAwMD/AAAAAABkAAAAMgAAAAAAAABkAAAAAAAAAH9/fwAKAAAAHwAAAFQAAAAAAAAFAAAAAQAAAAAAAAAAAAAAAAAAAAAAAAAAAAAAAAAAAAAAAAAAAAAAAn9/fwAAAAADzMzMAMDA/wB/f38AAAAAAAAAAAAAAAAAAAAAAAAAAAAhAAAAGAAAABQAAACyHwAASh8AAO46AAAQKgAAEAAAACYAAAAIAAAAPaAAAAAAAAA="/>
               </a:ext>
             </a:extLst>
           </p:cNvSpPr>
@@ -710,7 +735,7 @@
 </file>
 
 <file path=ppt/slideLayouts/slideLayout12.xml><?xml version="1.0" encoding="utf-8"?>
-<p:sldLayout xmlns:p="http://schemas.openxmlformats.org/presentationml/2006/main" xmlns:p14="http://schemas.microsoft.com/office/powerpoint/2010/main" xmlns:r="http://schemas.openxmlformats.org/officeDocument/2006/relationships" xmlns:a="http://schemas.openxmlformats.org/drawingml/2006/main" type="blank" preserve="1">
+<p:sldLayout xmlns:a="http://schemas.openxmlformats.org/drawingml/2006/main" xmlns:r="http://schemas.openxmlformats.org/officeDocument/2006/relationships" xmlns:p="http://schemas.openxmlformats.org/presentationml/2006/main" type="blank" preserve="1">
   <p:cSld name="Title, 6 Content">
     <p:spTree>
       <p:nvGrpSpPr>
@@ -733,7 +758,7 @@
             <a:spLocks noGrp="1" noChangeArrowheads="1"/>
             <a:extLst>
               <a:ext uri="smNativeData">
-                <pr:smNativeData xmlns:pr="smNativeData" val="SMDATA_13_47fkXxMAAAAlAAAAZAAAAA0AAAAAAAAAAAAAAAAAAAAAAAAAAAAAAAABAAAAAAAAAAEAAABQAAAAAAAAAAAA4D8AAAAAAADgPwAAAAAAAOA/AAAAAAAA4D8AAAAAAADgPwAAAAAAAOA/AAAAAAAA4D8AAAAAAADgPwAAAAAAAOA/AAAAAAAA4D8CAAAAjAAAAAAAAAAAAAAAT4G9DP///wgAAAAAAAAAAAAAAAAAAAAAAAAAAAAAAAAAAAAAZAAAAAEAAABAAAAAAAAAAAAAAAAAAAAAAAAAAAAAAAAAAAAAAAAAAAAAAAAAAAAAAAAAAAAAAAAAAAAAAAAAAAAAAAAAAAAAAAAAAAAAAAAAAAAAAAAAAAAAAAAAAAAAFAAAADwAAAAAAAAAAAAAAAAAAAkUAAAAAQAAABQAAAAUAAAAFAAAAAEAAAAAAAAAZAAAAGQAAAAAAAAAZAAAAGQAAAAVAAAAYAAAAAAAAAAAAAAADwAAACADAAAAAAAAAAAAAAEAAACgMgAAVgcAAKr4//8BAAAAf39/AAEAAABkAAAAAAAAABQAAABAHwAAAAAAACYAAAAAAAAAwOD//wAAAAAmAAAAZAAAABYAAABMAAAAAAAAAAAAAAAEAAAAAAAAAAEAAADu7OEKAAAAACgAAAAoAAAAZAAAAGQAAAAAAAAAzMzMAAAAAABQAAAAUAAAAGQAAABkAAAAAAAAABcAAAAUAAAAAAAAAAAAAAD/fwAA/38AAAAAAAAJAAAABAAAAAAAAAAMAAAAEAAAAAAAAAAAAAAAAAAAAAAAAAAeAAAAaAAAAAAAAAAAAAAAAAAAAAAAAAAAAAAAECcAABAnAAAAAAAAAAAAAAAAAAAAAAAAAAAAAAAAAAAAAAAAAAAAABQAAAAAAAAAwMD/AAAAAABkAAAAMgAAAAAAAABkAAAAAAAAAH9/fwAKAAAAHwAAAFQAAAAAAAAFAAAAAQAAAAAAAAAAAAAAAAAAAAAAAAAAAAAAAAAAAAAAAAAAAAAAAn9/fwAAAAADzMzMAMDA/wB/f38AAAAAAAAAAAAAAAAAAAAAAAAAAAAhAAAAGAAAABQAAAAaAwAApQYAAOg6AABGEQAAEAAAACYAAAAIAAAAPKAAAAAAAAA="/>
+                <pr:smNativeData xmlns="" xmlns:p14="http://schemas.microsoft.com/office/powerpoint/2010/main" xmlns:pr="smNativeData" val="SMDATA_13_47fkXxMAAAAlAAAAZAAAAA0AAAAAAAAAAAAAAAAAAAAAAAAAAAAAAAABAAAAAAAAAAEAAABQAAAAAAAAAAAA4D8AAAAAAADgPwAAAAAAAOA/AAAAAAAA4D8AAAAAAADgPwAAAAAAAOA/AAAAAAAA4D8AAAAAAADgPwAAAAAAAOA/AAAAAAAA4D8CAAAAjAAAAAAAAAAAAAAAT4G9DP///wgAAAAAAAAAAAAAAAAAAAAAAAAAAAAAAAAAAAAAZAAAAAEAAABAAAAAAAAAAAAAAAAAAAAAAAAAAAAAAAAAAAAAAAAAAAAAAAAAAAAAAAAAAAAAAAAAAAAAAAAAAAAAAAAAAAAAAAAAAAAAAAAAAAAAAAAAAAAAAAAAAAAAFAAAADwAAAAAAAAAAAAAAAAAAAkUAAAAAQAAABQAAAAUAAAAFAAAAAEAAAAAAAAAZAAAAGQAAAAAAAAAZAAAAGQAAAAVAAAAYAAAAAAAAAAAAAAADwAAACADAAAAAAAAAAAAAAEAAACgMgAAVgcAAKr4//8BAAAAf39/AAEAAABkAAAAAAAAABQAAABAHwAAAAAAACYAAAAAAAAAwOD//wAAAAAmAAAAZAAAABYAAABMAAAAAAAAAAAAAAAEAAAAAAAAAAEAAADu7OEKAAAAACgAAAAoAAAAZAAAAGQAAAAAAAAAzMzMAAAAAABQAAAAUAAAAGQAAABkAAAAAAAAABcAAAAUAAAAAAAAAAAAAAD/fwAA/38AAAAAAAAJAAAABAAAAAAAAAAMAAAAEAAAAAAAAAAAAAAAAAAAAAAAAAAeAAAAaAAAAAAAAAAAAAAAAAAAAAAAAAAAAAAAECcAABAnAAAAAAAAAAAAAAAAAAAAAAAAAAAAAAAAAAAAAAAAAAAAABQAAAAAAAAAwMD/AAAAAABkAAAAMgAAAAAAAABkAAAAAAAAAH9/fwAKAAAAHwAAAFQAAAAAAAAFAAAAAQAAAAAAAAAAAAAAAAAAAAAAAAAAAAAAAAAAAAAAAAAAAAAAAn9/fwAAAAADzMzMAMDA/wB/f38AAAAAAAAAAAAAAAAAAAAAAAAAAAAhAAAAGAAAABQAAAAaAwAApQYAAOg6AABGEQAAEAAAACYAAAAIAAAAPKAAAAAAAAA="/>
               </a:ext>
             </a:extLst>
           </p:cNvSpPr>
@@ -768,7 +793,7 @@
             <a:spLocks noGrp="1" noChangeArrowheads="1"/>
             <a:extLst>
               <a:ext uri="smNativeData">
-                <pr:smNativeData xmlns:pr="smNativeData" val="SMDATA_13_47fkXxMAAAAlAAAAZAAAAA0AAAAAAAAAAAAAAAAAAAAAAAAAAAAAAAAAAAAAAAAAAAEAAABQAAAAAAAAAAAA4D8AAAAAAADgPwAAAAAAAOA/AAAAAAAA4D8AAAAAAADgPwAAAAAAAOA/AAAAAAAA4D8AAAAAAADgPwAAAAAAAOA/AAAAAAAA4D8CAAAAjAAAAAAAAAAAAAAAT4G9DP///wgAAAAAAAAAAAAAAAAAAAAAAAAAAAAAAAAAAAAAZAAAAAEAAABAAAAAAAAAAAAAAAAAAAAAAAAAAAAAAAAAAAAAAAAAAAAAAAAAAAAAAAAAAAAAAAAAAAAAAAAAAAAAAAAAAAAAAAAAAAAAAAAAAAAAAAAAAAAAAAAAAAAAFAAAADwAAAAAAAAAAAAAAAAAAAkUAAAAAQAAABQAAAAUAAAAFAAAAAEAAAAAAAAAZAAAAGQAAAAAAAAAZAAAAGQAAAAVAAAAYAAAAAAAAAAAAAAADwAAACADAAAAAAAAAAAAAAEAAACgMgAAVgcAAKr4//8BAAAAf39/AAEAAABkAAAAAAAAABQAAABAHwAAAAAAACYAAAAAAAAAwOD//wAAAAAmAAAAZAAAABYAAABMAAAAAAAAAAAAAAAEAAAAAAAAAAEAAADu7OEKAAAAACgAAAAoAAAAZAAAAGQAAAAAAAAAzMzMAAAAAABQAAAAUAAAAGQAAABkAAAAAAAAABcAAAAUAAAAAAAAAAAAAAD/fwAA/38AAAAAAAAJAAAABAAAAAAAAAAMAAAAEAAAAAAAAAAAAAAAAAAAAAAAAAAeAAAAaAAAAAAAAAAAAAAAAAAAAAAAAAAAAAAAECcAABAnAAAAAAAAAAAAAAAAAAAAAAAAAAAAAAAAAAAAAAAAAAAAABQAAAAAAAAAwMD/AAAAAABkAAAAMgAAAAAAAABkAAAAAAAAAH9/fwAKAAAAHwAAAFQAAAAAAAAFAAAAAQAAAAAAAAAAAAAAAAAAAAAAAAAAAAAAAAAAAAAAAAAAAAAAAn9/fwAAAAADzMzMAMDA/wB/f38AAAAAAAAAAAAAAAAAAAAAAAAAAAAhAAAAGAAAABQAAAAaAwAAfRMAABEVAABDHgAAEAAAACYAAAAIAAAAPaAAAAAAAAA="/>
+                <pr:smNativeData xmlns="" xmlns:p14="http://schemas.microsoft.com/office/powerpoint/2010/main" xmlns:pr="smNativeData" val="SMDATA_13_47fkXxMAAAAlAAAAZAAAAA0AAAAAAAAAAAAAAAAAAAAAAAAAAAAAAAAAAAAAAAAAAAEAAABQAAAAAAAAAAAA4D8AAAAAAADgPwAAAAAAAOA/AAAAAAAA4D8AAAAAAADgPwAAAAAAAOA/AAAAAAAA4D8AAAAAAADgPwAAAAAAAOA/AAAAAAAA4D8CAAAAjAAAAAAAAAAAAAAAT4G9DP///wgAAAAAAAAAAAAAAAAAAAAAAAAAAAAAAAAAAAAAZAAAAAEAAABAAAAAAAAAAAAAAAAAAAAAAAAAAAAAAAAAAAAAAAAAAAAAAAAAAAAAAAAAAAAAAAAAAAAAAAAAAAAAAAAAAAAAAAAAAAAAAAAAAAAAAAAAAAAAAAAAAAAAFAAAADwAAAAAAAAAAAAAAAAAAAkUAAAAAQAAABQAAAAUAAAAFAAAAAEAAAAAAAAAZAAAAGQAAAAAAAAAZAAAAGQAAAAVAAAAYAAAAAAAAAAAAAAADwAAACADAAAAAAAAAAAAAAEAAACgMgAAVgcAAKr4//8BAAAAf39/AAEAAABkAAAAAAAAABQAAABAHwAAAAAAACYAAAAAAAAAwOD//wAAAAAmAAAAZAAAABYAAABMAAAAAAAAAAAAAAAEAAAAAAAAAAEAAADu7OEKAAAAACgAAAAoAAAAZAAAAGQAAAAAAAAAzMzMAAAAAABQAAAAUAAAAGQAAABkAAAAAAAAABcAAAAUAAAAAAAAAAAAAAD/fwAA/38AAAAAAAAJAAAABAAAAAAAAAAMAAAAEAAAAAAAAAAAAAAAAAAAAAAAAAAeAAAAaAAAAAAAAAAAAAAAAAAAAAAAAAAAAAAAECcAABAnAAAAAAAAAAAAAAAAAAAAAAAAAAAAAAAAAAAAAAAAAAAAABQAAAAAAAAAwMD/AAAAAABkAAAAMgAAAAAAAABkAAAAAAAAAH9/fwAKAAAAHwAAAFQAAAAAAAAFAAAAAQAAAAAAAAAAAAAAAAAAAAAAAAAAAAAAAAAAAAAAAAAAAAAAAn9/fwAAAAADzMzMAMDA/wB/f38AAAAAAAAAAAAAAAAAAAAAAAAAAAAhAAAAGAAAABQAAAAaAwAAfRMAABEVAABDHgAAEAAAACYAAAAIAAAAPaAAAAAAAAA="/>
               </a:ext>
             </a:extLst>
           </p:cNvSpPr>
@@ -826,7 +851,7 @@
             <a:spLocks noGrp="1" noChangeArrowheads="1"/>
             <a:extLst>
               <a:ext uri="smNativeData">
-                <pr:smNativeData xmlns:pr="smNativeData" val="SMDATA_13_47fkXxMAAAAlAAAAZAAAAA0AAAAAAAAAAAAAAAAAAAAAAAAAAAAAAAAAAAAAAAAAAAEAAABQAAAAAAAAAAAA4D8AAAAAAADgPwAAAAAAAOA/AAAAAAAA4D8AAAAAAADgPwAAAAAAAOA/AAAAAAAA4D8AAAAAAADgPwAAAAAAAOA/AAAAAAAA4D8CAAAAjAAAAAAAAAAAAAAAT4G9DP///wgAAAAAAAAAAAAAAAAAAAAAAAAAAAAAAAAAAAAAZAAAAAEAAABAAAAAAAAAAAAAAAAAAAAAAAAAAAAAAAAAAAAAAAAAAAAAAAAAAAAAAAAAAAAAAAAAAAAAAAAAAAAAAAAAAAAAAAAAAAAAAAAAAAAAAAAAAAAAAAAAAAAAFAAAADwAAAAAAAAAAAAAAAAAAAkUAAAAAQAAABQAAAAUAAAAFAAAAAEAAAAAAAAAZAAAAGQAAAAAAAAAZAAAAGQAAAAVAAAAYAAAAAAAAAAAAAAADwAAACADAAAAAAAAAAAAAAEAAACgMgAAVgcAAKr4//8BAAAAf39/AAEAAABkAAAAAAAAABQAAABAHwAAAAAAACYAAAAAAAAAwOD//wAAAAAmAAAAZAAAABYAAABMAAAAAAAAAAAAAAAEAAAAAAAAAAEAAADu7OEKAAAAACgAAAAoAAAAZAAAAGQAAAAAAAAAzMzMAAAAAABQAAAAUAAAAGQAAABkAAAAAAAAABcAAAAUAAAAAAAAAAAAAAD/fwAA/38AAAAAAAAJAAAABAAAAAAAAAAMAAAAEAAAAAAAAAAAAAAAAAAAAAAAAAAeAAAAaAAAAAAAAAAAAAAAAAAAAAAAAAAAAAAAECcAABAnAAAAAAAAAAAAAAAAAAAAAAAAAAAAAAAAAAAAAAAAAAAAABQAAAAAAAAAwMD/AAAAAABkAAAAMgAAAAAAAABkAAAAAAAAAH9/fwAKAAAAHwAAAFQAAAAAAAAFAAAAAQAAAAAAAAAAAAAAAAAAAAAAAAAAAAAAAAAAAAAAAAAAAAAAAn9/fwAAAAADzMzMAMDA/wB/f38AAAAAAAAAAAAAAAAAAAAAAAAAAAAhAAAAGAAAABQAAAD4FQAAfRMAAO8nAABDHgAAEAAAACYAAAAIAAAAPaAAAAAAAAA="/>
+                <pr:smNativeData xmlns="" xmlns:p14="http://schemas.microsoft.com/office/powerpoint/2010/main" xmlns:pr="smNativeData" val="SMDATA_13_47fkXxMAAAAlAAAAZAAAAA0AAAAAAAAAAAAAAAAAAAAAAAAAAAAAAAAAAAAAAAAAAAEAAABQAAAAAAAAAAAA4D8AAAAAAADgPwAAAAAAAOA/AAAAAAAA4D8AAAAAAADgPwAAAAAAAOA/AAAAAAAA4D8AAAAAAADgPwAAAAAAAOA/AAAAAAAA4D8CAAAAjAAAAAAAAAAAAAAAT4G9DP///wgAAAAAAAAAAAAAAAAAAAAAAAAAAAAAAAAAAAAAZAAAAAEAAABAAAAAAAAAAAAAAAAAAAAAAAAAAAAAAAAAAAAAAAAAAAAAAAAAAAAAAAAAAAAAAAAAAAAAAAAAAAAAAAAAAAAAAAAAAAAAAAAAAAAAAAAAAAAAAAAAAAAAFAAAADwAAAAAAAAAAAAAAAAAAAkUAAAAAQAAABQAAAAUAAAAFAAAAAEAAAAAAAAAZAAAAGQAAAAAAAAAZAAAAGQAAAAVAAAAYAAAAAAAAAAAAAAADwAAACADAAAAAAAAAAAAAAEAAACgMgAAVgcAAKr4//8BAAAAf39/AAEAAABkAAAAAAAAABQAAABAHwAAAAAAACYAAAAAAAAAwOD//wAAAAAmAAAAZAAAABYAAABMAAAAAAAAAAAAAAAEAAAAAAAAAAEAAADu7OEKAAAAACgAAAAoAAAAZAAAAGQAAAAAAAAAzMzMAAAAAABQAAAAUAAAAGQAAABkAAAAAAAAABcAAAAUAAAAAAAAAAAAAAD/fwAA/38AAAAAAAAJAAAABAAAAAAAAAAMAAAAEAAAAAAAAAAAAAAAAAAAAAAAAAAeAAAAaAAAAAAAAAAAAAAAAAAAAAAAAAAAAAAAECcAABAnAAAAAAAAAAAAAAAAAAAAAAAAAAAAAAAAAAAAAAAAAAAAABQAAAAAAAAAwMD/AAAAAABkAAAAMgAAAAAAAABkAAAAAAAAAH9/fwAKAAAAHwAAAFQAAAAAAAAFAAAAAQAAAAAAAAAAAAAAAAAAAAAAAAAAAAAAAAAAAAAAAAAAAAAAAn9/fwAAAAADzMzMAMDA/wB/f38AAAAAAAAAAAAAAAAAAAAAAAAAAAAhAAAAGAAAABQAAAD4FQAAfRMAAO8nAABDHgAAEAAAACYAAAAIAAAAPaAAAAAAAAA="/>
               </a:ext>
             </a:extLst>
           </p:cNvSpPr>
@@ -884,7 +909,7 @@
             <a:spLocks noGrp="1" noChangeArrowheads="1"/>
             <a:extLst>
               <a:ext uri="smNativeData">
-                <pr:smNativeData xmlns:pr="smNativeData" val="SMDATA_13_47fkXxMAAAAlAAAAZAAAAA0AAAAAAAAAAAAAAAAAAAAAAAAAAAAAAAAAAAAAAAAAAAEAAABQAAAAAAAAAAAA4D8AAAAAAADgPwAAAAAAAOA/AAAAAAAA4D8AAAAAAADgPwAAAAAAAOA/AAAAAAAA4D8AAAAAAADgPwAAAAAAAOA/AAAAAAAA4D8CAAAAjAAAAAAAAAAAAAAAT4G9DP///wgAAAAAAAAAAAAAAAAAAAAAAAAAAAAAAAAAAAAAZAAAAAEAAABAAAAAAAAAAAAAAAAAAAAAAAAAAAAAAAAAAAAAAAAAAAAAAAAAAAAAAAAAAAAAAAAAAAAAAAAAAAAAAAAAAAAAAAAAAAAAAAAAAAAAAAAAAAAAAAAAAAAAFAAAADwAAAAAAAAAAAAAAAAAAAkUAAAAAQAAABQAAAAUAAAAFAAAAAEAAAAAAAAAZAAAAGQAAAAAAAAAZAAAAGQAAAAVAAAAYAAAAAAAAAAAAAAADwAAACADAAAAAAAAAAAAAAEAAACgMgAAVgcAAKr4//8BAAAAf39/AAEAAABkAAAAAAAAABQAAABAHwAAAAAAACYAAAAAAAAAwOD//wAAAAAmAAAAZAAAABYAAABMAAAAAAAAAAAAAAAEAAAAAAAAAAEAAADu7OEKAAAAACgAAAAoAAAAZAAAAGQAAAAAAAAAzMzMAAAAAABQAAAAUAAAAGQAAABkAAAAAAAAABcAAAAUAAAAAAAAAAAAAAD/fwAA/38AAAAAAAAJAAAABAAAAAAAAAAMAAAAEAAAAAAAAAAAAAAAAAAAAAAAAAAeAAAAaAAAAAAAAAAAAAAAAAAAAAAAAAAAAAAAECcAABAnAAAAAAAAAAAAAAAAAAAAAAAAAAAAAAAAAAAAAAAAAAAAABQAAAAAAAAAwMD/AAAAAABkAAAAMgAAAAAAAABkAAAAAAAAAH9/fwAKAAAAHwAAAFQAAAAAAAAFAAAAAQAAAAAAAAAAAAAAAAAAAAAAAAAAAAAAAAAAAAAAAAAAAAAAAn9/fwAAAAADzMzMAMDA/wB/f38AAAAAAAAAAAAAAAAAAAAAAAAAAAAhAAAAGAAAABQAAADWKAAAfRMAAM06AABDHgAAEAAAACYAAAAIAAAAPaAAAAAAAAA="/>
+                <pr:smNativeData xmlns="" xmlns:p14="http://schemas.microsoft.com/office/powerpoint/2010/main" xmlns:pr="smNativeData" val="SMDATA_13_47fkXxMAAAAlAAAAZAAAAA0AAAAAAAAAAAAAAAAAAAAAAAAAAAAAAAAAAAAAAAAAAAEAAABQAAAAAAAAAAAA4D8AAAAAAADgPwAAAAAAAOA/AAAAAAAA4D8AAAAAAADgPwAAAAAAAOA/AAAAAAAA4D8AAAAAAADgPwAAAAAAAOA/AAAAAAAA4D8CAAAAjAAAAAAAAAAAAAAAT4G9DP///wgAAAAAAAAAAAAAAAAAAAAAAAAAAAAAAAAAAAAAZAAAAAEAAABAAAAAAAAAAAAAAAAAAAAAAAAAAAAAAAAAAAAAAAAAAAAAAAAAAAAAAAAAAAAAAAAAAAAAAAAAAAAAAAAAAAAAAAAAAAAAAAAAAAAAAAAAAAAAAAAAAAAAFAAAADwAAAAAAAAAAAAAAAAAAAkUAAAAAQAAABQAAAAUAAAAFAAAAAEAAAAAAAAAZAAAAGQAAAAAAAAAZAAAAGQAAAAVAAAAYAAAAAAAAAAAAAAADwAAACADAAAAAAAAAAAAAAEAAACgMgAAVgcAAKr4//8BAAAAf39/AAEAAABkAAAAAAAAABQAAABAHwAAAAAAACYAAAAAAAAAwOD//wAAAAAmAAAAZAAAABYAAABMAAAAAAAAAAAAAAAEAAAAAAAAAAEAAADu7OEKAAAAACgAAAAoAAAAZAAAAGQAAAAAAAAAzMzMAAAAAABQAAAAUAAAAGQAAABkAAAAAAAAABcAAAAUAAAAAAAAAAAAAAD/fwAA/38AAAAAAAAJAAAABAAAAAAAAAAMAAAAEAAAAAAAAAAAAAAAAAAAAAAAAAAeAAAAaAAAAAAAAAAAAAAAAAAAAAAAAAAAAAAAECcAABAnAAAAAAAAAAAAAAAAAAAAAAAAAAAAAAAAAAAAAAAAAAAAABQAAAAAAAAAwMD/AAAAAABkAAAAMgAAAAAAAABkAAAAAAAAAH9/fwAKAAAAHwAAAFQAAAAAAAAFAAAAAQAAAAAAAAAAAAAAAAAAAAAAAAAAAAAAAAAAAAAAAAAAAAAAAn9/fwAAAAADzMzMAMDA/wB/f38AAAAAAAAAAAAAAAAAAAAAAAAAAAAhAAAAGAAAABQAAADWKAAAfRMAAM06AABDHgAAEAAAACYAAAAIAAAAPaAAAAAAAAA="/>
               </a:ext>
             </a:extLst>
           </p:cNvSpPr>
@@ -942,7 +967,7 @@
             <a:spLocks noGrp="1" noChangeArrowheads="1"/>
             <a:extLst>
               <a:ext uri="smNativeData">
-                <pr:smNativeData xmlns:pr="smNativeData" val="SMDATA_13_47fkXxMAAAAlAAAAZAAAAA0AAAAAAAAAAAAAAAAAAAAAAAAAAAAAAAAAAAAAAAAAAAEAAABQAAAAAAAAAAAA4D8AAAAAAADgPwAAAAAAAOA/AAAAAAAA4D8AAAAAAADgPwAAAAAAAOA/AAAAAAAA4D8AAAAAAADgPwAAAAAAAOA/AAAAAAAA4D8CAAAAjAAAAAAAAAAAAAAAT4G9DP///wgAAAAAAAAAAAAAAAAAAAAAAAAAAAAAAAAAAAAAZAAAAAEAAABAAAAAAAAAAAAAAAAAAAAAAAAAAAAAAAAAAAAAAAAAAAAAAAAAAAAAAAAAAAAAAAAAAAAAAAAAAAAAAAAAAAAAAAAAAAAAAAAAAAAAAAAAAAAAAAAAAAAAFAAAADwAAAAAAAAAAAAAAAAAAAkUAAAAAQAAABQAAAAUAAAAFAAAAAEAAAAAAAAAZAAAAGQAAAAAAAAAZAAAAGQAAAAVAAAAYAAAAAAAAAAAAAAADwAAACADAAAAAAAAAAAAAAEAAACgMgAAVgcAAKr4//8BAAAAf39/AAEAAABkAAAAAAAAABQAAABAHwAAAAAAACYAAAAAAAAAwOD//wAAAAAmAAAAZAAAABYAAABMAAAAAAAAAAAAAAAEAAAAAAAAAAEAAADu7OEKAAAAACgAAAAoAAAAZAAAAGQAAAAAAAAAzMzMAAAAAABQAAAAUAAAAGQAAABkAAAAAAAAABcAAAAUAAAAAAAAAAAAAAD/fwAA/38AAAAAAAAJAAAABAAAAAAAAAAMAAAAEAAAAAAAAAAAAAAAAAAAAAAAAAAeAAAAaAAAAAAAAAAAAAAAAAAAAAAAAAAAAAAAECcAABAnAAAAAAAAAAAAAAAAAAAAAAAAAAAAAAAAAAAAAAAAAAAAABQAAAAAAAAAwMD/AAAAAABkAAAAMgAAAAAAAABkAAAAAAAAAH9/fwAKAAAAHwAAAFQAAAAAAAAFAAAAAQAAAAAAAAAAAAAAAAAAAAAAAAAAAAAAAAAAAAAAAAAAAAAAAn9/fwAAAAADzMzMAMDA/wB/f38AAAAAAAAAAAAAAAAAAAAAAAAAAAAhAAAAGAAAABQAAAAaAwAASh8AABEVAAAQKgAAEAAAACYAAAAIAAAAPaAAAAAAAAA="/>
+                <pr:smNativeData xmlns="" xmlns:p14="http://schemas.microsoft.com/office/powerpoint/2010/main" xmlns:pr="smNativeData" val="SMDATA_13_47fkXxMAAAAlAAAAZAAAAA0AAAAAAAAAAAAAAAAAAAAAAAAAAAAAAAAAAAAAAAAAAAEAAABQAAAAAAAAAAAA4D8AAAAAAADgPwAAAAAAAOA/AAAAAAAA4D8AAAAAAADgPwAAAAAAAOA/AAAAAAAA4D8AAAAAAADgPwAAAAAAAOA/AAAAAAAA4D8CAAAAjAAAAAAAAAAAAAAAT4G9DP///wgAAAAAAAAAAAAAAAAAAAAAAAAAAAAAAAAAAAAAZAAAAAEAAABAAAAAAAAAAAAAAAAAAAAAAAAAAAAAAAAAAAAAAAAAAAAAAAAAAAAAAAAAAAAAAAAAAAAAAAAAAAAAAAAAAAAAAAAAAAAAAAAAAAAAAAAAAAAAAAAAAAAAFAAAADwAAAAAAAAAAAAAAAAAAAkUAAAAAQAAABQAAAAUAAAAFAAAAAEAAAAAAAAAZAAAAGQAAAAAAAAAZAAAAGQAAAAVAAAAYAAAAAAAAAAAAAAADwAAACADAAAAAAAAAAAAAAEAAACgMgAAVgcAAKr4//8BAAAAf39/AAEAAABkAAAAAAAAABQAAABAHwAAAAAAACYAAAAAAAAAwOD//wAAAAAmAAAAZAAAABYAAABMAAAAAAAAAAAAAAAEAAAAAAAAAAEAAADu7OEKAAAAACgAAAAoAAAAZAAAAGQAAAAAAAAAzMzMAAAAAABQAAAAUAAAAGQAAABkAAAAAAAAABcAAAAUAAAAAAAAAAAAAAD/fwAA/38AAAAAAAAJAAAABAAAAAAAAAAMAAAAEAAAAAAAAAAAAAAAAAAAAAAAAAAeAAAAaAAAAAAAAAAAAAAAAAAAAAAAAAAAAAAAECcAABAnAAAAAAAAAAAAAAAAAAAAAAAAAAAAAAAAAAAAAAAAAAAAABQAAAAAAAAAwMD/AAAAAABkAAAAMgAAAAAAAABkAAAAAAAAAH9/fwAKAAAAHwAAAFQAAAAAAAAFAAAAAQAAAAAAAAAAAAAAAAAAAAAAAAAAAAAAAAAAAAAAAAAAAAAAAn9/fwAAAAADzMzMAMDA/wB/f38AAAAAAAAAAAAAAAAAAAAAAAAAAAAhAAAAGAAAABQAAAAaAwAASh8AABEVAAAQKgAAEAAAACYAAAAIAAAAPaAAAAAAAAA="/>
               </a:ext>
             </a:extLst>
           </p:cNvSpPr>
@@ -1000,7 +1025,7 @@
             <a:spLocks noGrp="1" noChangeArrowheads="1"/>
             <a:extLst>
               <a:ext uri="smNativeData">
-                <pr:smNativeData xmlns:pr="smNativeData" val="SMDATA_13_47fkXxMAAAAlAAAAZAAAAA0AAAAAAAAAAAAAAAAAAAAAAAAAAAAAAAAAAAAAAAAAAAEAAABQAAAAAAAAAAAA4D8AAAAAAADgPwAAAAAAAOA/AAAAAAAA4D8AAAAAAADgPwAAAAAAAOA/AAAAAAAA4D8AAAAAAADgPwAAAAAAAOA/AAAAAAAA4D8CAAAAjAAAAAAAAAAAAAAAT4G9DP///wgAAAAAAAAAAAAAAAAAAAAAAAAAAAAAAAAAAAAAZAAAAAEAAABAAAAAAAAAAAAAAAAAAAAAAAAAAAAAAAAAAAAAAAAAAAAAAAAAAAAAAAAAAAAAAAAAAAAAAAAAAAAAAAAAAAAAAAAAAAAAAAAAAAAAAAAAAAAAAAAAAAAAFAAAADwAAAAAAAAAAAAAAAAAAAkUAAAAAQAAABQAAAAUAAAAFAAAAAEAAAAAAAAAZAAAAGQAAAAAAAAAZAAAAGQAAAAVAAAAYAAAAAAAAAAAAAAADwAAACADAAAAAAAAAAAAAAEAAACgMgAAVgcAAKr4//8BAAAAf39/AAEAAABkAAAAAAAAABQAAABAHwAAAAAAACYAAAAAAAAAwOD//wAAAAAmAAAAZAAAABYAAABMAAAAAAAAAAAAAAAEAAAAAAAAAAEAAADu7OEKAAAAACgAAAAoAAAAZAAAAGQAAAAAAAAAzMzMAAAAAABQAAAAUAAAAGQAAABkAAAAAAAAABcAAAAUAAAAAAAAAAAAAAD/fwAA/38AAAAAAAAJAAAABAAAAAAAAAAMAAAAEAAAAAAAAAAAAAAAAAAAAAAAAAAeAAAAaAAAAAAAAAAAAAAAAAAAAAAAAAAAAAAAECcAABAnAAAAAAAAAAAAAAAAAAAAAAAAAAAAAAAAAAAAAAAAAAAAABQAAAAAAAAAwMD/AAAAAABkAAAAMgAAAAAAAABkAAAAAAAAAH9/fwAKAAAAHwAAAFQAAAAAAAAFAAAAAQAAAAAAAAAAAAAAAAAAAAAAAAAAAAAAAAAAAAAAAAAAAAAAAn9/fwAAAAADzMzMAMDA/wB/f38AAAAAAAAAAAAAAAAAAAAAAAAAAAAhAAAAGAAAABQAAAD4FQAASh8AAO8nAAAQKgAAEAAAACYAAAAIAAAAPaAAAAAAAAA="/>
+                <pr:smNativeData xmlns="" xmlns:p14="http://schemas.microsoft.com/office/powerpoint/2010/main" xmlns:pr="smNativeData" val="SMDATA_13_47fkXxMAAAAlAAAAZAAAAA0AAAAAAAAAAAAAAAAAAAAAAAAAAAAAAAAAAAAAAAAAAAEAAABQAAAAAAAAAAAA4D8AAAAAAADgPwAAAAAAAOA/AAAAAAAA4D8AAAAAAADgPwAAAAAAAOA/AAAAAAAA4D8AAAAAAADgPwAAAAAAAOA/AAAAAAAA4D8CAAAAjAAAAAAAAAAAAAAAT4G9DP///wgAAAAAAAAAAAAAAAAAAAAAAAAAAAAAAAAAAAAAZAAAAAEAAABAAAAAAAAAAAAAAAAAAAAAAAAAAAAAAAAAAAAAAAAAAAAAAAAAAAAAAAAAAAAAAAAAAAAAAAAAAAAAAAAAAAAAAAAAAAAAAAAAAAAAAAAAAAAAAAAAAAAAFAAAADwAAAAAAAAAAAAAAAAAAAkUAAAAAQAAABQAAAAUAAAAFAAAAAEAAAAAAAAAZAAAAGQAAAAAAAAAZAAAAGQAAAAVAAAAYAAAAAAAAAAAAAAADwAAACADAAAAAAAAAAAAAAEAAACgMgAAVgcAAKr4//8BAAAAf39/AAEAAABkAAAAAAAAABQAAABAHwAAAAAAACYAAAAAAAAAwOD//wAAAAAmAAAAZAAAABYAAABMAAAAAAAAAAAAAAAEAAAAAAAAAAEAAADu7OEKAAAAACgAAAAoAAAAZAAAAGQAAAAAAAAAzMzMAAAAAABQAAAAUAAAAGQAAABkAAAAAAAAABcAAAAUAAAAAAAAAAAAAAD/fwAA/38AAAAAAAAJAAAABAAAAAAAAAAMAAAAEAAAAAAAAAAAAAAAAAAAAAAAAAAeAAAAaAAAAAAAAAAAAAAAAAAAAAAAAAAAAAAAECcAABAnAAAAAAAAAAAAAAAAAAAAAAAAAAAAAAAAAAAAAAAAAAAAABQAAAAAAAAAwMD/AAAAAABkAAAAMgAAAAAAAABkAAAAAAAAAH9/fwAKAAAAHwAAAFQAAAAAAAAFAAAAAQAAAAAAAAAAAAAAAAAAAAAAAAAAAAAAAAAAAAAAAAAAAAAAAn9/fwAAAAADzMzMAMDA/wB/f38AAAAAAAAAAAAAAAAAAAAAAAAAAAAhAAAAGAAAABQAAAD4FQAASh8AAO8nAAAQKgAAEAAAACYAAAAIAAAAPaAAAAAAAAA="/>
               </a:ext>
             </a:extLst>
           </p:cNvSpPr>
@@ -1058,7 +1083,7 @@
             <a:spLocks noGrp="1" noChangeArrowheads="1"/>
             <a:extLst>
               <a:ext uri="smNativeData">
-                <pr:smNativeData xmlns:pr="smNativeData" val="SMDATA_13_47fkXxMAAAAlAAAAZAAAAA0AAAAAAAAAAAAAAAAAAAAAAAAAAAAAAAAAAAAAAAAAAAEAAABQAAAAAAAAAAAA4D8AAAAAAADgPwAAAAAAAOA/AAAAAAAA4D8AAAAAAADgPwAAAAAAAOA/AAAAAAAA4D8AAAAAAADgPwAAAAAAAOA/AAAAAAAA4D8CAAAAjAAAAAAAAAAAAAAAT4G9DP///wgAAAAAAAAAAAAAAAAAAAAAAAAAAAAAAAAAAAAAZAAAAAEAAABAAAAAAAAAAAAAAAAAAAAAAAAAAAAAAAAAAAAAAAAAAAAAAAAAAAAAAAAAAAAAAAAAAAAAAAAAAAAAAAAAAAAAAAAAAAAAAAAAAAAAAAAAAAAAAAAAAAAAFAAAADwAAAAAAAAAAAAAAAAAAAkUAAAAAQAAABQAAAAUAAAAFAAAAAEAAAAAAAAAZAAAAGQAAAAAAAAAZAAAAGQAAAAVAAAAYAAAAAAAAAAAAAAADwAAACADAAAAAAAAAAAAAAEAAACgMgAAVgcAAKr4//8BAAAAf39/AAEAAABkAAAAAAAAABQAAABAHwAAAAAAACYAAAAAAAAAwOD//wAAAAAmAAAAZAAAABYAAABMAAAAAAAAAAAAAAAEAAAAAAAAAAEAAADu7OEKAAAAACgAAAAoAAAAZAAAAGQAAAAAAAAAzMzMAAAAAABQAAAAUAAAAGQAAABkAAAAAAAAABcAAAAUAAAAAAAAAAAAAAD/fwAA/38AAAAAAAAJAAAABAAAAAAAAAAMAAAAEAAAAAAAAAAAAAAAAAAAAAAAAAAeAAAAaAAAAAAAAAAAAAAAAAAAAAAAAAAAAAAAECcAABAnAAAAAAAAAAAAAAAAAAAAAAAAAAAAAAAAAAAAAAAAAAAAABQAAAAAAAAAwMD/AAAAAABkAAAAMgAAAAAAAABkAAAAAAAAAH9/fwAKAAAAHwAAAFQAAAAAAAAFAAAAAQAAAAAAAAAAAAAAAAAAAAAAAAAAAAAAAAAAAAAAAAAAAAAAAn9/fwAAAAADzMzMAMDA/wB/f38AAAAAAAAAAAAAAAAAAAAAAAAAAAAhAAAAGAAAABQAAADWKAAASh8AAM06AAAQKgAAEAAAACYAAAAIAAAAPaAAAAAAAAA="/>
+                <pr:smNativeData xmlns="" xmlns:p14="http://schemas.microsoft.com/office/powerpoint/2010/main" xmlns:pr="smNativeData" val="SMDATA_13_47fkXxMAAAAlAAAAZAAAAA0AAAAAAAAAAAAAAAAAAAAAAAAAAAAAAAAAAAAAAAAAAAEAAABQAAAAAAAAAAAA4D8AAAAAAADgPwAAAAAAAOA/AAAAAAAA4D8AAAAAAADgPwAAAAAAAOA/AAAAAAAA4D8AAAAAAADgPwAAAAAAAOA/AAAAAAAA4D8CAAAAjAAAAAAAAAAAAAAAT4G9DP///wgAAAAAAAAAAAAAAAAAAAAAAAAAAAAAAAAAAAAAZAAAAAEAAABAAAAAAAAAAAAAAAAAAAAAAAAAAAAAAAAAAAAAAAAAAAAAAAAAAAAAAAAAAAAAAAAAAAAAAAAAAAAAAAAAAAAAAAAAAAAAAAAAAAAAAAAAAAAAAAAAAAAAFAAAADwAAAAAAAAAAAAAAAAAAAkUAAAAAQAAABQAAAAUAAAAFAAAAAEAAAAAAAAAZAAAAGQAAAAAAAAAZAAAAGQAAAAVAAAAYAAAAAAAAAAAAAAADwAAACADAAAAAAAAAAAAAAEAAACgMgAAVgcAAKr4//8BAAAAf39/AAEAAABkAAAAAAAAABQAAABAHwAAAAAAACYAAAAAAAAAwOD//wAAAAAmAAAAZAAAABYAAABMAAAAAAAAAAAAAAAEAAAAAAAAAAEAAADu7OEKAAAAACgAAAAoAAAAZAAAAGQAAAAAAAAAzMzMAAAAAABQAAAAUAAAAGQAAABkAAAAAAAAABcAAAAUAAAAAAAAAAAAAAD/fwAA/38AAAAAAAAJAAAABAAAAAAAAAAMAAAAEAAAAAAAAAAAAAAAAAAAAAAAAAAeAAAAaAAAAAAAAAAAAAAAAAAAAAAAAAAAAAAAECcAABAnAAAAAAAAAAAAAAAAAAAAAAAAAAAAAAAAAAAAAAAAAAAAABQAAAAAAAAAwMD/AAAAAABkAAAAMgAAAAAAAABkAAAAAAAAAH9/fwAKAAAAHwAAAFQAAAAAAAAFAAAAAQAAAAAAAAAAAAAAAAAAAAAAAAAAAAAAAAAAAAAAAAAAAAAAAn9/fwAAAAADzMzMAMDA/wB/f38AAAAAAAAAAAAAAAAAAAAAAAAAAAAhAAAAGAAAABQAAADWKAAASh8AAM06AAAQKgAAEAAAACYAAAAIAAAAPaAAAAAAAAA="/>
               </a:ext>
             </a:extLst>
           </p:cNvSpPr>
@@ -1118,7 +1143,7 @@
 </file>
 
 <file path=ppt/slideLayouts/slideLayout13.xml><?xml version="1.0" encoding="utf-8"?>
-<p:sldLayout xmlns:p="http://schemas.openxmlformats.org/presentationml/2006/main" xmlns:p14="http://schemas.microsoft.com/office/powerpoint/2010/main" xmlns:r="http://schemas.openxmlformats.org/officeDocument/2006/relationships" xmlns:a="http://schemas.openxmlformats.org/drawingml/2006/main" type="blank" preserve="1">
+<p:sldLayout xmlns:a="http://schemas.openxmlformats.org/drawingml/2006/main" xmlns:r="http://schemas.openxmlformats.org/officeDocument/2006/relationships" xmlns:p="http://schemas.openxmlformats.org/presentationml/2006/main" type="blank" preserve="1">
   <p:cSld name="Blank Slide">
     <p:spTree>
       <p:nvGrpSpPr>
@@ -1143,7 +1168,7 @@
 </file>
 
 <file path=ppt/slideLayouts/slideLayout14.xml><?xml version="1.0" encoding="utf-8"?>
-<p:sldLayout xmlns:p="http://schemas.openxmlformats.org/presentationml/2006/main" xmlns:p14="http://schemas.microsoft.com/office/powerpoint/2010/main" xmlns:r="http://schemas.openxmlformats.org/officeDocument/2006/relationships" xmlns:a="http://schemas.openxmlformats.org/drawingml/2006/main" type="tx" preserve="1">
+<p:sldLayout xmlns:a="http://schemas.openxmlformats.org/drawingml/2006/main" xmlns:r="http://schemas.openxmlformats.org/officeDocument/2006/relationships" xmlns:p="http://schemas.openxmlformats.org/presentationml/2006/main" type="tx" preserve="1">
   <p:cSld name="Title Slide">
     <p:spTree>
       <p:nvGrpSpPr>
@@ -1166,7 +1191,7 @@
             <a:spLocks noGrp="1" noChangeArrowheads="1"/>
             <a:extLst>
               <a:ext uri="smNativeData">
-                <pr:smNativeData xmlns:pr="smNativeData" val="SMDATA_13_47fkXxMAAAAlAAAAZAAAAA0AAAAAAAAAAAAAAAAAAAAAAAAAAAAAAAABAAAAAAAAAAEAAABQAAAAAAAAAAAA4D8AAAAAAADgPwAAAAAAAOA/AAAAAAAA4D8AAAAAAADgPwAAAAAAAOA/AAAAAAAA4D8AAAAAAADgPwAAAAAAAOA/AAAAAAAA4D8CAAAAjAAAAAAAAAAAAAAAT4G9DP///wgAAAAAAAAAAAAAAAAAAAAAAAAAAAAAAAAAAAAAZAAAAAEAAABAAAAAAAAAAAAAAAAAAAAAAAAAAAAAAAAAAAAAAAAAAAAAAAAAAAAAAAAAAAAAAAAAAAAAAAAAAAAAAAAAAAAAAAAAAAAAAAAAAAAAAAAAAAAAAAAAAAAAFAAAADwAAAAAAAAAAAAAAAAAAAkUAAAAAQAAABQAAAAUAAAAFAAAAAEAAAAAAAAAZAAAAGQAAAAAAAAAZAAAAGQAAAAVAAAAYAAAAAAAAAAAAAAADwAAACADAAAAAAAAAAAAAAEAAACgMgAAVgcAAKr4//8BAAAAf39/AAEAAABkAAAAAAAAABQAAABAHwAAAAAAACYAAAAAAAAAwOD//wAAAAAmAAAAZAAAABYAAABMAAAAAAAAAAAAAAAEAAAAAAAAAAEAAADu7OEKAAAAACgAAAAoAAAAZAAAAGQAAAAAAAAAzMzMAAAAAABQAAAAUAAAAGQAAABkAAAAAAAAABcAAAAUAAAAAAAAAAAAAAD/fwAA/38AAAAAAAAJAAAABAAAAAAAAAAMAAAAEAAAAAAAAAAAAAAAAAAAAAAAAAAeAAAAaAAAAAAAAAAAAAAAAAAAAAAAAAAAAAAAECcAABAnAAAAAAAAAAAAAAAAAAAAAAAAAAAAAAAAAAAAAAAAAAAAABQAAAAAAAAAwMD/AAAAAABkAAAAMgAAAAAAAABkAAAAAAAAAH9/fwAKAAAAHwAAAFQAAAAAAAAFAAAAAQAAAAAAAAAAAAAAAAAAAAAAAAAAAAAAAAAAAAAAAAAAAAAAAn9/fwAAAAADzMzMAMDA/wB/f38AAAAAAAAAAAAAAAAAAAAAAAAAAAAhAAAAGAAAABQAAAAaAwAApQYAAOg6AABGEQAAEAAAACYAAAAIAAAAPaAAAAAAAAA="/>
+                <pr:smNativeData xmlns="" xmlns:p14="http://schemas.microsoft.com/office/powerpoint/2010/main" xmlns:pr="smNativeData" val="SMDATA_13_47fkXxMAAAAlAAAAZAAAAA0AAAAAAAAAAAAAAAAAAAAAAAAAAAAAAAABAAAAAAAAAAEAAABQAAAAAAAAAAAA4D8AAAAAAADgPwAAAAAAAOA/AAAAAAAA4D8AAAAAAADgPwAAAAAAAOA/AAAAAAAA4D8AAAAAAADgPwAAAAAAAOA/AAAAAAAA4D8CAAAAjAAAAAAAAAAAAAAAT4G9DP///wgAAAAAAAAAAAAAAAAAAAAAAAAAAAAAAAAAAAAAZAAAAAEAAABAAAAAAAAAAAAAAAAAAAAAAAAAAAAAAAAAAAAAAAAAAAAAAAAAAAAAAAAAAAAAAAAAAAAAAAAAAAAAAAAAAAAAAAAAAAAAAAAAAAAAAAAAAAAAAAAAAAAAFAAAADwAAAAAAAAAAAAAAAAAAAkUAAAAAQAAABQAAAAUAAAAFAAAAAEAAAAAAAAAZAAAAGQAAAAAAAAAZAAAAGQAAAAVAAAAYAAAAAAAAAAAAAAADwAAACADAAAAAAAAAAAAAAEAAACgMgAAVgcAAKr4//8BAAAAf39/AAEAAABkAAAAAAAAABQAAABAHwAAAAAAACYAAAAAAAAAwOD//wAAAAAmAAAAZAAAABYAAABMAAAAAAAAAAAAAAAEAAAAAAAAAAEAAADu7OEKAAAAACgAAAAoAAAAZAAAAGQAAAAAAAAAzMzMAAAAAABQAAAAUAAAAGQAAABkAAAAAAAAABcAAAAUAAAAAAAAAAAAAAD/fwAA/38AAAAAAAAJAAAABAAAAAAAAAAMAAAAEAAAAAAAAAAAAAAAAAAAAAAAAAAeAAAAaAAAAAAAAAAAAAAAAAAAAAAAAAAAAAAAECcAABAnAAAAAAAAAAAAAAAAAAAAAAAAAAAAAAAAAAAAAAAAAAAAABQAAAAAAAAAwMD/AAAAAABkAAAAMgAAAAAAAABkAAAAAAAAAH9/fwAKAAAAHwAAAFQAAAAAAAAFAAAAAQAAAAAAAAAAAAAAAAAAAAAAAAAAAAAAAAAAAAAAAAAAAAAAAn9/fwAAAAADzMzMAMDA/wB/f38AAAAAAAAAAAAAAAAAAAAAAAAAAAAhAAAAGAAAABQAAAAaAwAApQYAAOg6AABGEQAAEAAAACYAAAAIAAAAPaAAAAAAAAA="/>
               </a:ext>
             </a:extLst>
           </p:cNvSpPr>
@@ -1210,7 +1235,7 @@
             <a:spLocks noGrp="1" noChangeArrowheads="1"/>
             <a:extLst>
               <a:ext uri="smNativeData">
-                <pr:smNativeData xmlns:pr="smNativeData" val="SMDATA_13_47fkXxMAAAAlAAAAZAAAAA0AAAAAAAAAAAAAAAAAAAAAAAAAAAAAAAABAAAAAAAAAAEAAABQAAAAAAAAAAAA4D8AAAAAAADgPwAAAAAAAOA/AAAAAAAA4D8AAAAAAADgPwAAAAAAAOA/AAAAAAAA4D8AAAAAAADgPwAAAAAAAOA/AAAAAAAA4D8CAAAAjAAAAAAAAAAAAAAAT4G9DP///wgAAAAAAAAAAAAAAAAAAAAAAAAAAAAAAAAAAAAAZAAAAAEAAABAAAAAAAAAAAAAAAAAAAAAAAAAAAAAAAAAAAAAAAAAAAAAAAAAAAAAAAAAAAAAAAAAAAAAAAAAAAAAAAAAAAAAAAAAAAAAAAAAAAAAAAAAAAAAAAAAAAAAFAAAADwAAAAAAAAAAAAAAAAAAAkUAAAAAQAAABQAAAAUAAAAFAAAAAEAAAAAAAAAZAAAAGQAAAAAAAAAZAAAAGQAAAAVAAAAYAAAAAAAAAAAAAAADwAAACADAAAAAAAAAAAAAAEAAACgMgAAVgcAAKr4//8BAAAAf39/AAEAAABkAAAAAAAAABQAAABAHwAAAAAAACYAAAAAAAAAwOD//wAAAAAmAAAAZAAAABYAAABMAAAAAAAAAAAAAAAEAAAAAAAAAAEAAADu7OEKAAAAACgAAAAoAAAAZAAAAGQAAAAAAAAAzMzMAAAAAABQAAAAUAAAAGQAAABkAAAAAAAAABcAAAAUAAAAAAAAAAAAAAD/fwAA/38AAAAAAAAJAAAABAAAAAAAAAAMAAAAEAAAAAAAAAAAAAAAAAAAAAAAAAAeAAAAaAAAAAAAAAAAAAAAAAAAAAAAAAAAAAAAECcAABAnAAAAAAAAAAAAAAAAAAAAAAAAAAAAAAAAAAAAAAAAAAAAABQAAAAAAAAAwMD/AAAAAABkAAAAMgAAAAAAAABkAAAAAAAAAH9/fwAKAAAAHwAAAFQAAAAAAAAFAAAAAQAAAAAAAAAAAAAAAAAAAAAAAAAAAAAAAAAAAAAAAAAAAAAAAn9/fwAAAAADzMzMAMDA/wB/f38AAAAAAAAAAAAAAAAAAAAAAAAAAAAhAAAAGAAAABQAAAAaAwAAfRMAAOg6AAAUKgAAEAAAACYAAAAIAAAAvaAAAAAAAAA="/>
+                <pr:smNativeData xmlns="" xmlns:p14="http://schemas.microsoft.com/office/powerpoint/2010/main" xmlns:pr="smNativeData" val="SMDATA_13_47fkXxMAAAAlAAAAZAAAAA0AAAAAAAAAAAAAAAAAAAAAAAAAAAAAAAABAAAAAAAAAAEAAABQAAAAAAAAAAAA4D8AAAAAAADgPwAAAAAAAOA/AAAAAAAA4D8AAAAAAADgPwAAAAAAAOA/AAAAAAAA4D8AAAAAAADgPwAAAAAAAOA/AAAAAAAA4D8CAAAAjAAAAAAAAAAAAAAAT4G9DP///wgAAAAAAAAAAAAAAAAAAAAAAAAAAAAAAAAAAAAAZAAAAAEAAABAAAAAAAAAAAAAAAAAAAAAAAAAAAAAAAAAAAAAAAAAAAAAAAAAAAAAAAAAAAAAAAAAAAAAAAAAAAAAAAAAAAAAAAAAAAAAAAAAAAAAAAAAAAAAAAAAAAAAFAAAADwAAAAAAAAAAAAAAAAAAAkUAAAAAQAAABQAAAAUAAAAFAAAAAEAAAAAAAAAZAAAAGQAAAAAAAAAZAAAAGQAAAAVAAAAYAAAAAAAAAAAAAAADwAAACADAAAAAAAAAAAAAAEAAACgMgAAVgcAAKr4//8BAAAAf39/AAEAAABkAAAAAAAAABQAAABAHwAAAAAAACYAAAAAAAAAwOD//wAAAAAmAAAAZAAAABYAAABMAAAAAAAAAAAAAAAEAAAAAAAAAAEAAADu7OEKAAAAACgAAAAoAAAAZAAAAGQAAAAAAAAAzMzMAAAAAABQAAAAUAAAAGQAAABkAAAAAAAAABcAAAAUAAAAAAAAAAAAAAD/fwAA/38AAAAAAAAJAAAABAAAAAAAAAAMAAAAEAAAAAAAAAAAAAAAAAAAAAAAAAAeAAAAaAAAAAAAAAAAAAAAAAAAAAAAAAAAAAAAECcAABAnAAAAAAAAAAAAAAAAAAAAAAAAAAAAAAAAAAAAAAAAAAAAABQAAAAAAAAAwMD/AAAAAABkAAAAMgAAAAAAAABkAAAAAAAAAH9/fwAKAAAAHwAAAFQAAAAAAAAFAAAAAQAAAAAAAAAAAAAAAAAAAAAAAAAAAAAAAAAAAAAAAAAAAAAAAn9/fwAAAAADzMzMAMDA/wB/f38AAAAAAAAAAAAAAAAAAAAAAAAAAAAhAAAAGAAAABQAAAAaAwAAfRMAAOg6AAAUKgAAEAAAACYAAAAIAAAAvaAAAAAAAAA="/>
               </a:ext>
             </a:extLst>
           </p:cNvSpPr>
@@ -1274,7 +1299,7 @@
 </file>
 
 <file path=ppt/slideLayouts/slideLayout15.xml><?xml version="1.0" encoding="utf-8"?>
-<p:sldLayout xmlns:p="http://schemas.openxmlformats.org/presentationml/2006/main" xmlns:p14="http://schemas.microsoft.com/office/powerpoint/2010/main" xmlns:r="http://schemas.openxmlformats.org/officeDocument/2006/relationships" xmlns:a="http://schemas.openxmlformats.org/drawingml/2006/main" type="obj" preserve="1">
+<p:sldLayout xmlns:a="http://schemas.openxmlformats.org/drawingml/2006/main" xmlns:r="http://schemas.openxmlformats.org/officeDocument/2006/relationships" xmlns:p="http://schemas.openxmlformats.org/presentationml/2006/main" type="obj" preserve="1">
   <p:cSld name="Title, Content">
     <p:spTree>
       <p:nvGrpSpPr>
@@ -1297,7 +1322,7 @@
             <a:spLocks noGrp="1" noChangeArrowheads="1"/>
             <a:extLst>
               <a:ext uri="smNativeData">
-                <pr:smNativeData xmlns:pr="smNativeData" val="SMDATA_13_47fkXxMAAAAlAAAAZAAAAA0AAAAAAAAAAAAAAAAAAAAAAAAAAAAAAAABAAAAAAAAAAEAAABQAAAAAAAAAAAA4D8AAAAAAADgPwAAAAAAAOA/AAAAAAAA4D8AAAAAAADgPwAAAAAAAOA/AAAAAAAA4D8AAAAAAADgPwAAAAAAAOA/AAAAAAAA4D8CAAAAjAAAAAAAAAAAAAAAT4G9DP///wgAAAAAAAAAAAAAAAAAAAAAAAAAAAAAAAAAAAAAZAAAAAEAAABAAAAAAAAAAAAAAAAAAAAAAAAAAAAAAAAAAAAAAAAAAAAAAAAAAAAAAAAAAAAAAAAAAAAAAAAAAAAAAAAAAAAAAAAAAAAAAAAAAAAAAAAAAAAAAAAAAAAAFAAAADwAAAAAAAAAAAAAAAAAAAkUAAAAAQAAABQAAAAUAAAAFAAAAAEAAAAAAAAAZAAAAGQAAAAAAAAAZAAAAGQAAAAVAAAAYAAAAAAAAAAAAAAADwAAACADAAAAAAAAAAAAAAEAAACgMgAAVgcAAKr4//8BAAAAf39/AAEAAABkAAAAAAAAABQAAABAHwAAAAAAACYAAAAAAAAAwOD//wAAAAAmAAAAZAAAABYAAABMAAAAAAAAAAAAAAAEAAAAAAAAAAEAAADu7OEKAAAAACgAAAAoAAAAZAAAAGQAAAAAAAAAzMzMAAAAAABQAAAAUAAAAGQAAABkAAAAAAAAABcAAAAUAAAAAAAAAAAAAAD/fwAA/38AAAAAAAAJAAAABAAAAAAAAAAMAAAAEAAAAAAAAAAAAAAAAAAAAAAAAAAeAAAAaAAAAAAAAAAAAAAAAAAAAAAAAAAAAAAAECcAABAnAAAAAAAAAAAAAAAAAAAAAAAAAAAAAAAAAAAAAAAAAAAAABQAAAAAAAAAwMD/AAAAAABkAAAAMgAAAAAAAABkAAAAAAAAAH9/fwAKAAAAHwAAAFQAAAAAAAAFAAAAAQAAAAAAAAAAAAAAAAAAAAAAAAAAAAAAAAAAAAAAAAAAAAAAAn9/fwAAAAADzMzMAMDA/wB/f38AAAAAAAAAAAAAAAAAAAAAAAAAAAAhAAAAGAAAABQAAAAaAwAApQYAAOg6AABGEQAAEAAAACYAAAAIAAAAPaAAAAAAAAA="/>
+                <pr:smNativeData xmlns="" xmlns:p14="http://schemas.microsoft.com/office/powerpoint/2010/main" xmlns:pr="smNativeData" val="SMDATA_13_47fkXxMAAAAlAAAAZAAAAA0AAAAAAAAAAAAAAAAAAAAAAAAAAAAAAAABAAAAAAAAAAEAAABQAAAAAAAAAAAA4D8AAAAAAADgPwAAAAAAAOA/AAAAAAAA4D8AAAAAAADgPwAAAAAAAOA/AAAAAAAA4D8AAAAAAADgPwAAAAAAAOA/AAAAAAAA4D8CAAAAjAAAAAAAAAAAAAAAT4G9DP///wgAAAAAAAAAAAAAAAAAAAAAAAAAAAAAAAAAAAAAZAAAAAEAAABAAAAAAAAAAAAAAAAAAAAAAAAAAAAAAAAAAAAAAAAAAAAAAAAAAAAAAAAAAAAAAAAAAAAAAAAAAAAAAAAAAAAAAAAAAAAAAAAAAAAAAAAAAAAAAAAAAAAAFAAAADwAAAAAAAAAAAAAAAAAAAkUAAAAAQAAABQAAAAUAAAAFAAAAAEAAAAAAAAAZAAAAGQAAAAAAAAAZAAAAGQAAAAVAAAAYAAAAAAAAAAAAAAADwAAACADAAAAAAAAAAAAAAEAAACgMgAAVgcAAKr4//8BAAAAf39/AAEAAABkAAAAAAAAABQAAABAHwAAAAAAACYAAAAAAAAAwOD//wAAAAAmAAAAZAAAABYAAABMAAAAAAAAAAAAAAAEAAAAAAAAAAEAAADu7OEKAAAAACgAAAAoAAAAZAAAAGQAAAAAAAAAzMzMAAAAAABQAAAAUAAAAGQAAABkAAAAAAAAABcAAAAUAAAAAAAAAAAAAAD/fwAA/38AAAAAAAAJAAAABAAAAAAAAAAMAAAAEAAAAAAAAAAAAAAAAAAAAAAAAAAeAAAAaAAAAAAAAAAAAAAAAAAAAAAAAAAAAAAAECcAABAnAAAAAAAAAAAAAAAAAAAAAAAAAAAAAAAAAAAAAAAAAAAAABQAAAAAAAAAwMD/AAAAAABkAAAAMgAAAAAAAABkAAAAAAAAAH9/fwAKAAAAHwAAAFQAAAAAAAAFAAAAAQAAAAAAAAAAAAAAAAAAAAAAAAAAAAAAAAAAAAAAAAAAAAAAAn9/fwAAAAADzMzMAMDA/wB/f38AAAAAAAAAAAAAAAAAAAAAAAAAAAAhAAAAGAAAABQAAAAaAwAApQYAAOg6AABGEQAAEAAAACYAAAAIAAAAPaAAAAAAAAA="/>
               </a:ext>
             </a:extLst>
           </p:cNvSpPr>
@@ -1341,7 +1366,7 @@
             <a:spLocks noGrp="1" noChangeArrowheads="1"/>
             <a:extLst>
               <a:ext uri="smNativeData">
-                <pr:smNativeData xmlns:pr="smNativeData" val="SMDATA_13_47fkXxMAAAAlAAAAZAAAAA0AAAAAAAAAAAAAAAAAAAAAAAAAAAAAAAAAAAAAAAAAAAEAAABQAAAAAAAAAAAA4D8AAAAAAADgPwAAAAAAAOA/AAAAAAAA4D8AAAAAAADgPwAAAAAAAOA/AAAAAAAA4D8AAAAAAADgPwAAAAAAAOA/AAAAAAAA4D8CAAAAjAAAAAAAAAAAAAAAT4G9DP///wgAAAAAAAAAAAAAAAAAAAAAAAAAAAAAAAAAAAAAZAAAAAEAAABAAAAAAAAAAAAAAAAAAAAAAAAAAAAAAAAAAAAAAAAAAAAAAAAAAAAAAAAAAAAAAAAAAAAAAAAAAAAAAAAAAAAAAAAAAAAAAAAAAAAAAAAAAAAAAAAAAAAAFAAAADwAAAAAAAAAAAAAAAAAAAkUAAAAAQAAABQAAAAUAAAAFAAAAAEAAAAAAAAAZAAAAGQAAAAAAAAAZAAAAGQAAAAVAAAAYAAAAAAAAAAAAAAADwAAACADAAAAAAAAAAAAAAEAAACgMgAAVgcAAKr4//8BAAAAf39/AAEAAABkAAAAAAAAABQAAABAHwAAAAAAACYAAAAAAAAAwOD//wAAAAAmAAAAZAAAABYAAABMAAAAAAAAAAAAAAAEAAAAAAAAAAEAAADu7OEKAAAAACgAAAAoAAAAZAAAAGQAAAAAAAAAzMzMAAAAAABQAAAAUAAAAGQAAABkAAAAAAAAABcAAAAUAAAAAAAAAAAAAAD/fwAA/38AAAAAAAAJAAAABAAAAAAAAAAMAAAAEAAAAAAAAAAAAAAAAAAAAAAAAAAeAAAAaAAAAAAAAAAAAAAAAAAAAAAAAAAAAAAAECcAABAnAAAAAAAAAAAAAAAAAAAAAAAAAAAAAAAAAAAAAAAAAAAAABQAAAAAAAAAwMD/AAAAAABkAAAAMgAAAAAAAABkAAAAAAAAAH9/fwAKAAAAHwAAAFQAAAAAAAAFAAAAAQAAAAAAAAAAAAAAAAAAAAAAAAAAAAAAAAAAAAAAAAAAAAAAAn9/fwAAAAADzMzMAMDA/wB/f38AAAAAAAAAAAAAAAAAAAAAAAAAAAAhAAAAGAAAABQAAAAaAwAAfRMAAOg6AAAUKgAAEAAAACYAAAAIAAAAPaAAAAAAAAA="/>
+                <pr:smNativeData xmlns="" xmlns:p14="http://schemas.microsoft.com/office/powerpoint/2010/main" xmlns:pr="smNativeData" val="SMDATA_13_47fkXxMAAAAlAAAAZAAAAA0AAAAAAAAAAAAAAAAAAAAAAAAAAAAAAAAAAAAAAAAAAAEAAABQAAAAAAAAAAAA4D8AAAAAAADgPwAAAAAAAOA/AAAAAAAA4D8AAAAAAADgPwAAAAAAAOA/AAAAAAAA4D8AAAAAAADgPwAAAAAAAOA/AAAAAAAA4D8CAAAAjAAAAAAAAAAAAAAAT4G9DP///wgAAAAAAAAAAAAAAAAAAAAAAAAAAAAAAAAAAAAAZAAAAAEAAABAAAAAAAAAAAAAAAAAAAAAAAAAAAAAAAAAAAAAAAAAAAAAAAAAAAAAAAAAAAAAAAAAAAAAAAAAAAAAAAAAAAAAAAAAAAAAAAAAAAAAAAAAAAAAAAAAAAAAFAAAADwAAAAAAAAAAAAAAAAAAAkUAAAAAQAAABQAAAAUAAAAFAAAAAEAAAAAAAAAZAAAAGQAAAAAAAAAZAAAAGQAAAAVAAAAYAAAAAAAAAAAAAAADwAAACADAAAAAAAAAAAAAAEAAACgMgAAVgcAAKr4//8BAAAAf39/AAEAAABkAAAAAAAAABQAAABAHwAAAAAAACYAAAAAAAAAwOD//wAAAAAmAAAAZAAAABYAAABMAAAAAAAAAAAAAAAEAAAAAAAAAAEAAADu7OEKAAAAACgAAAAoAAAAZAAAAGQAAAAAAAAAzMzMAAAAAABQAAAAUAAAAGQAAABkAAAAAAAAABcAAAAUAAAAAAAAAAAAAAD/fwAA/38AAAAAAAAJAAAABAAAAAAAAAAMAAAAEAAAAAAAAAAAAAAAAAAAAAAAAAAeAAAAaAAAAAAAAAAAAAAAAAAAAAAAAAAAAAAAECcAABAnAAAAAAAAAAAAAAAAAAAAAAAAAAAAAAAAAAAAAAAAAAAAABQAAAAAAAAAwMD/AAAAAABkAAAAMgAAAAAAAABkAAAAAAAAAH9/fwAKAAAAHwAAAFQAAAAAAAAFAAAAAQAAAAAAAAAAAAAAAAAAAAAAAAAAAAAAAAAAAAAAAAAAAAAAAn9/fwAAAAADzMzMAMDA/wB/f38AAAAAAAAAAAAAAAAAAAAAAAAAAAAhAAAAGAAAABQAAAAaAwAAfRMAAOg6AAAUKgAAEAAAACYAAAAIAAAAPaAAAAAAAAA="/>
               </a:ext>
             </a:extLst>
           </p:cNvSpPr>
@@ -1405,7 +1430,7 @@
 </file>
 
 <file path=ppt/slideLayouts/slideLayout16.xml><?xml version="1.0" encoding="utf-8"?>
-<p:sldLayout xmlns:p="http://schemas.openxmlformats.org/presentationml/2006/main" xmlns:p14="http://schemas.microsoft.com/office/powerpoint/2010/main" xmlns:r="http://schemas.openxmlformats.org/officeDocument/2006/relationships" xmlns:a="http://schemas.openxmlformats.org/drawingml/2006/main" type="twoObj" preserve="1">
+<p:sldLayout xmlns:a="http://schemas.openxmlformats.org/drawingml/2006/main" xmlns:r="http://schemas.openxmlformats.org/officeDocument/2006/relationships" xmlns:p="http://schemas.openxmlformats.org/presentationml/2006/main" type="twoObj" preserve="1">
   <p:cSld name="Title, 2 Content">
     <p:spTree>
       <p:nvGrpSpPr>
@@ -1428,7 +1453,7 @@
             <a:spLocks noGrp="1" noChangeArrowheads="1"/>
             <a:extLst>
               <a:ext uri="smNativeData">
-                <pr:smNativeData xmlns:pr="smNativeData" val="SMDATA_13_47fkXxMAAAAlAAAAZAAAAA0AAAAAAAAAAAAAAAAAAAAAAAAAAAAAAAABAAAAAAAAAAEAAABQAAAAAAAAAAAA4D8AAAAAAADgPwAAAAAAAOA/AAAAAAAA4D8AAAAAAADgPwAAAAAAAOA/AAAAAAAA4D8AAAAAAADgPwAAAAAAAOA/AAAAAAAA4D8CAAAAjAAAAAAAAAAAAAAAT4G9DP///wgAAAAAAAAAAAAAAAAAAAAAAAAAAAAAAAAAAAAAZAAAAAEAAABAAAAAAAAAAAAAAAAAAAAAAAAAAAAAAAAAAAAAAAAAAAAAAAAAAAAAAAAAAAAAAAAAAAAAAAAAAAAAAAAAAAAAAAAAAAAAAAAAAAAAAAAAAAAAAAAAAAAAFAAAADwAAAAAAAAAAAAAAAAAAAkUAAAAAQAAABQAAAAUAAAAFAAAAAEAAAAAAAAAZAAAAGQAAAAAAAAAZAAAAGQAAAAVAAAAYAAAAAAAAAAAAAAADwAAACADAAAAAAAAAAAAAAEAAACgMgAAVgcAAKr4//8BAAAAf39/AAEAAABkAAAAAAAAABQAAABAHwAAAAAAACYAAAAAAAAAwOD//wAAAAAmAAAAZAAAABYAAABMAAAAAAAAAAAAAAAEAAAAAAAAAAEAAADu7OEKAAAAACgAAAAoAAAAZAAAAGQAAAAAAAAAzMzMAAAAAABQAAAAUAAAAGQAAABkAAAAAAAAABcAAAAUAAAAAAAAAAAAAAD/fwAA/38AAAAAAAAJAAAABAAAAAAAAAAMAAAAEAAAAAAAAAAAAAAAAAAAAAAAAAAeAAAAaAAAAAAAAAAAAAAAAAAAAAAAAAAAAAAAECcAABAnAAAAAAAAAAAAAAAAAAAAAAAAAAAAAAAAAAAAAAAAAAAAABQAAAAAAAAAwMD/AAAAAABkAAAAMgAAAAAAAABkAAAAAAAAAH9/fwAKAAAAHwAAAFQAAAAAAAAFAAAAAQAAAAAAAAAAAAAAAAAAAAAAAAAAAAAAAAAAAAAAAAAAAAAAAn9/fwAAAAADzMzMAMDA/wB/f38AAAAAAAAAAAAAAAAAAAAAAAAAAAAhAAAAGAAAABQAAAAaAwAApQYAAOg6AABGEQAAEAAAACYAAAAIAAAAPaAAAAAAAAA="/>
+                <pr:smNativeData xmlns="" xmlns:p14="http://schemas.microsoft.com/office/powerpoint/2010/main" xmlns:pr="smNativeData" val="SMDATA_13_47fkXxMAAAAlAAAAZAAAAA0AAAAAAAAAAAAAAAAAAAAAAAAAAAAAAAABAAAAAAAAAAEAAABQAAAAAAAAAAAA4D8AAAAAAADgPwAAAAAAAOA/AAAAAAAA4D8AAAAAAADgPwAAAAAAAOA/AAAAAAAA4D8AAAAAAADgPwAAAAAAAOA/AAAAAAAA4D8CAAAAjAAAAAAAAAAAAAAAT4G9DP///wgAAAAAAAAAAAAAAAAAAAAAAAAAAAAAAAAAAAAAZAAAAAEAAABAAAAAAAAAAAAAAAAAAAAAAAAAAAAAAAAAAAAAAAAAAAAAAAAAAAAAAAAAAAAAAAAAAAAAAAAAAAAAAAAAAAAAAAAAAAAAAAAAAAAAAAAAAAAAAAAAAAAAFAAAADwAAAAAAAAAAAAAAAAAAAkUAAAAAQAAABQAAAAUAAAAFAAAAAEAAAAAAAAAZAAAAGQAAAAAAAAAZAAAAGQAAAAVAAAAYAAAAAAAAAAAAAAADwAAACADAAAAAAAAAAAAAAEAAACgMgAAVgcAAKr4//8BAAAAf39/AAEAAABkAAAAAAAAABQAAABAHwAAAAAAACYAAAAAAAAAwOD//wAAAAAmAAAAZAAAABYAAABMAAAAAAAAAAAAAAAEAAAAAAAAAAEAAADu7OEKAAAAACgAAAAoAAAAZAAAAGQAAAAAAAAAzMzMAAAAAABQAAAAUAAAAGQAAABkAAAAAAAAABcAAAAUAAAAAAAAAAAAAAD/fwAA/38AAAAAAAAJAAAABAAAAAAAAAAMAAAAEAAAAAAAAAAAAAAAAAAAAAAAAAAeAAAAaAAAAAAAAAAAAAAAAAAAAAAAAAAAAAAAECcAABAnAAAAAAAAAAAAAAAAAAAAAAAAAAAAAAAAAAAAAAAAAAAAABQAAAAAAAAAwMD/AAAAAABkAAAAMgAAAAAAAABkAAAAAAAAAH9/fwAKAAAAHwAAAFQAAAAAAAAFAAAAAQAAAAAAAAAAAAAAAAAAAAAAAAAAAAAAAAAAAAAAAAAAAAAAAn9/fwAAAAADzMzMAMDA/wB/f38AAAAAAAAAAAAAAAAAAAAAAAAAAAAhAAAAGAAAABQAAAAaAwAApQYAAOg6AABGEQAAEAAAACYAAAAIAAAAPaAAAAAAAAA="/>
               </a:ext>
             </a:extLst>
           </p:cNvSpPr>
@@ -1472,7 +1497,7 @@
             <a:spLocks noGrp="1" noChangeArrowheads="1"/>
             <a:extLst>
               <a:ext uri="smNativeData">
-                <pr:smNativeData xmlns:pr="smNativeData" val="SMDATA_13_47fkXxMAAAAlAAAAZAAAAA0AAAAAAAAAAAAAAAAAAAAAAAAAAAAAAAAAAAAAAAAAAAEAAABQAAAAAAAAAAAA4D8AAAAAAADgPwAAAAAAAOA/AAAAAAAA4D8AAAAAAADgPwAAAAAAAOA/AAAAAAAA4D8AAAAAAADgPwAAAAAAAOA/AAAAAAAA4D8CAAAAjAAAAAAAAAAAAAAAT4G9DP///wgAAAAAAAAAAAAAAAAAAAAAAAAAAAAAAAAAAAAAZAAAAAEAAABAAAAAAAAAAAAAAAAAAAAAAAAAAAAAAAAAAAAAAAAAAAAAAAAAAAAAAAAAAAAAAAAAAAAAAAAAAAAAAAAAAAAAAAAAAAAAAAAAAAAAAAAAAAAAAAAAAAAAFAAAADwAAAAAAAAAAAAAAAAAAAkUAAAAAQAAABQAAAAUAAAAFAAAAAEAAAAAAAAAZAAAAGQAAAAAAAAAZAAAAGQAAAAVAAAAYAAAAAAAAAAAAAAADwAAACADAAAAAAAAAAAAAAEAAACgMgAAVgcAAKr4//8BAAAAf39/AAEAAABkAAAAAAAAABQAAABAHwAAAAAAACYAAAAAAAAAwOD//wAAAAAmAAAAZAAAABYAAABMAAAAAAAAAAAAAAAEAAAAAAAAAAEAAADu7OEKAAAAACgAAAAoAAAAZAAAAGQAAAAAAAAAzMzMAAAAAABQAAAAUAAAAGQAAABkAAAAAAAAABcAAAAUAAAAAAAAAAAAAAD/fwAA/38AAAAAAAAJAAAABAAAAAAAAAAMAAAAEAAAAAAAAAAAAAAAAAAAAAAAAAAeAAAAaAAAAAAAAAAAAAAAAAAAAAAAAAAAAAAAECcAABAnAAAAAAAAAAAAAAAAAAAAAAAAAAAAAAAAAAAAAAAAAAAAABQAAAAAAAAAwMD/AAAAAABkAAAAMgAAAAAAAABkAAAAAAAAAH9/fwAKAAAAHwAAAFQAAAAAAAAFAAAAAQAAAAAAAAAAAAAAAAAAAAAAAAAAAAAAAAAAAAAAAAAAAAAAAn9/fwAAAAADzMzMAMDA/wB/f38AAAAAAAAAAAAAAAAAAAAAAAAAAAAhAAAAGAAAABQAAAAaAwAAfRMAAFUeAAAUKgAAEAAAACYAAAAIAAAAPaAAAAAAAAA="/>
+                <pr:smNativeData xmlns="" xmlns:p14="http://schemas.microsoft.com/office/powerpoint/2010/main" xmlns:pr="smNativeData" val="SMDATA_13_47fkXxMAAAAlAAAAZAAAAA0AAAAAAAAAAAAAAAAAAAAAAAAAAAAAAAAAAAAAAAAAAAEAAABQAAAAAAAAAAAA4D8AAAAAAADgPwAAAAAAAOA/AAAAAAAA4D8AAAAAAADgPwAAAAAAAOA/AAAAAAAA4D8AAAAAAADgPwAAAAAAAOA/AAAAAAAA4D8CAAAAjAAAAAAAAAAAAAAAT4G9DP///wgAAAAAAAAAAAAAAAAAAAAAAAAAAAAAAAAAAAAAZAAAAAEAAABAAAAAAAAAAAAAAAAAAAAAAAAAAAAAAAAAAAAAAAAAAAAAAAAAAAAAAAAAAAAAAAAAAAAAAAAAAAAAAAAAAAAAAAAAAAAAAAAAAAAAAAAAAAAAAAAAAAAAFAAAADwAAAAAAAAAAAAAAAAAAAkUAAAAAQAAABQAAAAUAAAAFAAAAAEAAAAAAAAAZAAAAGQAAAAAAAAAZAAAAGQAAAAVAAAAYAAAAAAAAAAAAAAADwAAACADAAAAAAAAAAAAAAEAAACgMgAAVgcAAKr4//8BAAAAf39/AAEAAABkAAAAAAAAABQAAABAHwAAAAAAACYAAAAAAAAAwOD//wAAAAAmAAAAZAAAABYAAABMAAAAAAAAAAAAAAAEAAAAAAAAAAEAAADu7OEKAAAAACgAAAAoAAAAZAAAAGQAAAAAAAAAzMzMAAAAAABQAAAAUAAAAGQAAABkAAAAAAAAABcAAAAUAAAAAAAAAAAAAAD/fwAA/38AAAAAAAAJAAAABAAAAAAAAAAMAAAAEAAAAAAAAAAAAAAAAAAAAAAAAAAeAAAAaAAAAAAAAAAAAAAAAAAAAAAAAAAAAAAAECcAABAnAAAAAAAAAAAAAAAAAAAAAAAAAAAAAAAAAAAAAAAAAAAAABQAAAAAAAAAwMD/AAAAAABkAAAAMgAAAAAAAABkAAAAAAAAAH9/fwAKAAAAHwAAAFQAAAAAAAAFAAAAAQAAAAAAAAAAAAAAAAAAAAAAAAAAAAAAAAAAAAAAAAAAAAAAAn9/fwAAAAADzMzMAMDA/wB/f38AAAAAAAAAAAAAAAAAAAAAAAAAAAAhAAAAGAAAABQAAAAaAwAAfRMAAFUeAAAUKgAAEAAAACYAAAAIAAAAPaAAAAAAAAA="/>
               </a:ext>
             </a:extLst>
           </p:cNvSpPr>
@@ -1534,7 +1559,7 @@
             <a:spLocks noGrp="1" noChangeArrowheads="1"/>
             <a:extLst>
               <a:ext uri="smNativeData">
-                <pr:smNativeData xmlns:pr="smNativeData" val="SMDATA_13_47fkXxMAAAAlAAAAZAAAAA0AAAAAAAAAAAAAAAAAAAAAAAAAAAAAAAAAAAAAAAAAAAEAAABQAAAAAAAAAAAA4D8AAAAAAADgPwAAAAAAAOA/AAAAAAAA4D8AAAAAAADgPwAAAAAAAOA/AAAAAAAA4D8AAAAAAADgPwAAAAAAAOA/AAAAAAAA4D8CAAAAjAAAAAAAAAAAAAAAT4G9DP///wgAAAAAAAAAAAAAAAAAAAAAAAAAAAAAAAAAAAAAZAAAAAEAAABAAAAAAAAAAAAAAAAAAAAAAAAAAAAAAAAAAAAAAAAAAAAAAAAAAAAAAAAAAAAAAAAAAAAAAAAAAAAAAAAAAAAAAAAAAAAAAAAAAAAAAAAAAAAAAAAAAAAAFAAAADwAAAAAAAAAAAAAAAAAAAkUAAAAAQAAABQAAAAUAAAAFAAAAAEAAAAAAAAAZAAAAGQAAAAAAAAAZAAAAGQAAAAVAAAAYAAAAAAAAAAAAAAADwAAACADAAAAAAAAAAAAAAEAAACgMgAAVgcAAKr4//8BAAAAf39/AAEAAABkAAAAAAAAABQAAABAHwAAAAAAACYAAAAAAAAAwOD//wAAAAAmAAAAZAAAABYAAABMAAAAAAAAAAAAAAAEAAAAAAAAAAEAAADu7OEKAAAAACgAAAAoAAAAZAAAAGQAAAAAAAAAzMzMAAAAAABQAAAAUAAAAGQAAABkAAAAAAAAABcAAAAUAAAAAAAAAAAAAAD/fwAA/38AAAAAAAAJAAAABAAAAAAAAAAMAAAAEAAAAAAAAAAAAAAAAAAAAAAAAAAeAAAAaAAAAAAAAAAAAAAAAAAAAAAAAAAAAAAAECcAABAnAAAAAAAAAAAAAAAAAAAAAAAAAAAAAAAAAAAAAAAAAAAAABQAAAAAAAAAwMD/AAAAAABkAAAAMgAAAAAAAABkAAAAAAAAAH9/fwAKAAAAHwAAAFQAAAAAAAAFAAAAAQAAAAAAAAAAAAAAAAAAAAAAAAAAAAAAAAAAAAAAAAAAAAAAAn9/fwAAAAADzMzMAMDA/wB/f38AAAAAAAAAAAAAAAAAAAAAAAAAAAAhAAAAGAAAABQAAACyHwAAfRMAAO46AAAUKgAAEAAAACYAAAAIAAAAPaAAAAAAAAA="/>
+                <pr:smNativeData xmlns="" xmlns:p14="http://schemas.microsoft.com/office/powerpoint/2010/main" xmlns:pr="smNativeData" val="SMDATA_13_47fkXxMAAAAlAAAAZAAAAA0AAAAAAAAAAAAAAAAAAAAAAAAAAAAAAAAAAAAAAAAAAAEAAABQAAAAAAAAAAAA4D8AAAAAAADgPwAAAAAAAOA/AAAAAAAA4D8AAAAAAADgPwAAAAAAAOA/AAAAAAAA4D8AAAAAAADgPwAAAAAAAOA/AAAAAAAA4D8CAAAAjAAAAAAAAAAAAAAAT4G9DP///wgAAAAAAAAAAAAAAAAAAAAAAAAAAAAAAAAAAAAAZAAAAAEAAABAAAAAAAAAAAAAAAAAAAAAAAAAAAAAAAAAAAAAAAAAAAAAAAAAAAAAAAAAAAAAAAAAAAAAAAAAAAAAAAAAAAAAAAAAAAAAAAAAAAAAAAAAAAAAAAAAAAAAFAAAADwAAAAAAAAAAAAAAAAAAAkUAAAAAQAAABQAAAAUAAAAFAAAAAEAAAAAAAAAZAAAAGQAAAAAAAAAZAAAAGQAAAAVAAAAYAAAAAAAAAAAAAAADwAAACADAAAAAAAAAAAAAAEAAACgMgAAVgcAAKr4//8BAAAAf39/AAEAAABkAAAAAAAAABQAAABAHwAAAAAAACYAAAAAAAAAwOD//wAAAAAmAAAAZAAAABYAAABMAAAAAAAAAAAAAAAEAAAAAAAAAAEAAADu7OEKAAAAACgAAAAoAAAAZAAAAGQAAAAAAAAAzMzMAAAAAABQAAAAUAAAAGQAAABkAAAAAAAAABcAAAAUAAAAAAAAAAAAAAD/fwAA/38AAAAAAAAJAAAABAAAAAAAAAAMAAAAEAAAAAAAAAAAAAAAAAAAAAAAAAAeAAAAaAAAAAAAAAAAAAAAAAAAAAAAAAAAAAAAECcAABAnAAAAAAAAAAAAAAAAAAAAAAAAAAAAAAAAAAAAAAAAAAAAABQAAAAAAAAAwMD/AAAAAABkAAAAMgAAAAAAAABkAAAAAAAAAH9/fwAKAAAAHwAAAFQAAAAAAAAFAAAAAQAAAAAAAAAAAAAAAAAAAAAAAAAAAAAAAAAAAAAAAAAAAAAAAn9/fwAAAAADzMzMAMDA/wB/f38AAAAAAAAAAAAAAAAAAAAAAAAAAAAhAAAAGAAAABQAAACyHwAAfRMAAO46AAAUKgAAEAAAACYAAAAIAAAAPaAAAAAAAAA="/>
               </a:ext>
             </a:extLst>
           </p:cNvSpPr>
@@ -1598,7 +1623,7 @@
 </file>
 
 <file path=ppt/slideLayouts/slideLayout17.xml><?xml version="1.0" encoding="utf-8"?>
-<p:sldLayout xmlns:p="http://schemas.openxmlformats.org/presentationml/2006/main" xmlns:p14="http://schemas.microsoft.com/office/powerpoint/2010/main" xmlns:r="http://schemas.openxmlformats.org/officeDocument/2006/relationships" xmlns:a="http://schemas.openxmlformats.org/drawingml/2006/main" type="titleOnly" preserve="1">
+<p:sldLayout xmlns:a="http://schemas.openxmlformats.org/drawingml/2006/main" xmlns:r="http://schemas.openxmlformats.org/officeDocument/2006/relationships" xmlns:p="http://schemas.openxmlformats.org/presentationml/2006/main" type="titleOnly" preserve="1">
   <p:cSld name="Title Only">
     <p:spTree>
       <p:nvGrpSpPr>
@@ -1621,7 +1646,7 @@
             <a:spLocks noGrp="1" noChangeArrowheads="1"/>
             <a:extLst>
               <a:ext uri="smNativeData">
-                <pr:smNativeData xmlns:pr="smNativeData" val="SMDATA_13_47fkXxMAAAAlAAAAZAAAAA0AAAAAAAAAAAAAAAAAAAAAAAAAAAAAAAABAAAAAAAAAAEAAABQAAAAAAAAAAAA4D8AAAAAAADgPwAAAAAAAOA/AAAAAAAA4D8AAAAAAADgPwAAAAAAAOA/AAAAAAAA4D8AAAAAAADgPwAAAAAAAOA/AAAAAAAA4D8CAAAAjAAAAAAAAAAAAAAAT4G9DP///wgAAAAAAAAAAAAAAAAAAAAAAAAAAAAAAAAAAAAAZAAAAAEAAABAAAAAAAAAAAAAAAAAAAAAAAAAAAAAAAAAAAAAAAAAAAAAAAAAAAAAAAAAAAAAAAAAAAAAAAAAAAAAAAAAAAAAAAAAAAAAAAAAAAAAAAAAAAAAAAAAAAAAFAAAADwAAAAAAAAAAAAAAAAAAAkUAAAAAQAAABQAAAAUAAAAFAAAAAEAAAAAAAAAZAAAAGQAAAAAAAAAZAAAAGQAAAAVAAAAYAAAAAAAAAAAAAAADwAAACADAAAAAAAAAAAAAAEAAACgMgAAVgcAAKr4//8BAAAAf39/AAEAAABkAAAAAAAAABQAAABAHwAAAAAAACYAAAAAAAAAwOD//wAAAAAmAAAAZAAAABYAAABMAAAAAAAAAAAAAAAEAAAAAAAAAAEAAADu7OEKAAAAACgAAAAoAAAAZAAAAGQAAAAAAAAAzMzMAAAAAABQAAAAUAAAAGQAAABkAAAAAAAAABcAAAAUAAAAAAAAAAAAAAD/fwAA/38AAAAAAAAJAAAABAAAAAAAAAAMAAAAEAAAAAAAAAAAAAAAAAAAAAAAAAAeAAAAaAAAAAAAAAAAAAAAAAAAAAAAAAAAAAAAECcAABAnAAAAAAAAAAAAAAAAAAAAAAAAAAAAAAAAAAAAAAAAAAAAABQAAAAAAAAAwMD/AAAAAABkAAAAMgAAAAAAAABkAAAAAAAAAH9/fwAKAAAAHwAAAFQAAAAAAAAFAAAAAQAAAAAAAAAAAAAAAAAAAAAAAAAAAAAAAAAAAAAAAAAAAAAAAn9/fwAAAAADzMzMAMDA/wB/f38AAAAAAAAAAAAAAAAAAAAAAAAAAAAhAAAAGAAAABQAAAAaAwAApQYAAOg6AABGEQAAEAAAACYAAAAIAAAAPaAAAAAAAAA="/>
+                <pr:smNativeData xmlns="" xmlns:p14="http://schemas.microsoft.com/office/powerpoint/2010/main" xmlns:pr="smNativeData" val="SMDATA_13_47fkXxMAAAAlAAAAZAAAAA0AAAAAAAAAAAAAAAAAAAAAAAAAAAAAAAABAAAAAAAAAAEAAABQAAAAAAAAAAAA4D8AAAAAAADgPwAAAAAAAOA/AAAAAAAA4D8AAAAAAADgPwAAAAAAAOA/AAAAAAAA4D8AAAAAAADgPwAAAAAAAOA/AAAAAAAA4D8CAAAAjAAAAAAAAAAAAAAAT4G9DP///wgAAAAAAAAAAAAAAAAAAAAAAAAAAAAAAAAAAAAAZAAAAAEAAABAAAAAAAAAAAAAAAAAAAAAAAAAAAAAAAAAAAAAAAAAAAAAAAAAAAAAAAAAAAAAAAAAAAAAAAAAAAAAAAAAAAAAAAAAAAAAAAAAAAAAAAAAAAAAAAAAAAAAFAAAADwAAAAAAAAAAAAAAAAAAAkUAAAAAQAAABQAAAAUAAAAFAAAAAEAAAAAAAAAZAAAAGQAAAAAAAAAZAAAAGQAAAAVAAAAYAAAAAAAAAAAAAAADwAAACADAAAAAAAAAAAAAAEAAACgMgAAVgcAAKr4//8BAAAAf39/AAEAAABkAAAAAAAAABQAAABAHwAAAAAAACYAAAAAAAAAwOD//wAAAAAmAAAAZAAAABYAAABMAAAAAAAAAAAAAAAEAAAAAAAAAAEAAADu7OEKAAAAACgAAAAoAAAAZAAAAGQAAAAAAAAAzMzMAAAAAABQAAAAUAAAAGQAAABkAAAAAAAAABcAAAAUAAAAAAAAAAAAAAD/fwAA/38AAAAAAAAJAAAABAAAAAAAAAAMAAAAEAAAAAAAAAAAAAAAAAAAAAAAAAAeAAAAaAAAAAAAAAAAAAAAAAAAAAAAAAAAAAAAECcAABAnAAAAAAAAAAAAAAAAAAAAAAAAAAAAAAAAAAAAAAAAAAAAABQAAAAAAAAAwMD/AAAAAABkAAAAMgAAAAAAAABkAAAAAAAAAH9/fwAKAAAAHwAAAFQAAAAAAAAFAAAAAQAAAAAAAAAAAAAAAAAAAAAAAAAAAAAAAAAAAAAAAAAAAAAAAn9/fwAAAAADzMzMAMDA/wB/f38AAAAAAAAAAAAAAAAAAAAAAAAAAAAhAAAAGAAAABQAAAAaAwAApQYAAOg6AABGEQAAEAAAACYAAAAIAAAAPaAAAAAAAAA="/>
               </a:ext>
             </a:extLst>
           </p:cNvSpPr>
@@ -1667,7 +1692,7 @@
 </file>
 
 <file path=ppt/slideLayouts/slideLayout18.xml><?xml version="1.0" encoding="utf-8"?>
-<p:sldLayout xmlns:p="http://schemas.openxmlformats.org/presentationml/2006/main" xmlns:p14="http://schemas.microsoft.com/office/powerpoint/2010/main" xmlns:r="http://schemas.openxmlformats.org/officeDocument/2006/relationships" xmlns:a="http://schemas.openxmlformats.org/drawingml/2006/main" type="objOnly" preserve="1">
+<p:sldLayout xmlns:a="http://schemas.openxmlformats.org/drawingml/2006/main" xmlns:r="http://schemas.openxmlformats.org/officeDocument/2006/relationships" xmlns:p="http://schemas.openxmlformats.org/presentationml/2006/main" type="objOnly" preserve="1">
   <p:cSld name="Centered Text">
     <p:spTree>
       <p:nvGrpSpPr>
@@ -1690,7 +1715,7 @@
             <a:spLocks noGrp="1" noChangeArrowheads="1"/>
             <a:extLst>
               <a:ext uri="smNativeData">
-                <pr:smNativeData xmlns:pr="smNativeData" val="SMDATA_13_47fkXxMAAAAlAAAAZAAAAA0AAAAAAAAAAAAAAAAAAAAAAAAAAAAAAAABAAAAAAAAAAEAAABQAAAAAAAAAAAA4D8AAAAAAADgPwAAAAAAAOA/AAAAAAAA4D8AAAAAAADgPwAAAAAAAOA/AAAAAAAA4D8AAAAAAADgPwAAAAAAAOA/AAAAAAAA4D8CAAAAjAAAAAAAAAAAAAAAT4G9DP///wgAAAAAAAAAAAAAAAAAAAAAAAAAAAAAAAAAAAAAZAAAAAEAAABAAAAAAAAAAAAAAAAAAAAAAAAAAAAAAAAAAAAAAAAAAAAAAAAAAAAAAAAAAAAAAAAAAAAAAAAAAAAAAAAAAAAAAAAAAAAAAAAAAAAAAAAAAAAAAAAAAAAAFAAAADwAAAAAAAAAAAAAAAAAAAkUAAAAAQAAABQAAAAUAAAAFAAAAAEAAAAAAAAAZAAAAGQAAAAAAAAAZAAAAGQAAAAVAAAAYAAAAAAAAAAAAAAADwAAACADAAAAAAAAAAAAAAEAAACgMgAAVgcAAKr4//8BAAAAf39/AAEAAABkAAAAAAAAABQAAABAHwAAAAAAACYAAAAAAAAAwOD//wAAAAAmAAAAZAAAABYAAABMAAAAAAAAAAAAAAAEAAAAAAAAAAEAAADu7OEKAAAAACgAAAAoAAAAZAAAAGQAAAAAAAAAzMzMAAAAAABQAAAAUAAAAGQAAABkAAAAAAAAABcAAAAUAAAAAAAAAAAAAAD/fwAA/38AAAAAAAAJAAAABAAAAAAAAAAMAAAAEAAAAAAAAAAAAAAAAAAAAAAAAAAeAAAAaAAAAAAAAAAAAAAAAAAAAAAAAAAAAAAAECcAABAnAAAAAAAAAAAAAAAAAAAAAAAAAAAAAAAAAAAAAAAAAAAAABQAAAAAAAAAwMD/AAAAAABkAAAAMgAAAAAAAABkAAAAAAAAAH9/fwAKAAAAHwAAAFQAAAAAAAAFAAAAAQAAAAAAAAAAAAAAAAAAAAAAAAAAAAAAAAAAAAAAAAAAAAAAAn9/fwAAAAADzMzMAMDA/wB/f38AAAAAAAAAAAAAAAAAAAAAAAAAAAAhAAAAGAAAABQAAAAaAwAApQYAAOg6AADtNwAAEAAAACYAAAAIAAAAvaAAAAAAAAA="/>
+                <pr:smNativeData xmlns="" xmlns:p14="http://schemas.microsoft.com/office/powerpoint/2010/main" xmlns:pr="smNativeData" val="SMDATA_13_47fkXxMAAAAlAAAAZAAAAA0AAAAAAAAAAAAAAAAAAAAAAAAAAAAAAAABAAAAAAAAAAEAAABQAAAAAAAAAAAA4D8AAAAAAADgPwAAAAAAAOA/AAAAAAAA4D8AAAAAAADgPwAAAAAAAOA/AAAAAAAA4D8AAAAAAADgPwAAAAAAAOA/AAAAAAAA4D8CAAAAjAAAAAAAAAAAAAAAT4G9DP///wgAAAAAAAAAAAAAAAAAAAAAAAAAAAAAAAAAAAAAZAAAAAEAAABAAAAAAAAAAAAAAAAAAAAAAAAAAAAAAAAAAAAAAAAAAAAAAAAAAAAAAAAAAAAAAAAAAAAAAAAAAAAAAAAAAAAAAAAAAAAAAAAAAAAAAAAAAAAAAAAAAAAAFAAAADwAAAAAAAAAAAAAAAAAAAkUAAAAAQAAABQAAAAUAAAAFAAAAAEAAAAAAAAAZAAAAGQAAAAAAAAAZAAAAGQAAAAVAAAAYAAAAAAAAAAAAAAADwAAACADAAAAAAAAAAAAAAEAAACgMgAAVgcAAKr4//8BAAAAf39/AAEAAABkAAAAAAAAABQAAABAHwAAAAAAACYAAAAAAAAAwOD//wAAAAAmAAAAZAAAABYAAABMAAAAAAAAAAAAAAAEAAAAAAAAAAEAAADu7OEKAAAAACgAAAAoAAAAZAAAAGQAAAAAAAAAzMzMAAAAAABQAAAAUAAAAGQAAABkAAAAAAAAABcAAAAUAAAAAAAAAAAAAAD/fwAA/38AAAAAAAAJAAAABAAAAAAAAAAMAAAAEAAAAAAAAAAAAAAAAAAAAAAAAAAeAAAAaAAAAAAAAAAAAAAAAAAAAAAAAAAAAAAAECcAABAnAAAAAAAAAAAAAAAAAAAAAAAAAAAAAAAAAAAAAAAAAAAAABQAAAAAAAAAwMD/AAAAAABkAAAAMgAAAAAAAABkAAAAAAAAAH9/fwAKAAAAHwAAAFQAAAAAAAAFAAAAAQAAAAAAAAAAAAAAAAAAAAAAAAAAAAAAAAAAAAAAAAAAAAAAAn9/fwAAAAADzMzMAMDA/wB/f38AAAAAAAAAAAAAAAAAAAAAAAAAAAAhAAAAGAAAABQAAAAaAwAApQYAAOg6AADtNwAAEAAAACYAAAAIAAAAvaAAAAAAAAA="/>
               </a:ext>
             </a:extLst>
           </p:cNvSpPr>
@@ -1754,7 +1779,7 @@
 </file>
 
 <file path=ppt/slideLayouts/slideLayout19.xml><?xml version="1.0" encoding="utf-8"?>
-<p:sldLayout xmlns:p="http://schemas.openxmlformats.org/presentationml/2006/main" xmlns:p14="http://schemas.microsoft.com/office/powerpoint/2010/main" xmlns:r="http://schemas.openxmlformats.org/officeDocument/2006/relationships" xmlns:a="http://schemas.openxmlformats.org/drawingml/2006/main" type="twoObjAndObj" preserve="1">
+<p:sldLayout xmlns:a="http://schemas.openxmlformats.org/drawingml/2006/main" xmlns:r="http://schemas.openxmlformats.org/officeDocument/2006/relationships" xmlns:p="http://schemas.openxmlformats.org/presentationml/2006/main" type="twoObjAndObj" preserve="1">
   <p:cSld name="Title, 2 Content and Content">
     <p:spTree>
       <p:nvGrpSpPr>
@@ -1777,7 +1802,7 @@
             <a:spLocks noGrp="1" noChangeArrowheads="1"/>
             <a:extLst>
               <a:ext uri="smNativeData">
-                <pr:smNativeData xmlns:pr="smNativeData" val="SMDATA_13_47fkXxMAAAAlAAAAZAAAAA0AAAAAAAAAAAAAAAAAAAAAAAAAAAAAAAABAAAAAAAAAAEAAABQAAAAAAAAAAAA4D8AAAAAAADgPwAAAAAAAOA/AAAAAAAA4D8AAAAAAADgPwAAAAAAAOA/AAAAAAAA4D8AAAAAAADgPwAAAAAAAOA/AAAAAAAA4D8CAAAAjAAAAAAAAAAAAAAAT4G9DP///wgAAAAAAAAAAAAAAAAAAAAAAAAAAAAAAAAAAAAAZAAAAAEAAABAAAAAAAAAAAAAAAAAAAAAAAAAAAAAAAAAAAAAAAAAAAAAAAAAAAAAAAAAAAAAAAAAAAAAAAAAAAAAAAAAAAAAAAAAAAAAAAAAAAAAAAAAAAAAAAAAAAAAFAAAADwAAAAAAAAAAAAAAAAAAAkUAAAAAQAAABQAAAAUAAAAFAAAAAEAAAAAAAAAZAAAAGQAAAAAAAAAZAAAAGQAAAAVAAAAYAAAAAAAAAAAAAAADwAAACADAAAAAAAAAAAAAAEAAACgMgAAVgcAAKr4//8BAAAAf39/AAEAAABkAAAAAAAAABQAAABAHwAAAAAAACYAAAAAAAAAwOD//wAAAAAmAAAAZAAAABYAAABMAAAAAAAAAAAAAAAEAAAAAAAAAAEAAADu7OEKAAAAACgAAAAoAAAAZAAAAGQAAAAAAAAAzMzMAAAAAABQAAAAUAAAAGQAAABkAAAAAAAAABcAAAAUAAAAAAAAAAAAAAD/fwAA/38AAAAAAAAJAAAABAAAAAAAAAAMAAAAEAAAAAAAAAAAAAAAAAAAAAAAAAAeAAAAaAAAAAAAAAAAAAAAAAAAAAAAAAAAAAAAECcAABAnAAAAAAAAAAAAAAAAAAAAAAAAAAAAAAAAAAAAAAAAAAAAABQAAAAAAAAAwMD/AAAAAABkAAAAMgAAAAAAAABkAAAAAAAAAH9/fwAKAAAAHwAAAFQAAAAAAAAFAAAAAQAAAAAAAAAAAAAAAAAAAAAAAAAAAAAAAAAAAAAAAAAAAAAAAn9/fwAAAAADzMzMAMDA/wB/f38AAAAAAAAAAAAAAAAAAAAAAAAAAAAhAAAAGAAAABQAAAAaAwAApQYAAOg6AABGEQAAEAAAACYAAAAIAAAAPaAAAAAAAAA="/>
+                <pr:smNativeData xmlns="" xmlns:p14="http://schemas.microsoft.com/office/powerpoint/2010/main" xmlns:pr="smNativeData" val="SMDATA_13_47fkXxMAAAAlAAAAZAAAAA0AAAAAAAAAAAAAAAAAAAAAAAAAAAAAAAABAAAAAAAAAAEAAABQAAAAAAAAAAAA4D8AAAAAAADgPwAAAAAAAOA/AAAAAAAA4D8AAAAAAADgPwAAAAAAAOA/AAAAAAAA4D8AAAAAAADgPwAAAAAAAOA/AAAAAAAA4D8CAAAAjAAAAAAAAAAAAAAAT4G9DP///wgAAAAAAAAAAAAAAAAAAAAAAAAAAAAAAAAAAAAAZAAAAAEAAABAAAAAAAAAAAAAAAAAAAAAAAAAAAAAAAAAAAAAAAAAAAAAAAAAAAAAAAAAAAAAAAAAAAAAAAAAAAAAAAAAAAAAAAAAAAAAAAAAAAAAAAAAAAAAAAAAAAAAFAAAADwAAAAAAAAAAAAAAAAAAAkUAAAAAQAAABQAAAAUAAAAFAAAAAEAAAAAAAAAZAAAAGQAAAAAAAAAZAAAAGQAAAAVAAAAYAAAAAAAAAAAAAAADwAAACADAAAAAAAAAAAAAAEAAACgMgAAVgcAAKr4//8BAAAAf39/AAEAAABkAAAAAAAAABQAAABAHwAAAAAAACYAAAAAAAAAwOD//wAAAAAmAAAAZAAAABYAAABMAAAAAAAAAAAAAAAEAAAAAAAAAAEAAADu7OEKAAAAACgAAAAoAAAAZAAAAGQAAAAAAAAAzMzMAAAAAABQAAAAUAAAAGQAAABkAAAAAAAAABcAAAAUAAAAAAAAAAAAAAD/fwAA/38AAAAAAAAJAAAABAAAAAAAAAAMAAAAEAAAAAAAAAAAAAAAAAAAAAAAAAAeAAAAaAAAAAAAAAAAAAAAAAAAAAAAAAAAAAAAECcAABAnAAAAAAAAAAAAAAAAAAAAAAAAAAAAAAAAAAAAAAAAAAAAABQAAAAAAAAAwMD/AAAAAABkAAAAMgAAAAAAAABkAAAAAAAAAH9/fwAKAAAAHwAAAFQAAAAAAAAFAAAAAQAAAAAAAAAAAAAAAAAAAAAAAAAAAAAAAAAAAAAAAAAAAAAAAn9/fwAAAAADzMzMAMDA/wB/f38AAAAAAAAAAAAAAAAAAAAAAAAAAAAhAAAAGAAAABQAAAAaAwAApQYAAOg6AABGEQAAEAAAACYAAAAIAAAAPaAAAAAAAAA="/>
               </a:ext>
             </a:extLst>
           </p:cNvSpPr>
@@ -1821,7 +1846,7 @@
             <a:spLocks noGrp="1" noChangeArrowheads="1"/>
             <a:extLst>
               <a:ext uri="smNativeData">
-                <pr:smNativeData xmlns:pr="smNativeData" val="SMDATA_13_47fkXxMAAAAlAAAAZAAAAA0AAAAAAAAAAAAAAAAAAAAAAAAAAAAAAAAAAAAAAAAAAAEAAABQAAAAAAAAAAAA4D8AAAAAAADgPwAAAAAAAOA/AAAAAAAA4D8AAAAAAADgPwAAAAAAAOA/AAAAAAAA4D8AAAAAAADgPwAAAAAAAOA/AAAAAAAA4D8CAAAAjAAAAAAAAAAAAAAAT4G9DP///wgAAAAAAAAAAAAAAAAAAAAAAAAAAAAAAAAAAAAAZAAAAAEAAABAAAAAAAAAAAAAAAAAAAAAAAAAAAAAAAAAAAAAAAAAAAAAAAAAAAAAAAAAAAAAAAAAAAAAAAAAAAAAAAAAAAAAAAAAAAAAAAAAAAAAAAAAAAAAAAAAAAAAFAAAADwAAAAAAAAAAAAAAAAAAAkUAAAAAQAAABQAAAAUAAAAFAAAAAEAAAAAAAAAZAAAAGQAAAAAAAAAZAAAAGQAAAAVAAAAYAAAAAAAAAAAAAAADwAAACADAAAAAAAAAAAAAAEAAACgMgAAVgcAAKr4//8BAAAAf39/AAEAAABkAAAAAAAAABQAAABAHwAAAAAAACYAAAAAAAAAwOD//wAAAAAmAAAAZAAAABYAAABMAAAAAAAAAAAAAAAEAAAAAAAAAAEAAADu7OEKAAAAACgAAAAoAAAAZAAAAGQAAAAAAAAAzMzMAAAAAABQAAAAUAAAAGQAAABkAAAAAAAAABcAAAAUAAAAAAAAAAAAAAD/fwAA/38AAAAAAAAJAAAABAAAAAAAAAAMAAAAEAAAAAAAAAAAAAAAAAAAAAAAAAAeAAAAaAAAAAAAAAAAAAAAAAAAAAAAAAAAAAAAECcAABAnAAAAAAAAAAAAAAAAAAAAAAAAAAAAAAAAAAAAAAAAAAAAABQAAAAAAAAAwMD/AAAAAABkAAAAMgAAAAAAAABkAAAAAAAAAH9/fwAKAAAAHwAAAFQAAAAAAAAFAAAAAQAAAAAAAAAAAAAAAAAAAAAAAAAAAAAAAAAAAAAAAAAAAAAAAn9/fwAAAAADzMzMAMDA/wB/f38AAAAAAAAAAAAAAAAAAAAAAAAAAAAhAAAAGAAAABQAAAAaAwAAfRMAAFUeAABDHgAAEAAAACYAAAAIAAAAPaAAAAAAAAA="/>
+                <pr:smNativeData xmlns="" xmlns:p14="http://schemas.microsoft.com/office/powerpoint/2010/main" xmlns:pr="smNativeData" val="SMDATA_13_47fkXxMAAAAlAAAAZAAAAA0AAAAAAAAAAAAAAAAAAAAAAAAAAAAAAAAAAAAAAAAAAAEAAABQAAAAAAAAAAAA4D8AAAAAAADgPwAAAAAAAOA/AAAAAAAA4D8AAAAAAADgPwAAAAAAAOA/AAAAAAAA4D8AAAAAAADgPwAAAAAAAOA/AAAAAAAA4D8CAAAAjAAAAAAAAAAAAAAAT4G9DP///wgAAAAAAAAAAAAAAAAAAAAAAAAAAAAAAAAAAAAAZAAAAAEAAABAAAAAAAAAAAAAAAAAAAAAAAAAAAAAAAAAAAAAAAAAAAAAAAAAAAAAAAAAAAAAAAAAAAAAAAAAAAAAAAAAAAAAAAAAAAAAAAAAAAAAAAAAAAAAAAAAAAAAFAAAADwAAAAAAAAAAAAAAAAAAAkUAAAAAQAAABQAAAAUAAAAFAAAAAEAAAAAAAAAZAAAAGQAAAAAAAAAZAAAAGQAAAAVAAAAYAAAAAAAAAAAAAAADwAAACADAAAAAAAAAAAAAAEAAACgMgAAVgcAAKr4//8BAAAAf39/AAEAAABkAAAAAAAAABQAAABAHwAAAAAAACYAAAAAAAAAwOD//wAAAAAmAAAAZAAAABYAAABMAAAAAAAAAAAAAAAEAAAAAAAAAAEAAADu7OEKAAAAACgAAAAoAAAAZAAAAGQAAAAAAAAAzMzMAAAAAABQAAAAUAAAAGQAAABkAAAAAAAAABcAAAAUAAAAAAAAAAAAAAD/fwAA/38AAAAAAAAJAAAABAAAAAAAAAAMAAAAEAAAAAAAAAAAAAAAAAAAAAAAAAAeAAAAaAAAAAAAAAAAAAAAAAAAAAAAAAAAAAAAECcAABAnAAAAAAAAAAAAAAAAAAAAAAAAAAAAAAAAAAAAAAAAAAAAABQAAAAAAAAAwMD/AAAAAABkAAAAMgAAAAAAAABkAAAAAAAAAH9/fwAKAAAAHwAAAFQAAAAAAAAFAAAAAQAAAAAAAAAAAAAAAAAAAAAAAAAAAAAAAAAAAAAAAAAAAAAAAn9/fwAAAAADzMzMAMDA/wB/f38AAAAAAAAAAAAAAAAAAAAAAAAAAAAhAAAAGAAAABQAAAAaAwAAfRMAAFUeAABDHgAAEAAAACYAAAAIAAAAPaAAAAAAAAA="/>
               </a:ext>
             </a:extLst>
           </p:cNvSpPr>
@@ -1883,7 +1908,7 @@
             <a:spLocks noGrp="1" noChangeArrowheads="1"/>
             <a:extLst>
               <a:ext uri="smNativeData">
-                <pr:smNativeData xmlns:pr="smNativeData" val="SMDATA_13_47fkXxMAAAAlAAAAZAAAAA0AAAAAAAAAAAAAAAAAAAAAAAAAAAAAAAAAAAAAAAAAAAEAAABQAAAAAAAAAAAA4D8AAAAAAADgPwAAAAAAAOA/AAAAAAAA4D8AAAAAAADgPwAAAAAAAOA/AAAAAAAA4D8AAAAAAADgPwAAAAAAAOA/AAAAAAAA4D8CAAAAjAAAAAAAAAAAAAAAT4G9DP///wgAAAAAAAAAAAAAAAAAAAAAAAAAAAAAAAAAAAAAZAAAAAEAAABAAAAAAAAAAAAAAAAAAAAAAAAAAAAAAAAAAAAAAAAAAAAAAAAAAAAAAAAAAAAAAAAAAAAAAAAAAAAAAAAAAAAAAAAAAAAAAAAAAAAAAAAAAAAAAAAAAAAAFAAAADwAAAAAAAAAAAAAAAAAAAkUAAAAAQAAABQAAAAUAAAAFAAAAAEAAAAAAAAAZAAAAGQAAAAAAAAAZAAAAGQAAAAVAAAAYAAAAAAAAAAAAAAADwAAACADAAAAAAAAAAAAAAEAAACgMgAAVgcAAKr4//8BAAAAf39/AAEAAABkAAAAAAAAABQAAABAHwAAAAAAACYAAAAAAAAAwOD//wAAAAAmAAAAZAAAABYAAABMAAAAAAAAAAAAAAAEAAAAAAAAAAEAAADu7OEKAAAAACgAAAAoAAAAZAAAAGQAAAAAAAAAzMzMAAAAAABQAAAAUAAAAGQAAABkAAAAAAAAABcAAAAUAAAAAAAAAAAAAAD/fwAA/38AAAAAAAAJAAAABAAAAAAAAAAMAAAAEAAAAAAAAAAAAAAAAAAAAAAAAAAeAAAAaAAAAAAAAAAAAAAAAAAAAAAAAAAAAAAAECcAABAnAAAAAAAAAAAAAAAAAAAAAAAAAAAAAAAAAAAAAAAAAAAAABQAAAAAAAAAwMD/AAAAAABkAAAAMgAAAAAAAABkAAAAAAAAAH9/fwAKAAAAHwAAAFQAAAAAAAAFAAAAAQAAAAAAAAAAAAAAAAAAAAAAAAAAAAAAAAAAAAAAAAAAAAAAAn9/fwAAAAADzMzMAMDA/wB/f38AAAAAAAAAAAAAAAAAAAAAAAAAAAAhAAAAGAAAABQAAACyHwAAfRMAAO46AAAUKgAAEAAAACYAAAAIAAAAPaAAAAAAAAA="/>
+                <pr:smNativeData xmlns="" xmlns:p14="http://schemas.microsoft.com/office/powerpoint/2010/main" xmlns:pr="smNativeData" val="SMDATA_13_47fkXxMAAAAlAAAAZAAAAA0AAAAAAAAAAAAAAAAAAAAAAAAAAAAAAAAAAAAAAAAAAAEAAABQAAAAAAAAAAAA4D8AAAAAAADgPwAAAAAAAOA/AAAAAAAA4D8AAAAAAADgPwAAAAAAAOA/AAAAAAAA4D8AAAAAAADgPwAAAAAAAOA/AAAAAAAA4D8CAAAAjAAAAAAAAAAAAAAAT4G9DP///wgAAAAAAAAAAAAAAAAAAAAAAAAAAAAAAAAAAAAAZAAAAAEAAABAAAAAAAAAAAAAAAAAAAAAAAAAAAAAAAAAAAAAAAAAAAAAAAAAAAAAAAAAAAAAAAAAAAAAAAAAAAAAAAAAAAAAAAAAAAAAAAAAAAAAAAAAAAAAAAAAAAAAFAAAADwAAAAAAAAAAAAAAAAAAAkUAAAAAQAAABQAAAAUAAAAFAAAAAEAAAAAAAAAZAAAAGQAAAAAAAAAZAAAAGQAAAAVAAAAYAAAAAAAAAAAAAAADwAAACADAAAAAAAAAAAAAAEAAACgMgAAVgcAAKr4//8BAAAAf39/AAEAAABkAAAAAAAAABQAAABAHwAAAAAAACYAAAAAAAAAwOD//wAAAAAmAAAAZAAAABYAAABMAAAAAAAAAAAAAAAEAAAAAAAAAAEAAADu7OEKAAAAACgAAAAoAAAAZAAAAGQAAAAAAAAAzMzMAAAAAABQAAAAUAAAAGQAAABkAAAAAAAAABcAAAAUAAAAAAAAAAAAAAD/fwAA/38AAAAAAAAJAAAABAAAAAAAAAAMAAAAEAAAAAAAAAAAAAAAAAAAAAAAAAAeAAAAaAAAAAAAAAAAAAAAAAAAAAAAAAAAAAAAECcAABAnAAAAAAAAAAAAAAAAAAAAAAAAAAAAAAAAAAAAAAAAAAAAABQAAAAAAAAAwMD/AAAAAABkAAAAMgAAAAAAAABkAAAAAAAAAH9/fwAKAAAAHwAAAFQAAAAAAAAFAAAAAQAAAAAAAAAAAAAAAAAAAAAAAAAAAAAAAAAAAAAAAAAAAAAAAn9/fwAAAAADzMzMAMDA/wB/f38AAAAAAAAAAAAAAAAAAAAAAAAAAAAhAAAAGAAAABQAAACyHwAAfRMAAO46AAAUKgAAEAAAACYAAAAIAAAAPaAAAAAAAAA="/>
               </a:ext>
             </a:extLst>
           </p:cNvSpPr>
@@ -1945,7 +1970,7 @@
             <a:spLocks noGrp="1" noChangeArrowheads="1"/>
             <a:extLst>
               <a:ext uri="smNativeData">
-                <pr:smNativeData xmlns:pr="smNativeData" val="SMDATA_13_47fkXxMAAAAlAAAAZAAAAA0AAAAAAAAAAAAAAAAAAAAAAAAAAAAAAAAAAAAAAAAAAAEAAABQAAAAAAAAAAAA4D8AAAAAAADgPwAAAAAAAOA/AAAAAAAA4D8AAAAAAADgPwAAAAAAAOA/AAAAAAAA4D8AAAAAAADgPwAAAAAAAOA/AAAAAAAA4D8CAAAAjAAAAAAAAAAAAAAAT4G9DP///wgAAAAAAAAAAAAAAAAAAAAAAAAAAAAAAAAAAAAAZAAAAAEAAABAAAAAAAAAAAAAAAAAAAAAAAAAAAAAAAAAAAAAAAAAAAAAAAAAAAAAAAAAAAAAAAAAAAAAAAAAAAAAAAAAAAAAAAAAAAAAAAAAAAAAAAAAAAAAAAAAAAAAFAAAADwAAAAAAAAAAAAAAAAAAAkUAAAAAQAAABQAAAAUAAAAFAAAAAEAAAAAAAAAZAAAAGQAAAAAAAAAZAAAAGQAAAAVAAAAYAAAAAAAAAAAAAAADwAAACADAAAAAAAAAAAAAAEAAACgMgAAVgcAAKr4//8BAAAAf39/AAEAAABkAAAAAAAAABQAAABAHwAAAAAAACYAAAAAAAAAwOD//wAAAAAmAAAAZAAAABYAAABMAAAAAAAAAAAAAAAEAAAAAAAAAAEAAADu7OEKAAAAACgAAAAoAAAAZAAAAGQAAAAAAAAAzMzMAAAAAABQAAAAUAAAAGQAAABkAAAAAAAAABcAAAAUAAAAAAAAAAAAAAD/fwAA/38AAAAAAAAJAAAABAAAAAAAAAAMAAAAEAAAAAAAAAAAAAAAAAAAAAAAAAAeAAAAaAAAAAAAAAAAAAAAAAAAAAAAAAAAAAAAECcAABAnAAAAAAAAAAAAAAAAAAAAAAAAAAAAAAAAAAAAAAAAAAAAABQAAAAAAAAAwMD/AAAAAABkAAAAMgAAAAAAAABkAAAAAAAAAH9/fwAKAAAAHwAAAFQAAAAAAAAFAAAAAQAAAAAAAAAAAAAAAAAAAAAAAAAAAAAAAAAAAAAAAAAAAAAAAn9/fwAAAAADzMzMAMDA/wB/f38AAAAAAAAAAAAAAAAAAAAAAAAAAAAhAAAAGAAAABQAAAAaAwAASh8AAFUeAAAQKgAAEAAAACYAAAAIAAAAPaAAAAAAAAA="/>
+                <pr:smNativeData xmlns="" xmlns:p14="http://schemas.microsoft.com/office/powerpoint/2010/main" xmlns:pr="smNativeData" val="SMDATA_13_47fkXxMAAAAlAAAAZAAAAA0AAAAAAAAAAAAAAAAAAAAAAAAAAAAAAAAAAAAAAAAAAAEAAABQAAAAAAAAAAAA4D8AAAAAAADgPwAAAAAAAOA/AAAAAAAA4D8AAAAAAADgPwAAAAAAAOA/AAAAAAAA4D8AAAAAAADgPwAAAAAAAOA/AAAAAAAA4D8CAAAAjAAAAAAAAAAAAAAAT4G9DP///wgAAAAAAAAAAAAAAAAAAAAAAAAAAAAAAAAAAAAAZAAAAAEAAABAAAAAAAAAAAAAAAAAAAAAAAAAAAAAAAAAAAAAAAAAAAAAAAAAAAAAAAAAAAAAAAAAAAAAAAAAAAAAAAAAAAAAAAAAAAAAAAAAAAAAAAAAAAAAAAAAAAAAFAAAADwAAAAAAAAAAAAAAAAAAAkUAAAAAQAAABQAAAAUAAAAFAAAAAEAAAAAAAAAZAAAAGQAAAAAAAAAZAAAAGQAAAAVAAAAYAAAAAAAAAAAAAAADwAAACADAAAAAAAAAAAAAAEAAACgMgAAVgcAAKr4//8BAAAAf39/AAEAAABkAAAAAAAAABQAAABAHwAAAAAAACYAAAAAAAAAwOD//wAAAAAmAAAAZAAAABYAAABMAAAAAAAAAAAAAAAEAAAAAAAAAAEAAADu7OEKAAAAACgAAAAoAAAAZAAAAGQAAAAAAAAAzMzMAAAAAABQAAAAUAAAAGQAAABkAAAAAAAAABcAAAAUAAAAAAAAAAAAAAD/fwAA/38AAAAAAAAJAAAABAAAAAAAAAAMAAAAEAAAAAAAAAAAAAAAAAAAAAAAAAAeAAAAaAAAAAAAAAAAAAAAAAAAAAAAAAAAAAAAECcAABAnAAAAAAAAAAAAAAAAAAAAAAAAAAAAAAAAAAAAAAAAAAAAABQAAAAAAAAAwMD/AAAAAABkAAAAMgAAAAAAAABkAAAAAAAAAH9/fwAKAAAAHwAAAFQAAAAAAAAFAAAAAQAAAAAAAAAAAAAAAAAAAAAAAAAAAAAAAAAAAAAAAAAAAAAAAn9/fwAAAAADzMzMAMDA/wB/f38AAAAAAAAAAAAAAAAAAAAAAAAAAAAhAAAAGAAAABQAAAAaAwAASh8AAFUeAAAQKgAAEAAAACYAAAAIAAAAPaAAAAAAAAA="/>
               </a:ext>
             </a:extLst>
           </p:cNvSpPr>
@@ -2009,7 +2034,7 @@
 </file>
 
 <file path=ppt/slideLayouts/slideLayout2.xml><?xml version="1.0" encoding="utf-8"?>
-<p:sldLayout xmlns:p="http://schemas.openxmlformats.org/presentationml/2006/main" xmlns:p14="http://schemas.microsoft.com/office/powerpoint/2010/main" xmlns:r="http://schemas.openxmlformats.org/officeDocument/2006/relationships" xmlns:a="http://schemas.openxmlformats.org/drawingml/2006/main" type="tx" preserve="1">
+<p:sldLayout xmlns:a="http://schemas.openxmlformats.org/drawingml/2006/main" xmlns:r="http://schemas.openxmlformats.org/officeDocument/2006/relationships" xmlns:p="http://schemas.openxmlformats.org/presentationml/2006/main" type="tx" preserve="1">
   <p:cSld name="Title Slide">
     <p:spTree>
       <p:nvGrpSpPr>
@@ -2032,7 +2057,7 @@
             <a:spLocks noGrp="1" noChangeArrowheads="1"/>
             <a:extLst>
               <a:ext uri="smNativeData">
-                <pr:smNativeData xmlns:pr="smNativeData" val="SMDATA_13_47fkXxMAAAAlAAAAZAAAAA0AAAAAAAAAAAAAAAAAAAAAAAAAAAAAAAABAAAAAAAAAAEAAABQAAAAAAAAAAAA4D8AAAAAAADgPwAAAAAAAOA/AAAAAAAA4D8AAAAAAADgPwAAAAAAAOA/AAAAAAAA4D8AAAAAAADgPwAAAAAAAOA/AAAAAAAA4D8CAAAAjAAAAAAAAAAAAAAAT4G9DP///wgAAAAAAAAAAAAAAAAAAAAAAAAAAAAAAAAAAAAAZAAAAAEAAABAAAAAAAAAAAAAAAAAAAAAAAAAAAAAAAAAAAAAAAAAAAAAAAAAAAAAAAAAAAAAAAAAAAAAAAAAAAAAAAAAAAAAAAAAAAAAAAAAAAAAAAAAAAAAAAAAAAAAFAAAADwAAAAAAAAAAAAAAAAAAAkUAAAAAQAAABQAAAAUAAAAFAAAAAEAAAAAAAAAZAAAAGQAAAAAAAAAZAAAAGQAAAAVAAAAYAAAAAAAAAAAAAAADwAAACADAAAAAAAAAAAAAAEAAACgMgAAVgcAAKr4//8BAAAAf39/AAEAAABkAAAAAAAAABQAAABAHwAAAAAAACYAAAAAAAAAwOD//wAAAAAmAAAAZAAAABYAAABMAAAAAAAAAAAAAAAEAAAAAAAAAAEAAADu7OEKAAAAACgAAAAoAAAAZAAAAGQAAAAAAAAAzMzMAAAAAABQAAAAUAAAAGQAAABkAAAAAAAAABcAAAAUAAAAAAAAAAAAAAD/fwAA/38AAAAAAAAJAAAABAAAAAAAAAAMAAAAEAAAAAAAAAAAAAAAAAAAAAAAAAAeAAAAaAAAAAAAAAAAAAAAAAAAAAAAAAAAAAAAECcAABAnAAAAAAAAAAAAAAAAAAAAAAAAAAAAAAAAAAAAAAAAAAAAABQAAAAAAAAAwMD/AAAAAABkAAAAMgAAAAAAAABkAAAAAAAAAH9/fwAKAAAAHwAAAFQAAAAAAAAFAAAAAQAAAAAAAAAAAAAAAAAAAAAAAAAAAAAAAAAAAAAAAAAAAAAAAn9/fwAAAAADzMzMAMDA/wB/f38AAAAAAAAAAAAAAAAAAAAAAAAAAAAhAAAAGAAAABQAAAAaAwAApQYAAOg6AABGEQAAEAAAACYAAAAIAAAAPKAAAAAAAAA="/>
+                <pr:smNativeData xmlns="" xmlns:p14="http://schemas.microsoft.com/office/powerpoint/2010/main" xmlns:pr="smNativeData" val="SMDATA_13_47fkXxMAAAAlAAAAZAAAAA0AAAAAAAAAAAAAAAAAAAAAAAAAAAAAAAABAAAAAAAAAAEAAABQAAAAAAAAAAAA4D8AAAAAAADgPwAAAAAAAOA/AAAAAAAA4D8AAAAAAADgPwAAAAAAAOA/AAAAAAAA4D8AAAAAAADgPwAAAAAAAOA/AAAAAAAA4D8CAAAAjAAAAAAAAAAAAAAAT4G9DP///wgAAAAAAAAAAAAAAAAAAAAAAAAAAAAAAAAAAAAAZAAAAAEAAABAAAAAAAAAAAAAAAAAAAAAAAAAAAAAAAAAAAAAAAAAAAAAAAAAAAAAAAAAAAAAAAAAAAAAAAAAAAAAAAAAAAAAAAAAAAAAAAAAAAAAAAAAAAAAAAAAAAAAFAAAADwAAAAAAAAAAAAAAAAAAAkUAAAAAQAAABQAAAAUAAAAFAAAAAEAAAAAAAAAZAAAAGQAAAAAAAAAZAAAAGQAAAAVAAAAYAAAAAAAAAAAAAAADwAAACADAAAAAAAAAAAAAAEAAACgMgAAVgcAAKr4//8BAAAAf39/AAEAAABkAAAAAAAAABQAAABAHwAAAAAAACYAAAAAAAAAwOD//wAAAAAmAAAAZAAAABYAAABMAAAAAAAAAAAAAAAEAAAAAAAAAAEAAADu7OEKAAAAACgAAAAoAAAAZAAAAGQAAAAAAAAAzMzMAAAAAABQAAAAUAAAAGQAAABkAAAAAAAAABcAAAAUAAAAAAAAAAAAAAD/fwAA/38AAAAAAAAJAAAABAAAAAAAAAAMAAAAEAAAAAAAAAAAAAAAAAAAAAAAAAAeAAAAaAAAAAAAAAAAAAAAAAAAAAAAAAAAAAAAECcAABAnAAAAAAAAAAAAAAAAAAAAAAAAAAAAAAAAAAAAAAAAAAAAABQAAAAAAAAAwMD/AAAAAABkAAAAMgAAAAAAAABkAAAAAAAAAH9/fwAKAAAAHwAAAFQAAAAAAAAFAAAAAQAAAAAAAAAAAAAAAAAAAAAAAAAAAAAAAAAAAAAAAAAAAAAAAn9/fwAAAAADzMzMAMDA/wB/f38AAAAAAAAAAAAAAAAAAAAAAAAAAAAhAAAAGAAAABQAAAAaAwAApQYAAOg6AABGEQAAEAAAACYAAAAIAAAAPKAAAAAAAAA="/>
               </a:ext>
             </a:extLst>
           </p:cNvSpPr>
@@ -2067,7 +2092,7 @@
             <a:spLocks noGrp="1" noChangeArrowheads="1"/>
             <a:extLst>
               <a:ext uri="smNativeData">
-                <pr:smNativeData xmlns:pr="smNativeData" val="SMDATA_13_47fkXxMAAAAlAAAAZAAAAA0AAAAAAAAAAAAAAAAAAAAAAAAAAAAAAAABAAAAAAAAAAEAAABQAAAAAAAAAAAA4D8AAAAAAADgPwAAAAAAAOA/AAAAAAAA4D8AAAAAAADgPwAAAAAAAOA/AAAAAAAA4D8AAAAAAADgPwAAAAAAAOA/AAAAAAAA4D8CAAAAjAAAAAAAAAAAAAAAT4G9DP///wgAAAAAAAAAAAAAAAAAAAAAAAAAAAAAAAAAAAAAZAAAAAEAAABAAAAAAAAAAAAAAAAAAAAAAAAAAAAAAAAAAAAAAAAAAAAAAAAAAAAAAAAAAAAAAAAAAAAAAAAAAAAAAAAAAAAAAAAAAAAAAAAAAAAAAAAAAAAAAAAAAAAAFAAAADwAAAAAAAAAAAAAAAAAAAkUAAAAAQAAABQAAAAUAAAAFAAAAAEAAAAAAAAAZAAAAGQAAAAAAAAAZAAAAGQAAAAVAAAAYAAAAAAAAAAAAAAADwAAACADAAAAAAAAAAAAAAEAAACgMgAAVgcAAKr4//8BAAAAf39/AAEAAABkAAAAAAAAABQAAABAHwAAAAAAACYAAAAAAAAAwOD//wAAAAAmAAAAZAAAABYAAABMAAAAAAAAAAAAAAAEAAAAAAAAAAEAAADu7OEKAAAAACgAAAAoAAAAZAAAAGQAAAAAAAAAzMzMAAAAAABQAAAAUAAAAGQAAABkAAAAAAAAABcAAAAUAAAAAAAAAAAAAAD/fwAA/38AAAAAAAAJAAAABAAAAAAAAAAMAAAAEAAAAAAAAAAAAAAAAAAAAAAAAAAeAAAAaAAAAAAAAAAAAAAAAAAAAAAAAAAAAAAAECcAABAnAAAAAAAAAAAAAAAAAAAAAAAAAAAAAAAAAAAAAAAAAAAAABQAAAAAAAAAwMD/AAAAAABkAAAAMgAAAAAAAABkAAAAAAAAAH9/fwAKAAAAHwAAAFQAAAAAAAAFAAAAAQAAAAAAAAAAAAAAAAAAAAAAAAAAAAAAAAAAAAAAAAAAAAAAAn9/fwAAAAADzMzMAMDA/wB/f38AAAAAAAAAAAAAAAAAAAAAAAAAAAAhAAAAGAAAABQAAAAaAwAAfRMAAOg6AAAUKgAAEAAAACYAAAAIAAAAvKAAAAAAAAA="/>
+                <pr:smNativeData xmlns="" xmlns:p14="http://schemas.microsoft.com/office/powerpoint/2010/main" xmlns:pr="smNativeData" val="SMDATA_13_47fkXxMAAAAlAAAAZAAAAA0AAAAAAAAAAAAAAAAAAAAAAAAAAAAAAAABAAAAAAAAAAEAAABQAAAAAAAAAAAA4D8AAAAAAADgPwAAAAAAAOA/AAAAAAAA4D8AAAAAAADgPwAAAAAAAOA/AAAAAAAA4D8AAAAAAADgPwAAAAAAAOA/AAAAAAAA4D8CAAAAjAAAAAAAAAAAAAAAT4G9DP///wgAAAAAAAAAAAAAAAAAAAAAAAAAAAAAAAAAAAAAZAAAAAEAAABAAAAAAAAAAAAAAAAAAAAAAAAAAAAAAAAAAAAAAAAAAAAAAAAAAAAAAAAAAAAAAAAAAAAAAAAAAAAAAAAAAAAAAAAAAAAAAAAAAAAAAAAAAAAAAAAAAAAAFAAAADwAAAAAAAAAAAAAAAAAAAkUAAAAAQAAABQAAAAUAAAAFAAAAAEAAAAAAAAAZAAAAGQAAAAAAAAAZAAAAGQAAAAVAAAAYAAAAAAAAAAAAAAADwAAACADAAAAAAAAAAAAAAEAAACgMgAAVgcAAKr4//8BAAAAf39/AAEAAABkAAAAAAAAABQAAABAHwAAAAAAACYAAAAAAAAAwOD//wAAAAAmAAAAZAAAABYAAABMAAAAAAAAAAAAAAAEAAAAAAAAAAEAAADu7OEKAAAAACgAAAAoAAAAZAAAAGQAAAAAAAAAzMzMAAAAAABQAAAAUAAAAGQAAABkAAAAAAAAABcAAAAUAAAAAAAAAAAAAAD/fwAA/38AAAAAAAAJAAAABAAAAAAAAAAMAAAAEAAAAAAAAAAAAAAAAAAAAAAAAAAeAAAAaAAAAAAAAAAAAAAAAAAAAAAAAAAAAAAAECcAABAnAAAAAAAAAAAAAAAAAAAAAAAAAAAAAAAAAAAAAAAAAAAAABQAAAAAAAAAwMD/AAAAAABkAAAAMgAAAAAAAABkAAAAAAAAAH9/fwAKAAAAHwAAAFQAAAAAAAAFAAAAAQAAAAAAAAAAAAAAAAAAAAAAAAAAAAAAAAAAAAAAAAAAAAAAAn9/fwAAAAADzMzMAMDA/wB/f38AAAAAAAAAAAAAAAAAAAAAAAAAAAAhAAAAGAAAABQAAAAaAwAAfRMAAOg6AAAUKgAAEAAAACYAAAAIAAAAvKAAAAAAAAA="/>
               </a:ext>
             </a:extLst>
           </p:cNvSpPr>
@@ -2122,7 +2147,7 @@
 </file>
 
 <file path=ppt/slideLayouts/slideLayout20.xml><?xml version="1.0" encoding="utf-8"?>
-<p:sldLayout xmlns:p="http://schemas.openxmlformats.org/presentationml/2006/main" xmlns:p14="http://schemas.microsoft.com/office/powerpoint/2010/main" xmlns:r="http://schemas.openxmlformats.org/officeDocument/2006/relationships" xmlns:a="http://schemas.openxmlformats.org/drawingml/2006/main" type="objAndTwoObj" preserve="1">
+<p:sldLayout xmlns:a="http://schemas.openxmlformats.org/drawingml/2006/main" xmlns:r="http://schemas.openxmlformats.org/officeDocument/2006/relationships" xmlns:p="http://schemas.openxmlformats.org/presentationml/2006/main" type="objAndTwoObj" preserve="1">
   <p:cSld name="Title Content and 2 Content">
     <p:spTree>
       <p:nvGrpSpPr>
@@ -2145,7 +2170,7 @@
             <a:spLocks noGrp="1" noChangeArrowheads="1"/>
             <a:extLst>
               <a:ext uri="smNativeData">
-                <pr:smNativeData xmlns:pr="smNativeData" val="SMDATA_13_47fkXxMAAAAlAAAAZAAAAA0AAAAAAAAAAAAAAAAAAAAAAAAAAAAAAAABAAAAAAAAAAEAAABQAAAAAAAAAAAA4D8AAAAAAADgPwAAAAAAAOA/AAAAAAAA4D8AAAAAAADgPwAAAAAAAOA/AAAAAAAA4D8AAAAAAADgPwAAAAAAAOA/AAAAAAAA4D8CAAAAjAAAAAAAAAAAAAAAT4G9DP///wgAAAAAAAAAAAAAAAAAAAAAAAAAAAAAAAAAAAAAZAAAAAEAAABAAAAAAAAAAAAAAAAAAAAAAAAAAAAAAAAAAAAAAAAAAAAAAAAAAAAAAAAAAAAAAAAAAAAAAAAAAAAAAAAAAAAAAAAAAAAAAAAAAAAAAAAAAAAAAAAAAAAAFAAAADwAAAAAAAAAAAAAAAAAAAkUAAAAAQAAABQAAAAUAAAAFAAAAAEAAAAAAAAAZAAAAGQAAAAAAAAAZAAAAGQAAAAVAAAAYAAAAAAAAAAAAAAADwAAACADAAAAAAAAAAAAAAEAAACgMgAAVgcAAKr4//8BAAAAf39/AAEAAABkAAAAAAAAABQAAABAHwAAAAAAACYAAAAAAAAAwOD//wAAAAAmAAAAZAAAABYAAABMAAAAAAAAAAAAAAAEAAAAAAAAAAEAAADu7OEKAAAAACgAAAAoAAAAZAAAAGQAAAAAAAAAzMzMAAAAAABQAAAAUAAAAGQAAABkAAAAAAAAABcAAAAUAAAAAAAAAAAAAAD/fwAA/38AAAAAAAAJAAAABAAAAAAAAAAMAAAAEAAAAAAAAAAAAAAAAAAAAAAAAAAeAAAAaAAAAAAAAAAAAAAAAAAAAAAAAAAAAAAAECcAABAnAAAAAAAAAAAAAAAAAAAAAAAAAAAAAAAAAAAAAAAAAAAAABQAAAAAAAAAwMD/AAAAAABkAAAAMgAAAAAAAABkAAAAAAAAAH9/fwAKAAAAHwAAAFQAAAAAAAAFAAAAAQAAAAAAAAAAAAAAAAAAAAAAAAAAAAAAAAAAAAAAAAAAAAAAAn9/fwAAAAADzMzMAMDA/wB/f38AAAAAAAAAAAAAAAAAAAAAAAAAAAAhAAAAGAAAABQAAAAaAwAApQYAAOg6AABGEQAAEAAAACYAAAAIAAAAPaAAAAAAAAA="/>
+                <pr:smNativeData xmlns="" xmlns:p14="http://schemas.microsoft.com/office/powerpoint/2010/main" xmlns:pr="smNativeData" val="SMDATA_13_47fkXxMAAAAlAAAAZAAAAA0AAAAAAAAAAAAAAAAAAAAAAAAAAAAAAAABAAAAAAAAAAEAAABQAAAAAAAAAAAA4D8AAAAAAADgPwAAAAAAAOA/AAAAAAAA4D8AAAAAAADgPwAAAAAAAOA/AAAAAAAA4D8AAAAAAADgPwAAAAAAAOA/AAAAAAAA4D8CAAAAjAAAAAAAAAAAAAAAT4G9DP///wgAAAAAAAAAAAAAAAAAAAAAAAAAAAAAAAAAAAAAZAAAAAEAAABAAAAAAAAAAAAAAAAAAAAAAAAAAAAAAAAAAAAAAAAAAAAAAAAAAAAAAAAAAAAAAAAAAAAAAAAAAAAAAAAAAAAAAAAAAAAAAAAAAAAAAAAAAAAAAAAAAAAAFAAAADwAAAAAAAAAAAAAAAAAAAkUAAAAAQAAABQAAAAUAAAAFAAAAAEAAAAAAAAAZAAAAGQAAAAAAAAAZAAAAGQAAAAVAAAAYAAAAAAAAAAAAAAADwAAACADAAAAAAAAAAAAAAEAAACgMgAAVgcAAKr4//8BAAAAf39/AAEAAABkAAAAAAAAABQAAABAHwAAAAAAACYAAAAAAAAAwOD//wAAAAAmAAAAZAAAABYAAABMAAAAAAAAAAAAAAAEAAAAAAAAAAEAAADu7OEKAAAAACgAAAAoAAAAZAAAAGQAAAAAAAAAzMzMAAAAAABQAAAAUAAAAGQAAABkAAAAAAAAABcAAAAUAAAAAAAAAAAAAAD/fwAA/38AAAAAAAAJAAAABAAAAAAAAAAMAAAAEAAAAAAAAAAAAAAAAAAAAAAAAAAeAAAAaAAAAAAAAAAAAAAAAAAAAAAAAAAAAAAAECcAABAnAAAAAAAAAAAAAAAAAAAAAAAAAAAAAAAAAAAAAAAAAAAAABQAAAAAAAAAwMD/AAAAAABkAAAAMgAAAAAAAABkAAAAAAAAAH9/fwAKAAAAHwAAAFQAAAAAAAAFAAAAAQAAAAAAAAAAAAAAAAAAAAAAAAAAAAAAAAAAAAAAAAAAAAAAAn9/fwAAAAADzMzMAMDA/wB/f38AAAAAAAAAAAAAAAAAAAAAAAAAAAAhAAAAGAAAABQAAAAaAwAApQYAAOg6AABGEQAAEAAAACYAAAAIAAAAPaAAAAAAAAA="/>
               </a:ext>
             </a:extLst>
           </p:cNvSpPr>
@@ -2189,7 +2214,7 @@
             <a:spLocks noGrp="1" noChangeArrowheads="1"/>
             <a:extLst>
               <a:ext uri="smNativeData">
-                <pr:smNativeData xmlns:pr="smNativeData" val="SMDATA_13_47fkXxMAAAAlAAAAZAAAAA0AAAAAAAAAAAAAAAAAAAAAAAAAAAAAAAAAAAAAAAAAAAEAAABQAAAAAAAAAAAA4D8AAAAAAADgPwAAAAAAAOA/AAAAAAAA4D8AAAAAAADgPwAAAAAAAOA/AAAAAAAA4D8AAAAAAADgPwAAAAAAAOA/AAAAAAAA4D8CAAAAjAAAAAAAAAAAAAAAT4G9DP///wgAAAAAAAAAAAAAAAAAAAAAAAAAAAAAAAAAAAAAZAAAAAEAAABAAAAAAAAAAAAAAAAAAAAAAAAAAAAAAAAAAAAAAAAAAAAAAAAAAAAAAAAAAAAAAAAAAAAAAAAAAAAAAAAAAAAAAAAAAAAAAAAAAAAAAAAAAAAAAAAAAAAAFAAAADwAAAAAAAAAAAAAAAAAAAkUAAAAAQAAABQAAAAUAAAAFAAAAAEAAAAAAAAAZAAAAGQAAAAAAAAAZAAAAGQAAAAVAAAAYAAAAAAAAAAAAAAADwAAACADAAAAAAAAAAAAAAEAAACgMgAAVgcAAKr4//8BAAAAf39/AAEAAABkAAAAAAAAABQAAABAHwAAAAAAACYAAAAAAAAAwOD//wAAAAAmAAAAZAAAABYAAABMAAAAAAAAAAAAAAAEAAAAAAAAAAEAAADu7OEKAAAAACgAAAAoAAAAZAAAAGQAAAAAAAAAzMzMAAAAAABQAAAAUAAAAGQAAABkAAAAAAAAABcAAAAUAAAAAAAAAAAAAAD/fwAA/38AAAAAAAAJAAAABAAAAAAAAAAMAAAAEAAAAAAAAAAAAAAAAAAAAAAAAAAeAAAAaAAAAAAAAAAAAAAAAAAAAAAAAAAAAAAAECcAABAnAAAAAAAAAAAAAAAAAAAAAAAAAAAAAAAAAAAAAAAAAAAAABQAAAAAAAAAwMD/AAAAAABkAAAAMgAAAAAAAABkAAAAAAAAAH9/fwAKAAAAHwAAAFQAAAAAAAAFAAAAAQAAAAAAAAAAAAAAAAAAAAAAAAAAAAAAAAAAAAAAAAAAAAAAAn9/fwAAAAADzMzMAMDA/wB/f38AAAAAAAAAAAAAAAAAAAAAAAAAAAAhAAAAGAAAABQAAAAaAwAAfRMAAFUeAAAUKgAAEAAAACYAAAAIAAAAPaAAAAAAAAA="/>
+                <pr:smNativeData xmlns="" xmlns:p14="http://schemas.microsoft.com/office/powerpoint/2010/main" xmlns:pr="smNativeData" val="SMDATA_13_47fkXxMAAAAlAAAAZAAAAA0AAAAAAAAAAAAAAAAAAAAAAAAAAAAAAAAAAAAAAAAAAAEAAABQAAAAAAAAAAAA4D8AAAAAAADgPwAAAAAAAOA/AAAAAAAA4D8AAAAAAADgPwAAAAAAAOA/AAAAAAAA4D8AAAAAAADgPwAAAAAAAOA/AAAAAAAA4D8CAAAAjAAAAAAAAAAAAAAAT4G9DP///wgAAAAAAAAAAAAAAAAAAAAAAAAAAAAAAAAAAAAAZAAAAAEAAABAAAAAAAAAAAAAAAAAAAAAAAAAAAAAAAAAAAAAAAAAAAAAAAAAAAAAAAAAAAAAAAAAAAAAAAAAAAAAAAAAAAAAAAAAAAAAAAAAAAAAAAAAAAAAAAAAAAAAFAAAADwAAAAAAAAAAAAAAAAAAAkUAAAAAQAAABQAAAAUAAAAFAAAAAEAAAAAAAAAZAAAAGQAAAAAAAAAZAAAAGQAAAAVAAAAYAAAAAAAAAAAAAAADwAAACADAAAAAAAAAAAAAAEAAACgMgAAVgcAAKr4//8BAAAAf39/AAEAAABkAAAAAAAAABQAAABAHwAAAAAAACYAAAAAAAAAwOD//wAAAAAmAAAAZAAAABYAAABMAAAAAAAAAAAAAAAEAAAAAAAAAAEAAADu7OEKAAAAACgAAAAoAAAAZAAAAGQAAAAAAAAAzMzMAAAAAABQAAAAUAAAAGQAAABkAAAAAAAAABcAAAAUAAAAAAAAAAAAAAD/fwAA/38AAAAAAAAJAAAABAAAAAAAAAAMAAAAEAAAAAAAAAAAAAAAAAAAAAAAAAAeAAAAaAAAAAAAAAAAAAAAAAAAAAAAAAAAAAAAECcAABAnAAAAAAAAAAAAAAAAAAAAAAAAAAAAAAAAAAAAAAAAAAAAABQAAAAAAAAAwMD/AAAAAABkAAAAMgAAAAAAAABkAAAAAAAAAH9/fwAKAAAAHwAAAFQAAAAAAAAFAAAAAQAAAAAAAAAAAAAAAAAAAAAAAAAAAAAAAAAAAAAAAAAAAAAAAn9/fwAAAAADzMzMAMDA/wB/f38AAAAAAAAAAAAAAAAAAAAAAAAAAAAhAAAAGAAAABQAAAAaAwAAfRMAAFUeAAAUKgAAEAAAACYAAAAIAAAAPaAAAAAAAAA="/>
               </a:ext>
             </a:extLst>
           </p:cNvSpPr>
@@ -2251,7 +2276,7 @@
             <a:spLocks noGrp="1" noChangeArrowheads="1"/>
             <a:extLst>
               <a:ext uri="smNativeData">
-                <pr:smNativeData xmlns:pr="smNativeData" val="SMDATA_13_47fkXxMAAAAlAAAAZAAAAA0AAAAAAAAAAAAAAAAAAAAAAAAAAAAAAAAAAAAAAAAAAAEAAABQAAAAAAAAAAAA4D8AAAAAAADgPwAAAAAAAOA/AAAAAAAA4D8AAAAAAADgPwAAAAAAAOA/AAAAAAAA4D8AAAAAAADgPwAAAAAAAOA/AAAAAAAA4D8CAAAAjAAAAAAAAAAAAAAAT4G9DP///wgAAAAAAAAAAAAAAAAAAAAAAAAAAAAAAAAAAAAAZAAAAAEAAABAAAAAAAAAAAAAAAAAAAAAAAAAAAAAAAAAAAAAAAAAAAAAAAAAAAAAAAAAAAAAAAAAAAAAAAAAAAAAAAAAAAAAAAAAAAAAAAAAAAAAAAAAAAAAAAAAAAAAFAAAADwAAAAAAAAAAAAAAAAAAAkUAAAAAQAAABQAAAAUAAAAFAAAAAEAAAAAAAAAZAAAAGQAAAAAAAAAZAAAAGQAAAAVAAAAYAAAAAAAAAAAAAAADwAAACADAAAAAAAAAAAAAAEAAACgMgAAVgcAAKr4//8BAAAAf39/AAEAAABkAAAAAAAAABQAAABAHwAAAAAAACYAAAAAAAAAwOD//wAAAAAmAAAAZAAAABYAAABMAAAAAAAAAAAAAAAEAAAAAAAAAAEAAADu7OEKAAAAACgAAAAoAAAAZAAAAGQAAAAAAAAAzMzMAAAAAABQAAAAUAAAAGQAAABkAAAAAAAAABcAAAAUAAAAAAAAAAAAAAD/fwAA/38AAAAAAAAJAAAABAAAAAAAAAAMAAAAEAAAAAAAAAAAAAAAAAAAAAAAAAAeAAAAaAAAAAAAAAAAAAAAAAAAAAAAAAAAAAAAECcAABAnAAAAAAAAAAAAAAAAAAAAAAAAAAAAAAAAAAAAAAAAAAAAABQAAAAAAAAAwMD/AAAAAABkAAAAMgAAAAAAAABkAAAAAAAAAH9/fwAKAAAAHwAAAFQAAAAAAAAFAAAAAQAAAAAAAAAAAAAAAAAAAAAAAAAAAAAAAAAAAAAAAAAAAAAAAn9/fwAAAAADzMzMAMDA/wB/f38AAAAAAAAAAAAAAAAAAAAAAAAAAAAhAAAAGAAAABQAAACyHwAAfRMAAO46AABDHgAAEAAAACYAAAAIAAAAPaAAAAAAAAA="/>
+                <pr:smNativeData xmlns="" xmlns:p14="http://schemas.microsoft.com/office/powerpoint/2010/main" xmlns:pr="smNativeData" val="SMDATA_13_47fkXxMAAAAlAAAAZAAAAA0AAAAAAAAAAAAAAAAAAAAAAAAAAAAAAAAAAAAAAAAAAAEAAABQAAAAAAAAAAAA4D8AAAAAAADgPwAAAAAAAOA/AAAAAAAA4D8AAAAAAADgPwAAAAAAAOA/AAAAAAAA4D8AAAAAAADgPwAAAAAAAOA/AAAAAAAA4D8CAAAAjAAAAAAAAAAAAAAAT4G9DP///wgAAAAAAAAAAAAAAAAAAAAAAAAAAAAAAAAAAAAAZAAAAAEAAABAAAAAAAAAAAAAAAAAAAAAAAAAAAAAAAAAAAAAAAAAAAAAAAAAAAAAAAAAAAAAAAAAAAAAAAAAAAAAAAAAAAAAAAAAAAAAAAAAAAAAAAAAAAAAAAAAAAAAFAAAADwAAAAAAAAAAAAAAAAAAAkUAAAAAQAAABQAAAAUAAAAFAAAAAEAAAAAAAAAZAAAAGQAAAAAAAAAZAAAAGQAAAAVAAAAYAAAAAAAAAAAAAAADwAAACADAAAAAAAAAAAAAAEAAACgMgAAVgcAAKr4//8BAAAAf39/AAEAAABkAAAAAAAAABQAAABAHwAAAAAAACYAAAAAAAAAwOD//wAAAAAmAAAAZAAAABYAAABMAAAAAAAAAAAAAAAEAAAAAAAAAAEAAADu7OEKAAAAACgAAAAoAAAAZAAAAGQAAAAAAAAAzMzMAAAAAABQAAAAUAAAAGQAAABkAAAAAAAAABcAAAAUAAAAAAAAAAAAAAD/fwAA/38AAAAAAAAJAAAABAAAAAAAAAAMAAAAEAAAAAAAAAAAAAAAAAAAAAAAAAAeAAAAaAAAAAAAAAAAAAAAAAAAAAAAAAAAAAAAECcAABAnAAAAAAAAAAAAAAAAAAAAAAAAAAAAAAAAAAAAAAAAAAAAABQAAAAAAAAAwMD/AAAAAABkAAAAMgAAAAAAAABkAAAAAAAAAH9/fwAKAAAAHwAAAFQAAAAAAAAFAAAAAQAAAAAAAAAAAAAAAAAAAAAAAAAAAAAAAAAAAAAAAAAAAAAAAn9/fwAAAAADzMzMAMDA/wB/f38AAAAAAAAAAAAAAAAAAAAAAAAAAAAhAAAAGAAAABQAAACyHwAAfRMAAO46AABDHgAAEAAAACYAAAAIAAAAPaAAAAAAAAA="/>
               </a:ext>
             </a:extLst>
           </p:cNvSpPr>
@@ -2313,7 +2338,7 @@
             <a:spLocks noGrp="1" noChangeArrowheads="1"/>
             <a:extLst>
               <a:ext uri="smNativeData">
-                <pr:smNativeData xmlns:pr="smNativeData" val="SMDATA_13_47fkXxMAAAAlAAAAZAAAAA0AAAAAAAAAAAAAAAAAAAAAAAAAAAAAAAAAAAAAAAAAAAEAAABQAAAAAAAAAAAA4D8AAAAAAADgPwAAAAAAAOA/AAAAAAAA4D8AAAAAAADgPwAAAAAAAOA/AAAAAAAA4D8AAAAAAADgPwAAAAAAAOA/AAAAAAAA4D8CAAAAjAAAAAAAAAAAAAAAT4G9DP///wgAAAAAAAAAAAAAAAAAAAAAAAAAAAAAAAAAAAAAZAAAAAEAAABAAAAAAAAAAAAAAAAAAAAAAAAAAAAAAAAAAAAAAAAAAAAAAAAAAAAAAAAAAAAAAAAAAAAAAAAAAAAAAAAAAAAAAAAAAAAAAAAAAAAAAAAAAAAAAAAAAAAAFAAAADwAAAAAAAAAAAAAAAAAAAkUAAAAAQAAABQAAAAUAAAAFAAAAAEAAAAAAAAAZAAAAGQAAAAAAAAAZAAAAGQAAAAVAAAAYAAAAAAAAAAAAAAADwAAACADAAAAAAAAAAAAAAEAAACgMgAAVgcAAKr4//8BAAAAf39/AAEAAABkAAAAAAAAABQAAABAHwAAAAAAACYAAAAAAAAAwOD//wAAAAAmAAAAZAAAABYAAABMAAAAAAAAAAAAAAAEAAAAAAAAAAEAAADu7OEKAAAAACgAAAAoAAAAZAAAAGQAAAAAAAAAzMzMAAAAAABQAAAAUAAAAGQAAABkAAAAAAAAABcAAAAUAAAAAAAAAAAAAAD/fwAA/38AAAAAAAAJAAAABAAAAAAAAAAMAAAAEAAAAAAAAAAAAAAAAAAAAAAAAAAeAAAAaAAAAAAAAAAAAAAAAAAAAAAAAAAAAAAAECcAABAnAAAAAAAAAAAAAAAAAAAAAAAAAAAAAAAAAAAAAAAAAAAAABQAAAAAAAAAwMD/AAAAAABkAAAAMgAAAAAAAABkAAAAAAAAAH9/fwAKAAAAHwAAAFQAAAAAAAAFAAAAAQAAAAAAAAAAAAAAAAAAAAAAAAAAAAAAAAAAAAAAAAAAAAAAAn9/fwAAAAADzMzMAMDA/wB/f38AAAAAAAAAAAAAAAAAAAAAAAAAAAAhAAAAGAAAABQAAACyHwAASh8AAO46AAAQKgAAEAAAACYAAAAIAAAAPaAAAAAAAAA="/>
+                <pr:smNativeData xmlns="" xmlns:p14="http://schemas.microsoft.com/office/powerpoint/2010/main" xmlns:pr="smNativeData" val="SMDATA_13_47fkXxMAAAAlAAAAZAAAAA0AAAAAAAAAAAAAAAAAAAAAAAAAAAAAAAAAAAAAAAAAAAEAAABQAAAAAAAAAAAA4D8AAAAAAADgPwAAAAAAAOA/AAAAAAAA4D8AAAAAAADgPwAAAAAAAOA/AAAAAAAA4D8AAAAAAADgPwAAAAAAAOA/AAAAAAAA4D8CAAAAjAAAAAAAAAAAAAAAT4G9DP///wgAAAAAAAAAAAAAAAAAAAAAAAAAAAAAAAAAAAAAZAAAAAEAAABAAAAAAAAAAAAAAAAAAAAAAAAAAAAAAAAAAAAAAAAAAAAAAAAAAAAAAAAAAAAAAAAAAAAAAAAAAAAAAAAAAAAAAAAAAAAAAAAAAAAAAAAAAAAAAAAAAAAAFAAAADwAAAAAAAAAAAAAAAAAAAkUAAAAAQAAABQAAAAUAAAAFAAAAAEAAAAAAAAAZAAAAGQAAAAAAAAAZAAAAGQAAAAVAAAAYAAAAAAAAAAAAAAADwAAACADAAAAAAAAAAAAAAEAAACgMgAAVgcAAKr4//8BAAAAf39/AAEAAABkAAAAAAAAABQAAABAHwAAAAAAACYAAAAAAAAAwOD//wAAAAAmAAAAZAAAABYAAABMAAAAAAAAAAAAAAAEAAAAAAAAAAEAAADu7OEKAAAAACgAAAAoAAAAZAAAAGQAAAAAAAAAzMzMAAAAAABQAAAAUAAAAGQAAABkAAAAAAAAABcAAAAUAAAAAAAAAAAAAAD/fwAA/38AAAAAAAAJAAAABAAAAAAAAAAMAAAAEAAAAAAAAAAAAAAAAAAAAAAAAAAeAAAAaAAAAAAAAAAAAAAAAAAAAAAAAAAAAAAAECcAABAnAAAAAAAAAAAAAAAAAAAAAAAAAAAAAAAAAAAAAAAAAAAAABQAAAAAAAAAwMD/AAAAAABkAAAAMgAAAAAAAABkAAAAAAAAAH9/fwAKAAAAHwAAAFQAAAAAAAAFAAAAAQAAAAAAAAAAAAAAAAAAAAAAAAAAAAAAAAAAAAAAAAAAAAAAAn9/fwAAAAADzMzMAMDA/wB/f38AAAAAAAAAAAAAAAAAAAAAAAAAAAAhAAAAGAAAABQAAACyHwAASh8AAO46AAAQKgAAEAAAACYAAAAIAAAAPaAAAAAAAAA="/>
               </a:ext>
             </a:extLst>
           </p:cNvSpPr>
@@ -2377,7 +2402,7 @@
 </file>
 
 <file path=ppt/slideLayouts/slideLayout21.xml><?xml version="1.0" encoding="utf-8"?>
-<p:sldLayout xmlns:p="http://schemas.openxmlformats.org/presentationml/2006/main" xmlns:p14="http://schemas.microsoft.com/office/powerpoint/2010/main" xmlns:r="http://schemas.openxmlformats.org/officeDocument/2006/relationships" xmlns:a="http://schemas.openxmlformats.org/drawingml/2006/main" type="twoObjOverTx" preserve="1">
+<p:sldLayout xmlns:a="http://schemas.openxmlformats.org/drawingml/2006/main" xmlns:r="http://schemas.openxmlformats.org/officeDocument/2006/relationships" xmlns:p="http://schemas.openxmlformats.org/presentationml/2006/main" type="twoObjOverTx" preserve="1">
   <p:cSld name="Title, 2 Content over Content">
     <p:spTree>
       <p:nvGrpSpPr>
@@ -2400,7 +2425,7 @@
             <a:spLocks noGrp="1" noChangeArrowheads="1"/>
             <a:extLst>
               <a:ext uri="smNativeData">
-                <pr:smNativeData xmlns:pr="smNativeData" val="SMDATA_13_47fkXxMAAAAlAAAAZAAAAA0AAAAAAAAAAAAAAAAAAAAAAAAAAAAAAAABAAAAAAAAAAEAAABQAAAAAAAAAAAA4D8AAAAAAADgPwAAAAAAAOA/AAAAAAAA4D8AAAAAAADgPwAAAAAAAOA/AAAAAAAA4D8AAAAAAADgPwAAAAAAAOA/AAAAAAAA4D8CAAAAjAAAAAAAAAAAAAAAT4G9DP///wgAAAAAAAAAAAAAAAAAAAAAAAAAAAAAAAAAAAAAZAAAAAEAAABAAAAAAAAAAAAAAAAAAAAAAAAAAAAAAAAAAAAAAAAAAAAAAAAAAAAAAAAAAAAAAAAAAAAAAAAAAAAAAAAAAAAAAAAAAAAAAAAAAAAAAAAAAAAAAAAAAAAAFAAAADwAAAAAAAAAAAAAAAAAAAkUAAAAAQAAABQAAAAUAAAAFAAAAAEAAAAAAAAAZAAAAGQAAAAAAAAAZAAAAGQAAAAVAAAAYAAAAAAAAAAAAAAADwAAACADAAAAAAAAAAAAAAEAAACgMgAAVgcAAKr4//8BAAAAf39/AAEAAABkAAAAAAAAABQAAABAHwAAAAAAACYAAAAAAAAAwOD//wAAAAAmAAAAZAAAABYAAABMAAAAAAAAAAAAAAAEAAAAAAAAAAEAAADu7OEKAAAAACgAAAAoAAAAZAAAAGQAAAAAAAAAzMzMAAAAAABQAAAAUAAAAGQAAABkAAAAAAAAABcAAAAUAAAAAAAAAAAAAAD/fwAA/38AAAAAAAAJAAAABAAAAAAAAAAMAAAAEAAAAAAAAAAAAAAAAAAAAAAAAAAeAAAAaAAAAAAAAAAAAAAAAAAAAAAAAAAAAAAAECcAABAnAAAAAAAAAAAAAAAAAAAAAAAAAAAAAAAAAAAAAAAAAAAAABQAAAAAAAAAwMD/AAAAAABkAAAAMgAAAAAAAABkAAAAAAAAAH9/fwAKAAAAHwAAAFQAAAAAAAAFAAAAAQAAAAAAAAAAAAAAAAAAAAAAAAAAAAAAAAAAAAAAAAAAAAAAAn9/fwAAAAADzMzMAMDA/wB/f38AAAAAAAAAAAAAAAAAAAAAAAAAAAAhAAAAGAAAABQAAAAaAwAApQYAAOg6AABGEQAAEAAAACYAAAAIAAAAPaAAAAAAAAA="/>
+                <pr:smNativeData xmlns="" xmlns:p14="http://schemas.microsoft.com/office/powerpoint/2010/main" xmlns:pr="smNativeData" val="SMDATA_13_47fkXxMAAAAlAAAAZAAAAA0AAAAAAAAAAAAAAAAAAAAAAAAAAAAAAAABAAAAAAAAAAEAAABQAAAAAAAAAAAA4D8AAAAAAADgPwAAAAAAAOA/AAAAAAAA4D8AAAAAAADgPwAAAAAAAOA/AAAAAAAA4D8AAAAAAADgPwAAAAAAAOA/AAAAAAAA4D8CAAAAjAAAAAAAAAAAAAAAT4G9DP///wgAAAAAAAAAAAAAAAAAAAAAAAAAAAAAAAAAAAAAZAAAAAEAAABAAAAAAAAAAAAAAAAAAAAAAAAAAAAAAAAAAAAAAAAAAAAAAAAAAAAAAAAAAAAAAAAAAAAAAAAAAAAAAAAAAAAAAAAAAAAAAAAAAAAAAAAAAAAAAAAAAAAAFAAAADwAAAAAAAAAAAAAAAAAAAkUAAAAAQAAABQAAAAUAAAAFAAAAAEAAAAAAAAAZAAAAGQAAAAAAAAAZAAAAGQAAAAVAAAAYAAAAAAAAAAAAAAADwAAACADAAAAAAAAAAAAAAEAAACgMgAAVgcAAKr4//8BAAAAf39/AAEAAABkAAAAAAAAABQAAABAHwAAAAAAACYAAAAAAAAAwOD//wAAAAAmAAAAZAAAABYAAABMAAAAAAAAAAAAAAAEAAAAAAAAAAEAAADu7OEKAAAAACgAAAAoAAAAZAAAAGQAAAAAAAAAzMzMAAAAAABQAAAAUAAAAGQAAABkAAAAAAAAABcAAAAUAAAAAAAAAAAAAAD/fwAA/38AAAAAAAAJAAAABAAAAAAAAAAMAAAAEAAAAAAAAAAAAAAAAAAAAAAAAAAeAAAAaAAAAAAAAAAAAAAAAAAAAAAAAAAAAAAAECcAABAnAAAAAAAAAAAAAAAAAAAAAAAAAAAAAAAAAAAAAAAAAAAAABQAAAAAAAAAwMD/AAAAAABkAAAAMgAAAAAAAABkAAAAAAAAAH9/fwAKAAAAHwAAAFQAAAAAAAAFAAAAAQAAAAAAAAAAAAAAAAAAAAAAAAAAAAAAAAAAAAAAAAAAAAAAAn9/fwAAAAADzMzMAMDA/wB/f38AAAAAAAAAAAAAAAAAAAAAAAAAAAAhAAAAGAAAABQAAAAaAwAApQYAAOg6AABGEQAAEAAAACYAAAAIAAAAPaAAAAAAAAA="/>
               </a:ext>
             </a:extLst>
           </p:cNvSpPr>
@@ -2444,7 +2469,7 @@
             <a:spLocks noGrp="1" noChangeArrowheads="1"/>
             <a:extLst>
               <a:ext uri="smNativeData">
-                <pr:smNativeData xmlns:pr="smNativeData" val="SMDATA_13_47fkXxMAAAAlAAAAZAAAAA0AAAAAAAAAAAAAAAAAAAAAAAAAAAAAAAAAAAAAAAAAAAEAAABQAAAAAAAAAAAA4D8AAAAAAADgPwAAAAAAAOA/AAAAAAAA4D8AAAAAAADgPwAAAAAAAOA/AAAAAAAA4D8AAAAAAADgPwAAAAAAAOA/AAAAAAAA4D8CAAAAjAAAAAAAAAAAAAAAT4G9DP///wgAAAAAAAAAAAAAAAAAAAAAAAAAAAAAAAAAAAAAZAAAAAEAAABAAAAAAAAAAAAAAAAAAAAAAAAAAAAAAAAAAAAAAAAAAAAAAAAAAAAAAAAAAAAAAAAAAAAAAAAAAAAAAAAAAAAAAAAAAAAAAAAAAAAAAAAAAAAAAAAAAAAAFAAAADwAAAAAAAAAAAAAAAAAAAkUAAAAAQAAABQAAAAUAAAAFAAAAAEAAAAAAAAAZAAAAGQAAAAAAAAAZAAAAGQAAAAVAAAAYAAAAAAAAAAAAAAADwAAACADAAAAAAAAAAAAAAEAAACgMgAAVgcAAKr4//8BAAAAf39/AAEAAABkAAAAAAAAABQAAABAHwAAAAAAACYAAAAAAAAAwOD//wAAAAAmAAAAZAAAABYAAABMAAAAAAAAAAAAAAAEAAAAAAAAAAEAAADu7OEKAAAAACgAAAAoAAAAZAAAAGQAAAAAAAAAzMzMAAAAAABQAAAAUAAAAGQAAABkAAAAAAAAABcAAAAUAAAAAAAAAAAAAAD/fwAA/38AAAAAAAAJAAAABAAAAAAAAAAMAAAAEAAAAAAAAAAAAAAAAAAAAAAAAAAeAAAAaAAAAAAAAAAAAAAAAAAAAAAAAAAAAAAAECcAABAnAAAAAAAAAAAAAAAAAAAAAAAAAAAAAAAAAAAAAAAAAAAAABQAAAAAAAAAwMD/AAAAAABkAAAAMgAAAAAAAABkAAAAAAAAAH9/fwAKAAAAHwAAAFQAAAAAAAAFAAAAAQAAAAAAAAAAAAAAAAAAAAAAAAAAAAAAAAAAAAAAAAAAAAAAAn9/fwAAAAADzMzMAMDA/wB/f38AAAAAAAAAAAAAAAAAAAAAAAAAAAAhAAAAGAAAABQAAAAaAwAAfRMAAFUeAABDHgAAEAAAACYAAAAIAAAAPaAAAAAAAAA="/>
+                <pr:smNativeData xmlns="" xmlns:p14="http://schemas.microsoft.com/office/powerpoint/2010/main" xmlns:pr="smNativeData" val="SMDATA_13_47fkXxMAAAAlAAAAZAAAAA0AAAAAAAAAAAAAAAAAAAAAAAAAAAAAAAAAAAAAAAAAAAEAAABQAAAAAAAAAAAA4D8AAAAAAADgPwAAAAAAAOA/AAAAAAAA4D8AAAAAAADgPwAAAAAAAOA/AAAAAAAA4D8AAAAAAADgPwAAAAAAAOA/AAAAAAAA4D8CAAAAjAAAAAAAAAAAAAAAT4G9DP///wgAAAAAAAAAAAAAAAAAAAAAAAAAAAAAAAAAAAAAZAAAAAEAAABAAAAAAAAAAAAAAAAAAAAAAAAAAAAAAAAAAAAAAAAAAAAAAAAAAAAAAAAAAAAAAAAAAAAAAAAAAAAAAAAAAAAAAAAAAAAAAAAAAAAAAAAAAAAAAAAAAAAAFAAAADwAAAAAAAAAAAAAAAAAAAkUAAAAAQAAABQAAAAUAAAAFAAAAAEAAAAAAAAAZAAAAGQAAAAAAAAAZAAAAGQAAAAVAAAAYAAAAAAAAAAAAAAADwAAACADAAAAAAAAAAAAAAEAAACgMgAAVgcAAKr4//8BAAAAf39/AAEAAABkAAAAAAAAABQAAABAHwAAAAAAACYAAAAAAAAAwOD//wAAAAAmAAAAZAAAABYAAABMAAAAAAAAAAAAAAAEAAAAAAAAAAEAAADu7OEKAAAAACgAAAAoAAAAZAAAAGQAAAAAAAAAzMzMAAAAAABQAAAAUAAAAGQAAABkAAAAAAAAABcAAAAUAAAAAAAAAAAAAAD/fwAA/38AAAAAAAAJAAAABAAAAAAAAAAMAAAAEAAAAAAAAAAAAAAAAAAAAAAAAAAeAAAAaAAAAAAAAAAAAAAAAAAAAAAAAAAAAAAAECcAABAnAAAAAAAAAAAAAAAAAAAAAAAAAAAAAAAAAAAAAAAAAAAAABQAAAAAAAAAwMD/AAAAAABkAAAAMgAAAAAAAABkAAAAAAAAAH9/fwAKAAAAHwAAAFQAAAAAAAAFAAAAAQAAAAAAAAAAAAAAAAAAAAAAAAAAAAAAAAAAAAAAAAAAAAAAAn9/fwAAAAADzMzMAMDA/wB/f38AAAAAAAAAAAAAAAAAAAAAAAAAAAAhAAAAGAAAABQAAAAaAwAAfRMAAFUeAABDHgAAEAAAACYAAAAIAAAAPaAAAAAAAAA="/>
               </a:ext>
             </a:extLst>
           </p:cNvSpPr>
@@ -2506,7 +2531,7 @@
             <a:spLocks noGrp="1" noChangeArrowheads="1"/>
             <a:extLst>
               <a:ext uri="smNativeData">
-                <pr:smNativeData xmlns:pr="smNativeData" val="SMDATA_13_47fkXxMAAAAlAAAAZAAAAA0AAAAAAAAAAAAAAAAAAAAAAAAAAAAAAAAAAAAAAAAAAAEAAABQAAAAAAAAAAAA4D8AAAAAAADgPwAAAAAAAOA/AAAAAAAA4D8AAAAAAADgPwAAAAAAAOA/AAAAAAAA4D8AAAAAAADgPwAAAAAAAOA/AAAAAAAA4D8CAAAAjAAAAAAAAAAAAAAAT4G9DP///wgAAAAAAAAAAAAAAAAAAAAAAAAAAAAAAAAAAAAAZAAAAAEAAABAAAAAAAAAAAAAAAAAAAAAAAAAAAAAAAAAAAAAAAAAAAAAAAAAAAAAAAAAAAAAAAAAAAAAAAAAAAAAAAAAAAAAAAAAAAAAAAAAAAAAAAAAAAAAAAAAAAAAFAAAADwAAAAAAAAAAAAAAAAAAAkUAAAAAQAAABQAAAAUAAAAFAAAAAEAAAAAAAAAZAAAAGQAAAAAAAAAZAAAAGQAAAAVAAAAYAAAAAAAAAAAAAAADwAAACADAAAAAAAAAAAAAAEAAACgMgAAVgcAAKr4//8BAAAAf39/AAEAAABkAAAAAAAAABQAAABAHwAAAAAAACYAAAAAAAAAwOD//wAAAAAmAAAAZAAAABYAAABMAAAAAAAAAAAAAAAEAAAAAAAAAAEAAADu7OEKAAAAACgAAAAoAAAAZAAAAGQAAAAAAAAAzMzMAAAAAABQAAAAUAAAAGQAAABkAAAAAAAAABcAAAAUAAAAAAAAAAAAAAD/fwAA/38AAAAAAAAJAAAABAAAAAAAAAAMAAAAEAAAAAAAAAAAAAAAAAAAAAAAAAAeAAAAaAAAAAAAAAAAAAAAAAAAAAAAAAAAAAAAECcAABAnAAAAAAAAAAAAAAAAAAAAAAAAAAAAAAAAAAAAAAAAAAAAABQAAAAAAAAAwMD/AAAAAABkAAAAMgAAAAAAAABkAAAAAAAAAH9/fwAKAAAAHwAAAFQAAAAAAAAFAAAAAQAAAAAAAAAAAAAAAAAAAAAAAAAAAAAAAAAAAAAAAAAAAAAAAn9/fwAAAAADzMzMAMDA/wB/f38AAAAAAAAAAAAAAAAAAAAAAAAAAAAhAAAAGAAAABQAAACyHwAAfRMAAO46AABDHgAAEAAAACYAAAAIAAAAPaAAAAAAAAA="/>
+                <pr:smNativeData xmlns="" xmlns:p14="http://schemas.microsoft.com/office/powerpoint/2010/main" xmlns:pr="smNativeData" val="SMDATA_13_47fkXxMAAAAlAAAAZAAAAA0AAAAAAAAAAAAAAAAAAAAAAAAAAAAAAAAAAAAAAAAAAAEAAABQAAAAAAAAAAAA4D8AAAAAAADgPwAAAAAAAOA/AAAAAAAA4D8AAAAAAADgPwAAAAAAAOA/AAAAAAAA4D8AAAAAAADgPwAAAAAAAOA/AAAAAAAA4D8CAAAAjAAAAAAAAAAAAAAAT4G9DP///wgAAAAAAAAAAAAAAAAAAAAAAAAAAAAAAAAAAAAAZAAAAAEAAABAAAAAAAAAAAAAAAAAAAAAAAAAAAAAAAAAAAAAAAAAAAAAAAAAAAAAAAAAAAAAAAAAAAAAAAAAAAAAAAAAAAAAAAAAAAAAAAAAAAAAAAAAAAAAAAAAAAAAFAAAADwAAAAAAAAAAAAAAAAAAAkUAAAAAQAAABQAAAAUAAAAFAAAAAEAAAAAAAAAZAAAAGQAAAAAAAAAZAAAAGQAAAAVAAAAYAAAAAAAAAAAAAAADwAAACADAAAAAAAAAAAAAAEAAACgMgAAVgcAAKr4//8BAAAAf39/AAEAAABkAAAAAAAAABQAAABAHwAAAAAAACYAAAAAAAAAwOD//wAAAAAmAAAAZAAAABYAAABMAAAAAAAAAAAAAAAEAAAAAAAAAAEAAADu7OEKAAAAACgAAAAoAAAAZAAAAGQAAAAAAAAAzMzMAAAAAABQAAAAUAAAAGQAAABkAAAAAAAAABcAAAAUAAAAAAAAAAAAAAD/fwAA/38AAAAAAAAJAAAABAAAAAAAAAAMAAAAEAAAAAAAAAAAAAAAAAAAAAAAAAAeAAAAaAAAAAAAAAAAAAAAAAAAAAAAAAAAAAAAECcAABAnAAAAAAAAAAAAAAAAAAAAAAAAAAAAAAAAAAAAAAAAAAAAABQAAAAAAAAAwMD/AAAAAABkAAAAMgAAAAAAAABkAAAAAAAAAH9/fwAKAAAAHwAAAFQAAAAAAAAFAAAAAQAAAAAAAAAAAAAAAAAAAAAAAAAAAAAAAAAAAAAAAAAAAAAAAn9/fwAAAAADzMzMAMDA/wB/f38AAAAAAAAAAAAAAAAAAAAAAAAAAAAhAAAAGAAAABQAAACyHwAAfRMAAO46AABDHgAAEAAAACYAAAAIAAAAPaAAAAAAAAA="/>
               </a:ext>
             </a:extLst>
           </p:cNvSpPr>
@@ -2568,7 +2593,7 @@
             <a:spLocks noGrp="1" noChangeArrowheads="1"/>
             <a:extLst>
               <a:ext uri="smNativeData">
-                <pr:smNativeData xmlns:pr="smNativeData" val="SMDATA_13_47fkXxMAAAAlAAAAZAAAAA0AAAAAAAAAAAAAAAAAAAAAAAAAAAAAAAAAAAAAAAAAAAEAAABQAAAAAAAAAAAA4D8AAAAAAADgPwAAAAAAAOA/AAAAAAAA4D8AAAAAAADgPwAAAAAAAOA/AAAAAAAA4D8AAAAAAADgPwAAAAAAAOA/AAAAAAAA4D8CAAAAjAAAAAAAAAAAAAAAT4G9DP///wgAAAAAAAAAAAAAAAAAAAAAAAAAAAAAAAAAAAAAZAAAAAEAAABAAAAAAAAAAAAAAAAAAAAAAAAAAAAAAAAAAAAAAAAAAAAAAAAAAAAAAAAAAAAAAAAAAAAAAAAAAAAAAAAAAAAAAAAAAAAAAAAAAAAAAAAAAAAAAAAAAAAAFAAAADwAAAAAAAAAAAAAAAAAAAkUAAAAAQAAABQAAAAUAAAAFAAAAAEAAAAAAAAAZAAAAGQAAAAAAAAAZAAAAGQAAAAVAAAAYAAAAAAAAAAAAAAADwAAACADAAAAAAAAAAAAAAEAAACgMgAAVgcAAKr4//8BAAAAf39/AAEAAABkAAAAAAAAABQAAABAHwAAAAAAACYAAAAAAAAAwOD//wAAAAAmAAAAZAAAABYAAABMAAAAAAAAAAAAAAAEAAAAAAAAAAEAAADu7OEKAAAAACgAAAAoAAAAZAAAAGQAAAAAAAAAzMzMAAAAAABQAAAAUAAAAGQAAABkAAAAAAAAABcAAAAUAAAAAAAAAAAAAAD/fwAA/38AAAAAAAAJAAAABAAAAAAAAAAMAAAAEAAAAAAAAAAAAAAAAAAAAAAAAAAeAAAAaAAAAAAAAAAAAAAAAAAAAAAAAAAAAAAAECcAABAnAAAAAAAAAAAAAAAAAAAAAAAAAAAAAAAAAAAAAAAAAAAAABQAAAAAAAAAwMD/AAAAAABkAAAAMgAAAAAAAABkAAAAAAAAAH9/fwAKAAAAHwAAAFQAAAAAAAAFAAAAAQAAAAAAAAAAAAAAAAAAAAAAAAAAAAAAAAAAAAAAAAAAAAAAAn9/fwAAAAADzMzMAMDA/wB/f38AAAAAAAAAAAAAAAAAAAAAAAAAAAAhAAAAGAAAABQAAAAaAwAASh8AAOg6AAAQKgAAEAAAACYAAAAIAAAAPaAAAAAAAAA="/>
+                <pr:smNativeData xmlns="" xmlns:p14="http://schemas.microsoft.com/office/powerpoint/2010/main" xmlns:pr="smNativeData" val="SMDATA_13_47fkXxMAAAAlAAAAZAAAAA0AAAAAAAAAAAAAAAAAAAAAAAAAAAAAAAAAAAAAAAAAAAEAAABQAAAAAAAAAAAA4D8AAAAAAADgPwAAAAAAAOA/AAAAAAAA4D8AAAAAAADgPwAAAAAAAOA/AAAAAAAA4D8AAAAAAADgPwAAAAAAAOA/AAAAAAAA4D8CAAAAjAAAAAAAAAAAAAAAT4G9DP///wgAAAAAAAAAAAAAAAAAAAAAAAAAAAAAAAAAAAAAZAAAAAEAAABAAAAAAAAAAAAAAAAAAAAAAAAAAAAAAAAAAAAAAAAAAAAAAAAAAAAAAAAAAAAAAAAAAAAAAAAAAAAAAAAAAAAAAAAAAAAAAAAAAAAAAAAAAAAAAAAAAAAAFAAAADwAAAAAAAAAAAAAAAAAAAkUAAAAAQAAABQAAAAUAAAAFAAAAAEAAAAAAAAAZAAAAGQAAAAAAAAAZAAAAGQAAAAVAAAAYAAAAAAAAAAAAAAADwAAACADAAAAAAAAAAAAAAEAAACgMgAAVgcAAKr4//8BAAAAf39/AAEAAABkAAAAAAAAABQAAABAHwAAAAAAACYAAAAAAAAAwOD//wAAAAAmAAAAZAAAABYAAABMAAAAAAAAAAAAAAAEAAAAAAAAAAEAAADu7OEKAAAAACgAAAAoAAAAZAAAAGQAAAAAAAAAzMzMAAAAAABQAAAAUAAAAGQAAABkAAAAAAAAABcAAAAUAAAAAAAAAAAAAAD/fwAA/38AAAAAAAAJAAAABAAAAAAAAAAMAAAAEAAAAAAAAAAAAAAAAAAAAAAAAAAeAAAAaAAAAAAAAAAAAAAAAAAAAAAAAAAAAAAAECcAABAnAAAAAAAAAAAAAAAAAAAAAAAAAAAAAAAAAAAAAAAAAAAAABQAAAAAAAAAwMD/AAAAAABkAAAAMgAAAAAAAABkAAAAAAAAAH9/fwAKAAAAHwAAAFQAAAAAAAAFAAAAAQAAAAAAAAAAAAAAAAAAAAAAAAAAAAAAAAAAAAAAAAAAAAAAAn9/fwAAAAADzMzMAMDA/wB/f38AAAAAAAAAAAAAAAAAAAAAAAAAAAAhAAAAGAAAABQAAAAaAwAASh8AAOg6AAAQKgAAEAAAACYAAAAIAAAAPaAAAAAAAAA="/>
               </a:ext>
             </a:extLst>
           </p:cNvSpPr>
@@ -2632,7 +2657,7 @@
 </file>
 
 <file path=ppt/slideLayouts/slideLayout22.xml><?xml version="1.0" encoding="utf-8"?>
-<p:sldLayout xmlns:p="http://schemas.openxmlformats.org/presentationml/2006/main" xmlns:p14="http://schemas.microsoft.com/office/powerpoint/2010/main" xmlns:r="http://schemas.openxmlformats.org/officeDocument/2006/relationships" xmlns:a="http://schemas.openxmlformats.org/drawingml/2006/main" type="objOverTx" preserve="1">
+<p:sldLayout xmlns:a="http://schemas.openxmlformats.org/drawingml/2006/main" xmlns:r="http://schemas.openxmlformats.org/officeDocument/2006/relationships" xmlns:p="http://schemas.openxmlformats.org/presentationml/2006/main" type="objOverTx" preserve="1">
   <p:cSld name="Title, Content over Content">
     <p:spTree>
       <p:nvGrpSpPr>
@@ -2655,7 +2680,7 @@
             <a:spLocks noGrp="1" noChangeArrowheads="1"/>
             <a:extLst>
               <a:ext uri="smNativeData">
-                <pr:smNativeData xmlns:pr="smNativeData" val="SMDATA_13_47fkXxMAAAAlAAAAZAAAAA0AAAAAAAAAAAAAAAAAAAAAAAAAAAAAAAABAAAAAAAAAAEAAABQAAAAAAAAAAAA4D8AAAAAAADgPwAAAAAAAOA/AAAAAAAA4D8AAAAAAADgPwAAAAAAAOA/AAAAAAAA4D8AAAAAAADgPwAAAAAAAOA/AAAAAAAA4D8CAAAAjAAAAAAAAAAAAAAAT4G9DP///wgAAAAAAAAAAAAAAAAAAAAAAAAAAAAAAAAAAAAAZAAAAAEAAABAAAAAAAAAAAAAAAAAAAAAAAAAAAAAAAAAAAAAAAAAAAAAAAAAAAAAAAAAAAAAAAAAAAAAAAAAAAAAAAAAAAAAAAAAAAAAAAAAAAAAAAAAAAAAAAAAAAAAFAAAADwAAAAAAAAAAAAAAAAAAAkUAAAAAQAAABQAAAAUAAAAFAAAAAEAAAAAAAAAZAAAAGQAAAAAAAAAZAAAAGQAAAAVAAAAYAAAAAAAAAAAAAAADwAAACADAAAAAAAAAAAAAAEAAACgMgAAVgcAAKr4//8BAAAAf39/AAEAAABkAAAAAAAAABQAAABAHwAAAAAAACYAAAAAAAAAwOD//wAAAAAmAAAAZAAAABYAAABMAAAAAAAAAAAAAAAEAAAAAAAAAAEAAADu7OEKAAAAACgAAAAoAAAAZAAAAGQAAAAAAAAAzMzMAAAAAABQAAAAUAAAAGQAAABkAAAAAAAAABcAAAAUAAAAAAAAAAAAAAD/fwAA/38AAAAAAAAJAAAABAAAAAAAAAAMAAAAEAAAAAAAAAAAAAAAAAAAAAAAAAAeAAAAaAAAAAAAAAAAAAAAAAAAAAAAAAAAAAAAECcAABAnAAAAAAAAAAAAAAAAAAAAAAAAAAAAAAAAAAAAAAAAAAAAABQAAAAAAAAAwMD/AAAAAABkAAAAMgAAAAAAAABkAAAAAAAAAH9/fwAKAAAAHwAAAFQAAAAAAAAFAAAAAQAAAAAAAAAAAAAAAAAAAAAAAAAAAAAAAAAAAAAAAAAAAAAAAn9/fwAAAAADzMzMAMDA/wB/f38AAAAAAAAAAAAAAAAAAAAAAAAAAAAhAAAAGAAAABQAAAAaAwAApQYAAOg6AABGEQAAEAAAACYAAAAIAAAAPaAAAAAAAAA="/>
+                <pr:smNativeData xmlns="" xmlns:p14="http://schemas.microsoft.com/office/powerpoint/2010/main" xmlns:pr="smNativeData" val="SMDATA_13_47fkXxMAAAAlAAAAZAAAAA0AAAAAAAAAAAAAAAAAAAAAAAAAAAAAAAABAAAAAAAAAAEAAABQAAAAAAAAAAAA4D8AAAAAAADgPwAAAAAAAOA/AAAAAAAA4D8AAAAAAADgPwAAAAAAAOA/AAAAAAAA4D8AAAAAAADgPwAAAAAAAOA/AAAAAAAA4D8CAAAAjAAAAAAAAAAAAAAAT4G9DP///wgAAAAAAAAAAAAAAAAAAAAAAAAAAAAAAAAAAAAAZAAAAAEAAABAAAAAAAAAAAAAAAAAAAAAAAAAAAAAAAAAAAAAAAAAAAAAAAAAAAAAAAAAAAAAAAAAAAAAAAAAAAAAAAAAAAAAAAAAAAAAAAAAAAAAAAAAAAAAAAAAAAAAFAAAADwAAAAAAAAAAAAAAAAAAAkUAAAAAQAAABQAAAAUAAAAFAAAAAEAAAAAAAAAZAAAAGQAAAAAAAAAZAAAAGQAAAAVAAAAYAAAAAAAAAAAAAAADwAAACADAAAAAAAAAAAAAAEAAACgMgAAVgcAAKr4//8BAAAAf39/AAEAAABkAAAAAAAAABQAAABAHwAAAAAAACYAAAAAAAAAwOD//wAAAAAmAAAAZAAAABYAAABMAAAAAAAAAAAAAAAEAAAAAAAAAAEAAADu7OEKAAAAACgAAAAoAAAAZAAAAGQAAAAAAAAAzMzMAAAAAABQAAAAUAAAAGQAAABkAAAAAAAAABcAAAAUAAAAAAAAAAAAAAD/fwAA/38AAAAAAAAJAAAABAAAAAAAAAAMAAAAEAAAAAAAAAAAAAAAAAAAAAAAAAAeAAAAaAAAAAAAAAAAAAAAAAAAAAAAAAAAAAAAECcAABAnAAAAAAAAAAAAAAAAAAAAAAAAAAAAAAAAAAAAAAAAAAAAABQAAAAAAAAAwMD/AAAAAABkAAAAMgAAAAAAAABkAAAAAAAAAH9/fwAKAAAAHwAAAFQAAAAAAAAFAAAAAQAAAAAAAAAAAAAAAAAAAAAAAAAAAAAAAAAAAAAAAAAAAAAAAn9/fwAAAAADzMzMAMDA/wB/f38AAAAAAAAAAAAAAAAAAAAAAAAAAAAhAAAAGAAAABQAAAAaAwAApQYAAOg6AABGEQAAEAAAACYAAAAIAAAAPaAAAAAAAAA="/>
               </a:ext>
             </a:extLst>
           </p:cNvSpPr>
@@ -2699,7 +2724,7 @@
             <a:spLocks noGrp="1" noChangeArrowheads="1"/>
             <a:extLst>
               <a:ext uri="smNativeData">
-                <pr:smNativeData xmlns:pr="smNativeData" val="SMDATA_13_47fkXxMAAAAlAAAAZAAAAA0AAAAAAAAAAAAAAAAAAAAAAAAAAAAAAAAAAAAAAAAAAAEAAABQAAAAAAAAAAAA4D8AAAAAAADgPwAAAAAAAOA/AAAAAAAA4D8AAAAAAADgPwAAAAAAAOA/AAAAAAAA4D8AAAAAAADgPwAAAAAAAOA/AAAAAAAA4D8CAAAAjAAAAAAAAAAAAAAAT4G9DP///wgAAAAAAAAAAAAAAAAAAAAAAAAAAAAAAAAAAAAAZAAAAAEAAABAAAAAAAAAAAAAAAAAAAAAAAAAAAAAAAAAAAAAAAAAAAAAAAAAAAAAAAAAAAAAAAAAAAAAAAAAAAAAAAAAAAAAAAAAAAAAAAAAAAAAAAAAAAAAAAAAAAAAFAAAADwAAAAAAAAAAAAAAAAAAAkUAAAAAQAAABQAAAAUAAAAFAAAAAEAAAAAAAAAZAAAAGQAAAAAAAAAZAAAAGQAAAAVAAAAYAAAAAAAAAAAAAAADwAAACADAAAAAAAAAAAAAAEAAACgMgAAVgcAAKr4//8BAAAAf39/AAEAAABkAAAAAAAAABQAAABAHwAAAAAAACYAAAAAAAAAwOD//wAAAAAmAAAAZAAAABYAAABMAAAAAAAAAAAAAAAEAAAAAAAAAAEAAADu7OEKAAAAACgAAAAoAAAAZAAAAGQAAAAAAAAAzMzMAAAAAABQAAAAUAAAAGQAAABkAAAAAAAAABcAAAAUAAAAAAAAAAAAAAD/fwAA/38AAAAAAAAJAAAABAAAAAAAAAAMAAAAEAAAAAAAAAAAAAAAAAAAAAAAAAAeAAAAaAAAAAAAAAAAAAAAAAAAAAAAAAAAAAAAECcAABAnAAAAAAAAAAAAAAAAAAAAAAAAAAAAAAAAAAAAAAAAAAAAABQAAAAAAAAAwMD/AAAAAABkAAAAMgAAAAAAAABkAAAAAAAAAH9/fwAKAAAAHwAAAFQAAAAAAAAFAAAAAQAAAAAAAAAAAAAAAAAAAAAAAAAAAAAAAAAAAAAAAAAAAAAAAn9/fwAAAAADzMzMAMDA/wB/f38AAAAAAAAAAAAAAAAAAAAAAAAAAAAhAAAAGAAAABQAAAAaAwAAfRMAAOg6AABDHgAAEAAAACYAAAAIAAAAPaAAAAAAAAA="/>
+                <pr:smNativeData xmlns="" xmlns:p14="http://schemas.microsoft.com/office/powerpoint/2010/main" xmlns:pr="smNativeData" val="SMDATA_13_47fkXxMAAAAlAAAAZAAAAA0AAAAAAAAAAAAAAAAAAAAAAAAAAAAAAAAAAAAAAAAAAAEAAABQAAAAAAAAAAAA4D8AAAAAAADgPwAAAAAAAOA/AAAAAAAA4D8AAAAAAADgPwAAAAAAAOA/AAAAAAAA4D8AAAAAAADgPwAAAAAAAOA/AAAAAAAA4D8CAAAAjAAAAAAAAAAAAAAAT4G9DP///wgAAAAAAAAAAAAAAAAAAAAAAAAAAAAAAAAAAAAAZAAAAAEAAABAAAAAAAAAAAAAAAAAAAAAAAAAAAAAAAAAAAAAAAAAAAAAAAAAAAAAAAAAAAAAAAAAAAAAAAAAAAAAAAAAAAAAAAAAAAAAAAAAAAAAAAAAAAAAAAAAAAAAFAAAADwAAAAAAAAAAAAAAAAAAAkUAAAAAQAAABQAAAAUAAAAFAAAAAEAAAAAAAAAZAAAAGQAAAAAAAAAZAAAAGQAAAAVAAAAYAAAAAAAAAAAAAAADwAAACADAAAAAAAAAAAAAAEAAACgMgAAVgcAAKr4//8BAAAAf39/AAEAAABkAAAAAAAAABQAAABAHwAAAAAAACYAAAAAAAAAwOD//wAAAAAmAAAAZAAAABYAAABMAAAAAAAAAAAAAAAEAAAAAAAAAAEAAADu7OEKAAAAACgAAAAoAAAAZAAAAGQAAAAAAAAAzMzMAAAAAABQAAAAUAAAAGQAAABkAAAAAAAAABcAAAAUAAAAAAAAAAAAAAD/fwAA/38AAAAAAAAJAAAABAAAAAAAAAAMAAAAEAAAAAAAAAAAAAAAAAAAAAAAAAAeAAAAaAAAAAAAAAAAAAAAAAAAAAAAAAAAAAAAECcAABAnAAAAAAAAAAAAAAAAAAAAAAAAAAAAAAAAAAAAAAAAAAAAABQAAAAAAAAAwMD/AAAAAABkAAAAMgAAAAAAAABkAAAAAAAAAH9/fwAKAAAAHwAAAFQAAAAAAAAFAAAAAQAAAAAAAAAAAAAAAAAAAAAAAAAAAAAAAAAAAAAAAAAAAAAAAn9/fwAAAAADzMzMAMDA/wB/f38AAAAAAAAAAAAAAAAAAAAAAAAAAAAhAAAAGAAAABQAAAAaAwAAfRMAAOg6AABDHgAAEAAAACYAAAAIAAAAPaAAAAAAAAA="/>
               </a:ext>
             </a:extLst>
           </p:cNvSpPr>
@@ -2761,7 +2786,7 @@
             <a:spLocks noGrp="1" noChangeArrowheads="1"/>
             <a:extLst>
               <a:ext uri="smNativeData">
-                <pr:smNativeData xmlns:pr="smNativeData" val="SMDATA_13_47fkXxMAAAAlAAAAZAAAAA0AAAAAAAAAAAAAAAAAAAAAAAAAAAAAAAAAAAAAAAAAAAEAAABQAAAAAAAAAAAA4D8AAAAAAADgPwAAAAAAAOA/AAAAAAAA4D8AAAAAAADgPwAAAAAAAOA/AAAAAAAA4D8AAAAAAADgPwAAAAAAAOA/AAAAAAAA4D8CAAAAjAAAAAAAAAAAAAAAT4G9DP///wgAAAAAAAAAAAAAAAAAAAAAAAAAAAAAAAAAAAAAZAAAAAEAAABAAAAAAAAAAAAAAAAAAAAAAAAAAAAAAAAAAAAAAAAAAAAAAAAAAAAAAAAAAAAAAAAAAAAAAAAAAAAAAAAAAAAAAAAAAAAAAAAAAAAAAAAAAAAAAAAAAAAAFAAAADwAAAAAAAAAAAAAAAAAAAkUAAAAAQAAABQAAAAUAAAAFAAAAAEAAAAAAAAAZAAAAGQAAAAAAAAAZAAAAGQAAAAVAAAAYAAAAAAAAAAAAAAADwAAACADAAAAAAAAAAAAAAEAAACgMgAAVgcAAKr4//8BAAAAf39/AAEAAABkAAAAAAAAABQAAABAHwAAAAAAACYAAAAAAAAAwOD//wAAAAAmAAAAZAAAABYAAABMAAAAAAAAAAAAAAAEAAAAAAAAAAEAAADu7OEKAAAAACgAAAAoAAAAZAAAAGQAAAAAAAAAzMzMAAAAAABQAAAAUAAAAGQAAABkAAAAAAAAABcAAAAUAAAAAAAAAAAAAAD/fwAA/38AAAAAAAAJAAAABAAAAAAAAAAMAAAAEAAAAAAAAAAAAAAAAAAAAAAAAAAeAAAAaAAAAAAAAAAAAAAAAAAAAAAAAAAAAAAAECcAABAnAAAAAAAAAAAAAAAAAAAAAAAAAAAAAAAAAAAAAAAAAAAAABQAAAAAAAAAwMD/AAAAAABkAAAAMgAAAAAAAABkAAAAAAAAAH9/fwAKAAAAHwAAAFQAAAAAAAAFAAAAAQAAAAAAAAAAAAAAAAAAAAAAAAAAAAAAAAAAAAAAAAAAAAAAAn9/fwAAAAADzMzMAMDA/wB/f38AAAAAAAAAAAAAAAAAAAAAAAAAAAAhAAAAGAAAABQAAAAaAwAASh8AAOg6AAAQKgAAEAAAACYAAAAIAAAAPaAAAAAAAAA="/>
+                <pr:smNativeData xmlns="" xmlns:p14="http://schemas.microsoft.com/office/powerpoint/2010/main" xmlns:pr="smNativeData" val="SMDATA_13_47fkXxMAAAAlAAAAZAAAAA0AAAAAAAAAAAAAAAAAAAAAAAAAAAAAAAAAAAAAAAAAAAEAAABQAAAAAAAAAAAA4D8AAAAAAADgPwAAAAAAAOA/AAAAAAAA4D8AAAAAAADgPwAAAAAAAOA/AAAAAAAA4D8AAAAAAADgPwAAAAAAAOA/AAAAAAAA4D8CAAAAjAAAAAAAAAAAAAAAT4G9DP///wgAAAAAAAAAAAAAAAAAAAAAAAAAAAAAAAAAAAAAZAAAAAEAAABAAAAAAAAAAAAAAAAAAAAAAAAAAAAAAAAAAAAAAAAAAAAAAAAAAAAAAAAAAAAAAAAAAAAAAAAAAAAAAAAAAAAAAAAAAAAAAAAAAAAAAAAAAAAAAAAAAAAAFAAAADwAAAAAAAAAAAAAAAAAAAkUAAAAAQAAABQAAAAUAAAAFAAAAAEAAAAAAAAAZAAAAGQAAAAAAAAAZAAAAGQAAAAVAAAAYAAAAAAAAAAAAAAADwAAACADAAAAAAAAAAAAAAEAAACgMgAAVgcAAKr4//8BAAAAf39/AAEAAABkAAAAAAAAABQAAABAHwAAAAAAACYAAAAAAAAAwOD//wAAAAAmAAAAZAAAABYAAABMAAAAAAAAAAAAAAAEAAAAAAAAAAEAAADu7OEKAAAAACgAAAAoAAAAZAAAAGQAAAAAAAAAzMzMAAAAAABQAAAAUAAAAGQAAABkAAAAAAAAABcAAAAUAAAAAAAAAAAAAAD/fwAA/38AAAAAAAAJAAAABAAAAAAAAAAMAAAAEAAAAAAAAAAAAAAAAAAAAAAAAAAeAAAAaAAAAAAAAAAAAAAAAAAAAAAAAAAAAAAAECcAABAnAAAAAAAAAAAAAAAAAAAAAAAAAAAAAAAAAAAAAAAAAAAAABQAAAAAAAAAwMD/AAAAAABkAAAAMgAAAAAAAABkAAAAAAAAAH9/fwAKAAAAHwAAAFQAAAAAAAAFAAAAAQAAAAAAAAAAAAAAAAAAAAAAAAAAAAAAAAAAAAAAAAAAAAAAAn9/fwAAAAADzMzMAMDA/wB/f38AAAAAAAAAAAAAAAAAAAAAAAAAAAAhAAAAGAAAABQAAAAaAwAASh8AAOg6AAAQKgAAEAAAACYAAAAIAAAAPaAAAAAAAAA="/>
               </a:ext>
             </a:extLst>
           </p:cNvSpPr>
@@ -2825,7 +2850,7 @@
 </file>
 
 <file path=ppt/slideLayouts/slideLayout23.xml><?xml version="1.0" encoding="utf-8"?>
-<p:sldLayout xmlns:p="http://schemas.openxmlformats.org/presentationml/2006/main" xmlns:p14="http://schemas.microsoft.com/office/powerpoint/2010/main" xmlns:r="http://schemas.openxmlformats.org/officeDocument/2006/relationships" xmlns:a="http://schemas.openxmlformats.org/drawingml/2006/main" type="fourObj" preserve="1">
+<p:sldLayout xmlns:a="http://schemas.openxmlformats.org/drawingml/2006/main" xmlns:r="http://schemas.openxmlformats.org/officeDocument/2006/relationships" xmlns:p="http://schemas.openxmlformats.org/presentationml/2006/main" type="fourObj" preserve="1">
   <p:cSld name="Title, 4 Content">
     <p:spTree>
       <p:nvGrpSpPr>
@@ -2848,7 +2873,7 @@
             <a:spLocks noGrp="1" noChangeArrowheads="1"/>
             <a:extLst>
               <a:ext uri="smNativeData">
-                <pr:smNativeData xmlns:pr="smNativeData" val="SMDATA_13_47fkXxMAAAAlAAAAZAAAAA0AAAAAAAAAAAAAAAAAAAAAAAAAAAAAAAABAAAAAAAAAAEAAABQAAAAAAAAAAAA4D8AAAAAAADgPwAAAAAAAOA/AAAAAAAA4D8AAAAAAADgPwAAAAAAAOA/AAAAAAAA4D8AAAAAAADgPwAAAAAAAOA/AAAAAAAA4D8CAAAAjAAAAAAAAAAAAAAAT4G9DP///wgAAAAAAAAAAAAAAAAAAAAAAAAAAAAAAAAAAAAAZAAAAAEAAABAAAAAAAAAAAAAAAAAAAAAAAAAAAAAAAAAAAAAAAAAAAAAAAAAAAAAAAAAAAAAAAAAAAAAAAAAAAAAAAAAAAAAAAAAAAAAAAAAAAAAAAAAAAAAAAAAAAAAFAAAADwAAAAAAAAAAAAAAAAAAAkUAAAAAQAAABQAAAAUAAAAFAAAAAEAAAAAAAAAZAAAAGQAAAAAAAAAZAAAAGQAAAAVAAAAYAAAAAAAAAAAAAAADwAAACADAAAAAAAAAAAAAAEAAACgMgAAVgcAAKr4//8BAAAAf39/AAEAAABkAAAAAAAAABQAAABAHwAAAAAAACYAAAAAAAAAwOD//wAAAAAmAAAAZAAAABYAAABMAAAAAAAAAAAAAAAEAAAAAAAAAAEAAADu7OEKAAAAACgAAAAoAAAAZAAAAGQAAAAAAAAAzMzMAAAAAABQAAAAUAAAAGQAAABkAAAAAAAAABcAAAAUAAAAAAAAAAAAAAD/fwAA/38AAAAAAAAJAAAABAAAAAAAAAAMAAAAEAAAAAAAAAAAAAAAAAAAAAAAAAAeAAAAaAAAAAAAAAAAAAAAAAAAAAAAAAAAAAAAECcAABAnAAAAAAAAAAAAAAAAAAAAAAAAAAAAAAAAAAAAAAAAAAAAABQAAAAAAAAAwMD/AAAAAABkAAAAMgAAAAAAAABkAAAAAAAAAH9/fwAKAAAAHwAAAFQAAAAAAAAFAAAAAQAAAAAAAAAAAAAAAAAAAAAAAAAAAAAAAAAAAAAAAAAAAAAAAn9/fwAAAAADzMzMAMDA/wB/f38AAAAAAAAAAAAAAAAAAAAAAAAAAAAhAAAAGAAAABQAAAAaAwAApQYAAOg6AABGEQAAEAAAACYAAAAIAAAAPaAAAAAAAAA="/>
+                <pr:smNativeData xmlns="" xmlns:p14="http://schemas.microsoft.com/office/powerpoint/2010/main" xmlns:pr="smNativeData" val="SMDATA_13_47fkXxMAAAAlAAAAZAAAAA0AAAAAAAAAAAAAAAAAAAAAAAAAAAAAAAABAAAAAAAAAAEAAABQAAAAAAAAAAAA4D8AAAAAAADgPwAAAAAAAOA/AAAAAAAA4D8AAAAAAADgPwAAAAAAAOA/AAAAAAAA4D8AAAAAAADgPwAAAAAAAOA/AAAAAAAA4D8CAAAAjAAAAAAAAAAAAAAAT4G9DP///wgAAAAAAAAAAAAAAAAAAAAAAAAAAAAAAAAAAAAAZAAAAAEAAABAAAAAAAAAAAAAAAAAAAAAAAAAAAAAAAAAAAAAAAAAAAAAAAAAAAAAAAAAAAAAAAAAAAAAAAAAAAAAAAAAAAAAAAAAAAAAAAAAAAAAAAAAAAAAAAAAAAAAFAAAADwAAAAAAAAAAAAAAAAAAAkUAAAAAQAAABQAAAAUAAAAFAAAAAEAAAAAAAAAZAAAAGQAAAAAAAAAZAAAAGQAAAAVAAAAYAAAAAAAAAAAAAAADwAAACADAAAAAAAAAAAAAAEAAACgMgAAVgcAAKr4//8BAAAAf39/AAEAAABkAAAAAAAAABQAAABAHwAAAAAAACYAAAAAAAAAwOD//wAAAAAmAAAAZAAAABYAAABMAAAAAAAAAAAAAAAEAAAAAAAAAAEAAADu7OEKAAAAACgAAAAoAAAAZAAAAGQAAAAAAAAAzMzMAAAAAABQAAAAUAAAAGQAAABkAAAAAAAAABcAAAAUAAAAAAAAAAAAAAD/fwAA/38AAAAAAAAJAAAABAAAAAAAAAAMAAAAEAAAAAAAAAAAAAAAAAAAAAAAAAAeAAAAaAAAAAAAAAAAAAAAAAAAAAAAAAAAAAAAECcAABAnAAAAAAAAAAAAAAAAAAAAAAAAAAAAAAAAAAAAAAAAAAAAABQAAAAAAAAAwMD/AAAAAABkAAAAMgAAAAAAAABkAAAAAAAAAH9/fwAKAAAAHwAAAFQAAAAAAAAFAAAAAQAAAAAAAAAAAAAAAAAAAAAAAAAAAAAAAAAAAAAAAAAAAAAAAn9/fwAAAAADzMzMAMDA/wB/f38AAAAAAAAAAAAAAAAAAAAAAAAAAAAhAAAAGAAAABQAAAAaAwAApQYAAOg6AABGEQAAEAAAACYAAAAIAAAAPaAAAAAAAAA="/>
               </a:ext>
             </a:extLst>
           </p:cNvSpPr>
@@ -2892,7 +2917,7 @@
             <a:spLocks noGrp="1" noChangeArrowheads="1"/>
             <a:extLst>
               <a:ext uri="smNativeData">
-                <pr:smNativeData xmlns:pr="smNativeData" val="SMDATA_13_47fkXxMAAAAlAAAAZAAAAA0AAAAAAAAAAAAAAAAAAAAAAAAAAAAAAAAAAAAAAAAAAAEAAABQAAAAAAAAAAAA4D8AAAAAAADgPwAAAAAAAOA/AAAAAAAA4D8AAAAAAADgPwAAAAAAAOA/AAAAAAAA4D8AAAAAAADgPwAAAAAAAOA/AAAAAAAA4D8CAAAAjAAAAAAAAAAAAAAAT4G9DP///wgAAAAAAAAAAAAAAAAAAAAAAAAAAAAAAAAAAAAAZAAAAAEAAABAAAAAAAAAAAAAAAAAAAAAAAAAAAAAAAAAAAAAAAAAAAAAAAAAAAAAAAAAAAAAAAAAAAAAAAAAAAAAAAAAAAAAAAAAAAAAAAAAAAAAAAAAAAAAAAAAAAAAFAAAADwAAAAAAAAAAAAAAAAAAAkUAAAAAQAAABQAAAAUAAAAFAAAAAEAAAAAAAAAZAAAAGQAAAAAAAAAZAAAAGQAAAAVAAAAYAAAAAAAAAAAAAAADwAAACADAAAAAAAAAAAAAAEAAACgMgAAVgcAAKr4//8BAAAAf39/AAEAAABkAAAAAAAAABQAAABAHwAAAAAAACYAAAAAAAAAwOD//wAAAAAmAAAAZAAAABYAAABMAAAAAAAAAAAAAAAEAAAAAAAAAAEAAADu7OEKAAAAACgAAAAoAAAAZAAAAGQAAAAAAAAAzMzMAAAAAABQAAAAUAAAAGQAAABkAAAAAAAAABcAAAAUAAAAAAAAAAAAAAD/fwAA/38AAAAAAAAJAAAABAAAAAAAAAAMAAAAEAAAAAAAAAAAAAAAAAAAAAAAAAAeAAAAaAAAAAAAAAAAAAAAAAAAAAAAAAAAAAAAECcAABAnAAAAAAAAAAAAAAAAAAAAAAAAAAAAAAAAAAAAAAAAAAAAABQAAAAAAAAAwMD/AAAAAABkAAAAMgAAAAAAAABkAAAAAAAAAH9/fwAKAAAAHwAAAFQAAAAAAAAFAAAAAQAAAAAAAAAAAAAAAAAAAAAAAAAAAAAAAAAAAAAAAAAAAAAAAn9/fwAAAAADzMzMAMDA/wB/f38AAAAAAAAAAAAAAAAAAAAAAAAAAAAhAAAAGAAAABQAAAAaAwAAfRMAAFUeAABDHgAAEAAAACYAAAAIAAAAPaAAAAAAAAA="/>
+                <pr:smNativeData xmlns="" xmlns:p14="http://schemas.microsoft.com/office/powerpoint/2010/main" xmlns:pr="smNativeData" val="SMDATA_13_47fkXxMAAAAlAAAAZAAAAA0AAAAAAAAAAAAAAAAAAAAAAAAAAAAAAAAAAAAAAAAAAAEAAABQAAAAAAAAAAAA4D8AAAAAAADgPwAAAAAAAOA/AAAAAAAA4D8AAAAAAADgPwAAAAAAAOA/AAAAAAAA4D8AAAAAAADgPwAAAAAAAOA/AAAAAAAA4D8CAAAAjAAAAAAAAAAAAAAAT4G9DP///wgAAAAAAAAAAAAAAAAAAAAAAAAAAAAAAAAAAAAAZAAAAAEAAABAAAAAAAAAAAAAAAAAAAAAAAAAAAAAAAAAAAAAAAAAAAAAAAAAAAAAAAAAAAAAAAAAAAAAAAAAAAAAAAAAAAAAAAAAAAAAAAAAAAAAAAAAAAAAAAAAAAAAFAAAADwAAAAAAAAAAAAAAAAAAAkUAAAAAQAAABQAAAAUAAAAFAAAAAEAAAAAAAAAZAAAAGQAAAAAAAAAZAAAAGQAAAAVAAAAYAAAAAAAAAAAAAAADwAAACADAAAAAAAAAAAAAAEAAACgMgAAVgcAAKr4//8BAAAAf39/AAEAAABkAAAAAAAAABQAAABAHwAAAAAAACYAAAAAAAAAwOD//wAAAAAmAAAAZAAAABYAAABMAAAAAAAAAAAAAAAEAAAAAAAAAAEAAADu7OEKAAAAACgAAAAoAAAAZAAAAGQAAAAAAAAAzMzMAAAAAABQAAAAUAAAAGQAAABkAAAAAAAAABcAAAAUAAAAAAAAAAAAAAD/fwAA/38AAAAAAAAJAAAABAAAAAAAAAAMAAAAEAAAAAAAAAAAAAAAAAAAAAAAAAAeAAAAaAAAAAAAAAAAAAAAAAAAAAAAAAAAAAAAECcAABAnAAAAAAAAAAAAAAAAAAAAAAAAAAAAAAAAAAAAAAAAAAAAABQAAAAAAAAAwMD/AAAAAABkAAAAMgAAAAAAAABkAAAAAAAAAH9/fwAKAAAAHwAAAFQAAAAAAAAFAAAAAQAAAAAAAAAAAAAAAAAAAAAAAAAAAAAAAAAAAAAAAAAAAAAAAn9/fwAAAAADzMzMAMDA/wB/f38AAAAAAAAAAAAAAAAAAAAAAAAAAAAhAAAAGAAAABQAAAAaAwAAfRMAAFUeAABDHgAAEAAAACYAAAAIAAAAPaAAAAAAAAA="/>
               </a:ext>
             </a:extLst>
           </p:cNvSpPr>
@@ -2954,7 +2979,7 @@
             <a:spLocks noGrp="1" noChangeArrowheads="1"/>
             <a:extLst>
               <a:ext uri="smNativeData">
-                <pr:smNativeData xmlns:pr="smNativeData" val="SMDATA_13_47fkXxMAAAAlAAAAZAAAAA0AAAAAAAAAAAAAAAAAAAAAAAAAAAAAAAAAAAAAAAAAAAEAAABQAAAAAAAAAAAA4D8AAAAAAADgPwAAAAAAAOA/AAAAAAAA4D8AAAAAAADgPwAAAAAAAOA/AAAAAAAA4D8AAAAAAADgPwAAAAAAAOA/AAAAAAAA4D8CAAAAjAAAAAAAAAAAAAAAT4G9DP///wgAAAAAAAAAAAAAAAAAAAAAAAAAAAAAAAAAAAAAZAAAAAEAAABAAAAAAAAAAAAAAAAAAAAAAAAAAAAAAAAAAAAAAAAAAAAAAAAAAAAAAAAAAAAAAAAAAAAAAAAAAAAAAAAAAAAAAAAAAAAAAAAAAAAAAAAAAAAAAAAAAAAAFAAAADwAAAAAAAAAAAAAAAAAAAkUAAAAAQAAABQAAAAUAAAAFAAAAAEAAAAAAAAAZAAAAGQAAAAAAAAAZAAAAGQAAAAVAAAAYAAAAAAAAAAAAAAADwAAACADAAAAAAAAAAAAAAEAAACgMgAAVgcAAKr4//8BAAAAf39/AAEAAABkAAAAAAAAABQAAABAHwAAAAAAACYAAAAAAAAAwOD//wAAAAAmAAAAZAAAABYAAABMAAAAAAAAAAAAAAAEAAAAAAAAAAEAAADu7OEKAAAAACgAAAAoAAAAZAAAAGQAAAAAAAAAzMzMAAAAAABQAAAAUAAAAGQAAABkAAAAAAAAABcAAAAUAAAAAAAAAAAAAAD/fwAA/38AAAAAAAAJAAAABAAAAAAAAAAMAAAAEAAAAAAAAAAAAAAAAAAAAAAAAAAeAAAAaAAAAAAAAAAAAAAAAAAAAAAAAAAAAAAAECcAABAnAAAAAAAAAAAAAAAAAAAAAAAAAAAAAAAAAAAAAAAAAAAAABQAAAAAAAAAwMD/AAAAAABkAAAAMgAAAAAAAABkAAAAAAAAAH9/fwAKAAAAHwAAAFQAAAAAAAAFAAAAAQAAAAAAAAAAAAAAAAAAAAAAAAAAAAAAAAAAAAAAAAAAAAAAAn9/fwAAAAADzMzMAMDA/wB/f38AAAAAAAAAAAAAAAAAAAAAAAAAAAAhAAAAGAAAABQAAACyHwAAfRMAAO46AABDHgAAEAAAACYAAAAIAAAAPaAAAAAAAAA="/>
+                <pr:smNativeData xmlns="" xmlns:p14="http://schemas.microsoft.com/office/powerpoint/2010/main" xmlns:pr="smNativeData" val="SMDATA_13_47fkXxMAAAAlAAAAZAAAAA0AAAAAAAAAAAAAAAAAAAAAAAAAAAAAAAAAAAAAAAAAAAEAAABQAAAAAAAAAAAA4D8AAAAAAADgPwAAAAAAAOA/AAAAAAAA4D8AAAAAAADgPwAAAAAAAOA/AAAAAAAA4D8AAAAAAADgPwAAAAAAAOA/AAAAAAAA4D8CAAAAjAAAAAAAAAAAAAAAT4G9DP///wgAAAAAAAAAAAAAAAAAAAAAAAAAAAAAAAAAAAAAZAAAAAEAAABAAAAAAAAAAAAAAAAAAAAAAAAAAAAAAAAAAAAAAAAAAAAAAAAAAAAAAAAAAAAAAAAAAAAAAAAAAAAAAAAAAAAAAAAAAAAAAAAAAAAAAAAAAAAAAAAAAAAAFAAAADwAAAAAAAAAAAAAAAAAAAkUAAAAAQAAABQAAAAUAAAAFAAAAAEAAAAAAAAAZAAAAGQAAAAAAAAAZAAAAGQAAAAVAAAAYAAAAAAAAAAAAAAADwAAACADAAAAAAAAAAAAAAEAAACgMgAAVgcAAKr4//8BAAAAf39/AAEAAABkAAAAAAAAABQAAABAHwAAAAAAACYAAAAAAAAAwOD//wAAAAAmAAAAZAAAABYAAABMAAAAAAAAAAAAAAAEAAAAAAAAAAEAAADu7OEKAAAAACgAAAAoAAAAZAAAAGQAAAAAAAAAzMzMAAAAAABQAAAAUAAAAGQAAABkAAAAAAAAABcAAAAUAAAAAAAAAAAAAAD/fwAA/38AAAAAAAAJAAAABAAAAAAAAAAMAAAAEAAAAAAAAAAAAAAAAAAAAAAAAAAeAAAAaAAAAAAAAAAAAAAAAAAAAAAAAAAAAAAAECcAABAnAAAAAAAAAAAAAAAAAAAAAAAAAAAAAAAAAAAAAAAAAAAAABQAAAAAAAAAwMD/AAAAAABkAAAAMgAAAAAAAABkAAAAAAAAAH9/fwAKAAAAHwAAAFQAAAAAAAAFAAAAAQAAAAAAAAAAAAAAAAAAAAAAAAAAAAAAAAAAAAAAAAAAAAAAAn9/fwAAAAADzMzMAMDA/wB/f38AAAAAAAAAAAAAAAAAAAAAAAAAAAAhAAAAGAAAABQAAACyHwAAfRMAAO46AABDHgAAEAAAACYAAAAIAAAAPaAAAAAAAAA="/>
               </a:ext>
             </a:extLst>
           </p:cNvSpPr>
@@ -3016,7 +3041,7 @@
             <a:spLocks noGrp="1" noChangeArrowheads="1"/>
             <a:extLst>
               <a:ext uri="smNativeData">
-                <pr:smNativeData xmlns:pr="smNativeData" val="SMDATA_13_47fkXxMAAAAlAAAAZAAAAA0AAAAAAAAAAAAAAAAAAAAAAAAAAAAAAAAAAAAAAAAAAAEAAABQAAAAAAAAAAAA4D8AAAAAAADgPwAAAAAAAOA/AAAAAAAA4D8AAAAAAADgPwAAAAAAAOA/AAAAAAAA4D8AAAAAAADgPwAAAAAAAOA/AAAAAAAA4D8CAAAAjAAAAAAAAAAAAAAAT4G9DP///wgAAAAAAAAAAAAAAAAAAAAAAAAAAAAAAAAAAAAAZAAAAAEAAABAAAAAAAAAAAAAAAAAAAAAAAAAAAAAAAAAAAAAAAAAAAAAAAAAAAAAAAAAAAAAAAAAAAAAAAAAAAAAAAAAAAAAAAAAAAAAAAAAAAAAAAAAAAAAAAAAAAAAFAAAADwAAAAAAAAAAAAAAAAAAAkUAAAAAQAAABQAAAAUAAAAFAAAAAEAAAAAAAAAZAAAAGQAAAAAAAAAZAAAAGQAAAAVAAAAYAAAAAAAAAAAAAAADwAAACADAAAAAAAAAAAAAAEAAACgMgAAVgcAAKr4//8BAAAAf39/AAEAAABkAAAAAAAAABQAAABAHwAAAAAAACYAAAAAAAAAwOD//wAAAAAmAAAAZAAAABYAAABMAAAAAAAAAAAAAAAEAAAAAAAAAAEAAADu7OEKAAAAACgAAAAoAAAAZAAAAGQAAAAAAAAAzMzMAAAAAABQAAAAUAAAAGQAAABkAAAAAAAAABcAAAAUAAAAAAAAAAAAAAD/fwAA/38AAAAAAAAJAAAABAAAAAAAAAAMAAAAEAAAAAAAAAAAAAAAAAAAAAAAAAAeAAAAaAAAAAAAAAAAAAAAAAAAAAAAAAAAAAAAECcAABAnAAAAAAAAAAAAAAAAAAAAAAAAAAAAAAAAAAAAAAAAAAAAABQAAAAAAAAAwMD/AAAAAABkAAAAMgAAAAAAAABkAAAAAAAAAH9/fwAKAAAAHwAAAFQAAAAAAAAFAAAAAQAAAAAAAAAAAAAAAAAAAAAAAAAAAAAAAAAAAAAAAAAAAAAAAn9/fwAAAAADzMzMAMDA/wB/f38AAAAAAAAAAAAAAAAAAAAAAAAAAAAhAAAAGAAAABQAAAAaAwAASh8AAFUeAAAQKgAAEAAAACYAAAAIAAAAPaAAAAAAAAA="/>
+                <pr:smNativeData xmlns="" xmlns:p14="http://schemas.microsoft.com/office/powerpoint/2010/main" xmlns:pr="smNativeData" val="SMDATA_13_47fkXxMAAAAlAAAAZAAAAA0AAAAAAAAAAAAAAAAAAAAAAAAAAAAAAAAAAAAAAAAAAAEAAABQAAAAAAAAAAAA4D8AAAAAAADgPwAAAAAAAOA/AAAAAAAA4D8AAAAAAADgPwAAAAAAAOA/AAAAAAAA4D8AAAAAAADgPwAAAAAAAOA/AAAAAAAA4D8CAAAAjAAAAAAAAAAAAAAAT4G9DP///wgAAAAAAAAAAAAAAAAAAAAAAAAAAAAAAAAAAAAAZAAAAAEAAABAAAAAAAAAAAAAAAAAAAAAAAAAAAAAAAAAAAAAAAAAAAAAAAAAAAAAAAAAAAAAAAAAAAAAAAAAAAAAAAAAAAAAAAAAAAAAAAAAAAAAAAAAAAAAAAAAAAAAFAAAADwAAAAAAAAAAAAAAAAAAAkUAAAAAQAAABQAAAAUAAAAFAAAAAEAAAAAAAAAZAAAAGQAAAAAAAAAZAAAAGQAAAAVAAAAYAAAAAAAAAAAAAAADwAAACADAAAAAAAAAAAAAAEAAACgMgAAVgcAAKr4//8BAAAAf39/AAEAAABkAAAAAAAAABQAAABAHwAAAAAAACYAAAAAAAAAwOD//wAAAAAmAAAAZAAAABYAAABMAAAAAAAAAAAAAAAEAAAAAAAAAAEAAADu7OEKAAAAACgAAAAoAAAAZAAAAGQAAAAAAAAAzMzMAAAAAABQAAAAUAAAAGQAAABkAAAAAAAAABcAAAAUAAAAAAAAAAAAAAD/fwAA/38AAAAAAAAJAAAABAAAAAAAAAAMAAAAEAAAAAAAAAAAAAAAAAAAAAAAAAAeAAAAaAAAAAAAAAAAAAAAAAAAAAAAAAAAAAAAECcAABAnAAAAAAAAAAAAAAAAAAAAAAAAAAAAAAAAAAAAAAAAAAAAABQAAAAAAAAAwMD/AAAAAABkAAAAMgAAAAAAAABkAAAAAAAAAH9/fwAKAAAAHwAAAFQAAAAAAAAFAAAAAQAAAAAAAAAAAAAAAAAAAAAAAAAAAAAAAAAAAAAAAAAAAAAAAn9/fwAAAAADzMzMAMDA/wB/f38AAAAAAAAAAAAAAAAAAAAAAAAAAAAhAAAAGAAAABQAAAAaAwAASh8AAFUeAAAQKgAAEAAAACYAAAAIAAAAPaAAAAAAAAA="/>
               </a:ext>
             </a:extLst>
           </p:cNvSpPr>
@@ -3078,7 +3103,7 @@
             <a:spLocks noGrp="1" noChangeArrowheads="1"/>
             <a:extLst>
               <a:ext uri="smNativeData">
-                <pr:smNativeData xmlns:pr="smNativeData" val="SMDATA_13_47fkXxMAAAAlAAAAZAAAAA0AAAAAAAAAAAAAAAAAAAAAAAAAAAAAAAAAAAAAAAAAAAEAAABQAAAAAAAAAAAA4D8AAAAAAADgPwAAAAAAAOA/AAAAAAAA4D8AAAAAAADgPwAAAAAAAOA/AAAAAAAA4D8AAAAAAADgPwAAAAAAAOA/AAAAAAAA4D8CAAAAjAAAAAAAAAAAAAAAT4G9DP///wgAAAAAAAAAAAAAAAAAAAAAAAAAAAAAAAAAAAAAZAAAAAEAAABAAAAAAAAAAAAAAAAAAAAAAAAAAAAAAAAAAAAAAAAAAAAAAAAAAAAAAAAAAAAAAAAAAAAAAAAAAAAAAAAAAAAAAAAAAAAAAAAAAAAAAAAAAAAAAAAAAAAAFAAAADwAAAAAAAAAAAAAAAAAAAkUAAAAAQAAABQAAAAUAAAAFAAAAAEAAAAAAAAAZAAAAGQAAAAAAAAAZAAAAGQAAAAVAAAAYAAAAAAAAAAAAAAADwAAACADAAAAAAAAAAAAAAEAAACgMgAAVgcAAKr4//8BAAAAf39/AAEAAABkAAAAAAAAABQAAABAHwAAAAAAACYAAAAAAAAAwOD//wAAAAAmAAAAZAAAABYAAABMAAAAAAAAAAAAAAAEAAAAAAAAAAEAAADu7OEKAAAAACgAAAAoAAAAZAAAAGQAAAAAAAAAzMzMAAAAAABQAAAAUAAAAGQAAABkAAAAAAAAABcAAAAUAAAAAAAAAAAAAAD/fwAA/38AAAAAAAAJAAAABAAAAAAAAAAMAAAAEAAAAAAAAAAAAAAAAAAAAAAAAAAeAAAAaAAAAAAAAAAAAAAAAAAAAAAAAAAAAAAAECcAABAnAAAAAAAAAAAAAAAAAAAAAAAAAAAAAAAAAAAAAAAAAAAAABQAAAAAAAAAwMD/AAAAAABkAAAAMgAAAAAAAABkAAAAAAAAAH9/fwAKAAAAHwAAAFQAAAAAAAAFAAAAAQAAAAAAAAAAAAAAAAAAAAAAAAAAAAAAAAAAAAAAAAAAAAAAAn9/fwAAAAADzMzMAMDA/wB/f38AAAAAAAAAAAAAAAAAAAAAAAAAAAAhAAAAGAAAABQAAACyHwAASh8AAO46AAAQKgAAEAAAACYAAAAIAAAAPaAAAAAAAAA="/>
+                <pr:smNativeData xmlns="" xmlns:p14="http://schemas.microsoft.com/office/powerpoint/2010/main" xmlns:pr="smNativeData" val="SMDATA_13_47fkXxMAAAAlAAAAZAAAAA0AAAAAAAAAAAAAAAAAAAAAAAAAAAAAAAAAAAAAAAAAAAEAAABQAAAAAAAAAAAA4D8AAAAAAADgPwAAAAAAAOA/AAAAAAAA4D8AAAAAAADgPwAAAAAAAOA/AAAAAAAA4D8AAAAAAADgPwAAAAAAAOA/AAAAAAAA4D8CAAAAjAAAAAAAAAAAAAAAT4G9DP///wgAAAAAAAAAAAAAAAAAAAAAAAAAAAAAAAAAAAAAZAAAAAEAAABAAAAAAAAAAAAAAAAAAAAAAAAAAAAAAAAAAAAAAAAAAAAAAAAAAAAAAAAAAAAAAAAAAAAAAAAAAAAAAAAAAAAAAAAAAAAAAAAAAAAAAAAAAAAAAAAAAAAAFAAAADwAAAAAAAAAAAAAAAAAAAkUAAAAAQAAABQAAAAUAAAAFAAAAAEAAAAAAAAAZAAAAGQAAAAAAAAAZAAAAGQAAAAVAAAAYAAAAAAAAAAAAAAADwAAACADAAAAAAAAAAAAAAEAAACgMgAAVgcAAKr4//8BAAAAf39/AAEAAABkAAAAAAAAABQAAABAHwAAAAAAACYAAAAAAAAAwOD//wAAAAAmAAAAZAAAABYAAABMAAAAAAAAAAAAAAAEAAAAAAAAAAEAAADu7OEKAAAAACgAAAAoAAAAZAAAAGQAAAAAAAAAzMzMAAAAAABQAAAAUAAAAGQAAABkAAAAAAAAABcAAAAUAAAAAAAAAAAAAAD/fwAA/38AAAAAAAAJAAAABAAAAAAAAAAMAAAAEAAAAAAAAAAAAAAAAAAAAAAAAAAeAAAAaAAAAAAAAAAAAAAAAAAAAAAAAAAAAAAAECcAABAnAAAAAAAAAAAAAAAAAAAAAAAAAAAAAAAAAAAAAAAAAAAAABQAAAAAAAAAwMD/AAAAAABkAAAAMgAAAAAAAABkAAAAAAAAAH9/fwAKAAAAHwAAAFQAAAAAAAAFAAAAAQAAAAAAAAAAAAAAAAAAAAAAAAAAAAAAAAAAAAAAAAAAAAAAAn9/fwAAAAADzMzMAMDA/wB/f38AAAAAAAAAAAAAAAAAAAAAAAAAAAAhAAAAGAAAABQAAACyHwAASh8AAO46AAAQKgAAEAAAACYAAAAIAAAAPaAAAAAAAAA="/>
               </a:ext>
             </a:extLst>
           </p:cNvSpPr>
@@ -3142,7 +3167,7 @@
 </file>
 
 <file path=ppt/slideLayouts/slideLayout24.xml><?xml version="1.0" encoding="utf-8"?>
-<p:sldLayout xmlns:p="http://schemas.openxmlformats.org/presentationml/2006/main" xmlns:p14="http://schemas.microsoft.com/office/powerpoint/2010/main" xmlns:r="http://schemas.openxmlformats.org/officeDocument/2006/relationships" xmlns:a="http://schemas.openxmlformats.org/drawingml/2006/main" type="blank" preserve="1">
+<p:sldLayout xmlns:a="http://schemas.openxmlformats.org/drawingml/2006/main" xmlns:r="http://schemas.openxmlformats.org/officeDocument/2006/relationships" xmlns:p="http://schemas.openxmlformats.org/presentationml/2006/main" type="blank" preserve="1">
   <p:cSld name="Title, 6 Content">
     <p:spTree>
       <p:nvGrpSpPr>
@@ -3165,7 +3190,7 @@
             <a:spLocks noGrp="1" noChangeArrowheads="1"/>
             <a:extLst>
               <a:ext uri="smNativeData">
-                <pr:smNativeData xmlns:pr="smNativeData" val="SMDATA_13_47fkXxMAAAAlAAAAZAAAAA0AAAAAAAAAAAAAAAAAAAAAAAAAAAAAAAABAAAAAAAAAAEAAABQAAAAAAAAAAAA4D8AAAAAAADgPwAAAAAAAOA/AAAAAAAA4D8AAAAAAADgPwAAAAAAAOA/AAAAAAAA4D8AAAAAAADgPwAAAAAAAOA/AAAAAAAA4D8CAAAAjAAAAAAAAAAAAAAAT4G9DP///wgAAAAAAAAAAAAAAAAAAAAAAAAAAAAAAAAAAAAAZAAAAAEAAABAAAAAAAAAAAAAAAAAAAAAAAAAAAAAAAAAAAAAAAAAAAAAAAAAAAAAAAAAAAAAAAAAAAAAAAAAAAAAAAAAAAAAAAAAAAAAAAAAAAAAAAAAAAAAAAAAAAAAFAAAADwAAAAAAAAAAAAAAAAAAAkUAAAAAQAAABQAAAAUAAAAFAAAAAEAAAAAAAAAZAAAAGQAAAAAAAAAZAAAAGQAAAAVAAAAYAAAAAAAAAAAAAAADwAAACADAAAAAAAAAAAAAAEAAACgMgAAVgcAAKr4//8BAAAAf39/AAEAAABkAAAAAAAAABQAAABAHwAAAAAAACYAAAAAAAAAwOD//wAAAAAmAAAAZAAAABYAAABMAAAAAAAAAAAAAAAEAAAAAAAAAAEAAADu7OEKAAAAACgAAAAoAAAAZAAAAGQAAAAAAAAAzMzMAAAAAABQAAAAUAAAAGQAAABkAAAAAAAAABcAAAAUAAAAAAAAAAAAAAD/fwAA/38AAAAAAAAJAAAABAAAAAAAAAAMAAAAEAAAAAAAAAAAAAAAAAAAAAAAAAAeAAAAaAAAAAAAAAAAAAAAAAAAAAAAAAAAAAAAECcAABAnAAAAAAAAAAAAAAAAAAAAAAAAAAAAAAAAAAAAAAAAAAAAABQAAAAAAAAAwMD/AAAAAABkAAAAMgAAAAAAAABkAAAAAAAAAH9/fwAKAAAAHwAAAFQAAAAAAAAFAAAAAQAAAAAAAAAAAAAAAAAAAAAAAAAAAAAAAAAAAAAAAAAAAAAAAn9/fwAAAAADzMzMAMDA/wB/f38AAAAAAAAAAAAAAAAAAAAAAAAAAAAhAAAAGAAAABQAAAAaAwAApQYAAOg6AABGEQAAEAAAACYAAAAIAAAAPaAAAAAAAAA="/>
+                <pr:smNativeData xmlns="" xmlns:p14="http://schemas.microsoft.com/office/powerpoint/2010/main" xmlns:pr="smNativeData" val="SMDATA_13_47fkXxMAAAAlAAAAZAAAAA0AAAAAAAAAAAAAAAAAAAAAAAAAAAAAAAABAAAAAAAAAAEAAABQAAAAAAAAAAAA4D8AAAAAAADgPwAAAAAAAOA/AAAAAAAA4D8AAAAAAADgPwAAAAAAAOA/AAAAAAAA4D8AAAAAAADgPwAAAAAAAOA/AAAAAAAA4D8CAAAAjAAAAAAAAAAAAAAAT4G9DP///wgAAAAAAAAAAAAAAAAAAAAAAAAAAAAAAAAAAAAAZAAAAAEAAABAAAAAAAAAAAAAAAAAAAAAAAAAAAAAAAAAAAAAAAAAAAAAAAAAAAAAAAAAAAAAAAAAAAAAAAAAAAAAAAAAAAAAAAAAAAAAAAAAAAAAAAAAAAAAAAAAAAAAFAAAADwAAAAAAAAAAAAAAAAAAAkUAAAAAQAAABQAAAAUAAAAFAAAAAEAAAAAAAAAZAAAAGQAAAAAAAAAZAAAAGQAAAAVAAAAYAAAAAAAAAAAAAAADwAAACADAAAAAAAAAAAAAAEAAACgMgAAVgcAAKr4//8BAAAAf39/AAEAAABkAAAAAAAAABQAAABAHwAAAAAAACYAAAAAAAAAwOD//wAAAAAmAAAAZAAAABYAAABMAAAAAAAAAAAAAAAEAAAAAAAAAAEAAADu7OEKAAAAACgAAAAoAAAAZAAAAGQAAAAAAAAAzMzMAAAAAABQAAAAUAAAAGQAAABkAAAAAAAAABcAAAAUAAAAAAAAAAAAAAD/fwAA/38AAAAAAAAJAAAABAAAAAAAAAAMAAAAEAAAAAAAAAAAAAAAAAAAAAAAAAAeAAAAaAAAAAAAAAAAAAAAAAAAAAAAAAAAAAAAECcAABAnAAAAAAAAAAAAAAAAAAAAAAAAAAAAAAAAAAAAAAAAAAAAABQAAAAAAAAAwMD/AAAAAABkAAAAMgAAAAAAAABkAAAAAAAAAH9/fwAKAAAAHwAAAFQAAAAAAAAFAAAAAQAAAAAAAAAAAAAAAAAAAAAAAAAAAAAAAAAAAAAAAAAAAAAAAn9/fwAAAAADzMzMAMDA/wB/f38AAAAAAAAAAAAAAAAAAAAAAAAAAAAhAAAAGAAAABQAAAAaAwAApQYAAOg6AABGEQAAEAAAACYAAAAIAAAAPaAAAAAAAAA="/>
               </a:ext>
             </a:extLst>
           </p:cNvSpPr>
@@ -3209,7 +3234,7 @@
             <a:spLocks noGrp="1" noChangeArrowheads="1"/>
             <a:extLst>
               <a:ext uri="smNativeData">
-                <pr:smNativeData xmlns:pr="smNativeData" val="SMDATA_13_47fkXxMAAAAlAAAAZAAAAA0AAAAAAAAAAAAAAAAAAAAAAAAAAAAAAAAAAAAAAAAAAAEAAABQAAAAAAAAAAAA4D8AAAAAAADgPwAAAAAAAOA/AAAAAAAA4D8AAAAAAADgPwAAAAAAAOA/AAAAAAAA4D8AAAAAAADgPwAAAAAAAOA/AAAAAAAA4D8CAAAAjAAAAAAAAAAAAAAAT4G9DP///wgAAAAAAAAAAAAAAAAAAAAAAAAAAAAAAAAAAAAAZAAAAAEAAABAAAAAAAAAAAAAAAAAAAAAAAAAAAAAAAAAAAAAAAAAAAAAAAAAAAAAAAAAAAAAAAAAAAAAAAAAAAAAAAAAAAAAAAAAAAAAAAAAAAAAAAAAAAAAAAAAAAAAFAAAADwAAAAAAAAAAAAAAAAAAAkUAAAAAQAAABQAAAAUAAAAFAAAAAEAAAAAAAAAZAAAAGQAAAAAAAAAZAAAAGQAAAAVAAAAYAAAAAAAAAAAAAAADwAAACADAAAAAAAAAAAAAAEAAACgMgAAVgcAAKr4//8BAAAAf39/AAEAAABkAAAAAAAAABQAAABAHwAAAAAAACYAAAAAAAAAwOD//wAAAAAmAAAAZAAAABYAAABMAAAAAAAAAAAAAAAEAAAAAAAAAAEAAADu7OEKAAAAACgAAAAoAAAAZAAAAGQAAAAAAAAAzMzMAAAAAABQAAAAUAAAAGQAAABkAAAAAAAAABcAAAAUAAAAAAAAAAAAAAD/fwAA/38AAAAAAAAJAAAABAAAAAAAAAAMAAAAEAAAAAAAAAAAAAAAAAAAAAAAAAAeAAAAaAAAAAAAAAAAAAAAAAAAAAAAAAAAAAAAECcAABAnAAAAAAAAAAAAAAAAAAAAAAAAAAAAAAAAAAAAAAAAAAAAABQAAAAAAAAAwMD/AAAAAABkAAAAMgAAAAAAAABkAAAAAAAAAH9/fwAKAAAAHwAAAFQAAAAAAAAFAAAAAQAAAAAAAAAAAAAAAAAAAAAAAAAAAAAAAAAAAAAAAAAAAAAAAn9/fwAAAAADzMzMAMDA/wB/f38AAAAAAAAAAAAAAAAAAAAAAAAAAAAhAAAAGAAAABQAAAAaAwAAfRMAABEVAABDHgAAEAAAACYAAAAIAAAAPaAAAAAAAAA="/>
+                <pr:smNativeData xmlns="" xmlns:p14="http://schemas.microsoft.com/office/powerpoint/2010/main" xmlns:pr="smNativeData" val="SMDATA_13_47fkXxMAAAAlAAAAZAAAAA0AAAAAAAAAAAAAAAAAAAAAAAAAAAAAAAAAAAAAAAAAAAEAAABQAAAAAAAAAAAA4D8AAAAAAADgPwAAAAAAAOA/AAAAAAAA4D8AAAAAAADgPwAAAAAAAOA/AAAAAAAA4D8AAAAAAADgPwAAAAAAAOA/AAAAAAAA4D8CAAAAjAAAAAAAAAAAAAAAT4G9DP///wgAAAAAAAAAAAAAAAAAAAAAAAAAAAAAAAAAAAAAZAAAAAEAAABAAAAAAAAAAAAAAAAAAAAAAAAAAAAAAAAAAAAAAAAAAAAAAAAAAAAAAAAAAAAAAAAAAAAAAAAAAAAAAAAAAAAAAAAAAAAAAAAAAAAAAAAAAAAAAAAAAAAAFAAAADwAAAAAAAAAAAAAAAAAAAkUAAAAAQAAABQAAAAUAAAAFAAAAAEAAAAAAAAAZAAAAGQAAAAAAAAAZAAAAGQAAAAVAAAAYAAAAAAAAAAAAAAADwAAACADAAAAAAAAAAAAAAEAAACgMgAAVgcAAKr4//8BAAAAf39/AAEAAABkAAAAAAAAABQAAABAHwAAAAAAACYAAAAAAAAAwOD//wAAAAAmAAAAZAAAABYAAABMAAAAAAAAAAAAAAAEAAAAAAAAAAEAAADu7OEKAAAAACgAAAAoAAAAZAAAAGQAAAAAAAAAzMzMAAAAAABQAAAAUAAAAGQAAABkAAAAAAAAABcAAAAUAAAAAAAAAAAAAAD/fwAA/38AAAAAAAAJAAAABAAAAAAAAAAMAAAAEAAAAAAAAAAAAAAAAAAAAAAAAAAeAAAAaAAAAAAAAAAAAAAAAAAAAAAAAAAAAAAAECcAABAnAAAAAAAAAAAAAAAAAAAAAAAAAAAAAAAAAAAAAAAAAAAAABQAAAAAAAAAwMD/AAAAAABkAAAAMgAAAAAAAABkAAAAAAAAAH9/fwAKAAAAHwAAAFQAAAAAAAAFAAAAAQAAAAAAAAAAAAAAAAAAAAAAAAAAAAAAAAAAAAAAAAAAAAAAAn9/fwAAAAADzMzMAMDA/wB/f38AAAAAAAAAAAAAAAAAAAAAAAAAAAAhAAAAGAAAABQAAAAaAwAAfRMAABEVAABDHgAAEAAAACYAAAAIAAAAPaAAAAAAAAA="/>
               </a:ext>
             </a:extLst>
           </p:cNvSpPr>
@@ -3271,7 +3296,7 @@
             <a:spLocks noGrp="1" noChangeArrowheads="1"/>
             <a:extLst>
               <a:ext uri="smNativeData">
-                <pr:smNativeData xmlns:pr="smNativeData" val="SMDATA_13_47fkXxMAAAAlAAAAZAAAAA0AAAAAAAAAAAAAAAAAAAAAAAAAAAAAAAAAAAAAAAAAAAEAAABQAAAAAAAAAAAA4D8AAAAAAADgPwAAAAAAAOA/AAAAAAAA4D8AAAAAAADgPwAAAAAAAOA/AAAAAAAA4D8AAAAAAADgPwAAAAAAAOA/AAAAAAAA4D8CAAAAjAAAAAAAAAAAAAAAT4G9DP///wgAAAAAAAAAAAAAAAAAAAAAAAAAAAAAAAAAAAAAZAAAAAEAAABAAAAAAAAAAAAAAAAAAAAAAAAAAAAAAAAAAAAAAAAAAAAAAAAAAAAAAAAAAAAAAAAAAAAAAAAAAAAAAAAAAAAAAAAAAAAAAAAAAAAAAAAAAAAAAAAAAAAAFAAAADwAAAAAAAAAAAAAAAAAAAkUAAAAAQAAABQAAAAUAAAAFAAAAAEAAAAAAAAAZAAAAGQAAAAAAAAAZAAAAGQAAAAVAAAAYAAAAAAAAAAAAAAADwAAACADAAAAAAAAAAAAAAEAAACgMgAAVgcAAKr4//8BAAAAf39/AAEAAABkAAAAAAAAABQAAABAHwAAAAAAACYAAAAAAAAAwOD//wAAAAAmAAAAZAAAABYAAABMAAAAAAAAAAAAAAAEAAAAAAAAAAEAAADu7OEKAAAAACgAAAAoAAAAZAAAAGQAAAAAAAAAzMzMAAAAAABQAAAAUAAAAGQAAABkAAAAAAAAABcAAAAUAAAAAAAAAAAAAAD/fwAA/38AAAAAAAAJAAAABAAAAAAAAAAMAAAAEAAAAAAAAAAAAAAAAAAAAAAAAAAeAAAAaAAAAAAAAAAAAAAAAAAAAAAAAAAAAAAAECcAABAnAAAAAAAAAAAAAAAAAAAAAAAAAAAAAAAAAAAAAAAAAAAAABQAAAAAAAAAwMD/AAAAAABkAAAAMgAAAAAAAABkAAAAAAAAAH9/fwAKAAAAHwAAAFQAAAAAAAAFAAAAAQAAAAAAAAAAAAAAAAAAAAAAAAAAAAAAAAAAAAAAAAAAAAAAAn9/fwAAAAADzMzMAMDA/wB/f38AAAAAAAAAAAAAAAAAAAAAAAAAAAAhAAAAGAAAABQAAAD4FQAAfRMAAO8nAABDHgAAEAAAACYAAAAIAAAAPaAAAAAAAAA="/>
+                <pr:smNativeData xmlns="" xmlns:p14="http://schemas.microsoft.com/office/powerpoint/2010/main" xmlns:pr="smNativeData" val="SMDATA_13_47fkXxMAAAAlAAAAZAAAAA0AAAAAAAAAAAAAAAAAAAAAAAAAAAAAAAAAAAAAAAAAAAEAAABQAAAAAAAAAAAA4D8AAAAAAADgPwAAAAAAAOA/AAAAAAAA4D8AAAAAAADgPwAAAAAAAOA/AAAAAAAA4D8AAAAAAADgPwAAAAAAAOA/AAAAAAAA4D8CAAAAjAAAAAAAAAAAAAAAT4G9DP///wgAAAAAAAAAAAAAAAAAAAAAAAAAAAAAAAAAAAAAZAAAAAEAAABAAAAAAAAAAAAAAAAAAAAAAAAAAAAAAAAAAAAAAAAAAAAAAAAAAAAAAAAAAAAAAAAAAAAAAAAAAAAAAAAAAAAAAAAAAAAAAAAAAAAAAAAAAAAAAAAAAAAAFAAAADwAAAAAAAAAAAAAAAAAAAkUAAAAAQAAABQAAAAUAAAAFAAAAAEAAAAAAAAAZAAAAGQAAAAAAAAAZAAAAGQAAAAVAAAAYAAAAAAAAAAAAAAADwAAACADAAAAAAAAAAAAAAEAAACgMgAAVgcAAKr4//8BAAAAf39/AAEAAABkAAAAAAAAABQAAABAHwAAAAAAACYAAAAAAAAAwOD//wAAAAAmAAAAZAAAABYAAABMAAAAAAAAAAAAAAAEAAAAAAAAAAEAAADu7OEKAAAAACgAAAAoAAAAZAAAAGQAAAAAAAAAzMzMAAAAAABQAAAAUAAAAGQAAABkAAAAAAAAABcAAAAUAAAAAAAAAAAAAAD/fwAA/38AAAAAAAAJAAAABAAAAAAAAAAMAAAAEAAAAAAAAAAAAAAAAAAAAAAAAAAeAAAAaAAAAAAAAAAAAAAAAAAAAAAAAAAAAAAAECcAABAnAAAAAAAAAAAAAAAAAAAAAAAAAAAAAAAAAAAAAAAAAAAAABQAAAAAAAAAwMD/AAAAAABkAAAAMgAAAAAAAABkAAAAAAAAAH9/fwAKAAAAHwAAAFQAAAAAAAAFAAAAAQAAAAAAAAAAAAAAAAAAAAAAAAAAAAAAAAAAAAAAAAAAAAAAAn9/fwAAAAADzMzMAMDA/wB/f38AAAAAAAAAAAAAAAAAAAAAAAAAAAAhAAAAGAAAABQAAAD4FQAAfRMAAO8nAABDHgAAEAAAACYAAAAIAAAAPaAAAAAAAAA="/>
               </a:ext>
             </a:extLst>
           </p:cNvSpPr>
@@ -3333,7 +3358,7 @@
             <a:spLocks noGrp="1" noChangeArrowheads="1"/>
             <a:extLst>
               <a:ext uri="smNativeData">
-                <pr:smNativeData xmlns:pr="smNativeData" val="SMDATA_13_47fkXxMAAAAlAAAAZAAAAA0AAAAAAAAAAAAAAAAAAAAAAAAAAAAAAAAAAAAAAAAAAAEAAABQAAAAAAAAAAAA4D8AAAAAAADgPwAAAAAAAOA/AAAAAAAA4D8AAAAAAADgPwAAAAAAAOA/AAAAAAAA4D8AAAAAAADgPwAAAAAAAOA/AAAAAAAA4D8CAAAAjAAAAAAAAAAAAAAAT4G9DP///wgAAAAAAAAAAAAAAAAAAAAAAAAAAAAAAAAAAAAAZAAAAAEAAABAAAAAAAAAAAAAAAAAAAAAAAAAAAAAAAAAAAAAAAAAAAAAAAAAAAAAAAAAAAAAAAAAAAAAAAAAAAAAAAAAAAAAAAAAAAAAAAAAAAAAAAAAAAAAAAAAAAAAFAAAADwAAAAAAAAAAAAAAAAAAAkUAAAAAQAAABQAAAAUAAAAFAAAAAEAAAAAAAAAZAAAAGQAAAAAAAAAZAAAAGQAAAAVAAAAYAAAAAAAAAAAAAAADwAAACADAAAAAAAAAAAAAAEAAACgMgAAVgcAAKr4//8BAAAAf39/AAEAAABkAAAAAAAAABQAAABAHwAAAAAAACYAAAAAAAAAwOD//wAAAAAmAAAAZAAAABYAAABMAAAAAAAAAAAAAAAEAAAAAAAAAAEAAADu7OEKAAAAACgAAAAoAAAAZAAAAGQAAAAAAAAAzMzMAAAAAABQAAAAUAAAAGQAAABkAAAAAAAAABcAAAAUAAAAAAAAAAAAAAD/fwAA/38AAAAAAAAJAAAABAAAAAAAAAAMAAAAEAAAAAAAAAAAAAAAAAAAAAAAAAAeAAAAaAAAAAAAAAAAAAAAAAAAAAAAAAAAAAAAECcAABAnAAAAAAAAAAAAAAAAAAAAAAAAAAAAAAAAAAAAAAAAAAAAABQAAAAAAAAAwMD/AAAAAABkAAAAMgAAAAAAAABkAAAAAAAAAH9/fwAKAAAAHwAAAFQAAAAAAAAFAAAAAQAAAAAAAAAAAAAAAAAAAAAAAAAAAAAAAAAAAAAAAAAAAAAAAn9/fwAAAAADzMzMAMDA/wB/f38AAAAAAAAAAAAAAAAAAAAAAAAAAAAhAAAAGAAAABQAAADWKAAAfRMAAM06AABDHgAAEAAAACYAAAAIAAAAPaAAAAAAAAA="/>
+                <pr:smNativeData xmlns="" xmlns:p14="http://schemas.microsoft.com/office/powerpoint/2010/main" xmlns:pr="smNativeData" val="SMDATA_13_47fkXxMAAAAlAAAAZAAAAA0AAAAAAAAAAAAAAAAAAAAAAAAAAAAAAAAAAAAAAAAAAAEAAABQAAAAAAAAAAAA4D8AAAAAAADgPwAAAAAAAOA/AAAAAAAA4D8AAAAAAADgPwAAAAAAAOA/AAAAAAAA4D8AAAAAAADgPwAAAAAAAOA/AAAAAAAA4D8CAAAAjAAAAAAAAAAAAAAAT4G9DP///wgAAAAAAAAAAAAAAAAAAAAAAAAAAAAAAAAAAAAAZAAAAAEAAABAAAAAAAAAAAAAAAAAAAAAAAAAAAAAAAAAAAAAAAAAAAAAAAAAAAAAAAAAAAAAAAAAAAAAAAAAAAAAAAAAAAAAAAAAAAAAAAAAAAAAAAAAAAAAAAAAAAAAFAAAADwAAAAAAAAAAAAAAAAAAAkUAAAAAQAAABQAAAAUAAAAFAAAAAEAAAAAAAAAZAAAAGQAAAAAAAAAZAAAAGQAAAAVAAAAYAAAAAAAAAAAAAAADwAAACADAAAAAAAAAAAAAAEAAACgMgAAVgcAAKr4//8BAAAAf39/AAEAAABkAAAAAAAAABQAAABAHwAAAAAAACYAAAAAAAAAwOD//wAAAAAmAAAAZAAAABYAAABMAAAAAAAAAAAAAAAEAAAAAAAAAAEAAADu7OEKAAAAACgAAAAoAAAAZAAAAGQAAAAAAAAAzMzMAAAAAABQAAAAUAAAAGQAAABkAAAAAAAAABcAAAAUAAAAAAAAAAAAAAD/fwAA/38AAAAAAAAJAAAABAAAAAAAAAAMAAAAEAAAAAAAAAAAAAAAAAAAAAAAAAAeAAAAaAAAAAAAAAAAAAAAAAAAAAAAAAAAAAAAECcAABAnAAAAAAAAAAAAAAAAAAAAAAAAAAAAAAAAAAAAAAAAAAAAABQAAAAAAAAAwMD/AAAAAABkAAAAMgAAAAAAAABkAAAAAAAAAH9/fwAKAAAAHwAAAFQAAAAAAAAFAAAAAQAAAAAAAAAAAAAAAAAAAAAAAAAAAAAAAAAAAAAAAAAAAAAAAn9/fwAAAAADzMzMAMDA/wB/f38AAAAAAAAAAAAAAAAAAAAAAAAAAAAhAAAAGAAAABQAAADWKAAAfRMAAM06AABDHgAAEAAAACYAAAAIAAAAPaAAAAAAAAA="/>
               </a:ext>
             </a:extLst>
           </p:cNvSpPr>
@@ -3395,7 +3420,7 @@
             <a:spLocks noGrp="1" noChangeArrowheads="1"/>
             <a:extLst>
               <a:ext uri="smNativeData">
-                <pr:smNativeData xmlns:pr="smNativeData" val="SMDATA_13_47fkXxMAAAAlAAAAZAAAAA0AAAAAAAAAAAAAAAAAAAAAAAAAAAAAAAAAAAAAAAAAAAEAAABQAAAAAAAAAAAA4D8AAAAAAADgPwAAAAAAAOA/AAAAAAAA4D8AAAAAAADgPwAAAAAAAOA/AAAAAAAA4D8AAAAAAADgPwAAAAAAAOA/AAAAAAAA4D8CAAAAjAAAAAAAAAAAAAAAT4G9DP///wgAAAAAAAAAAAAAAAAAAAAAAAAAAAAAAAAAAAAAZAAAAAEAAABAAAAAAAAAAAAAAAAAAAAAAAAAAAAAAAAAAAAAAAAAAAAAAAAAAAAAAAAAAAAAAAAAAAAAAAAAAAAAAAAAAAAAAAAAAAAAAAAAAAAAAAAAAAAAAAAAAAAAFAAAADwAAAAAAAAAAAAAAAAAAAkUAAAAAQAAABQAAAAUAAAAFAAAAAEAAAAAAAAAZAAAAGQAAAAAAAAAZAAAAGQAAAAVAAAAYAAAAAAAAAAAAAAADwAAACADAAAAAAAAAAAAAAEAAACgMgAAVgcAAKr4//8BAAAAf39/AAEAAABkAAAAAAAAABQAAABAHwAAAAAAACYAAAAAAAAAwOD//wAAAAAmAAAAZAAAABYAAABMAAAAAAAAAAAAAAAEAAAAAAAAAAEAAADu7OEKAAAAACgAAAAoAAAAZAAAAGQAAAAAAAAAzMzMAAAAAABQAAAAUAAAAGQAAABkAAAAAAAAABcAAAAUAAAAAAAAAAAAAAD/fwAA/38AAAAAAAAJAAAABAAAAAAAAAAMAAAAEAAAAAAAAAAAAAAAAAAAAAAAAAAeAAAAaAAAAAAAAAAAAAAAAAAAAAAAAAAAAAAAECcAABAnAAAAAAAAAAAAAAAAAAAAAAAAAAAAAAAAAAAAAAAAAAAAABQAAAAAAAAAwMD/AAAAAABkAAAAMgAAAAAAAABkAAAAAAAAAH9/fwAKAAAAHwAAAFQAAAAAAAAFAAAAAQAAAAAAAAAAAAAAAAAAAAAAAAAAAAAAAAAAAAAAAAAAAAAAAn9/fwAAAAADzMzMAMDA/wB/f38AAAAAAAAAAAAAAAAAAAAAAAAAAAAhAAAAGAAAABQAAAAaAwAASh8AABEVAAAQKgAAEAAAACYAAAAIAAAAPaAAAAAAAAA="/>
+                <pr:smNativeData xmlns="" xmlns:p14="http://schemas.microsoft.com/office/powerpoint/2010/main" xmlns:pr="smNativeData" val="SMDATA_13_47fkXxMAAAAlAAAAZAAAAA0AAAAAAAAAAAAAAAAAAAAAAAAAAAAAAAAAAAAAAAAAAAEAAABQAAAAAAAAAAAA4D8AAAAAAADgPwAAAAAAAOA/AAAAAAAA4D8AAAAAAADgPwAAAAAAAOA/AAAAAAAA4D8AAAAAAADgPwAAAAAAAOA/AAAAAAAA4D8CAAAAjAAAAAAAAAAAAAAAT4G9DP///wgAAAAAAAAAAAAAAAAAAAAAAAAAAAAAAAAAAAAAZAAAAAEAAABAAAAAAAAAAAAAAAAAAAAAAAAAAAAAAAAAAAAAAAAAAAAAAAAAAAAAAAAAAAAAAAAAAAAAAAAAAAAAAAAAAAAAAAAAAAAAAAAAAAAAAAAAAAAAAAAAAAAAFAAAADwAAAAAAAAAAAAAAAAAAAkUAAAAAQAAABQAAAAUAAAAFAAAAAEAAAAAAAAAZAAAAGQAAAAAAAAAZAAAAGQAAAAVAAAAYAAAAAAAAAAAAAAADwAAACADAAAAAAAAAAAAAAEAAACgMgAAVgcAAKr4//8BAAAAf39/AAEAAABkAAAAAAAAABQAAABAHwAAAAAAACYAAAAAAAAAwOD//wAAAAAmAAAAZAAAABYAAABMAAAAAAAAAAAAAAAEAAAAAAAAAAEAAADu7OEKAAAAACgAAAAoAAAAZAAAAGQAAAAAAAAAzMzMAAAAAABQAAAAUAAAAGQAAABkAAAAAAAAABcAAAAUAAAAAAAAAAAAAAD/fwAA/38AAAAAAAAJAAAABAAAAAAAAAAMAAAAEAAAAAAAAAAAAAAAAAAAAAAAAAAeAAAAaAAAAAAAAAAAAAAAAAAAAAAAAAAAAAAAECcAABAnAAAAAAAAAAAAAAAAAAAAAAAAAAAAAAAAAAAAAAAAAAAAABQAAAAAAAAAwMD/AAAAAABkAAAAMgAAAAAAAABkAAAAAAAAAH9/fwAKAAAAHwAAAFQAAAAAAAAFAAAAAQAAAAAAAAAAAAAAAAAAAAAAAAAAAAAAAAAAAAAAAAAAAAAAAn9/fwAAAAADzMzMAMDA/wB/f38AAAAAAAAAAAAAAAAAAAAAAAAAAAAhAAAAGAAAABQAAAAaAwAASh8AABEVAAAQKgAAEAAAACYAAAAIAAAAPaAAAAAAAAA="/>
               </a:ext>
             </a:extLst>
           </p:cNvSpPr>
@@ -3457,7 +3482,7 @@
             <a:spLocks noGrp="1" noChangeArrowheads="1"/>
             <a:extLst>
               <a:ext uri="smNativeData">
-                <pr:smNativeData xmlns:pr="smNativeData" val="SMDATA_13_47fkXxMAAAAlAAAAZAAAAA0AAAAAAAAAAAAAAAAAAAAAAAAAAAAAAAAAAAAAAAAAAAEAAABQAAAAAAAAAAAA4D8AAAAAAADgPwAAAAAAAOA/AAAAAAAA4D8AAAAAAADgPwAAAAAAAOA/AAAAAAAA4D8AAAAAAADgPwAAAAAAAOA/AAAAAAAA4D8CAAAAjAAAAAAAAAAAAAAAT4G9DP///wgAAAAAAAAAAAAAAAAAAAAAAAAAAAAAAAAAAAAAZAAAAAEAAABAAAAAAAAAAAAAAAAAAAAAAAAAAAAAAAAAAAAAAAAAAAAAAAAAAAAAAAAAAAAAAAAAAAAAAAAAAAAAAAAAAAAAAAAAAAAAAAAAAAAAAAAAAAAAAAAAAAAAFAAAADwAAAAAAAAAAAAAAAAAAAkUAAAAAQAAABQAAAAUAAAAFAAAAAEAAAAAAAAAZAAAAGQAAAAAAAAAZAAAAGQAAAAVAAAAYAAAAAAAAAAAAAAADwAAACADAAAAAAAAAAAAAAEAAACgMgAAVgcAAKr4//8BAAAAf39/AAEAAABkAAAAAAAAABQAAABAHwAAAAAAACYAAAAAAAAAwOD//wAAAAAmAAAAZAAAABYAAABMAAAAAAAAAAAAAAAEAAAAAAAAAAEAAADu7OEKAAAAACgAAAAoAAAAZAAAAGQAAAAAAAAAzMzMAAAAAABQAAAAUAAAAGQAAABkAAAAAAAAABcAAAAUAAAAAAAAAAAAAAD/fwAA/38AAAAAAAAJAAAABAAAAAAAAAAMAAAAEAAAAAAAAAAAAAAAAAAAAAAAAAAeAAAAaAAAAAAAAAAAAAAAAAAAAAAAAAAAAAAAECcAABAnAAAAAAAAAAAAAAAAAAAAAAAAAAAAAAAAAAAAAAAAAAAAABQAAAAAAAAAwMD/AAAAAABkAAAAMgAAAAAAAABkAAAAAAAAAH9/fwAKAAAAHwAAAFQAAAAAAAAFAAAAAQAAAAAAAAAAAAAAAAAAAAAAAAAAAAAAAAAAAAAAAAAAAAAAAn9/fwAAAAADzMzMAMDA/wB/f38AAAAAAAAAAAAAAAAAAAAAAAAAAAAhAAAAGAAAABQAAAD4FQAASh8AAO8nAAAQKgAAEAAAACYAAAAIAAAAPaAAAAAAAAA="/>
+                <pr:smNativeData xmlns="" xmlns:p14="http://schemas.microsoft.com/office/powerpoint/2010/main" xmlns:pr="smNativeData" val="SMDATA_13_47fkXxMAAAAlAAAAZAAAAA0AAAAAAAAAAAAAAAAAAAAAAAAAAAAAAAAAAAAAAAAAAAEAAABQAAAAAAAAAAAA4D8AAAAAAADgPwAAAAAAAOA/AAAAAAAA4D8AAAAAAADgPwAAAAAAAOA/AAAAAAAA4D8AAAAAAADgPwAAAAAAAOA/AAAAAAAA4D8CAAAAjAAAAAAAAAAAAAAAT4G9DP///wgAAAAAAAAAAAAAAAAAAAAAAAAAAAAAAAAAAAAAZAAAAAEAAABAAAAAAAAAAAAAAAAAAAAAAAAAAAAAAAAAAAAAAAAAAAAAAAAAAAAAAAAAAAAAAAAAAAAAAAAAAAAAAAAAAAAAAAAAAAAAAAAAAAAAAAAAAAAAAAAAAAAAFAAAADwAAAAAAAAAAAAAAAAAAAkUAAAAAQAAABQAAAAUAAAAFAAAAAEAAAAAAAAAZAAAAGQAAAAAAAAAZAAAAGQAAAAVAAAAYAAAAAAAAAAAAAAADwAAACADAAAAAAAAAAAAAAEAAACgMgAAVgcAAKr4//8BAAAAf39/AAEAAABkAAAAAAAAABQAAABAHwAAAAAAACYAAAAAAAAAwOD//wAAAAAmAAAAZAAAABYAAABMAAAAAAAAAAAAAAAEAAAAAAAAAAEAAADu7OEKAAAAACgAAAAoAAAAZAAAAGQAAAAAAAAAzMzMAAAAAABQAAAAUAAAAGQAAABkAAAAAAAAABcAAAAUAAAAAAAAAAAAAAD/fwAA/38AAAAAAAAJAAAABAAAAAAAAAAMAAAAEAAAAAAAAAAAAAAAAAAAAAAAAAAeAAAAaAAAAAAAAAAAAAAAAAAAAAAAAAAAAAAAECcAABAnAAAAAAAAAAAAAAAAAAAAAAAAAAAAAAAAAAAAAAAAAAAAABQAAAAAAAAAwMD/AAAAAABkAAAAMgAAAAAAAABkAAAAAAAAAH9/fwAKAAAAHwAAAFQAAAAAAAAFAAAAAQAAAAAAAAAAAAAAAAAAAAAAAAAAAAAAAAAAAAAAAAAAAAAAAn9/fwAAAAADzMzMAMDA/wB/f38AAAAAAAAAAAAAAAAAAAAAAAAAAAAhAAAAGAAAABQAAAD4FQAASh8AAO8nAAAQKgAAEAAAACYAAAAIAAAAPaAAAAAAAAA="/>
               </a:ext>
             </a:extLst>
           </p:cNvSpPr>
@@ -3519,7 +3544,7 @@
             <a:spLocks noGrp="1" noChangeArrowheads="1"/>
             <a:extLst>
               <a:ext uri="smNativeData">
-                <pr:smNativeData xmlns:pr="smNativeData" val="SMDATA_13_47fkXxMAAAAlAAAAZAAAAA0AAAAAAAAAAAAAAAAAAAAAAAAAAAAAAAAAAAAAAAAAAAEAAABQAAAAAAAAAAAA4D8AAAAAAADgPwAAAAAAAOA/AAAAAAAA4D8AAAAAAADgPwAAAAAAAOA/AAAAAAAA4D8AAAAAAADgPwAAAAAAAOA/AAAAAAAA4D8CAAAAjAAAAAAAAAAAAAAAT4G9DP///wgAAAAAAAAAAAAAAAAAAAAAAAAAAAAAAAAAAAAAZAAAAAEAAABAAAAAAAAAAAAAAAAAAAAAAAAAAAAAAAAAAAAAAAAAAAAAAAAAAAAAAAAAAAAAAAAAAAAAAAAAAAAAAAAAAAAAAAAAAAAAAAAAAAAAAAAAAAAAAAAAAAAAFAAAADwAAAAAAAAAAAAAAAAAAAkUAAAAAQAAABQAAAAUAAAAFAAAAAEAAAAAAAAAZAAAAGQAAAAAAAAAZAAAAGQAAAAVAAAAYAAAAAAAAAAAAAAADwAAACADAAAAAAAAAAAAAAEAAACgMgAAVgcAAKr4//8BAAAAf39/AAEAAABkAAAAAAAAABQAAABAHwAAAAAAACYAAAAAAAAAwOD//wAAAAAmAAAAZAAAABYAAABMAAAAAAAAAAAAAAAEAAAAAAAAAAEAAADu7OEKAAAAACgAAAAoAAAAZAAAAGQAAAAAAAAAzMzMAAAAAABQAAAAUAAAAGQAAABkAAAAAAAAABcAAAAUAAAAAAAAAAAAAAD/fwAA/38AAAAAAAAJAAAABAAAAAAAAAAMAAAAEAAAAAAAAAAAAAAAAAAAAAAAAAAeAAAAaAAAAAAAAAAAAAAAAAAAAAAAAAAAAAAAECcAABAnAAAAAAAAAAAAAAAAAAAAAAAAAAAAAAAAAAAAAAAAAAAAABQAAAAAAAAAwMD/AAAAAABkAAAAMgAAAAAAAABkAAAAAAAAAH9/fwAKAAAAHwAAAFQAAAAAAAAFAAAAAQAAAAAAAAAAAAAAAAAAAAAAAAAAAAAAAAAAAAAAAAAAAAAAAn9/fwAAAAADzMzMAMDA/wB/f38AAAAAAAAAAAAAAAAAAAAAAAAAAAAhAAAAGAAAABQAAADWKAAASh8AAM06AAAQKgAAEAAAACYAAAAIAAAAPaAAAAAAAAA="/>
+                <pr:smNativeData xmlns="" xmlns:p14="http://schemas.microsoft.com/office/powerpoint/2010/main" xmlns:pr="smNativeData" val="SMDATA_13_47fkXxMAAAAlAAAAZAAAAA0AAAAAAAAAAAAAAAAAAAAAAAAAAAAAAAAAAAAAAAAAAAEAAABQAAAAAAAAAAAA4D8AAAAAAADgPwAAAAAAAOA/AAAAAAAA4D8AAAAAAADgPwAAAAAAAOA/AAAAAAAA4D8AAAAAAADgPwAAAAAAAOA/AAAAAAAA4D8CAAAAjAAAAAAAAAAAAAAAT4G9DP///wgAAAAAAAAAAAAAAAAAAAAAAAAAAAAAAAAAAAAAZAAAAAEAAABAAAAAAAAAAAAAAAAAAAAAAAAAAAAAAAAAAAAAAAAAAAAAAAAAAAAAAAAAAAAAAAAAAAAAAAAAAAAAAAAAAAAAAAAAAAAAAAAAAAAAAAAAAAAAAAAAAAAAFAAAADwAAAAAAAAAAAAAAAAAAAkUAAAAAQAAABQAAAAUAAAAFAAAAAEAAAAAAAAAZAAAAGQAAAAAAAAAZAAAAGQAAAAVAAAAYAAAAAAAAAAAAAAADwAAACADAAAAAAAAAAAAAAEAAACgMgAAVgcAAKr4//8BAAAAf39/AAEAAABkAAAAAAAAABQAAABAHwAAAAAAACYAAAAAAAAAwOD//wAAAAAmAAAAZAAAABYAAABMAAAAAAAAAAAAAAAEAAAAAAAAAAEAAADu7OEKAAAAACgAAAAoAAAAZAAAAGQAAAAAAAAAzMzMAAAAAABQAAAAUAAAAGQAAABkAAAAAAAAABcAAAAUAAAAAAAAAAAAAAD/fwAA/38AAAAAAAAJAAAABAAAAAAAAAAMAAAAEAAAAAAAAAAAAAAAAAAAAAAAAAAeAAAAaAAAAAAAAAAAAAAAAAAAAAAAAAAAAAAAECcAABAnAAAAAAAAAAAAAAAAAAAAAAAAAAAAAAAAAAAAAAAAAAAAABQAAAAAAAAAwMD/AAAAAABkAAAAMgAAAAAAAABkAAAAAAAAAH9/fwAKAAAAHwAAAFQAAAAAAAAFAAAAAQAAAAAAAAAAAAAAAAAAAAAAAAAAAAAAAAAAAAAAAAAAAAAAAn9/fwAAAAADzMzMAMDA/wB/f38AAAAAAAAAAAAAAAAAAAAAAAAAAAAhAAAAGAAAABQAAADWKAAASh8AAM06AAAQKgAAEAAAACYAAAAIAAAAPaAAAAAAAAA="/>
               </a:ext>
             </a:extLst>
           </p:cNvSpPr>
@@ -3583,7 +3608,7 @@
 </file>
 
 <file path=ppt/slideLayouts/slideLayout3.xml><?xml version="1.0" encoding="utf-8"?>
-<p:sldLayout xmlns:p="http://schemas.openxmlformats.org/presentationml/2006/main" xmlns:p14="http://schemas.microsoft.com/office/powerpoint/2010/main" xmlns:r="http://schemas.openxmlformats.org/officeDocument/2006/relationships" xmlns:a="http://schemas.openxmlformats.org/drawingml/2006/main" type="obj" preserve="1">
+<p:sldLayout xmlns:a="http://schemas.openxmlformats.org/drawingml/2006/main" xmlns:r="http://schemas.openxmlformats.org/officeDocument/2006/relationships" xmlns:p="http://schemas.openxmlformats.org/presentationml/2006/main" type="obj" preserve="1">
   <p:cSld name="Title, Content">
     <p:spTree>
       <p:nvGrpSpPr>
@@ -3606,7 +3631,7 @@
             <a:spLocks noGrp="1" noChangeArrowheads="1"/>
             <a:extLst>
               <a:ext uri="smNativeData">
-                <pr:smNativeData xmlns:pr="smNativeData" val="SMDATA_13_47fkXxMAAAAlAAAAZAAAAA0AAAAAAAAAAAAAAAAAAAAAAAAAAAAAAAABAAAAAAAAAAEAAABQAAAAAAAAAAAA4D8AAAAAAADgPwAAAAAAAOA/AAAAAAAA4D8AAAAAAADgPwAAAAAAAOA/AAAAAAAA4D8AAAAAAADgPwAAAAAAAOA/AAAAAAAA4D8CAAAAjAAAAAAAAAAAAAAAT4G9DP///wgAAAAAAAAAAAAAAAAAAAAAAAAAAAAAAAAAAAAAZAAAAAEAAABAAAAAAAAAAAAAAAAAAAAAAAAAAAAAAAAAAAAAAAAAAAAAAAAAAAAAAAAAAAAAAAAAAAAAAAAAAAAAAAAAAAAAAAAAAAAAAAAAAAAAAAAAAAAAAAAAAAAAFAAAADwAAAAAAAAAAAAAAAAAAAkUAAAAAQAAABQAAAAUAAAAFAAAAAEAAAAAAAAAZAAAAGQAAAAAAAAAZAAAAGQAAAAVAAAAYAAAAAAAAAAAAAAADwAAACADAAAAAAAAAAAAAAEAAACgMgAAVgcAAKr4//8BAAAAf39/AAEAAABkAAAAAAAAABQAAABAHwAAAAAAACYAAAAAAAAAwOD//wAAAAAmAAAAZAAAABYAAABMAAAAAAAAAAAAAAAEAAAAAAAAAAEAAADu7OEKAAAAACgAAAAoAAAAZAAAAGQAAAAAAAAAzMzMAAAAAABQAAAAUAAAAGQAAABkAAAAAAAAABcAAAAUAAAAAAAAAAAAAAD/fwAA/38AAAAAAAAJAAAABAAAAAAAAAAMAAAAEAAAAAAAAAAAAAAAAAAAAAAAAAAeAAAAaAAAAAAAAAAAAAAAAAAAAAAAAAAAAAAAECcAABAnAAAAAAAAAAAAAAAAAAAAAAAAAAAAAAAAAAAAAAAAAAAAABQAAAAAAAAAwMD/AAAAAABkAAAAMgAAAAAAAABkAAAAAAAAAH9/fwAKAAAAHwAAAFQAAAAAAAAFAAAAAQAAAAAAAAAAAAAAAAAAAAAAAAAAAAAAAAAAAAAAAAAAAAAAAn9/fwAAAAADzMzMAMDA/wB/f38AAAAAAAAAAAAAAAAAAAAAAAAAAAAhAAAAGAAAABQAAAAaAwAApQYAAOg6AABGEQAAEAAAACYAAAAIAAAAPKAAAAAAAAA="/>
+                <pr:smNativeData xmlns="" xmlns:p14="http://schemas.microsoft.com/office/powerpoint/2010/main" xmlns:pr="smNativeData" val="SMDATA_13_47fkXxMAAAAlAAAAZAAAAA0AAAAAAAAAAAAAAAAAAAAAAAAAAAAAAAABAAAAAAAAAAEAAABQAAAAAAAAAAAA4D8AAAAAAADgPwAAAAAAAOA/AAAAAAAA4D8AAAAAAADgPwAAAAAAAOA/AAAAAAAA4D8AAAAAAADgPwAAAAAAAOA/AAAAAAAA4D8CAAAAjAAAAAAAAAAAAAAAT4G9DP///wgAAAAAAAAAAAAAAAAAAAAAAAAAAAAAAAAAAAAAZAAAAAEAAABAAAAAAAAAAAAAAAAAAAAAAAAAAAAAAAAAAAAAAAAAAAAAAAAAAAAAAAAAAAAAAAAAAAAAAAAAAAAAAAAAAAAAAAAAAAAAAAAAAAAAAAAAAAAAAAAAAAAAFAAAADwAAAAAAAAAAAAAAAAAAAkUAAAAAQAAABQAAAAUAAAAFAAAAAEAAAAAAAAAZAAAAGQAAAAAAAAAZAAAAGQAAAAVAAAAYAAAAAAAAAAAAAAADwAAACADAAAAAAAAAAAAAAEAAACgMgAAVgcAAKr4//8BAAAAf39/AAEAAABkAAAAAAAAABQAAABAHwAAAAAAACYAAAAAAAAAwOD//wAAAAAmAAAAZAAAABYAAABMAAAAAAAAAAAAAAAEAAAAAAAAAAEAAADu7OEKAAAAACgAAAAoAAAAZAAAAGQAAAAAAAAAzMzMAAAAAABQAAAAUAAAAGQAAABkAAAAAAAAABcAAAAUAAAAAAAAAAAAAAD/fwAA/38AAAAAAAAJAAAABAAAAAAAAAAMAAAAEAAAAAAAAAAAAAAAAAAAAAAAAAAeAAAAaAAAAAAAAAAAAAAAAAAAAAAAAAAAAAAAECcAABAnAAAAAAAAAAAAAAAAAAAAAAAAAAAAAAAAAAAAAAAAAAAAABQAAAAAAAAAwMD/AAAAAABkAAAAMgAAAAAAAABkAAAAAAAAAH9/fwAKAAAAHwAAAFQAAAAAAAAFAAAAAQAAAAAAAAAAAAAAAAAAAAAAAAAAAAAAAAAAAAAAAAAAAAAAAn9/fwAAAAADzMzMAMDA/wB/f38AAAAAAAAAAAAAAAAAAAAAAAAAAAAhAAAAGAAAABQAAAAaAwAApQYAAOg6AABGEQAAEAAAACYAAAAIAAAAPKAAAAAAAAA="/>
               </a:ext>
             </a:extLst>
           </p:cNvSpPr>
@@ -3641,7 +3666,7 @@
             <a:spLocks noGrp="1" noChangeArrowheads="1"/>
             <a:extLst>
               <a:ext uri="smNativeData">
-                <pr:smNativeData xmlns:pr="smNativeData" val="SMDATA_13_47fkXxMAAAAlAAAAZAAAAA0AAAAAAAAAAAAAAAAAAAAAAAAAAAAAAAAAAAAAAAAAAAEAAABQAAAAAAAAAAAA4D8AAAAAAADgPwAAAAAAAOA/AAAAAAAA4D8AAAAAAADgPwAAAAAAAOA/AAAAAAAA4D8AAAAAAADgPwAAAAAAAOA/AAAAAAAA4D8CAAAAjAAAAAAAAAAAAAAAT4G9DP///wgAAAAAAAAAAAAAAAAAAAAAAAAAAAAAAAAAAAAAZAAAAAEAAABAAAAAAAAAAAAAAAAAAAAAAAAAAAAAAAAAAAAAAAAAAAAAAAAAAAAAAAAAAAAAAAAAAAAAAAAAAAAAAAAAAAAAAAAAAAAAAAAAAAAAAAAAAAAAAAAAAAAAFAAAADwAAAAAAAAAAAAAAAAAAAkUAAAAAQAAABQAAAAUAAAAFAAAAAEAAAAAAAAAZAAAAGQAAAAAAAAAZAAAAGQAAAAVAAAAYAAAAAAAAAAAAAAADwAAACADAAAAAAAAAAAAAAEAAACgMgAAVgcAAKr4//8BAAAAf39/AAEAAABkAAAAAAAAABQAAABAHwAAAAAAACYAAAAAAAAAwOD//wAAAAAmAAAAZAAAABYAAABMAAAAAAAAAAAAAAAEAAAAAAAAAAEAAADu7OEKAAAAACgAAAAoAAAAZAAAAGQAAAAAAAAAzMzMAAAAAABQAAAAUAAAAGQAAABkAAAAAAAAABcAAAAUAAAAAAAAAAAAAAD/fwAA/38AAAAAAAAJAAAABAAAAAAAAAAMAAAAEAAAAAAAAAAAAAAAAAAAAAAAAAAeAAAAaAAAAAAAAAAAAAAAAAAAAAAAAAAAAAAAECcAABAnAAAAAAAAAAAAAAAAAAAAAAAAAAAAAAAAAAAAAAAAAAAAABQAAAAAAAAAwMD/AAAAAABkAAAAMgAAAAAAAABkAAAAAAAAAH9/fwAKAAAAHwAAAFQAAAAAAAAFAAAAAQAAAAAAAAAAAAAAAAAAAAAAAAAAAAAAAAAAAAAAAAAAAAAAAn9/fwAAAAADzMzMAMDA/wB/f38AAAAAAAAAAAAAAAAAAAAAAAAAAAAhAAAAGAAAABQAAAAaAwAAfRMAAOg6AAAUKgAAEAAAACYAAAAIAAAAPKAAAAAAAAA="/>
+                <pr:smNativeData xmlns="" xmlns:p14="http://schemas.microsoft.com/office/powerpoint/2010/main" xmlns:pr="smNativeData" val="SMDATA_13_47fkXxMAAAAlAAAAZAAAAA0AAAAAAAAAAAAAAAAAAAAAAAAAAAAAAAAAAAAAAAAAAAEAAABQAAAAAAAAAAAA4D8AAAAAAADgPwAAAAAAAOA/AAAAAAAA4D8AAAAAAADgPwAAAAAAAOA/AAAAAAAA4D8AAAAAAADgPwAAAAAAAOA/AAAAAAAA4D8CAAAAjAAAAAAAAAAAAAAAT4G9DP///wgAAAAAAAAAAAAAAAAAAAAAAAAAAAAAAAAAAAAAZAAAAAEAAABAAAAAAAAAAAAAAAAAAAAAAAAAAAAAAAAAAAAAAAAAAAAAAAAAAAAAAAAAAAAAAAAAAAAAAAAAAAAAAAAAAAAAAAAAAAAAAAAAAAAAAAAAAAAAAAAAAAAAFAAAADwAAAAAAAAAAAAAAAAAAAkUAAAAAQAAABQAAAAUAAAAFAAAAAEAAAAAAAAAZAAAAGQAAAAAAAAAZAAAAGQAAAAVAAAAYAAAAAAAAAAAAAAADwAAACADAAAAAAAAAAAAAAEAAACgMgAAVgcAAKr4//8BAAAAf39/AAEAAABkAAAAAAAAABQAAABAHwAAAAAAACYAAAAAAAAAwOD//wAAAAAmAAAAZAAAABYAAABMAAAAAAAAAAAAAAAEAAAAAAAAAAEAAADu7OEKAAAAACgAAAAoAAAAZAAAAGQAAAAAAAAAzMzMAAAAAABQAAAAUAAAAGQAAABkAAAAAAAAABcAAAAUAAAAAAAAAAAAAAD/fwAA/38AAAAAAAAJAAAABAAAAAAAAAAMAAAAEAAAAAAAAAAAAAAAAAAAAAAAAAAeAAAAaAAAAAAAAAAAAAAAAAAAAAAAAAAAAAAAECcAABAnAAAAAAAAAAAAAAAAAAAAAAAAAAAAAAAAAAAAAAAAAAAAABQAAAAAAAAAwMD/AAAAAABkAAAAMgAAAAAAAABkAAAAAAAAAH9/fwAKAAAAHwAAAFQAAAAAAAAFAAAAAQAAAAAAAAAAAAAAAAAAAAAAAAAAAAAAAAAAAAAAAAAAAAAAAn9/fwAAAAADzMzMAMDA/wB/f38AAAAAAAAAAAAAAAAAAAAAAAAAAAAhAAAAGAAAABQAAAAaAwAAfRMAAOg6AAAUKgAAEAAAACYAAAAIAAAAPKAAAAAAAAA="/>
               </a:ext>
             </a:extLst>
           </p:cNvSpPr>
@@ -3696,7 +3721,7 @@
 </file>
 
 <file path=ppt/slideLayouts/slideLayout4.xml><?xml version="1.0" encoding="utf-8"?>
-<p:sldLayout xmlns:p="http://schemas.openxmlformats.org/presentationml/2006/main" xmlns:p14="http://schemas.microsoft.com/office/powerpoint/2010/main" xmlns:r="http://schemas.openxmlformats.org/officeDocument/2006/relationships" xmlns:a="http://schemas.openxmlformats.org/drawingml/2006/main" type="twoObj" preserve="1">
+<p:sldLayout xmlns:a="http://schemas.openxmlformats.org/drawingml/2006/main" xmlns:r="http://schemas.openxmlformats.org/officeDocument/2006/relationships" xmlns:p="http://schemas.openxmlformats.org/presentationml/2006/main" type="twoObj" preserve="1">
   <p:cSld name="Title, 2 Content">
     <p:spTree>
       <p:nvGrpSpPr>
@@ -3719,7 +3744,7 @@
             <a:spLocks noGrp="1" noChangeArrowheads="1"/>
             <a:extLst>
               <a:ext uri="smNativeData">
-                <pr:smNativeData xmlns:pr="smNativeData" val="SMDATA_13_47fkXxMAAAAlAAAAZAAAAA0AAAAAAAAAAAAAAAAAAAAAAAAAAAAAAAABAAAAAAAAAAEAAABQAAAAAAAAAAAA4D8AAAAAAADgPwAAAAAAAOA/AAAAAAAA4D8AAAAAAADgPwAAAAAAAOA/AAAAAAAA4D8AAAAAAADgPwAAAAAAAOA/AAAAAAAA4D8CAAAAjAAAAAAAAAAAAAAAT4G9DP///wgAAAAAAAAAAAAAAAAAAAAAAAAAAAAAAAAAAAAAZAAAAAEAAABAAAAAAAAAAAAAAAAAAAAAAAAAAAAAAAAAAAAAAAAAAAAAAAAAAAAAAAAAAAAAAAAAAAAAAAAAAAAAAAAAAAAAAAAAAAAAAAAAAAAAAAAAAAAAAAAAAAAAFAAAADwAAAAAAAAAAAAAAAAAAAkUAAAAAQAAABQAAAAUAAAAFAAAAAEAAAAAAAAAZAAAAGQAAAAAAAAAZAAAAGQAAAAVAAAAYAAAAAAAAAAAAAAADwAAACADAAAAAAAAAAAAAAEAAACgMgAAVgcAAKr4//8BAAAAf39/AAEAAABkAAAAAAAAABQAAABAHwAAAAAAACYAAAAAAAAAwOD//wAAAAAmAAAAZAAAABYAAABMAAAAAAAAAAAAAAAEAAAAAAAAAAEAAADu7OEKAAAAACgAAAAoAAAAZAAAAGQAAAAAAAAAzMzMAAAAAABQAAAAUAAAAGQAAABkAAAAAAAAABcAAAAUAAAAAAAAAAAAAAD/fwAA/38AAAAAAAAJAAAABAAAAAAAAAAMAAAAEAAAAAAAAAAAAAAAAAAAAAAAAAAeAAAAaAAAAAAAAAAAAAAAAAAAAAAAAAAAAAAAECcAABAnAAAAAAAAAAAAAAAAAAAAAAAAAAAAAAAAAAAAAAAAAAAAABQAAAAAAAAAwMD/AAAAAABkAAAAMgAAAAAAAABkAAAAAAAAAH9/fwAKAAAAHwAAAFQAAAAAAAAFAAAAAQAAAAAAAAAAAAAAAAAAAAAAAAAAAAAAAAAAAAAAAAAAAAAAAn9/fwAAAAADzMzMAMDA/wB/f38AAAAAAAAAAAAAAAAAAAAAAAAAAAAhAAAAGAAAABQAAAAaAwAApQYAAOg6AABGEQAAEAAAACYAAAAIAAAAPKAAAAAAAAA="/>
+                <pr:smNativeData xmlns="" xmlns:p14="http://schemas.microsoft.com/office/powerpoint/2010/main" xmlns:pr="smNativeData" val="SMDATA_13_47fkXxMAAAAlAAAAZAAAAA0AAAAAAAAAAAAAAAAAAAAAAAAAAAAAAAABAAAAAAAAAAEAAABQAAAAAAAAAAAA4D8AAAAAAADgPwAAAAAAAOA/AAAAAAAA4D8AAAAAAADgPwAAAAAAAOA/AAAAAAAA4D8AAAAAAADgPwAAAAAAAOA/AAAAAAAA4D8CAAAAjAAAAAAAAAAAAAAAT4G9DP///wgAAAAAAAAAAAAAAAAAAAAAAAAAAAAAAAAAAAAAZAAAAAEAAABAAAAAAAAAAAAAAAAAAAAAAAAAAAAAAAAAAAAAAAAAAAAAAAAAAAAAAAAAAAAAAAAAAAAAAAAAAAAAAAAAAAAAAAAAAAAAAAAAAAAAAAAAAAAAAAAAAAAAFAAAADwAAAAAAAAAAAAAAAAAAAkUAAAAAQAAABQAAAAUAAAAFAAAAAEAAAAAAAAAZAAAAGQAAAAAAAAAZAAAAGQAAAAVAAAAYAAAAAAAAAAAAAAADwAAACADAAAAAAAAAAAAAAEAAACgMgAAVgcAAKr4//8BAAAAf39/AAEAAABkAAAAAAAAABQAAABAHwAAAAAAACYAAAAAAAAAwOD//wAAAAAmAAAAZAAAABYAAABMAAAAAAAAAAAAAAAEAAAAAAAAAAEAAADu7OEKAAAAACgAAAAoAAAAZAAAAGQAAAAAAAAAzMzMAAAAAABQAAAAUAAAAGQAAABkAAAAAAAAABcAAAAUAAAAAAAAAAAAAAD/fwAA/38AAAAAAAAJAAAABAAAAAAAAAAMAAAAEAAAAAAAAAAAAAAAAAAAAAAAAAAeAAAAaAAAAAAAAAAAAAAAAAAAAAAAAAAAAAAAECcAABAnAAAAAAAAAAAAAAAAAAAAAAAAAAAAAAAAAAAAAAAAAAAAABQAAAAAAAAAwMD/AAAAAABkAAAAMgAAAAAAAABkAAAAAAAAAH9/fwAKAAAAHwAAAFQAAAAAAAAFAAAAAQAAAAAAAAAAAAAAAAAAAAAAAAAAAAAAAAAAAAAAAAAAAAAAAn9/fwAAAAADzMzMAMDA/wB/f38AAAAAAAAAAAAAAAAAAAAAAAAAAAAhAAAAGAAAABQAAAAaAwAApQYAAOg6AABGEQAAEAAAACYAAAAIAAAAPKAAAAAAAAA="/>
               </a:ext>
             </a:extLst>
           </p:cNvSpPr>
@@ -3754,7 +3779,7 @@
             <a:spLocks noGrp="1" noChangeArrowheads="1"/>
             <a:extLst>
               <a:ext uri="smNativeData">
-                <pr:smNativeData xmlns:pr="smNativeData" val="SMDATA_13_47fkXxMAAAAlAAAAZAAAAA0AAAAAAAAAAAAAAAAAAAAAAAAAAAAAAAAAAAAAAAAAAAEAAABQAAAAAAAAAAAA4D8AAAAAAADgPwAAAAAAAOA/AAAAAAAA4D8AAAAAAADgPwAAAAAAAOA/AAAAAAAA4D8AAAAAAADgPwAAAAAAAOA/AAAAAAAA4D8CAAAAjAAAAAAAAAAAAAAAT4G9DP///wgAAAAAAAAAAAAAAAAAAAAAAAAAAAAAAAAAAAAAZAAAAAEAAABAAAAAAAAAAAAAAAAAAAAAAAAAAAAAAAAAAAAAAAAAAAAAAAAAAAAAAAAAAAAAAAAAAAAAAAAAAAAAAAAAAAAAAAAAAAAAAAAAAAAAAAAAAAAAAAAAAAAAFAAAADwAAAAAAAAAAAAAAAAAAAkUAAAAAQAAABQAAAAUAAAAFAAAAAEAAAAAAAAAZAAAAGQAAAAAAAAAZAAAAGQAAAAVAAAAYAAAAAAAAAAAAAAADwAAACADAAAAAAAAAAAAAAEAAACgMgAAVgcAAKr4//8BAAAAf39/AAEAAABkAAAAAAAAABQAAABAHwAAAAAAACYAAAAAAAAAwOD//wAAAAAmAAAAZAAAABYAAABMAAAAAAAAAAAAAAAEAAAAAAAAAAEAAADu7OEKAAAAACgAAAAoAAAAZAAAAGQAAAAAAAAAzMzMAAAAAABQAAAAUAAAAGQAAABkAAAAAAAAABcAAAAUAAAAAAAAAAAAAAD/fwAA/38AAAAAAAAJAAAABAAAAAAAAAAMAAAAEAAAAAAAAAAAAAAAAAAAAAAAAAAeAAAAaAAAAAAAAAAAAAAAAAAAAAAAAAAAAAAAECcAABAnAAAAAAAAAAAAAAAAAAAAAAAAAAAAAAAAAAAAAAAAAAAAABQAAAAAAAAAwMD/AAAAAABkAAAAMgAAAAAAAABkAAAAAAAAAH9/fwAKAAAAHwAAAFQAAAAAAAAFAAAAAQAAAAAAAAAAAAAAAAAAAAAAAAAAAAAAAAAAAAAAAAAAAAAAAn9/fwAAAAADzMzMAMDA/wB/f38AAAAAAAAAAAAAAAAAAAAAAAAAAAAhAAAAGAAAABQAAAAaAwAAfRMAAFUeAAAUKgAAEAAAACYAAAAIAAAAPaAAAAAAAAA="/>
+                <pr:smNativeData xmlns="" xmlns:p14="http://schemas.microsoft.com/office/powerpoint/2010/main" xmlns:pr="smNativeData" val="SMDATA_13_47fkXxMAAAAlAAAAZAAAAA0AAAAAAAAAAAAAAAAAAAAAAAAAAAAAAAAAAAAAAAAAAAEAAABQAAAAAAAAAAAA4D8AAAAAAADgPwAAAAAAAOA/AAAAAAAA4D8AAAAAAADgPwAAAAAAAOA/AAAAAAAA4D8AAAAAAADgPwAAAAAAAOA/AAAAAAAA4D8CAAAAjAAAAAAAAAAAAAAAT4G9DP///wgAAAAAAAAAAAAAAAAAAAAAAAAAAAAAAAAAAAAAZAAAAAEAAABAAAAAAAAAAAAAAAAAAAAAAAAAAAAAAAAAAAAAAAAAAAAAAAAAAAAAAAAAAAAAAAAAAAAAAAAAAAAAAAAAAAAAAAAAAAAAAAAAAAAAAAAAAAAAAAAAAAAAFAAAADwAAAAAAAAAAAAAAAAAAAkUAAAAAQAAABQAAAAUAAAAFAAAAAEAAAAAAAAAZAAAAGQAAAAAAAAAZAAAAGQAAAAVAAAAYAAAAAAAAAAAAAAADwAAACADAAAAAAAAAAAAAAEAAACgMgAAVgcAAKr4//8BAAAAf39/AAEAAABkAAAAAAAAABQAAABAHwAAAAAAACYAAAAAAAAAwOD//wAAAAAmAAAAZAAAABYAAABMAAAAAAAAAAAAAAAEAAAAAAAAAAEAAADu7OEKAAAAACgAAAAoAAAAZAAAAGQAAAAAAAAAzMzMAAAAAABQAAAAUAAAAGQAAABkAAAAAAAAABcAAAAUAAAAAAAAAAAAAAD/fwAA/38AAAAAAAAJAAAABAAAAAAAAAAMAAAAEAAAAAAAAAAAAAAAAAAAAAAAAAAeAAAAaAAAAAAAAAAAAAAAAAAAAAAAAAAAAAAAECcAABAnAAAAAAAAAAAAAAAAAAAAAAAAAAAAAAAAAAAAAAAAAAAAABQAAAAAAAAAwMD/AAAAAABkAAAAMgAAAAAAAABkAAAAAAAAAH9/fwAKAAAAHwAAAFQAAAAAAAAFAAAAAQAAAAAAAAAAAAAAAAAAAAAAAAAAAAAAAAAAAAAAAAAAAAAAAn9/fwAAAAADzMzMAMDA/wB/f38AAAAAAAAAAAAAAAAAAAAAAAAAAAAhAAAAGAAAABQAAAAaAwAAfRMAAFUeAAAUKgAAEAAAACYAAAAIAAAAPaAAAAAAAAA="/>
               </a:ext>
             </a:extLst>
           </p:cNvSpPr>
@@ -3812,7 +3837,7 @@
             <a:spLocks noGrp="1" noChangeArrowheads="1"/>
             <a:extLst>
               <a:ext uri="smNativeData">
-                <pr:smNativeData xmlns:pr="smNativeData" val="SMDATA_13_47fkXxMAAAAlAAAAZAAAAA0AAAAAAAAAAAAAAAAAAAAAAAAAAAAAAAAAAAAAAAAAAAEAAABQAAAAAAAAAAAA4D8AAAAAAADgPwAAAAAAAOA/AAAAAAAA4D8AAAAAAADgPwAAAAAAAOA/AAAAAAAA4D8AAAAAAADgPwAAAAAAAOA/AAAAAAAA4D8CAAAAjAAAAAAAAAAAAAAAT4G9DP///wgAAAAAAAAAAAAAAAAAAAAAAAAAAAAAAAAAAAAAZAAAAAEAAABAAAAAAAAAAAAAAAAAAAAAAAAAAAAAAAAAAAAAAAAAAAAAAAAAAAAAAAAAAAAAAAAAAAAAAAAAAAAAAAAAAAAAAAAAAAAAAAAAAAAAAAAAAAAAAAAAAAAAFAAAADwAAAAAAAAAAAAAAAAAAAkUAAAAAQAAABQAAAAUAAAAFAAAAAEAAAAAAAAAZAAAAGQAAAAAAAAAZAAAAGQAAAAVAAAAYAAAAAAAAAAAAAAADwAAACADAAAAAAAAAAAAAAEAAACgMgAAVgcAAKr4//8BAAAAf39/AAEAAABkAAAAAAAAABQAAABAHwAAAAAAACYAAAAAAAAAwOD//wAAAAAmAAAAZAAAABYAAABMAAAAAAAAAAAAAAAEAAAAAAAAAAEAAADu7OEKAAAAACgAAAAoAAAAZAAAAGQAAAAAAAAAzMzMAAAAAABQAAAAUAAAAGQAAABkAAAAAAAAABcAAAAUAAAAAAAAAAAAAAD/fwAA/38AAAAAAAAJAAAABAAAAAAAAAAMAAAAEAAAAAAAAAAAAAAAAAAAAAAAAAAeAAAAaAAAAAAAAAAAAAAAAAAAAAAAAAAAAAAAECcAABAnAAAAAAAAAAAAAAAAAAAAAAAAAAAAAAAAAAAAAAAAAAAAABQAAAAAAAAAwMD/AAAAAABkAAAAMgAAAAAAAABkAAAAAAAAAH9/fwAKAAAAHwAAAFQAAAAAAAAFAAAAAQAAAAAAAAAAAAAAAAAAAAAAAAAAAAAAAAAAAAAAAAAAAAAAAn9/fwAAAAADzMzMAMDA/wB/f38AAAAAAAAAAAAAAAAAAAAAAAAAAAAhAAAAGAAAABQAAACyHwAAfRMAAO46AAAUKgAAEAAAACYAAAAIAAAAPaAAAAAAAAA="/>
+                <pr:smNativeData xmlns="" xmlns:p14="http://schemas.microsoft.com/office/powerpoint/2010/main" xmlns:pr="smNativeData" val="SMDATA_13_47fkXxMAAAAlAAAAZAAAAA0AAAAAAAAAAAAAAAAAAAAAAAAAAAAAAAAAAAAAAAAAAAEAAABQAAAAAAAAAAAA4D8AAAAAAADgPwAAAAAAAOA/AAAAAAAA4D8AAAAAAADgPwAAAAAAAOA/AAAAAAAA4D8AAAAAAADgPwAAAAAAAOA/AAAAAAAA4D8CAAAAjAAAAAAAAAAAAAAAT4G9DP///wgAAAAAAAAAAAAAAAAAAAAAAAAAAAAAAAAAAAAAZAAAAAEAAABAAAAAAAAAAAAAAAAAAAAAAAAAAAAAAAAAAAAAAAAAAAAAAAAAAAAAAAAAAAAAAAAAAAAAAAAAAAAAAAAAAAAAAAAAAAAAAAAAAAAAAAAAAAAAAAAAAAAAFAAAADwAAAAAAAAAAAAAAAAAAAkUAAAAAQAAABQAAAAUAAAAFAAAAAEAAAAAAAAAZAAAAGQAAAAAAAAAZAAAAGQAAAAVAAAAYAAAAAAAAAAAAAAADwAAACADAAAAAAAAAAAAAAEAAACgMgAAVgcAAKr4//8BAAAAf39/AAEAAABkAAAAAAAAABQAAABAHwAAAAAAACYAAAAAAAAAwOD//wAAAAAmAAAAZAAAABYAAABMAAAAAAAAAAAAAAAEAAAAAAAAAAEAAADu7OEKAAAAACgAAAAoAAAAZAAAAGQAAAAAAAAAzMzMAAAAAABQAAAAUAAAAGQAAABkAAAAAAAAABcAAAAUAAAAAAAAAAAAAAD/fwAA/38AAAAAAAAJAAAABAAAAAAAAAAMAAAAEAAAAAAAAAAAAAAAAAAAAAAAAAAeAAAAaAAAAAAAAAAAAAAAAAAAAAAAAAAAAAAAECcAABAnAAAAAAAAAAAAAAAAAAAAAAAAAAAAAAAAAAAAAAAAAAAAABQAAAAAAAAAwMD/AAAAAABkAAAAMgAAAAAAAABkAAAAAAAAAH9/fwAKAAAAHwAAAFQAAAAAAAAFAAAAAQAAAAAAAAAAAAAAAAAAAAAAAAAAAAAAAAAAAAAAAAAAAAAAAn9/fwAAAAADzMzMAMDA/wB/f38AAAAAAAAAAAAAAAAAAAAAAAAAAAAhAAAAGAAAABQAAACyHwAAfRMAAO46AAAUKgAAEAAAACYAAAAIAAAAPaAAAAAAAAA="/>
               </a:ext>
             </a:extLst>
           </p:cNvSpPr>
@@ -3872,7 +3897,7 @@
 </file>
 
 <file path=ppt/slideLayouts/slideLayout5.xml><?xml version="1.0" encoding="utf-8"?>
-<p:sldLayout xmlns:p="http://schemas.openxmlformats.org/presentationml/2006/main" xmlns:p14="http://schemas.microsoft.com/office/powerpoint/2010/main" xmlns:r="http://schemas.openxmlformats.org/officeDocument/2006/relationships" xmlns:a="http://schemas.openxmlformats.org/drawingml/2006/main" type="titleOnly" preserve="1">
+<p:sldLayout xmlns:a="http://schemas.openxmlformats.org/drawingml/2006/main" xmlns:r="http://schemas.openxmlformats.org/officeDocument/2006/relationships" xmlns:p="http://schemas.openxmlformats.org/presentationml/2006/main" type="titleOnly" preserve="1">
   <p:cSld name="Title Only">
     <p:spTree>
       <p:nvGrpSpPr>
@@ -3895,7 +3920,7 @@
             <a:spLocks noGrp="1" noChangeArrowheads="1"/>
             <a:extLst>
               <a:ext uri="smNativeData">
-                <pr:smNativeData xmlns:pr="smNativeData" val="SMDATA_13_47fkXxMAAAAlAAAAZAAAAA0AAAAAAAAAAAAAAAAAAAAAAAAAAAAAAAABAAAAAAAAAAEAAABQAAAAAAAAAAAA4D8AAAAAAADgPwAAAAAAAOA/AAAAAAAA4D8AAAAAAADgPwAAAAAAAOA/AAAAAAAA4D8AAAAAAADgPwAAAAAAAOA/AAAAAAAA4D8CAAAAjAAAAAAAAAAAAAAAT4G9DP///wgAAAAAAAAAAAAAAAAAAAAAAAAAAAAAAAAAAAAAZAAAAAEAAABAAAAAAAAAAAAAAAAAAAAAAAAAAAAAAAAAAAAAAAAAAAAAAAAAAAAAAAAAAAAAAAAAAAAAAAAAAAAAAAAAAAAAAAAAAAAAAAAAAAAAAAAAAAAAAAAAAAAAFAAAADwAAAAAAAAAAAAAAAAAAAkUAAAAAQAAABQAAAAUAAAAFAAAAAEAAAAAAAAAZAAAAGQAAAAAAAAAZAAAAGQAAAAVAAAAYAAAAAAAAAAAAAAADwAAACADAAAAAAAAAAAAAAEAAACgMgAAVgcAAKr4//8BAAAAf39/AAEAAABkAAAAAAAAABQAAABAHwAAAAAAACYAAAAAAAAAwOD//wAAAAAmAAAAZAAAABYAAABMAAAAAAAAAAAAAAAEAAAAAAAAAAEAAADu7OEKAAAAACgAAAAoAAAAZAAAAGQAAAAAAAAAzMzMAAAAAABQAAAAUAAAAGQAAABkAAAAAAAAABcAAAAUAAAAAAAAAAAAAAD/fwAA/38AAAAAAAAJAAAABAAAAAAAAAAMAAAAEAAAAAAAAAAAAAAAAAAAAAAAAAAeAAAAaAAAAAAAAAAAAAAAAAAAAAAAAAAAAAAAECcAABAnAAAAAAAAAAAAAAAAAAAAAAAAAAAAAAAAAAAAAAAAAAAAABQAAAAAAAAAwMD/AAAAAABkAAAAMgAAAAAAAABkAAAAAAAAAH9/fwAKAAAAHwAAAFQAAAAAAAAFAAAAAQAAAAAAAAAAAAAAAAAAAAAAAAAAAAAAAAAAAAAAAAAAAAAAAn9/fwAAAAADzMzMAMDA/wB/f38AAAAAAAAAAAAAAAAAAAAAAAAAAAAhAAAAGAAAABQAAAAaAwAApQYAAOg6AABGEQAAEAAAACYAAAAIAAAAPKAAAAAAAAA="/>
+                <pr:smNativeData xmlns="" xmlns:p14="http://schemas.microsoft.com/office/powerpoint/2010/main" xmlns:pr="smNativeData" val="SMDATA_13_47fkXxMAAAAlAAAAZAAAAA0AAAAAAAAAAAAAAAAAAAAAAAAAAAAAAAABAAAAAAAAAAEAAABQAAAAAAAAAAAA4D8AAAAAAADgPwAAAAAAAOA/AAAAAAAA4D8AAAAAAADgPwAAAAAAAOA/AAAAAAAA4D8AAAAAAADgPwAAAAAAAOA/AAAAAAAA4D8CAAAAjAAAAAAAAAAAAAAAT4G9DP///wgAAAAAAAAAAAAAAAAAAAAAAAAAAAAAAAAAAAAAZAAAAAEAAABAAAAAAAAAAAAAAAAAAAAAAAAAAAAAAAAAAAAAAAAAAAAAAAAAAAAAAAAAAAAAAAAAAAAAAAAAAAAAAAAAAAAAAAAAAAAAAAAAAAAAAAAAAAAAAAAAAAAAFAAAADwAAAAAAAAAAAAAAAAAAAkUAAAAAQAAABQAAAAUAAAAFAAAAAEAAAAAAAAAZAAAAGQAAAAAAAAAZAAAAGQAAAAVAAAAYAAAAAAAAAAAAAAADwAAACADAAAAAAAAAAAAAAEAAACgMgAAVgcAAKr4//8BAAAAf39/AAEAAABkAAAAAAAAABQAAABAHwAAAAAAACYAAAAAAAAAwOD//wAAAAAmAAAAZAAAABYAAABMAAAAAAAAAAAAAAAEAAAAAAAAAAEAAADu7OEKAAAAACgAAAAoAAAAZAAAAGQAAAAAAAAAzMzMAAAAAABQAAAAUAAAAGQAAABkAAAAAAAAABcAAAAUAAAAAAAAAAAAAAD/fwAA/38AAAAAAAAJAAAABAAAAAAAAAAMAAAAEAAAAAAAAAAAAAAAAAAAAAAAAAAeAAAAaAAAAAAAAAAAAAAAAAAAAAAAAAAAAAAAECcAABAnAAAAAAAAAAAAAAAAAAAAAAAAAAAAAAAAAAAAAAAAAAAAABQAAAAAAAAAwMD/AAAAAABkAAAAMgAAAAAAAABkAAAAAAAAAH9/fwAKAAAAHwAAAFQAAAAAAAAFAAAAAQAAAAAAAAAAAAAAAAAAAAAAAAAAAAAAAAAAAAAAAAAAAAAAAn9/fwAAAAADzMzMAMDA/wB/f38AAAAAAAAAAAAAAAAAAAAAAAAAAAAhAAAAGAAAABQAAAAaAwAApQYAAOg6AABGEQAAEAAAACYAAAAIAAAAPKAAAAAAAAA="/>
               </a:ext>
             </a:extLst>
           </p:cNvSpPr>
@@ -3932,7 +3957,7 @@
 </file>
 
 <file path=ppt/slideLayouts/slideLayout6.xml><?xml version="1.0" encoding="utf-8"?>
-<p:sldLayout xmlns:p="http://schemas.openxmlformats.org/presentationml/2006/main" xmlns:p14="http://schemas.microsoft.com/office/powerpoint/2010/main" xmlns:r="http://schemas.openxmlformats.org/officeDocument/2006/relationships" xmlns:a="http://schemas.openxmlformats.org/drawingml/2006/main" type="objOnly" preserve="1">
+<p:sldLayout xmlns:a="http://schemas.openxmlformats.org/drawingml/2006/main" xmlns:r="http://schemas.openxmlformats.org/officeDocument/2006/relationships" xmlns:p="http://schemas.openxmlformats.org/presentationml/2006/main" type="objOnly" preserve="1">
   <p:cSld name="Centered Text">
     <p:spTree>
       <p:nvGrpSpPr>
@@ -3955,7 +3980,7 @@
             <a:spLocks noGrp="1" noChangeArrowheads="1"/>
             <a:extLst>
               <a:ext uri="smNativeData">
-                <pr:smNativeData xmlns:pr="smNativeData" val="SMDATA_13_47fkXxMAAAAlAAAAZAAAAA0AAAAAAAAAAAAAAAAAAAAAAAAAAAAAAAABAAAAAAAAAAEAAABQAAAAAAAAAAAA4D8AAAAAAADgPwAAAAAAAOA/AAAAAAAA4D8AAAAAAADgPwAAAAAAAOA/AAAAAAAA4D8AAAAAAADgPwAAAAAAAOA/AAAAAAAA4D8CAAAAjAAAAAAAAAAAAAAAT4G9DP///wgAAAAAAAAAAAAAAAAAAAAAAAAAAAAAAAAAAAAAZAAAAAEAAABAAAAAAAAAAAAAAAAAAAAAAAAAAAAAAAAAAAAAAAAAAAAAAAAAAAAAAAAAAAAAAAAAAAAAAAAAAAAAAAAAAAAAAAAAAAAAAAAAAAAAAAAAAAAAAAAAAAAAFAAAADwAAAAAAAAAAAAAAAAAAAkUAAAAAQAAABQAAAAUAAAAFAAAAAEAAAAAAAAAZAAAAGQAAAAAAAAAZAAAAGQAAAAVAAAAYAAAAAAAAAAAAAAADwAAACADAAAAAAAAAAAAAAEAAACgMgAAVgcAAKr4//8BAAAAf39/AAEAAABkAAAAAAAAABQAAABAHwAAAAAAACYAAAAAAAAAwOD//wAAAAAmAAAAZAAAABYAAABMAAAAAAAAAAAAAAAEAAAAAAAAAAEAAADu7OEKAAAAACgAAAAoAAAAZAAAAGQAAAAAAAAAzMzMAAAAAABQAAAAUAAAAGQAAABkAAAAAAAAABcAAAAUAAAAAAAAAAAAAAD/fwAA/38AAAAAAAAJAAAABAAAAAAAAAAMAAAAEAAAAAAAAAAAAAAAAAAAAAAAAAAeAAAAaAAAAAAAAAAAAAAAAAAAAAAAAAAAAAAAECcAABAnAAAAAAAAAAAAAAAAAAAAAAAAAAAAAAAAAAAAAAAAAAAAABQAAAAAAAAAwMD/AAAAAABkAAAAMgAAAAAAAABkAAAAAAAAAH9/fwAKAAAAHwAAAFQAAAAAAAAFAAAAAQAAAAAAAAAAAAAAAAAAAAAAAAAAAAAAAAAAAAAAAAAAAAAAAn9/fwAAAAADzMzMAMDA/wB/f38AAAAAAAAAAAAAAAAAAAAAAAAAAAAhAAAAGAAAABQAAAAaAwAApQYAAOg6AADtNwAAEAAAACYAAAAIAAAAvaAAAAAAAAA="/>
+                <pr:smNativeData xmlns="" xmlns:p14="http://schemas.microsoft.com/office/powerpoint/2010/main" xmlns:pr="smNativeData" val="SMDATA_13_47fkXxMAAAAlAAAAZAAAAA0AAAAAAAAAAAAAAAAAAAAAAAAAAAAAAAABAAAAAAAAAAEAAABQAAAAAAAAAAAA4D8AAAAAAADgPwAAAAAAAOA/AAAAAAAA4D8AAAAAAADgPwAAAAAAAOA/AAAAAAAA4D8AAAAAAADgPwAAAAAAAOA/AAAAAAAA4D8CAAAAjAAAAAAAAAAAAAAAT4G9DP///wgAAAAAAAAAAAAAAAAAAAAAAAAAAAAAAAAAAAAAZAAAAAEAAABAAAAAAAAAAAAAAAAAAAAAAAAAAAAAAAAAAAAAAAAAAAAAAAAAAAAAAAAAAAAAAAAAAAAAAAAAAAAAAAAAAAAAAAAAAAAAAAAAAAAAAAAAAAAAAAAAAAAAFAAAADwAAAAAAAAAAAAAAAAAAAkUAAAAAQAAABQAAAAUAAAAFAAAAAEAAAAAAAAAZAAAAGQAAAAAAAAAZAAAAGQAAAAVAAAAYAAAAAAAAAAAAAAADwAAACADAAAAAAAAAAAAAAEAAACgMgAAVgcAAKr4//8BAAAAf39/AAEAAABkAAAAAAAAABQAAABAHwAAAAAAACYAAAAAAAAAwOD//wAAAAAmAAAAZAAAABYAAABMAAAAAAAAAAAAAAAEAAAAAAAAAAEAAADu7OEKAAAAACgAAAAoAAAAZAAAAGQAAAAAAAAAzMzMAAAAAABQAAAAUAAAAGQAAABkAAAAAAAAABcAAAAUAAAAAAAAAAAAAAD/fwAA/38AAAAAAAAJAAAABAAAAAAAAAAMAAAAEAAAAAAAAAAAAAAAAAAAAAAAAAAeAAAAaAAAAAAAAAAAAAAAAAAAAAAAAAAAAAAAECcAABAnAAAAAAAAAAAAAAAAAAAAAAAAAAAAAAAAAAAAAAAAAAAAABQAAAAAAAAAwMD/AAAAAABkAAAAMgAAAAAAAABkAAAAAAAAAH9/fwAKAAAAHwAAAFQAAAAAAAAFAAAAAQAAAAAAAAAAAAAAAAAAAAAAAAAAAAAAAAAAAAAAAAAAAAAAAn9/fwAAAAADzMzMAMDA/wB/f38AAAAAAAAAAAAAAAAAAAAAAAAAAAAhAAAAGAAAABQAAAAaAwAApQYAAOg6AADtNwAAEAAAACYAAAAIAAAAvaAAAAAAAAA="/>
               </a:ext>
             </a:extLst>
           </p:cNvSpPr>
@@ -4015,7 +4040,7 @@
 </file>
 
 <file path=ppt/slideLayouts/slideLayout7.xml><?xml version="1.0" encoding="utf-8"?>
-<p:sldLayout xmlns:p="http://schemas.openxmlformats.org/presentationml/2006/main" xmlns:p14="http://schemas.microsoft.com/office/powerpoint/2010/main" xmlns:r="http://schemas.openxmlformats.org/officeDocument/2006/relationships" xmlns:a="http://schemas.openxmlformats.org/drawingml/2006/main" type="twoObjAndObj" preserve="1">
+<p:sldLayout xmlns:a="http://schemas.openxmlformats.org/drawingml/2006/main" xmlns:r="http://schemas.openxmlformats.org/officeDocument/2006/relationships" xmlns:p="http://schemas.openxmlformats.org/presentationml/2006/main" type="twoObjAndObj" preserve="1">
   <p:cSld name="Title, 2 Content and Content">
     <p:spTree>
       <p:nvGrpSpPr>
@@ -4038,7 +4063,7 @@
             <a:spLocks noGrp="1" noChangeArrowheads="1"/>
             <a:extLst>
               <a:ext uri="smNativeData">
-                <pr:smNativeData xmlns:pr="smNativeData" val="SMDATA_13_47fkXxMAAAAlAAAAZAAAAA0AAAAAAAAAAAAAAAAAAAAAAAAAAAAAAAABAAAAAAAAAAEAAABQAAAAAAAAAAAA4D8AAAAAAADgPwAAAAAAAOA/AAAAAAAA4D8AAAAAAADgPwAAAAAAAOA/AAAAAAAA4D8AAAAAAADgPwAAAAAAAOA/AAAAAAAA4D8CAAAAjAAAAAAAAAAAAAAAT4G9DP///wgAAAAAAAAAAAAAAAAAAAAAAAAAAAAAAAAAAAAAZAAAAAEAAABAAAAAAAAAAAAAAAAAAAAAAAAAAAAAAAAAAAAAAAAAAAAAAAAAAAAAAAAAAAAAAAAAAAAAAAAAAAAAAAAAAAAAAAAAAAAAAAAAAAAAAAAAAAAAAAAAAAAAFAAAADwAAAAAAAAAAAAAAAAAAAkUAAAAAQAAABQAAAAUAAAAFAAAAAEAAAAAAAAAZAAAAGQAAAAAAAAAZAAAAGQAAAAVAAAAYAAAAAAAAAAAAAAADwAAACADAAAAAAAAAAAAAAEAAACgMgAAVgcAAKr4//8BAAAAf39/AAEAAABkAAAAAAAAABQAAABAHwAAAAAAACYAAAAAAAAAwOD//wAAAAAmAAAAZAAAABYAAABMAAAAAAAAAAAAAAAEAAAAAAAAAAEAAADu7OEKAAAAACgAAAAoAAAAZAAAAGQAAAAAAAAAzMzMAAAAAABQAAAAUAAAAGQAAABkAAAAAAAAABcAAAAUAAAAAAAAAAAAAAD/fwAA/38AAAAAAAAJAAAABAAAAAAAAAAMAAAAEAAAAAAAAAAAAAAAAAAAAAAAAAAeAAAAaAAAAAAAAAAAAAAAAAAAAAAAAAAAAAAAECcAABAnAAAAAAAAAAAAAAAAAAAAAAAAAAAAAAAAAAAAAAAAAAAAABQAAAAAAAAAwMD/AAAAAABkAAAAMgAAAAAAAABkAAAAAAAAAH9/fwAKAAAAHwAAAFQAAAAAAAAFAAAAAQAAAAAAAAAAAAAAAAAAAAAAAAAAAAAAAAAAAAAAAAAAAAAAAn9/fwAAAAADzMzMAMDA/wB/f38AAAAAAAAAAAAAAAAAAAAAAAAAAAAhAAAAGAAAABQAAAAaAwAApQYAAOg6AABGEQAAEAAAACYAAAAIAAAAPKAAAAAAAAA="/>
+                <pr:smNativeData xmlns="" xmlns:p14="http://schemas.microsoft.com/office/powerpoint/2010/main" xmlns:pr="smNativeData" val="SMDATA_13_47fkXxMAAAAlAAAAZAAAAA0AAAAAAAAAAAAAAAAAAAAAAAAAAAAAAAABAAAAAAAAAAEAAABQAAAAAAAAAAAA4D8AAAAAAADgPwAAAAAAAOA/AAAAAAAA4D8AAAAAAADgPwAAAAAAAOA/AAAAAAAA4D8AAAAAAADgPwAAAAAAAOA/AAAAAAAA4D8CAAAAjAAAAAAAAAAAAAAAT4G9DP///wgAAAAAAAAAAAAAAAAAAAAAAAAAAAAAAAAAAAAAZAAAAAEAAABAAAAAAAAAAAAAAAAAAAAAAAAAAAAAAAAAAAAAAAAAAAAAAAAAAAAAAAAAAAAAAAAAAAAAAAAAAAAAAAAAAAAAAAAAAAAAAAAAAAAAAAAAAAAAAAAAAAAAFAAAADwAAAAAAAAAAAAAAAAAAAkUAAAAAQAAABQAAAAUAAAAFAAAAAEAAAAAAAAAZAAAAGQAAAAAAAAAZAAAAGQAAAAVAAAAYAAAAAAAAAAAAAAADwAAACADAAAAAAAAAAAAAAEAAACgMgAAVgcAAKr4//8BAAAAf39/AAEAAABkAAAAAAAAABQAAABAHwAAAAAAACYAAAAAAAAAwOD//wAAAAAmAAAAZAAAABYAAABMAAAAAAAAAAAAAAAEAAAAAAAAAAEAAADu7OEKAAAAACgAAAAoAAAAZAAAAGQAAAAAAAAAzMzMAAAAAABQAAAAUAAAAGQAAABkAAAAAAAAABcAAAAUAAAAAAAAAAAAAAD/fwAA/38AAAAAAAAJAAAABAAAAAAAAAAMAAAAEAAAAAAAAAAAAAAAAAAAAAAAAAAeAAAAaAAAAAAAAAAAAAAAAAAAAAAAAAAAAAAAECcAABAnAAAAAAAAAAAAAAAAAAAAAAAAAAAAAAAAAAAAAAAAAAAAABQAAAAAAAAAwMD/AAAAAABkAAAAMgAAAAAAAABkAAAAAAAAAH9/fwAKAAAAHwAAAFQAAAAAAAAFAAAAAQAAAAAAAAAAAAAAAAAAAAAAAAAAAAAAAAAAAAAAAAAAAAAAAn9/fwAAAAADzMzMAMDA/wB/f38AAAAAAAAAAAAAAAAAAAAAAAAAAAAhAAAAGAAAABQAAAAaAwAApQYAAOg6AABGEQAAEAAAACYAAAAIAAAAPKAAAAAAAAA="/>
               </a:ext>
             </a:extLst>
           </p:cNvSpPr>
@@ -4073,7 +4098,7 @@
             <a:spLocks noGrp="1" noChangeArrowheads="1"/>
             <a:extLst>
               <a:ext uri="smNativeData">
-                <pr:smNativeData xmlns:pr="smNativeData" val="SMDATA_13_47fkXxMAAAAlAAAAZAAAAA0AAAAAAAAAAAAAAAAAAAAAAAAAAAAAAAAAAAAAAAAAAAEAAABQAAAAAAAAAAAA4D8AAAAAAADgPwAAAAAAAOA/AAAAAAAA4D8AAAAAAADgPwAAAAAAAOA/AAAAAAAA4D8AAAAAAADgPwAAAAAAAOA/AAAAAAAA4D8CAAAAjAAAAAAAAAAAAAAAT4G9DP///wgAAAAAAAAAAAAAAAAAAAAAAAAAAAAAAAAAAAAAZAAAAAEAAABAAAAAAAAAAAAAAAAAAAAAAAAAAAAAAAAAAAAAAAAAAAAAAAAAAAAAAAAAAAAAAAAAAAAAAAAAAAAAAAAAAAAAAAAAAAAAAAAAAAAAAAAAAAAAAAAAAAAAFAAAADwAAAAAAAAAAAAAAAAAAAkUAAAAAQAAABQAAAAUAAAAFAAAAAEAAAAAAAAAZAAAAGQAAAAAAAAAZAAAAGQAAAAVAAAAYAAAAAAAAAAAAAAADwAAACADAAAAAAAAAAAAAAEAAACgMgAAVgcAAKr4//8BAAAAf39/AAEAAABkAAAAAAAAABQAAABAHwAAAAAAACYAAAAAAAAAwOD//wAAAAAmAAAAZAAAABYAAABMAAAAAAAAAAAAAAAEAAAAAAAAAAEAAADu7OEKAAAAACgAAAAoAAAAZAAAAGQAAAAAAAAAzMzMAAAAAABQAAAAUAAAAGQAAABkAAAAAAAAABcAAAAUAAAAAAAAAAAAAAD/fwAA/38AAAAAAAAJAAAABAAAAAAAAAAMAAAAEAAAAAAAAAAAAAAAAAAAAAAAAAAeAAAAaAAAAAAAAAAAAAAAAAAAAAAAAAAAAAAAECcAABAnAAAAAAAAAAAAAAAAAAAAAAAAAAAAAAAAAAAAAAAAAAAAABQAAAAAAAAAwMD/AAAAAABkAAAAMgAAAAAAAABkAAAAAAAAAH9/fwAKAAAAHwAAAFQAAAAAAAAFAAAAAQAAAAAAAAAAAAAAAAAAAAAAAAAAAAAAAAAAAAAAAAAAAAAAAn9/fwAAAAADzMzMAMDA/wB/f38AAAAAAAAAAAAAAAAAAAAAAAAAAAAhAAAAGAAAABQAAAAaAwAAfRMAAFUeAABDHgAAEAAAACYAAAAIAAAAPaAAAAAAAAA="/>
+                <pr:smNativeData xmlns="" xmlns:p14="http://schemas.microsoft.com/office/powerpoint/2010/main" xmlns:pr="smNativeData" val="SMDATA_13_47fkXxMAAAAlAAAAZAAAAA0AAAAAAAAAAAAAAAAAAAAAAAAAAAAAAAAAAAAAAAAAAAEAAABQAAAAAAAAAAAA4D8AAAAAAADgPwAAAAAAAOA/AAAAAAAA4D8AAAAAAADgPwAAAAAAAOA/AAAAAAAA4D8AAAAAAADgPwAAAAAAAOA/AAAAAAAA4D8CAAAAjAAAAAAAAAAAAAAAT4G9DP///wgAAAAAAAAAAAAAAAAAAAAAAAAAAAAAAAAAAAAAZAAAAAEAAABAAAAAAAAAAAAAAAAAAAAAAAAAAAAAAAAAAAAAAAAAAAAAAAAAAAAAAAAAAAAAAAAAAAAAAAAAAAAAAAAAAAAAAAAAAAAAAAAAAAAAAAAAAAAAAAAAAAAAFAAAADwAAAAAAAAAAAAAAAAAAAkUAAAAAQAAABQAAAAUAAAAFAAAAAEAAAAAAAAAZAAAAGQAAAAAAAAAZAAAAGQAAAAVAAAAYAAAAAAAAAAAAAAADwAAACADAAAAAAAAAAAAAAEAAACgMgAAVgcAAKr4//8BAAAAf39/AAEAAABkAAAAAAAAABQAAABAHwAAAAAAACYAAAAAAAAAwOD//wAAAAAmAAAAZAAAABYAAABMAAAAAAAAAAAAAAAEAAAAAAAAAAEAAADu7OEKAAAAACgAAAAoAAAAZAAAAGQAAAAAAAAAzMzMAAAAAABQAAAAUAAAAGQAAABkAAAAAAAAABcAAAAUAAAAAAAAAAAAAAD/fwAA/38AAAAAAAAJAAAABAAAAAAAAAAMAAAAEAAAAAAAAAAAAAAAAAAAAAAAAAAeAAAAaAAAAAAAAAAAAAAAAAAAAAAAAAAAAAAAECcAABAnAAAAAAAAAAAAAAAAAAAAAAAAAAAAAAAAAAAAAAAAAAAAABQAAAAAAAAAwMD/AAAAAABkAAAAMgAAAAAAAABkAAAAAAAAAH9/fwAKAAAAHwAAAFQAAAAAAAAFAAAAAQAAAAAAAAAAAAAAAAAAAAAAAAAAAAAAAAAAAAAAAAAAAAAAAn9/fwAAAAADzMzMAMDA/wB/f38AAAAAAAAAAAAAAAAAAAAAAAAAAAAhAAAAGAAAABQAAAAaAwAAfRMAAFUeAABDHgAAEAAAACYAAAAIAAAAPaAAAAAAAAA="/>
               </a:ext>
             </a:extLst>
           </p:cNvSpPr>
@@ -4131,7 +4156,7 @@
             <a:spLocks noGrp="1" noChangeArrowheads="1"/>
             <a:extLst>
               <a:ext uri="smNativeData">
-                <pr:smNativeData xmlns:pr="smNativeData" val="SMDATA_13_47fkXxMAAAAlAAAAZAAAAA0AAAAAAAAAAAAAAAAAAAAAAAAAAAAAAAAAAAAAAAAAAAEAAABQAAAAAAAAAAAA4D8AAAAAAADgPwAAAAAAAOA/AAAAAAAA4D8AAAAAAADgPwAAAAAAAOA/AAAAAAAA4D8AAAAAAADgPwAAAAAAAOA/AAAAAAAA4D8CAAAAjAAAAAAAAAAAAAAAT4G9DP///wgAAAAAAAAAAAAAAAAAAAAAAAAAAAAAAAAAAAAAZAAAAAEAAABAAAAAAAAAAAAAAAAAAAAAAAAAAAAAAAAAAAAAAAAAAAAAAAAAAAAAAAAAAAAAAAAAAAAAAAAAAAAAAAAAAAAAAAAAAAAAAAAAAAAAAAAAAAAAAAAAAAAAFAAAADwAAAAAAAAAAAAAAAAAAAkUAAAAAQAAABQAAAAUAAAAFAAAAAEAAAAAAAAAZAAAAGQAAAAAAAAAZAAAAGQAAAAVAAAAYAAAAAAAAAAAAAAADwAAACADAAAAAAAAAAAAAAEAAACgMgAAVgcAAKr4//8BAAAAf39/AAEAAABkAAAAAAAAABQAAABAHwAAAAAAACYAAAAAAAAAwOD//wAAAAAmAAAAZAAAABYAAABMAAAAAAAAAAAAAAAEAAAAAAAAAAEAAADu7OEKAAAAACgAAAAoAAAAZAAAAGQAAAAAAAAAzMzMAAAAAABQAAAAUAAAAGQAAABkAAAAAAAAABcAAAAUAAAAAAAAAAAAAAD/fwAA/38AAAAAAAAJAAAABAAAAAAAAAAMAAAAEAAAAAAAAAAAAAAAAAAAAAAAAAAeAAAAaAAAAAAAAAAAAAAAAAAAAAAAAAAAAAAAECcAABAnAAAAAAAAAAAAAAAAAAAAAAAAAAAAAAAAAAAAAAAAAAAAABQAAAAAAAAAwMD/AAAAAABkAAAAMgAAAAAAAABkAAAAAAAAAH9/fwAKAAAAHwAAAFQAAAAAAAAFAAAAAQAAAAAAAAAAAAAAAAAAAAAAAAAAAAAAAAAAAAAAAAAAAAAAAn9/fwAAAAADzMzMAMDA/wB/f38AAAAAAAAAAAAAAAAAAAAAAAAAAAAhAAAAGAAAABQAAACyHwAAfRMAAO46AAAUKgAAEAAAACYAAAAIAAAAPaAAAAAAAAA="/>
+                <pr:smNativeData xmlns="" xmlns:p14="http://schemas.microsoft.com/office/powerpoint/2010/main" xmlns:pr="smNativeData" val="SMDATA_13_47fkXxMAAAAlAAAAZAAAAA0AAAAAAAAAAAAAAAAAAAAAAAAAAAAAAAAAAAAAAAAAAAEAAABQAAAAAAAAAAAA4D8AAAAAAADgPwAAAAAAAOA/AAAAAAAA4D8AAAAAAADgPwAAAAAAAOA/AAAAAAAA4D8AAAAAAADgPwAAAAAAAOA/AAAAAAAA4D8CAAAAjAAAAAAAAAAAAAAAT4G9DP///wgAAAAAAAAAAAAAAAAAAAAAAAAAAAAAAAAAAAAAZAAAAAEAAABAAAAAAAAAAAAAAAAAAAAAAAAAAAAAAAAAAAAAAAAAAAAAAAAAAAAAAAAAAAAAAAAAAAAAAAAAAAAAAAAAAAAAAAAAAAAAAAAAAAAAAAAAAAAAAAAAAAAAFAAAADwAAAAAAAAAAAAAAAAAAAkUAAAAAQAAABQAAAAUAAAAFAAAAAEAAAAAAAAAZAAAAGQAAAAAAAAAZAAAAGQAAAAVAAAAYAAAAAAAAAAAAAAADwAAACADAAAAAAAAAAAAAAEAAACgMgAAVgcAAKr4//8BAAAAf39/AAEAAABkAAAAAAAAABQAAABAHwAAAAAAACYAAAAAAAAAwOD//wAAAAAmAAAAZAAAABYAAABMAAAAAAAAAAAAAAAEAAAAAAAAAAEAAADu7OEKAAAAACgAAAAoAAAAZAAAAGQAAAAAAAAAzMzMAAAAAABQAAAAUAAAAGQAAABkAAAAAAAAABcAAAAUAAAAAAAAAAAAAAD/fwAA/38AAAAAAAAJAAAABAAAAAAAAAAMAAAAEAAAAAAAAAAAAAAAAAAAAAAAAAAeAAAAaAAAAAAAAAAAAAAAAAAAAAAAAAAAAAAAECcAABAnAAAAAAAAAAAAAAAAAAAAAAAAAAAAAAAAAAAAAAAAAAAAABQAAAAAAAAAwMD/AAAAAABkAAAAMgAAAAAAAABkAAAAAAAAAH9/fwAKAAAAHwAAAFQAAAAAAAAFAAAAAQAAAAAAAAAAAAAAAAAAAAAAAAAAAAAAAAAAAAAAAAAAAAAAAn9/fwAAAAADzMzMAMDA/wB/f38AAAAAAAAAAAAAAAAAAAAAAAAAAAAhAAAAGAAAABQAAACyHwAAfRMAAO46AAAUKgAAEAAAACYAAAAIAAAAPaAAAAAAAAA="/>
               </a:ext>
             </a:extLst>
           </p:cNvSpPr>
@@ -4189,7 +4214,7 @@
             <a:spLocks noGrp="1" noChangeArrowheads="1"/>
             <a:extLst>
               <a:ext uri="smNativeData">
-                <pr:smNativeData xmlns:pr="smNativeData" val="SMDATA_13_47fkXxMAAAAlAAAAZAAAAA0AAAAAAAAAAAAAAAAAAAAAAAAAAAAAAAAAAAAAAAAAAAEAAABQAAAAAAAAAAAA4D8AAAAAAADgPwAAAAAAAOA/AAAAAAAA4D8AAAAAAADgPwAAAAAAAOA/AAAAAAAA4D8AAAAAAADgPwAAAAAAAOA/AAAAAAAA4D8CAAAAjAAAAAAAAAAAAAAAT4G9DP///wgAAAAAAAAAAAAAAAAAAAAAAAAAAAAAAAAAAAAAZAAAAAEAAABAAAAAAAAAAAAAAAAAAAAAAAAAAAAAAAAAAAAAAAAAAAAAAAAAAAAAAAAAAAAAAAAAAAAAAAAAAAAAAAAAAAAAAAAAAAAAAAAAAAAAAAAAAAAAAAAAAAAAFAAAADwAAAAAAAAAAAAAAAAAAAkUAAAAAQAAABQAAAAUAAAAFAAAAAEAAAAAAAAAZAAAAGQAAAAAAAAAZAAAAGQAAAAVAAAAYAAAAAAAAAAAAAAADwAAACADAAAAAAAAAAAAAAEAAACgMgAAVgcAAKr4//8BAAAAf39/AAEAAABkAAAAAAAAABQAAABAHwAAAAAAACYAAAAAAAAAwOD//wAAAAAmAAAAZAAAABYAAABMAAAAAAAAAAAAAAAEAAAAAAAAAAEAAADu7OEKAAAAACgAAAAoAAAAZAAAAGQAAAAAAAAAzMzMAAAAAABQAAAAUAAAAGQAAABkAAAAAAAAABcAAAAUAAAAAAAAAAAAAAD/fwAA/38AAAAAAAAJAAAABAAAAAAAAAAMAAAAEAAAAAAAAAAAAAAAAAAAAAAAAAAeAAAAaAAAAAAAAAAAAAAAAAAAAAAAAAAAAAAAECcAABAnAAAAAAAAAAAAAAAAAAAAAAAAAAAAAAAAAAAAAAAAAAAAABQAAAAAAAAAwMD/AAAAAABkAAAAMgAAAAAAAABkAAAAAAAAAH9/fwAKAAAAHwAAAFQAAAAAAAAFAAAAAQAAAAAAAAAAAAAAAAAAAAAAAAAAAAAAAAAAAAAAAAAAAAAAAn9/fwAAAAADzMzMAMDA/wB/f38AAAAAAAAAAAAAAAAAAAAAAAAAAAAhAAAAGAAAABQAAAAaAwAASh8AAFUeAAAQKgAAEAAAACYAAAAIAAAAPaAAAAAAAAA="/>
+                <pr:smNativeData xmlns="" xmlns:p14="http://schemas.microsoft.com/office/powerpoint/2010/main" xmlns:pr="smNativeData" val="SMDATA_13_47fkXxMAAAAlAAAAZAAAAA0AAAAAAAAAAAAAAAAAAAAAAAAAAAAAAAAAAAAAAAAAAAEAAABQAAAAAAAAAAAA4D8AAAAAAADgPwAAAAAAAOA/AAAAAAAA4D8AAAAAAADgPwAAAAAAAOA/AAAAAAAA4D8AAAAAAADgPwAAAAAAAOA/AAAAAAAA4D8CAAAAjAAAAAAAAAAAAAAAT4G9DP///wgAAAAAAAAAAAAAAAAAAAAAAAAAAAAAAAAAAAAAZAAAAAEAAABAAAAAAAAAAAAAAAAAAAAAAAAAAAAAAAAAAAAAAAAAAAAAAAAAAAAAAAAAAAAAAAAAAAAAAAAAAAAAAAAAAAAAAAAAAAAAAAAAAAAAAAAAAAAAAAAAAAAAFAAAADwAAAAAAAAAAAAAAAAAAAkUAAAAAQAAABQAAAAUAAAAFAAAAAEAAAAAAAAAZAAAAGQAAAAAAAAAZAAAAGQAAAAVAAAAYAAAAAAAAAAAAAAADwAAACADAAAAAAAAAAAAAAEAAACgMgAAVgcAAKr4//8BAAAAf39/AAEAAABkAAAAAAAAABQAAABAHwAAAAAAACYAAAAAAAAAwOD//wAAAAAmAAAAZAAAABYAAABMAAAAAAAAAAAAAAAEAAAAAAAAAAEAAADu7OEKAAAAACgAAAAoAAAAZAAAAGQAAAAAAAAAzMzMAAAAAABQAAAAUAAAAGQAAABkAAAAAAAAABcAAAAUAAAAAAAAAAAAAAD/fwAA/38AAAAAAAAJAAAABAAAAAAAAAAMAAAAEAAAAAAAAAAAAAAAAAAAAAAAAAAeAAAAaAAAAAAAAAAAAAAAAAAAAAAAAAAAAAAAECcAABAnAAAAAAAAAAAAAAAAAAAAAAAAAAAAAAAAAAAAAAAAAAAAABQAAAAAAAAAwMD/AAAAAABkAAAAMgAAAAAAAABkAAAAAAAAAH9/fwAKAAAAHwAAAFQAAAAAAAAFAAAAAQAAAAAAAAAAAAAAAAAAAAAAAAAAAAAAAAAAAAAAAAAAAAAAAn9/fwAAAAADzMzMAMDA/wB/f38AAAAAAAAAAAAAAAAAAAAAAAAAAAAhAAAAGAAAABQAAAAaAwAASh8AAFUeAAAQKgAAEAAAACYAAAAIAAAAPaAAAAAAAAA="/>
               </a:ext>
             </a:extLst>
           </p:cNvSpPr>
@@ -4249,7 +4274,7 @@
 </file>
 
 <file path=ppt/slideLayouts/slideLayout8.xml><?xml version="1.0" encoding="utf-8"?>
-<p:sldLayout xmlns:p="http://schemas.openxmlformats.org/presentationml/2006/main" xmlns:p14="http://schemas.microsoft.com/office/powerpoint/2010/main" xmlns:r="http://schemas.openxmlformats.org/officeDocument/2006/relationships" xmlns:a="http://schemas.openxmlformats.org/drawingml/2006/main" type="objAndTwoObj" preserve="1">
+<p:sldLayout xmlns:a="http://schemas.openxmlformats.org/drawingml/2006/main" xmlns:r="http://schemas.openxmlformats.org/officeDocument/2006/relationships" xmlns:p="http://schemas.openxmlformats.org/presentationml/2006/main" type="objAndTwoObj" preserve="1">
   <p:cSld name="Title Content and 2 Content">
     <p:spTree>
       <p:nvGrpSpPr>
@@ -4272,7 +4297,7 @@
             <a:spLocks noGrp="1" noChangeArrowheads="1"/>
             <a:extLst>
               <a:ext uri="smNativeData">
-                <pr:smNativeData xmlns:pr="smNativeData" val="SMDATA_13_47fkXxMAAAAlAAAAZAAAAA0AAAAAAAAAAAAAAAAAAAAAAAAAAAAAAAABAAAAAAAAAAEAAABQAAAAAAAAAAAA4D8AAAAAAADgPwAAAAAAAOA/AAAAAAAA4D8AAAAAAADgPwAAAAAAAOA/AAAAAAAA4D8AAAAAAADgPwAAAAAAAOA/AAAAAAAA4D8CAAAAjAAAAAAAAAAAAAAAT4G9DP///wgAAAAAAAAAAAAAAAAAAAAAAAAAAAAAAAAAAAAAZAAAAAEAAABAAAAAAAAAAAAAAAAAAAAAAAAAAAAAAAAAAAAAAAAAAAAAAAAAAAAAAAAAAAAAAAAAAAAAAAAAAAAAAAAAAAAAAAAAAAAAAAAAAAAAAAAAAAAAAAAAAAAAFAAAADwAAAAAAAAAAAAAAAAAAAkUAAAAAQAAABQAAAAUAAAAFAAAAAEAAAAAAAAAZAAAAGQAAAAAAAAAZAAAAGQAAAAVAAAAYAAAAAAAAAAAAAAADwAAACADAAAAAAAAAAAAAAEAAACgMgAAVgcAAKr4//8BAAAAf39/AAEAAABkAAAAAAAAABQAAABAHwAAAAAAACYAAAAAAAAAwOD//wAAAAAmAAAAZAAAABYAAABMAAAAAAAAAAAAAAAEAAAAAAAAAAEAAADu7OEKAAAAACgAAAAoAAAAZAAAAGQAAAAAAAAAzMzMAAAAAABQAAAAUAAAAGQAAABkAAAAAAAAABcAAAAUAAAAAAAAAAAAAAD/fwAA/38AAAAAAAAJAAAABAAAAAAAAAAMAAAAEAAAAAAAAAAAAAAAAAAAAAAAAAAeAAAAaAAAAAAAAAAAAAAAAAAAAAAAAAAAAAAAECcAABAnAAAAAAAAAAAAAAAAAAAAAAAAAAAAAAAAAAAAAAAAAAAAABQAAAAAAAAAwMD/AAAAAABkAAAAMgAAAAAAAABkAAAAAAAAAH9/fwAKAAAAHwAAAFQAAAAAAAAFAAAAAQAAAAAAAAAAAAAAAAAAAAAAAAAAAAAAAAAAAAAAAAAAAAAAAn9/fwAAAAADzMzMAMDA/wB/f38AAAAAAAAAAAAAAAAAAAAAAAAAAAAhAAAAGAAAABQAAAAaAwAApQYAAOg6AABGEQAAEAAAACYAAAAIAAAAPKAAAAAAAAA="/>
+                <pr:smNativeData xmlns="" xmlns:p14="http://schemas.microsoft.com/office/powerpoint/2010/main" xmlns:pr="smNativeData" val="SMDATA_13_47fkXxMAAAAlAAAAZAAAAA0AAAAAAAAAAAAAAAAAAAAAAAAAAAAAAAABAAAAAAAAAAEAAABQAAAAAAAAAAAA4D8AAAAAAADgPwAAAAAAAOA/AAAAAAAA4D8AAAAAAADgPwAAAAAAAOA/AAAAAAAA4D8AAAAAAADgPwAAAAAAAOA/AAAAAAAA4D8CAAAAjAAAAAAAAAAAAAAAT4G9DP///wgAAAAAAAAAAAAAAAAAAAAAAAAAAAAAAAAAAAAAZAAAAAEAAABAAAAAAAAAAAAAAAAAAAAAAAAAAAAAAAAAAAAAAAAAAAAAAAAAAAAAAAAAAAAAAAAAAAAAAAAAAAAAAAAAAAAAAAAAAAAAAAAAAAAAAAAAAAAAAAAAAAAAFAAAADwAAAAAAAAAAAAAAAAAAAkUAAAAAQAAABQAAAAUAAAAFAAAAAEAAAAAAAAAZAAAAGQAAAAAAAAAZAAAAGQAAAAVAAAAYAAAAAAAAAAAAAAADwAAACADAAAAAAAAAAAAAAEAAACgMgAAVgcAAKr4//8BAAAAf39/AAEAAABkAAAAAAAAABQAAABAHwAAAAAAACYAAAAAAAAAwOD//wAAAAAmAAAAZAAAABYAAABMAAAAAAAAAAAAAAAEAAAAAAAAAAEAAADu7OEKAAAAACgAAAAoAAAAZAAAAGQAAAAAAAAAzMzMAAAAAABQAAAAUAAAAGQAAABkAAAAAAAAABcAAAAUAAAAAAAAAAAAAAD/fwAA/38AAAAAAAAJAAAABAAAAAAAAAAMAAAAEAAAAAAAAAAAAAAAAAAAAAAAAAAeAAAAaAAAAAAAAAAAAAAAAAAAAAAAAAAAAAAAECcAABAnAAAAAAAAAAAAAAAAAAAAAAAAAAAAAAAAAAAAAAAAAAAAABQAAAAAAAAAwMD/AAAAAABkAAAAMgAAAAAAAABkAAAAAAAAAH9/fwAKAAAAHwAAAFQAAAAAAAAFAAAAAQAAAAAAAAAAAAAAAAAAAAAAAAAAAAAAAAAAAAAAAAAAAAAAAn9/fwAAAAADzMzMAMDA/wB/f38AAAAAAAAAAAAAAAAAAAAAAAAAAAAhAAAAGAAAABQAAAAaAwAApQYAAOg6AABGEQAAEAAAACYAAAAIAAAAPKAAAAAAAAA="/>
               </a:ext>
             </a:extLst>
           </p:cNvSpPr>
@@ -4307,7 +4332,7 @@
             <a:spLocks noGrp="1" noChangeArrowheads="1"/>
             <a:extLst>
               <a:ext uri="smNativeData">
-                <pr:smNativeData xmlns:pr="smNativeData" val="SMDATA_13_47fkXxMAAAAlAAAAZAAAAA0AAAAAAAAAAAAAAAAAAAAAAAAAAAAAAAAAAAAAAAAAAAEAAABQAAAAAAAAAAAA4D8AAAAAAADgPwAAAAAAAOA/AAAAAAAA4D8AAAAAAADgPwAAAAAAAOA/AAAAAAAA4D8AAAAAAADgPwAAAAAAAOA/AAAAAAAA4D8CAAAAjAAAAAAAAAAAAAAAT4G9DP///wgAAAAAAAAAAAAAAAAAAAAAAAAAAAAAAAAAAAAAZAAAAAEAAABAAAAAAAAAAAAAAAAAAAAAAAAAAAAAAAAAAAAAAAAAAAAAAAAAAAAAAAAAAAAAAAAAAAAAAAAAAAAAAAAAAAAAAAAAAAAAAAAAAAAAAAAAAAAAAAAAAAAAFAAAADwAAAAAAAAAAAAAAAAAAAkUAAAAAQAAABQAAAAUAAAAFAAAAAEAAAAAAAAAZAAAAGQAAAAAAAAAZAAAAGQAAAAVAAAAYAAAAAAAAAAAAAAADwAAACADAAAAAAAAAAAAAAEAAACgMgAAVgcAAKr4//8BAAAAf39/AAEAAABkAAAAAAAAABQAAABAHwAAAAAAACYAAAAAAAAAwOD//wAAAAAmAAAAZAAAABYAAABMAAAAAAAAAAAAAAAEAAAAAAAAAAEAAADu7OEKAAAAACgAAAAoAAAAZAAAAGQAAAAAAAAAzMzMAAAAAABQAAAAUAAAAGQAAABkAAAAAAAAABcAAAAUAAAAAAAAAAAAAAD/fwAA/38AAAAAAAAJAAAABAAAAAAAAAAMAAAAEAAAAAAAAAAAAAAAAAAAAAAAAAAeAAAAaAAAAAAAAAAAAAAAAAAAAAAAAAAAAAAAECcAABAnAAAAAAAAAAAAAAAAAAAAAAAAAAAAAAAAAAAAAAAAAAAAABQAAAAAAAAAwMD/AAAAAABkAAAAMgAAAAAAAABkAAAAAAAAAH9/fwAKAAAAHwAAAFQAAAAAAAAFAAAAAQAAAAAAAAAAAAAAAAAAAAAAAAAAAAAAAAAAAAAAAAAAAAAAAn9/fwAAAAADzMzMAMDA/wB/f38AAAAAAAAAAAAAAAAAAAAAAAAAAAAhAAAAGAAAABQAAAAaAwAAfRMAAFUeAAAUKgAAEAAAACYAAAAIAAAAPaAAAAAAAAA="/>
+                <pr:smNativeData xmlns="" xmlns:p14="http://schemas.microsoft.com/office/powerpoint/2010/main" xmlns:pr="smNativeData" val="SMDATA_13_47fkXxMAAAAlAAAAZAAAAA0AAAAAAAAAAAAAAAAAAAAAAAAAAAAAAAAAAAAAAAAAAAEAAABQAAAAAAAAAAAA4D8AAAAAAADgPwAAAAAAAOA/AAAAAAAA4D8AAAAAAADgPwAAAAAAAOA/AAAAAAAA4D8AAAAAAADgPwAAAAAAAOA/AAAAAAAA4D8CAAAAjAAAAAAAAAAAAAAAT4G9DP///wgAAAAAAAAAAAAAAAAAAAAAAAAAAAAAAAAAAAAAZAAAAAEAAABAAAAAAAAAAAAAAAAAAAAAAAAAAAAAAAAAAAAAAAAAAAAAAAAAAAAAAAAAAAAAAAAAAAAAAAAAAAAAAAAAAAAAAAAAAAAAAAAAAAAAAAAAAAAAAAAAAAAAFAAAADwAAAAAAAAAAAAAAAAAAAkUAAAAAQAAABQAAAAUAAAAFAAAAAEAAAAAAAAAZAAAAGQAAAAAAAAAZAAAAGQAAAAVAAAAYAAAAAAAAAAAAAAADwAAACADAAAAAAAAAAAAAAEAAACgMgAAVgcAAKr4//8BAAAAf39/AAEAAABkAAAAAAAAABQAAABAHwAAAAAAACYAAAAAAAAAwOD//wAAAAAmAAAAZAAAABYAAABMAAAAAAAAAAAAAAAEAAAAAAAAAAEAAADu7OEKAAAAACgAAAAoAAAAZAAAAGQAAAAAAAAAzMzMAAAAAABQAAAAUAAAAGQAAABkAAAAAAAAABcAAAAUAAAAAAAAAAAAAAD/fwAA/38AAAAAAAAJAAAABAAAAAAAAAAMAAAAEAAAAAAAAAAAAAAAAAAAAAAAAAAeAAAAaAAAAAAAAAAAAAAAAAAAAAAAAAAAAAAAECcAABAnAAAAAAAAAAAAAAAAAAAAAAAAAAAAAAAAAAAAAAAAAAAAABQAAAAAAAAAwMD/AAAAAABkAAAAMgAAAAAAAABkAAAAAAAAAH9/fwAKAAAAHwAAAFQAAAAAAAAFAAAAAQAAAAAAAAAAAAAAAAAAAAAAAAAAAAAAAAAAAAAAAAAAAAAAAn9/fwAAAAADzMzMAMDA/wB/f38AAAAAAAAAAAAAAAAAAAAAAAAAAAAhAAAAGAAAABQAAAAaAwAAfRMAAFUeAAAUKgAAEAAAACYAAAAIAAAAPaAAAAAAAAA="/>
               </a:ext>
             </a:extLst>
           </p:cNvSpPr>
@@ -4365,7 +4390,7 @@
             <a:spLocks noGrp="1" noChangeArrowheads="1"/>
             <a:extLst>
               <a:ext uri="smNativeData">
-                <pr:smNativeData xmlns:pr="smNativeData" val="SMDATA_13_47fkXxMAAAAlAAAAZAAAAA0AAAAAAAAAAAAAAAAAAAAAAAAAAAAAAAAAAAAAAAAAAAEAAABQAAAAAAAAAAAA4D8AAAAAAADgPwAAAAAAAOA/AAAAAAAA4D8AAAAAAADgPwAAAAAAAOA/AAAAAAAA4D8AAAAAAADgPwAAAAAAAOA/AAAAAAAA4D8CAAAAjAAAAAAAAAAAAAAAT4G9DP///wgAAAAAAAAAAAAAAAAAAAAAAAAAAAAAAAAAAAAAZAAAAAEAAABAAAAAAAAAAAAAAAAAAAAAAAAAAAAAAAAAAAAAAAAAAAAAAAAAAAAAAAAAAAAAAAAAAAAAAAAAAAAAAAAAAAAAAAAAAAAAAAAAAAAAAAAAAAAAAAAAAAAAFAAAADwAAAAAAAAAAAAAAAAAAAkUAAAAAQAAABQAAAAUAAAAFAAAAAEAAAAAAAAAZAAAAGQAAAAAAAAAZAAAAGQAAAAVAAAAYAAAAAAAAAAAAAAADwAAACADAAAAAAAAAAAAAAEAAACgMgAAVgcAAKr4//8BAAAAf39/AAEAAABkAAAAAAAAABQAAABAHwAAAAAAACYAAAAAAAAAwOD//wAAAAAmAAAAZAAAABYAAABMAAAAAAAAAAAAAAAEAAAAAAAAAAEAAADu7OEKAAAAACgAAAAoAAAAZAAAAGQAAAAAAAAAzMzMAAAAAABQAAAAUAAAAGQAAABkAAAAAAAAABcAAAAUAAAAAAAAAAAAAAD/fwAA/38AAAAAAAAJAAAABAAAAAAAAAAMAAAAEAAAAAAAAAAAAAAAAAAAAAAAAAAeAAAAaAAAAAAAAAAAAAAAAAAAAAAAAAAAAAAAECcAABAnAAAAAAAAAAAAAAAAAAAAAAAAAAAAAAAAAAAAAAAAAAAAABQAAAAAAAAAwMD/AAAAAABkAAAAMgAAAAAAAABkAAAAAAAAAH9/fwAKAAAAHwAAAFQAAAAAAAAFAAAAAQAAAAAAAAAAAAAAAAAAAAAAAAAAAAAAAAAAAAAAAAAAAAAAAn9/fwAAAAADzMzMAMDA/wB/f38AAAAAAAAAAAAAAAAAAAAAAAAAAAAhAAAAGAAAABQAAACyHwAAfRMAAO46AABDHgAAEAAAACYAAAAIAAAAPaAAAAAAAAA="/>
+                <pr:smNativeData xmlns="" xmlns:p14="http://schemas.microsoft.com/office/powerpoint/2010/main" xmlns:pr="smNativeData" val="SMDATA_13_47fkXxMAAAAlAAAAZAAAAA0AAAAAAAAAAAAAAAAAAAAAAAAAAAAAAAAAAAAAAAAAAAEAAABQAAAAAAAAAAAA4D8AAAAAAADgPwAAAAAAAOA/AAAAAAAA4D8AAAAAAADgPwAAAAAAAOA/AAAAAAAA4D8AAAAAAADgPwAAAAAAAOA/AAAAAAAA4D8CAAAAjAAAAAAAAAAAAAAAT4G9DP///wgAAAAAAAAAAAAAAAAAAAAAAAAAAAAAAAAAAAAAZAAAAAEAAABAAAAAAAAAAAAAAAAAAAAAAAAAAAAAAAAAAAAAAAAAAAAAAAAAAAAAAAAAAAAAAAAAAAAAAAAAAAAAAAAAAAAAAAAAAAAAAAAAAAAAAAAAAAAAAAAAAAAAFAAAADwAAAAAAAAAAAAAAAAAAAkUAAAAAQAAABQAAAAUAAAAFAAAAAEAAAAAAAAAZAAAAGQAAAAAAAAAZAAAAGQAAAAVAAAAYAAAAAAAAAAAAAAADwAAACADAAAAAAAAAAAAAAEAAACgMgAAVgcAAKr4//8BAAAAf39/AAEAAABkAAAAAAAAABQAAABAHwAAAAAAACYAAAAAAAAAwOD//wAAAAAmAAAAZAAAABYAAABMAAAAAAAAAAAAAAAEAAAAAAAAAAEAAADu7OEKAAAAACgAAAAoAAAAZAAAAGQAAAAAAAAAzMzMAAAAAABQAAAAUAAAAGQAAABkAAAAAAAAABcAAAAUAAAAAAAAAAAAAAD/fwAA/38AAAAAAAAJAAAABAAAAAAAAAAMAAAAEAAAAAAAAAAAAAAAAAAAAAAAAAAeAAAAaAAAAAAAAAAAAAAAAAAAAAAAAAAAAAAAECcAABAnAAAAAAAAAAAAAAAAAAAAAAAAAAAAAAAAAAAAAAAAAAAAABQAAAAAAAAAwMD/AAAAAABkAAAAMgAAAAAAAABkAAAAAAAAAH9/fwAKAAAAHwAAAFQAAAAAAAAFAAAAAQAAAAAAAAAAAAAAAAAAAAAAAAAAAAAAAAAAAAAAAAAAAAAAAn9/fwAAAAADzMzMAMDA/wB/f38AAAAAAAAAAAAAAAAAAAAAAAAAAAAhAAAAGAAAABQAAACyHwAAfRMAAO46AABDHgAAEAAAACYAAAAIAAAAPaAAAAAAAAA="/>
               </a:ext>
             </a:extLst>
           </p:cNvSpPr>
@@ -4423,7 +4448,7 @@
             <a:spLocks noGrp="1" noChangeArrowheads="1"/>
             <a:extLst>
               <a:ext uri="smNativeData">
-                <pr:smNativeData xmlns:pr="smNativeData" val="SMDATA_13_47fkXxMAAAAlAAAAZAAAAA0AAAAAAAAAAAAAAAAAAAAAAAAAAAAAAAAAAAAAAAAAAAEAAABQAAAAAAAAAAAA4D8AAAAAAADgPwAAAAAAAOA/AAAAAAAA4D8AAAAAAADgPwAAAAAAAOA/AAAAAAAA4D8AAAAAAADgPwAAAAAAAOA/AAAAAAAA4D8CAAAAjAAAAAAAAAAAAAAAT4G9DP///wgAAAAAAAAAAAAAAAAAAAAAAAAAAAAAAAAAAAAAZAAAAAEAAABAAAAAAAAAAAAAAAAAAAAAAAAAAAAAAAAAAAAAAAAAAAAAAAAAAAAAAAAAAAAAAAAAAAAAAAAAAAAAAAAAAAAAAAAAAAAAAAAAAAAAAAAAAAAAAAAAAAAAFAAAADwAAAAAAAAAAAAAAAAAAAkUAAAAAQAAABQAAAAUAAAAFAAAAAEAAAAAAAAAZAAAAGQAAAAAAAAAZAAAAGQAAAAVAAAAYAAAAAAAAAAAAAAADwAAACADAAAAAAAAAAAAAAEAAACgMgAAVgcAAKr4//8BAAAAf39/AAEAAABkAAAAAAAAABQAAABAHwAAAAAAACYAAAAAAAAAwOD//wAAAAAmAAAAZAAAABYAAABMAAAAAAAAAAAAAAAEAAAAAAAAAAEAAADu7OEKAAAAACgAAAAoAAAAZAAAAGQAAAAAAAAAzMzMAAAAAABQAAAAUAAAAGQAAABkAAAAAAAAABcAAAAUAAAAAAAAAAAAAAD/fwAA/38AAAAAAAAJAAAABAAAAAAAAAAMAAAAEAAAAAAAAAAAAAAAAAAAAAAAAAAeAAAAaAAAAAAAAAAAAAAAAAAAAAAAAAAAAAAAECcAABAnAAAAAAAAAAAAAAAAAAAAAAAAAAAAAAAAAAAAAAAAAAAAABQAAAAAAAAAwMD/AAAAAABkAAAAMgAAAAAAAABkAAAAAAAAAH9/fwAKAAAAHwAAAFQAAAAAAAAFAAAAAQAAAAAAAAAAAAAAAAAAAAAAAAAAAAAAAAAAAAAAAAAAAAAAAn9/fwAAAAADzMzMAMDA/wB/f38AAAAAAAAAAAAAAAAAAAAAAAAAAAAhAAAAGAAAABQAAACyHwAASh8AAO46AAAQKgAAEAAAACYAAAAIAAAAPaAAAAAAAAA="/>
+                <pr:smNativeData xmlns="" xmlns:p14="http://schemas.microsoft.com/office/powerpoint/2010/main" xmlns:pr="smNativeData" val="SMDATA_13_47fkXxMAAAAlAAAAZAAAAA0AAAAAAAAAAAAAAAAAAAAAAAAAAAAAAAAAAAAAAAAAAAEAAABQAAAAAAAAAAAA4D8AAAAAAADgPwAAAAAAAOA/AAAAAAAA4D8AAAAAAADgPwAAAAAAAOA/AAAAAAAA4D8AAAAAAADgPwAAAAAAAOA/AAAAAAAA4D8CAAAAjAAAAAAAAAAAAAAAT4G9DP///wgAAAAAAAAAAAAAAAAAAAAAAAAAAAAAAAAAAAAAZAAAAAEAAABAAAAAAAAAAAAAAAAAAAAAAAAAAAAAAAAAAAAAAAAAAAAAAAAAAAAAAAAAAAAAAAAAAAAAAAAAAAAAAAAAAAAAAAAAAAAAAAAAAAAAAAAAAAAAAAAAAAAAFAAAADwAAAAAAAAAAAAAAAAAAAkUAAAAAQAAABQAAAAUAAAAFAAAAAEAAAAAAAAAZAAAAGQAAAAAAAAAZAAAAGQAAAAVAAAAYAAAAAAAAAAAAAAADwAAACADAAAAAAAAAAAAAAEAAACgMgAAVgcAAKr4//8BAAAAf39/AAEAAABkAAAAAAAAABQAAABAHwAAAAAAACYAAAAAAAAAwOD//wAAAAAmAAAAZAAAABYAAABMAAAAAAAAAAAAAAAEAAAAAAAAAAEAAADu7OEKAAAAACgAAAAoAAAAZAAAAGQAAAAAAAAAzMzMAAAAAABQAAAAUAAAAGQAAABkAAAAAAAAABcAAAAUAAAAAAAAAAAAAAD/fwAA/38AAAAAAAAJAAAABAAAAAAAAAAMAAAAEAAAAAAAAAAAAAAAAAAAAAAAAAAeAAAAaAAAAAAAAAAAAAAAAAAAAAAAAAAAAAAAECcAABAnAAAAAAAAAAAAAAAAAAAAAAAAAAAAAAAAAAAAAAAAAAAAABQAAAAAAAAAwMD/AAAAAABkAAAAMgAAAAAAAABkAAAAAAAAAH9/fwAKAAAAHwAAAFQAAAAAAAAFAAAAAQAAAAAAAAAAAAAAAAAAAAAAAAAAAAAAAAAAAAAAAAAAAAAAAn9/fwAAAAADzMzMAMDA/wB/f38AAAAAAAAAAAAAAAAAAAAAAAAAAAAhAAAAGAAAABQAAACyHwAASh8AAO46AAAQKgAAEAAAACYAAAAIAAAAPaAAAAAAAAA="/>
               </a:ext>
             </a:extLst>
           </p:cNvSpPr>
@@ -4483,7 +4508,7 @@
 </file>
 
 <file path=ppt/slideLayouts/slideLayout9.xml><?xml version="1.0" encoding="utf-8"?>
-<p:sldLayout xmlns:p="http://schemas.openxmlformats.org/presentationml/2006/main" xmlns:p14="http://schemas.microsoft.com/office/powerpoint/2010/main" xmlns:r="http://schemas.openxmlformats.org/officeDocument/2006/relationships" xmlns:a="http://schemas.openxmlformats.org/drawingml/2006/main" type="twoObjOverTx" preserve="1">
+<p:sldLayout xmlns:a="http://schemas.openxmlformats.org/drawingml/2006/main" xmlns:r="http://schemas.openxmlformats.org/officeDocument/2006/relationships" xmlns:p="http://schemas.openxmlformats.org/presentationml/2006/main" type="twoObjOverTx" preserve="1">
   <p:cSld name="Title, 2 Content over Content">
     <p:spTree>
       <p:nvGrpSpPr>
@@ -4506,7 +4531,7 @@
             <a:spLocks noGrp="1" noChangeArrowheads="1"/>
             <a:extLst>
               <a:ext uri="smNativeData">
-                <pr:smNativeData xmlns:pr="smNativeData" val="SMDATA_13_47fkXxMAAAAlAAAAZAAAAA0AAAAAAAAAAAAAAAAAAAAAAAAAAAAAAAABAAAAAAAAAAEAAABQAAAAAAAAAAAA4D8AAAAAAADgPwAAAAAAAOA/AAAAAAAA4D8AAAAAAADgPwAAAAAAAOA/AAAAAAAA4D8AAAAAAADgPwAAAAAAAOA/AAAAAAAA4D8CAAAAjAAAAAAAAAAAAAAAT4G9DP///wgAAAAAAAAAAAAAAAAAAAAAAAAAAAAAAAAAAAAAZAAAAAEAAABAAAAAAAAAAAAAAAAAAAAAAAAAAAAAAAAAAAAAAAAAAAAAAAAAAAAAAAAAAAAAAAAAAAAAAAAAAAAAAAAAAAAAAAAAAAAAAAAAAAAAAAAAAAAAAAAAAAAAFAAAADwAAAAAAAAAAAAAAAAAAAkUAAAAAQAAABQAAAAUAAAAFAAAAAEAAAAAAAAAZAAAAGQAAAAAAAAAZAAAAGQAAAAVAAAAYAAAAAAAAAAAAAAADwAAACADAAAAAAAAAAAAAAEAAACgMgAAVgcAAKr4//8BAAAAf39/AAEAAABkAAAAAAAAABQAAABAHwAAAAAAACYAAAAAAAAAwOD//wAAAAAmAAAAZAAAABYAAABMAAAAAAAAAAAAAAAEAAAAAAAAAAEAAADu7OEKAAAAACgAAAAoAAAAZAAAAGQAAAAAAAAAzMzMAAAAAABQAAAAUAAAAGQAAABkAAAAAAAAABcAAAAUAAAAAAAAAAAAAAD/fwAA/38AAAAAAAAJAAAABAAAAAAAAAAMAAAAEAAAAAAAAAAAAAAAAAAAAAAAAAAeAAAAaAAAAAAAAAAAAAAAAAAAAAAAAAAAAAAAECcAABAnAAAAAAAAAAAAAAAAAAAAAAAAAAAAAAAAAAAAAAAAAAAAABQAAAAAAAAAwMD/AAAAAABkAAAAMgAAAAAAAABkAAAAAAAAAH9/fwAKAAAAHwAAAFQAAAAAAAAFAAAAAQAAAAAAAAAAAAAAAAAAAAAAAAAAAAAAAAAAAAAAAAAAAAAAAn9/fwAAAAADzMzMAMDA/wB/f38AAAAAAAAAAAAAAAAAAAAAAAAAAAAhAAAAGAAAABQAAAAaAwAApQYAAOg6AABGEQAAEAAAACYAAAAIAAAAPKAAAAAAAAA="/>
+                <pr:smNativeData xmlns="" xmlns:p14="http://schemas.microsoft.com/office/powerpoint/2010/main" xmlns:pr="smNativeData" val="SMDATA_13_47fkXxMAAAAlAAAAZAAAAA0AAAAAAAAAAAAAAAAAAAAAAAAAAAAAAAABAAAAAAAAAAEAAABQAAAAAAAAAAAA4D8AAAAAAADgPwAAAAAAAOA/AAAAAAAA4D8AAAAAAADgPwAAAAAAAOA/AAAAAAAA4D8AAAAAAADgPwAAAAAAAOA/AAAAAAAA4D8CAAAAjAAAAAAAAAAAAAAAT4G9DP///wgAAAAAAAAAAAAAAAAAAAAAAAAAAAAAAAAAAAAAZAAAAAEAAABAAAAAAAAAAAAAAAAAAAAAAAAAAAAAAAAAAAAAAAAAAAAAAAAAAAAAAAAAAAAAAAAAAAAAAAAAAAAAAAAAAAAAAAAAAAAAAAAAAAAAAAAAAAAAAAAAAAAAFAAAADwAAAAAAAAAAAAAAAAAAAkUAAAAAQAAABQAAAAUAAAAFAAAAAEAAAAAAAAAZAAAAGQAAAAAAAAAZAAAAGQAAAAVAAAAYAAAAAAAAAAAAAAADwAAACADAAAAAAAAAAAAAAEAAACgMgAAVgcAAKr4//8BAAAAf39/AAEAAABkAAAAAAAAABQAAABAHwAAAAAAACYAAAAAAAAAwOD//wAAAAAmAAAAZAAAABYAAABMAAAAAAAAAAAAAAAEAAAAAAAAAAEAAADu7OEKAAAAACgAAAAoAAAAZAAAAGQAAAAAAAAAzMzMAAAAAABQAAAAUAAAAGQAAABkAAAAAAAAABcAAAAUAAAAAAAAAAAAAAD/fwAA/38AAAAAAAAJAAAABAAAAAAAAAAMAAAAEAAAAAAAAAAAAAAAAAAAAAAAAAAeAAAAaAAAAAAAAAAAAAAAAAAAAAAAAAAAAAAAECcAABAnAAAAAAAAAAAAAAAAAAAAAAAAAAAAAAAAAAAAAAAAAAAAABQAAAAAAAAAwMD/AAAAAABkAAAAMgAAAAAAAABkAAAAAAAAAH9/fwAKAAAAHwAAAFQAAAAAAAAFAAAAAQAAAAAAAAAAAAAAAAAAAAAAAAAAAAAAAAAAAAAAAAAAAAAAAn9/fwAAAAADzMzMAMDA/wB/f38AAAAAAAAAAAAAAAAAAAAAAAAAAAAhAAAAGAAAABQAAAAaAwAApQYAAOg6AABGEQAAEAAAACYAAAAIAAAAPKAAAAAAAAA="/>
               </a:ext>
             </a:extLst>
           </p:cNvSpPr>
@@ -4541,7 +4566,7 @@
             <a:spLocks noGrp="1" noChangeArrowheads="1"/>
             <a:extLst>
               <a:ext uri="smNativeData">
-                <pr:smNativeData xmlns:pr="smNativeData" val="SMDATA_13_47fkXxMAAAAlAAAAZAAAAA0AAAAAAAAAAAAAAAAAAAAAAAAAAAAAAAAAAAAAAAAAAAEAAABQAAAAAAAAAAAA4D8AAAAAAADgPwAAAAAAAOA/AAAAAAAA4D8AAAAAAADgPwAAAAAAAOA/AAAAAAAA4D8AAAAAAADgPwAAAAAAAOA/AAAAAAAA4D8CAAAAjAAAAAAAAAAAAAAAT4G9DP///wgAAAAAAAAAAAAAAAAAAAAAAAAAAAAAAAAAAAAAZAAAAAEAAABAAAAAAAAAAAAAAAAAAAAAAAAAAAAAAAAAAAAAAAAAAAAAAAAAAAAAAAAAAAAAAAAAAAAAAAAAAAAAAAAAAAAAAAAAAAAAAAAAAAAAAAAAAAAAAAAAAAAAFAAAADwAAAAAAAAAAAAAAAAAAAkUAAAAAQAAABQAAAAUAAAAFAAAAAEAAAAAAAAAZAAAAGQAAAAAAAAAZAAAAGQAAAAVAAAAYAAAAAAAAAAAAAAADwAAACADAAAAAAAAAAAAAAEAAACgMgAAVgcAAKr4//8BAAAAf39/AAEAAABkAAAAAAAAABQAAABAHwAAAAAAACYAAAAAAAAAwOD//wAAAAAmAAAAZAAAABYAAABMAAAAAAAAAAAAAAAEAAAAAAAAAAEAAADu7OEKAAAAACgAAAAoAAAAZAAAAGQAAAAAAAAAzMzMAAAAAABQAAAAUAAAAGQAAABkAAAAAAAAABcAAAAUAAAAAAAAAAAAAAD/fwAA/38AAAAAAAAJAAAABAAAAAAAAAAMAAAAEAAAAAAAAAAAAAAAAAAAAAAAAAAeAAAAaAAAAAAAAAAAAAAAAAAAAAAAAAAAAAAAECcAABAnAAAAAAAAAAAAAAAAAAAAAAAAAAAAAAAAAAAAAAAAAAAAABQAAAAAAAAAwMD/AAAAAABkAAAAMgAAAAAAAABkAAAAAAAAAH9/fwAKAAAAHwAAAFQAAAAAAAAFAAAAAQAAAAAAAAAAAAAAAAAAAAAAAAAAAAAAAAAAAAAAAAAAAAAAAn9/fwAAAAADzMzMAMDA/wB/f38AAAAAAAAAAAAAAAAAAAAAAAAAAAAhAAAAGAAAABQAAAAaAwAAfRMAAFUeAABDHgAAEAAAACYAAAAIAAAAPaAAAAAAAAA="/>
+                <pr:smNativeData xmlns="" xmlns:p14="http://schemas.microsoft.com/office/powerpoint/2010/main" xmlns:pr="smNativeData" val="SMDATA_13_47fkXxMAAAAlAAAAZAAAAA0AAAAAAAAAAAAAAAAAAAAAAAAAAAAAAAAAAAAAAAAAAAEAAABQAAAAAAAAAAAA4D8AAAAAAADgPwAAAAAAAOA/AAAAAAAA4D8AAAAAAADgPwAAAAAAAOA/AAAAAAAA4D8AAAAAAADgPwAAAAAAAOA/AAAAAAAA4D8CAAAAjAAAAAAAAAAAAAAAT4G9DP///wgAAAAAAAAAAAAAAAAAAAAAAAAAAAAAAAAAAAAAZAAAAAEAAABAAAAAAAAAAAAAAAAAAAAAAAAAAAAAAAAAAAAAAAAAAAAAAAAAAAAAAAAAAAAAAAAAAAAAAAAAAAAAAAAAAAAAAAAAAAAAAAAAAAAAAAAAAAAAAAAAAAAAFAAAADwAAAAAAAAAAAAAAAAAAAkUAAAAAQAAABQAAAAUAAAAFAAAAAEAAAAAAAAAZAAAAGQAAAAAAAAAZAAAAGQAAAAVAAAAYAAAAAAAAAAAAAAADwAAACADAAAAAAAAAAAAAAEAAACgMgAAVgcAAKr4//8BAAAAf39/AAEAAABkAAAAAAAAABQAAABAHwAAAAAAACYAAAAAAAAAwOD//wAAAAAmAAAAZAAAABYAAABMAAAAAAAAAAAAAAAEAAAAAAAAAAEAAADu7OEKAAAAACgAAAAoAAAAZAAAAGQAAAAAAAAAzMzMAAAAAABQAAAAUAAAAGQAAABkAAAAAAAAABcAAAAUAAAAAAAAAAAAAAD/fwAA/38AAAAAAAAJAAAABAAAAAAAAAAMAAAAEAAAAAAAAAAAAAAAAAAAAAAAAAAeAAAAaAAAAAAAAAAAAAAAAAAAAAAAAAAAAAAAECcAABAnAAAAAAAAAAAAAAAAAAAAAAAAAAAAAAAAAAAAAAAAAAAAABQAAAAAAAAAwMD/AAAAAABkAAAAMgAAAAAAAABkAAAAAAAAAH9/fwAKAAAAHwAAAFQAAAAAAAAFAAAAAQAAAAAAAAAAAAAAAAAAAAAAAAAAAAAAAAAAAAAAAAAAAAAAAn9/fwAAAAADzMzMAMDA/wB/f38AAAAAAAAAAAAAAAAAAAAAAAAAAAAhAAAAGAAAABQAAAAaAwAAfRMAAFUeAABDHgAAEAAAACYAAAAIAAAAPaAAAAAAAAA="/>
               </a:ext>
             </a:extLst>
           </p:cNvSpPr>
@@ -4599,7 +4624,7 @@
             <a:spLocks noGrp="1" noChangeArrowheads="1"/>
             <a:extLst>
               <a:ext uri="smNativeData">
-                <pr:smNativeData xmlns:pr="smNativeData" val="SMDATA_13_47fkXxMAAAAlAAAAZAAAAA0AAAAAAAAAAAAAAAAAAAAAAAAAAAAAAAAAAAAAAAAAAAEAAABQAAAAAAAAAAAA4D8AAAAAAADgPwAAAAAAAOA/AAAAAAAA4D8AAAAAAADgPwAAAAAAAOA/AAAAAAAA4D8AAAAAAADgPwAAAAAAAOA/AAAAAAAA4D8CAAAAjAAAAAAAAAAAAAAAT4G9DP///wgAAAAAAAAAAAAAAAAAAAAAAAAAAAAAAAAAAAAAZAAAAAEAAABAAAAAAAAAAAAAAAAAAAAAAAAAAAAAAAAAAAAAAAAAAAAAAAAAAAAAAAAAAAAAAAAAAAAAAAAAAAAAAAAAAAAAAAAAAAAAAAAAAAAAAAAAAAAAAAAAAAAAFAAAADwAAAAAAAAAAAAAAAAAAAkUAAAAAQAAABQAAAAUAAAAFAAAAAEAAAAAAAAAZAAAAGQAAAAAAAAAZAAAAGQAAAAVAAAAYAAAAAAAAAAAAAAADwAAACADAAAAAAAAAAAAAAEAAACgMgAAVgcAAKr4//8BAAAAf39/AAEAAABkAAAAAAAAABQAAABAHwAAAAAAACYAAAAAAAAAwOD//wAAAAAmAAAAZAAAABYAAABMAAAAAAAAAAAAAAAEAAAAAAAAAAEAAADu7OEKAAAAACgAAAAoAAAAZAAAAGQAAAAAAAAAzMzMAAAAAABQAAAAUAAAAGQAAABkAAAAAAAAABcAAAAUAAAAAAAAAAAAAAD/fwAA/38AAAAAAAAJAAAABAAAAAAAAAAMAAAAEAAAAAAAAAAAAAAAAAAAAAAAAAAeAAAAaAAAAAAAAAAAAAAAAAAAAAAAAAAAAAAAECcAABAnAAAAAAAAAAAAAAAAAAAAAAAAAAAAAAAAAAAAAAAAAAAAABQAAAAAAAAAwMD/AAAAAABkAAAAMgAAAAAAAABkAAAAAAAAAH9/fwAKAAAAHwAAAFQAAAAAAAAFAAAAAQAAAAAAAAAAAAAAAAAAAAAAAAAAAAAAAAAAAAAAAAAAAAAAAn9/fwAAAAADzMzMAMDA/wB/f38AAAAAAAAAAAAAAAAAAAAAAAAAAAAhAAAAGAAAABQAAACyHwAAfRMAAO46AABDHgAAEAAAACYAAAAIAAAAPaAAAAAAAAA="/>
+                <pr:smNativeData xmlns="" xmlns:p14="http://schemas.microsoft.com/office/powerpoint/2010/main" xmlns:pr="smNativeData" val="SMDATA_13_47fkXxMAAAAlAAAAZAAAAA0AAAAAAAAAAAAAAAAAAAAAAAAAAAAAAAAAAAAAAAAAAAEAAABQAAAAAAAAAAAA4D8AAAAAAADgPwAAAAAAAOA/AAAAAAAA4D8AAAAAAADgPwAAAAAAAOA/AAAAAAAA4D8AAAAAAADgPwAAAAAAAOA/AAAAAAAA4D8CAAAAjAAAAAAAAAAAAAAAT4G9DP///wgAAAAAAAAAAAAAAAAAAAAAAAAAAAAAAAAAAAAAZAAAAAEAAABAAAAAAAAAAAAAAAAAAAAAAAAAAAAAAAAAAAAAAAAAAAAAAAAAAAAAAAAAAAAAAAAAAAAAAAAAAAAAAAAAAAAAAAAAAAAAAAAAAAAAAAAAAAAAAAAAAAAAFAAAADwAAAAAAAAAAAAAAAAAAAkUAAAAAQAAABQAAAAUAAAAFAAAAAEAAAAAAAAAZAAAAGQAAAAAAAAAZAAAAGQAAAAVAAAAYAAAAAAAAAAAAAAADwAAACADAAAAAAAAAAAAAAEAAACgMgAAVgcAAKr4//8BAAAAf39/AAEAAABkAAAAAAAAABQAAABAHwAAAAAAACYAAAAAAAAAwOD//wAAAAAmAAAAZAAAABYAAABMAAAAAAAAAAAAAAAEAAAAAAAAAAEAAADu7OEKAAAAACgAAAAoAAAAZAAAAGQAAAAAAAAAzMzMAAAAAABQAAAAUAAAAGQAAABkAAAAAAAAABcAAAAUAAAAAAAAAAAAAAD/fwAA/38AAAAAAAAJAAAABAAAAAAAAAAMAAAAEAAAAAAAAAAAAAAAAAAAAAAAAAAeAAAAaAAAAAAAAAAAAAAAAAAAAAAAAAAAAAAAECcAABAnAAAAAAAAAAAAAAAAAAAAAAAAAAAAAAAAAAAAAAAAAAAAABQAAAAAAAAAwMD/AAAAAABkAAAAMgAAAAAAAABkAAAAAAAAAH9/fwAKAAAAHwAAAFQAAAAAAAAFAAAAAQAAAAAAAAAAAAAAAAAAAAAAAAAAAAAAAAAAAAAAAAAAAAAAAn9/fwAAAAADzMzMAMDA/wB/f38AAAAAAAAAAAAAAAAAAAAAAAAAAAAhAAAAGAAAABQAAACyHwAAfRMAAO46AABDHgAAEAAAACYAAAAIAAAAPaAAAAAAAAA="/>
               </a:ext>
             </a:extLst>
           </p:cNvSpPr>
@@ -4657,7 +4682,7 @@
             <a:spLocks noGrp="1" noChangeArrowheads="1"/>
             <a:extLst>
               <a:ext uri="smNativeData">
-                <pr:smNativeData xmlns:pr="smNativeData" val="SMDATA_13_47fkXxMAAAAlAAAAZAAAAA0AAAAAAAAAAAAAAAAAAAAAAAAAAAAAAAAAAAAAAAAAAAEAAABQAAAAAAAAAAAA4D8AAAAAAADgPwAAAAAAAOA/AAAAAAAA4D8AAAAAAADgPwAAAAAAAOA/AAAAAAAA4D8AAAAAAADgPwAAAAAAAOA/AAAAAAAA4D8CAAAAjAAAAAAAAAAAAAAAT4G9DP///wgAAAAAAAAAAAAAAAAAAAAAAAAAAAAAAAAAAAAAZAAAAAEAAABAAAAAAAAAAAAAAAAAAAAAAAAAAAAAAAAAAAAAAAAAAAAAAAAAAAAAAAAAAAAAAAAAAAAAAAAAAAAAAAAAAAAAAAAAAAAAAAAAAAAAAAAAAAAAAAAAAAAAFAAAADwAAAAAAAAAAAAAAAAAAAkUAAAAAQAAABQAAAAUAAAAFAAAAAEAAAAAAAAAZAAAAGQAAAAAAAAAZAAAAGQAAAAVAAAAYAAAAAAAAAAAAAAADwAAACADAAAAAAAAAAAAAAEAAACgMgAAVgcAAKr4//8BAAAAf39/AAEAAABkAAAAAAAAABQAAABAHwAAAAAAACYAAAAAAAAAwOD//wAAAAAmAAAAZAAAABYAAABMAAAAAAAAAAAAAAAEAAAAAAAAAAEAAADu7OEKAAAAACgAAAAoAAAAZAAAAGQAAAAAAAAAzMzMAAAAAABQAAAAUAAAAGQAAABkAAAAAAAAABcAAAAUAAAAAAAAAAAAAAD/fwAA/38AAAAAAAAJAAAABAAAAAAAAAAMAAAAEAAAAAAAAAAAAAAAAAAAAAAAAAAeAAAAaAAAAAAAAAAAAAAAAAAAAAAAAAAAAAAAECcAABAnAAAAAAAAAAAAAAAAAAAAAAAAAAAAAAAAAAAAAAAAAAAAABQAAAAAAAAAwMD/AAAAAABkAAAAMgAAAAAAAABkAAAAAAAAAH9/fwAKAAAAHwAAAFQAAAAAAAAFAAAAAQAAAAAAAAAAAAAAAAAAAAAAAAAAAAAAAAAAAAAAAAAAAAAAAn9/fwAAAAADzMzMAMDA/wB/f38AAAAAAAAAAAAAAAAAAAAAAAAAAAAhAAAAGAAAABQAAAAaAwAASh8AAOg6AAAQKgAAEAAAACYAAAAIAAAAPaAAAAAAAAA="/>
+                <pr:smNativeData xmlns="" xmlns:p14="http://schemas.microsoft.com/office/powerpoint/2010/main" xmlns:pr="smNativeData" val="SMDATA_13_47fkXxMAAAAlAAAAZAAAAA0AAAAAAAAAAAAAAAAAAAAAAAAAAAAAAAAAAAAAAAAAAAEAAABQAAAAAAAAAAAA4D8AAAAAAADgPwAAAAAAAOA/AAAAAAAA4D8AAAAAAADgPwAAAAAAAOA/AAAAAAAA4D8AAAAAAADgPwAAAAAAAOA/AAAAAAAA4D8CAAAAjAAAAAAAAAAAAAAAT4G9DP///wgAAAAAAAAAAAAAAAAAAAAAAAAAAAAAAAAAAAAAZAAAAAEAAABAAAAAAAAAAAAAAAAAAAAAAAAAAAAAAAAAAAAAAAAAAAAAAAAAAAAAAAAAAAAAAAAAAAAAAAAAAAAAAAAAAAAAAAAAAAAAAAAAAAAAAAAAAAAAAAAAAAAAFAAAADwAAAAAAAAAAAAAAAAAAAkUAAAAAQAAABQAAAAUAAAAFAAAAAEAAAAAAAAAZAAAAGQAAAAAAAAAZAAAAGQAAAAVAAAAYAAAAAAAAAAAAAAADwAAACADAAAAAAAAAAAAAAEAAACgMgAAVgcAAKr4//8BAAAAf39/AAEAAABkAAAAAAAAABQAAABAHwAAAAAAACYAAAAAAAAAwOD//wAAAAAmAAAAZAAAABYAAABMAAAAAAAAAAAAAAAEAAAAAAAAAAEAAADu7OEKAAAAACgAAAAoAAAAZAAAAGQAAAAAAAAAzMzMAAAAAABQAAAAUAAAAGQAAABkAAAAAAAAABcAAAAUAAAAAAAAAAAAAAD/fwAA/38AAAAAAAAJAAAABAAAAAAAAAAMAAAAEAAAAAAAAAAAAAAAAAAAAAAAAAAeAAAAaAAAAAAAAAAAAAAAAAAAAAAAAAAAAAAAECcAABAnAAAAAAAAAAAAAAAAAAAAAAAAAAAAAAAAAAAAAAAAAAAAABQAAAAAAAAAwMD/AAAAAABkAAAAMgAAAAAAAABkAAAAAAAAAH9/fwAKAAAAHwAAAFQAAAAAAAAFAAAAAQAAAAAAAAAAAAAAAAAAAAAAAAAAAAAAAAAAAAAAAAAAAAAAAn9/fwAAAAADzMzMAMDA/wB/f38AAAAAAAAAAAAAAAAAAAAAAAAAAAAhAAAAGAAAABQAAAAaAwAASh8AAOg6AAAQKgAAEAAAACYAAAAIAAAAPaAAAAAAAAA="/>
               </a:ext>
             </a:extLst>
           </p:cNvSpPr>
@@ -4717,12 +4742,12 @@
 </file>
 
 <file path=ppt/slideMasters/slideMaster1.xml><?xml version="1.0" encoding="utf-8"?>
-<p:sldMaster xmlns:p="http://schemas.openxmlformats.org/presentationml/2006/main" xmlns:p14="http://schemas.microsoft.com/office/powerpoint/2010/main" xmlns:r="http://schemas.openxmlformats.org/officeDocument/2006/relationships" xmlns:a="http://schemas.openxmlformats.org/drawingml/2006/main">
+<p:sldMaster xmlns:a="http://schemas.openxmlformats.org/drawingml/2006/main" xmlns:r="http://schemas.openxmlformats.org/officeDocument/2006/relationships" xmlns:p="http://schemas.openxmlformats.org/presentationml/2006/main">
   <p:cSld>
     <p:bg>
       <p:bgPr>
         <a:blipFill>
-          <a:blip r:embed="rId1"/>
+          <a:blip r:embed="rId14"/>
           <a:srcRect/>
           <a:stretch/>
         </a:blipFill>
@@ -4750,7 +4775,7 @@
             <a:spLocks noGrp="1" noChangeArrowheads="1"/>
             <a:extLst>
               <a:ext uri="smNativeData">
-                <pr:smNativeData xmlns:pr="smNativeData" val="SMDATA_13_47fkXxMAAAAlAAAAZAAAAA0AAAAAAAAAAAAAAAAAAAAAAAAAAAAAAAABAAAAAAAAAAEAAABQAAAAAAAAAAAA4D8AAAAAAADgPwAAAAAAAOA/AAAAAAAA4D8AAAAAAADgPwAAAAAAAOA/AAAAAAAA4D8AAAAAAADgPwAAAAAAAOA/AAAAAAAA4D8CAAAAjAAAAAAAAAAAAAAA////AP///wgAAAAAAAAAAAAAAAAAAAAAAAAAAAAAAAAAAAAAeAAAAAEAAABAAAAAAAAAAAAAAABaAAAAAAAAAAAAAAAAAAAAAAAAAAAAAAAAAAAAAAAAAAAAAAAAAAAAAAAAAAAAAAAAAAAAAAAAAAAAAAAAAAAAAAAAAAAAAAAAAAAAFAAAADwAAAAAAAAAAAAAAAAAAAAPAAAAAQAAACMAAAAjAAAAIwAAAB4AAAAAAAAAZAAAAGQAAAAAAAAAZAAAAGQAAAAVAAAAYAAAAAAAAAAAAAAADwAAACADAAAAAAAAAAAAAAEAAACgMgAAVgcAAKr4//8BAAAAf39/AAEAAABkAAAAAAAAABQAAABAHwAAAAAAACYAAAAAAAAAwOD//wAAAAAmAAAAZAAAABYAAABMAAAAAAAAAAAAAAAEAAAAAAAAAAEAAADu7OEKAAAAACgAAAAoAAAAZAAAAGQAAAAAAAAAzMzMAAAAAABQAAAAUAAAAGQAAABkAAAAAAAAABcAAAAUAAAAAAAAAAAAAAD/fwAA/38AAAAAAAAJAAAABAAAAAAAAAAMAAAAEAAAAAAAAAAAAAAAAAAAAAAAAAAeAAAAaAAAAAAAAAAAAAAAAAAAAAAAAAAAAAAAECcAABAnAAAAAAAAAAAAAAAAAAAAAAAAAAAAAAAAAAAAAAAAAAAAABQAAAAAAAAAwMD/AAAAAABkAAAAMgAAAAAAAABkAAAAAAAAAH9/fwAKAAAAHwAAAFQAAAD///8AAAAAAQAAAAAAAAAAAAAAAAAAAAAAAAAAAAAAAAAAAAAAAAAAAAAAAH9/fwAAAAADzMzMAMDA/wB/f38AAAAAAAAAAAAAAAAAAAAAAAAAAAAhAAAAGAAAABQAAAAaAwAApQYAAOg6AABGEQAAEAAAACYAAAAIAAAAvS8AAAAAAAA="/>
+                <pr:smNativeData xmlns="" xmlns:p14="http://schemas.microsoft.com/office/powerpoint/2010/main" xmlns:pr="smNativeData" val="SMDATA_13_47fkXxMAAAAlAAAAZAAAAA0AAAAAAAAAAAAAAAAAAAAAAAAAAAAAAAABAAAAAAAAAAEAAABQAAAAAAAAAAAA4D8AAAAAAADgPwAAAAAAAOA/AAAAAAAA4D8AAAAAAADgPwAAAAAAAOA/AAAAAAAA4D8AAAAAAADgPwAAAAAAAOA/AAAAAAAA4D8CAAAAjAAAAAAAAAAAAAAA////AP///wgAAAAAAAAAAAAAAAAAAAAAAAAAAAAAAAAAAAAAeAAAAAEAAABAAAAAAAAAAAAAAABaAAAAAAAAAAAAAAAAAAAAAAAAAAAAAAAAAAAAAAAAAAAAAAAAAAAAAAAAAAAAAAAAAAAAAAAAAAAAAAAAAAAAAAAAAAAAAAAAAAAAFAAAADwAAAAAAAAAAAAAAAAAAAAPAAAAAQAAACMAAAAjAAAAIwAAAB4AAAAAAAAAZAAAAGQAAAAAAAAAZAAAAGQAAAAVAAAAYAAAAAAAAAAAAAAADwAAACADAAAAAAAAAAAAAAEAAACgMgAAVgcAAKr4//8BAAAAf39/AAEAAABkAAAAAAAAABQAAABAHwAAAAAAACYAAAAAAAAAwOD//wAAAAAmAAAAZAAAABYAAABMAAAAAAAAAAAAAAAEAAAAAAAAAAEAAADu7OEKAAAAACgAAAAoAAAAZAAAAGQAAAAAAAAAzMzMAAAAAABQAAAAUAAAAGQAAABkAAAAAAAAABcAAAAUAAAAAAAAAAAAAAD/fwAA/38AAAAAAAAJAAAABAAAAAAAAAAMAAAAEAAAAAAAAAAAAAAAAAAAAAAAAAAeAAAAaAAAAAAAAAAAAAAAAAAAAAAAAAAAAAAAECcAABAnAAAAAAAAAAAAAAAAAAAAAAAAAAAAAAAAAAAAAAAAAAAAABQAAAAAAAAAwMD/AAAAAABkAAAAMgAAAAAAAABkAAAAAAAAAH9/fwAKAAAAHwAAAFQAAAD///8AAAAAAQAAAAAAAAAAAAAAAAAAAAAAAAAAAAAAAAAAAAAAAAAAAAAAAH9/fwAAAAADzMzMAMDA/wB/f38AAAAAAAAAAAAAAAAAAAAAAAAAAAAhAAAAGAAAABQAAAAaAwAApQYAAOg6AABGEQAAEAAAACYAAAAIAAAAvS8AAAAAAAA="/>
               </a:ext>
             </a:extLst>
           </p:cNvSpPr>
@@ -4792,7 +4817,7 @@
             <a:spLocks noGrp="1" noChangeArrowheads="1"/>
             <a:extLst>
               <a:ext uri="smNativeData">
-                <pr:smNativeData xmlns:pr="smNativeData" val="SMDATA_13_47fkXxMAAAAlAAAAZAAAAA0AAAAAAAAAAAAAAAAAAAAAAAAAAAAAAAAAAAAAAAAAAAEAAABQAAAAAAAAAAAA4D8AAAAAAADgPwAAAAAAAOA/AAAAAAAA4D8AAAAAAADgPwAAAAAAAOA/AAAAAAAA4D8AAAAAAADgPwAAAAAAAOA/AAAAAAAA4D8CAAAAjAAAAAAAAAAAAAAA////AP///wgAAAAAAAAAAAAAAAAAAAAAAAAAAAAAAAAAAAAAeAAAAAEAAABAAAAAAAAAAAAAAABaAAAAAAAAAAAAAAAAAAAAAAAAAAAAAAAAAAAAAAAAAAAAAAAAAAAAAAAAAAAAAAAAAAAAAAAAAAAAAAAAAAAAAAAAAAAAAAAAAAAAFAAAADwAAAAAAAAAAAAAAAAAAAAPAAAAAQAAACMAAAAjAAAAIwAAAB4AAAAAAAAAZAAAAGQAAAAAAAAAZAAAAGQAAAAVAAAAYAAAAAAAAAAAAAAADwAAACADAAAAAAAAAAAAAAEAAACgMgAAVgcAAKr4//8BAAAAf39/AAEAAABkAAAAAAAAABQAAABAHwAAAAAAACYAAAAAAAAAwOD//wAAAAAmAAAAZAAAABYAAABMAAAAAAAAAAAAAAAEAAAAAAAAAAEAAADu7OEKAAAAACgAAAAoAAAAZAAAAGQAAAAAAAAAzMzMAAAAAABQAAAAUAAAAGQAAABkAAAAAAAAABcAAAAUAAAAAAAAAAAAAAD/fwAA/38AAAAAAAAJAAAABAAAAAAAAAAMAAAAEAAAAAAAAAAAAAAAAAAAAAAAAAAeAAAAaAAAAAAAAAAAAAAAAAAAAAAAAAAAAAAAECcAABAnAAAAAAAAAAAAAAAAAAAAAAAAAAAAAAAAAAAAAAAAAAAAABQAAAAAAAAAwMD/AAAAAABkAAAAMgAAAAAAAABkAAAAAAAAAH9/fwAKAAAAHwAAAFQAAAD///8AAAAAAQAAAAAAAAAAAAAAAAAAAAAAAAAAAAAAAAAAAAAAAAAAAAAAAH9/fwAAAAADzMzMAMDA/wB/f38AAAAAAAAAAAAAAAAAAAAAAAAAAAAhAAAAGAAAABQAAAAaAwAAfRMAAOg6AAAUKgAAEAAAACYAAAAIAAAAPS8AAAAAAAA="/>
+                <pr:smNativeData xmlns="" xmlns:p14="http://schemas.microsoft.com/office/powerpoint/2010/main" xmlns:pr="smNativeData" val="SMDATA_13_47fkXxMAAAAlAAAAZAAAAA0AAAAAAAAAAAAAAAAAAAAAAAAAAAAAAAAAAAAAAAAAAAEAAABQAAAAAAAAAAAA4D8AAAAAAADgPwAAAAAAAOA/AAAAAAAA4D8AAAAAAADgPwAAAAAAAOA/AAAAAAAA4D8AAAAAAADgPwAAAAAAAOA/AAAAAAAA4D8CAAAAjAAAAAAAAAAAAAAA////AP///wgAAAAAAAAAAAAAAAAAAAAAAAAAAAAAAAAAAAAAeAAAAAEAAABAAAAAAAAAAAAAAABaAAAAAAAAAAAAAAAAAAAAAAAAAAAAAAAAAAAAAAAAAAAAAAAAAAAAAAAAAAAAAAAAAAAAAAAAAAAAAAAAAAAAAAAAAAAAAAAAAAAAFAAAADwAAAAAAAAAAAAAAAAAAAAPAAAAAQAAACMAAAAjAAAAIwAAAB4AAAAAAAAAZAAAAGQAAAAAAAAAZAAAAGQAAAAVAAAAYAAAAAAAAAAAAAAADwAAACADAAAAAAAAAAAAAAEAAACgMgAAVgcAAKr4//8BAAAAf39/AAEAAABkAAAAAAAAABQAAABAHwAAAAAAACYAAAAAAAAAwOD//wAAAAAmAAAAZAAAABYAAABMAAAAAAAAAAAAAAAEAAAAAAAAAAEAAADu7OEKAAAAACgAAAAoAAAAZAAAAGQAAAAAAAAAzMzMAAAAAABQAAAAUAAAAGQAAABkAAAAAAAAABcAAAAUAAAAAAAAAAAAAAD/fwAA/38AAAAAAAAJAAAABAAAAAAAAAAMAAAAEAAAAAAAAAAAAAAAAAAAAAAAAAAeAAAAaAAAAAAAAAAAAAAAAAAAAAAAAAAAAAAAECcAABAnAAAAAAAAAAAAAAAAAAAAAAAAAAAAAAAAAAAAAAAAAAAAABQAAAAAAAAAwMD/AAAAAABkAAAAMgAAAAAAAABkAAAAAAAAAH9/fwAKAAAAHwAAAFQAAAD///8AAAAAAQAAAAAAAAAAAAAAAAAAAAAAAAAAAAAAAAAAAAAAAAAAAAAAAH9/fwAAAAADzMzMAMDA/wB/f38AAAAAAAAAAAAAAAAAAAAAAAAAAAAhAAAAGAAAABQAAAAaAwAAfRMAAOg6AAAUKgAAEAAAACYAAAAIAAAAPS8AAAAAAAA="/>
               </a:ext>
             </a:extLst>
           </p:cNvSpPr>
@@ -4888,7 +4913,7 @@
             <a:spLocks noGrp="1" noChangeArrowheads="1"/>
             <a:extLst>
               <a:ext uri="smNativeData">
-                <pr:smNativeData xmlns:pr="smNativeData" val="SMDATA_13_47fkXxMAAAAlAAAAZAAAAA0AAAAAAAAAAAAAAAAAAAAAAAAAAAAAAAAAAAAAAAAAAAEAAABQAAAAAAAAAAAA4D8AAAAAAADgPwAAAAAAAOA/AAAAAAAA4D8AAAAAAADgPwAAAAAAAOA/AAAAAAAA4D8AAAAAAADgPwAAAAAAAOA/AAAAAAAA4D8CAAAAjAAAAAAAAAAAAAAA////AP///wgAAAAAAAAAAAAAAAAAAAAAAAAAAAAAAAAAAAAAeAAAAAEAAABAAAAAAAAAAAAAAABaAAAAAAAAAAAAAAAAAAAAAAAAAAAAAAAAAAAAAAAAAAAAAAAAAAAAAAAAAAAAAAAAAAAAAAAAAAAAAAAAAAAAAAAAAAAAAAAAAAAAFAAAADwAAAAAAAAAAAAAAAAAAAAPAAAAAQAAACMAAAAjAAAAIwAAAB4AAAAAAAAAZAAAAGQAAAAAAAAAZAAAAGQAAAAVAAAAYAAAAAAAAAAAAAAADwAAACADAAAAAAAAAAAAAAEAAACgMgAAVgcAAKr4//8BAAAAf39/AAEAAABkAAAAAAAAABQAAABAHwAAAAAAACYAAAAAAAAAwOD//wAAAAAmAAAAZAAAABYAAABMAAAAAAAAAAAAAAAEAAAAAAAAAAEAAADu7OEKAAAAACgAAAAoAAAAZAAAAGQAAAAAAAAAzMzMAAAAAABQAAAAUAAAAGQAAABkAAAAAAAAABcAAAAUAAAAAAAAAAAAAAD/fwAA/38AAAAAAAAJAAAABAAAAAAAAAAMAAAAEAAAAAAAAAAAAAAAAAAAAAAAAAAeAAAAaAAAAAAAAAAAAAAAAAAAAAAAAAAAAAAAECcAABAnAAAAAAAAAAAAAAAAAAAAAAAAAAAAAAAAAAAAAAAAAAAAABQAAAAAAAAAwMD/AAAAAABkAAAAMgAAAAAAAABkAAAAAAAAAH9/fwAKAAAAHwAAAFQAAAD///8AAAAAAQAAAAAAAAAAAAAAAAAAAAAAAAAAAAAAAAAAAAAAAAAAAAAAAH9/fwAAAAADzMzMAMDA/wB/f38AAAAAAAAAAAAAAAAAAAAAAAAAAAAhAAAAGAAAABQAAAAaAwAAXSoAAIwRAACSLQAAEAAAACYAAAAIAAAAPS8AAAAAAAA="/>
+                <pr:smNativeData xmlns="" xmlns:p14="http://schemas.microsoft.com/office/powerpoint/2010/main" xmlns:pr="smNativeData" val="SMDATA_13_47fkXxMAAAAlAAAAZAAAAA0AAAAAAAAAAAAAAAAAAAAAAAAAAAAAAAAAAAAAAAAAAAEAAABQAAAAAAAAAAAA4D8AAAAAAADgPwAAAAAAAOA/AAAAAAAA4D8AAAAAAADgPwAAAAAAAOA/AAAAAAAA4D8AAAAAAADgPwAAAAAAAOA/AAAAAAAA4D8CAAAAjAAAAAAAAAAAAAAA////AP///wgAAAAAAAAAAAAAAAAAAAAAAAAAAAAAAAAAAAAAeAAAAAEAAABAAAAAAAAAAAAAAABaAAAAAAAAAAAAAAAAAAAAAAAAAAAAAAAAAAAAAAAAAAAAAAAAAAAAAAAAAAAAAAAAAAAAAAAAAAAAAAAAAAAAAAAAAAAAAAAAAAAAFAAAADwAAAAAAAAAAAAAAAAAAAAPAAAAAQAAACMAAAAjAAAAIwAAAB4AAAAAAAAAZAAAAGQAAAAAAAAAZAAAAGQAAAAVAAAAYAAAAAAAAAAAAAAADwAAACADAAAAAAAAAAAAAAEAAACgMgAAVgcAAKr4//8BAAAAf39/AAEAAABkAAAAAAAAABQAAABAHwAAAAAAACYAAAAAAAAAwOD//wAAAAAmAAAAZAAAABYAAABMAAAAAAAAAAAAAAAEAAAAAAAAAAEAAADu7OEKAAAAACgAAAAoAAAAZAAAAGQAAAAAAAAAzMzMAAAAAABQAAAAUAAAAGQAAABkAAAAAAAAABcAAAAUAAAAAAAAAAAAAAD/fwAA/38AAAAAAAAJAAAABAAAAAAAAAAMAAAAEAAAAAAAAAAAAAAAAAAAAAAAAAAeAAAAaAAAAAAAAAAAAAAAAAAAAAAAAAAAAAAAECcAABAnAAAAAAAAAAAAAAAAAAAAAAAAAAAAAAAAAAAAAAAAAAAAABQAAAAAAAAAwMD/AAAAAABkAAAAMgAAAAAAAABkAAAAAAAAAH9/fwAKAAAAHwAAAFQAAAD///8AAAAAAQAAAAAAAAAAAAAAAAAAAAAAAAAAAAAAAAAAAAAAAAAAAAAAAH9/fwAAAAADzMzMAMDA/wB/f38AAAAAAAAAAAAAAAAAAAAAAAAAAAAhAAAAGAAAABQAAAAaAwAAXSoAAIwRAACSLQAAEAAAACYAAAAIAAAAPS8AAAAAAAA="/>
               </a:ext>
             </a:extLst>
           </p:cNvSpPr>
@@ -4913,7 +4938,6 @@
           </a:bodyPr>
           <a:lstStyle/>
           <a:p>
-            <a:pPr/>
             <a:r>
               <a:rPr lang="en-us" sz="1400">
                 <a:solidFill>
@@ -4922,11 +4946,6 @@
               </a:rPr>
               <a:t>&lt;日期/时间&gt;</a:t>
             </a:r>
-            <a:endParaRPr lang="en-us" sz="1400">
-              <a:solidFill>
-                <a:srgbClr val="FFFFFF"/>
-              </a:solidFill>
-            </a:endParaRPr>
           </a:p>
         </p:txBody>
       </p:sp>
@@ -4937,7 +4956,7 @@
             <a:spLocks noGrp="1" noChangeArrowheads="1"/>
             <a:extLst>
               <a:ext uri="smNativeData">
-                <pr:smNativeData xmlns:pr="smNativeData" val="SMDATA_13_47fkXxMAAAAlAAAAZAAAAA0AAAAAAAAAAAAAAAAAAAAAAAAAAAAAAAAAAAAAAAAAAAEAAABQAAAAAAAAAAAA4D8AAAAAAADgPwAAAAAAAOA/AAAAAAAA4D8AAAAAAADgPwAAAAAAAOA/AAAAAAAA4D8AAAAAAADgPwAAAAAAAOA/AAAAAAAA4D8CAAAAjAAAAAAAAAAAAAAA////AP///wgAAAAAAAAAAAAAAAAAAAAAAAAAAAAAAAAAAAAAeAAAAAEAAABAAAAAAAAAAAAAAABaAAAAAAAAAAAAAAAAAAAAAAAAAAAAAAAAAAAAAAAAAAAAAAAAAAAAAAAAAAAAAAAAAAAAAAAAAAAAAAAAAAAAAAAAAAAAAAAAAAAAFAAAADwAAAAAAAAAAAAAAAAAAAAPAAAAAQAAACMAAAAjAAAAIwAAAB4AAAAAAAAAZAAAAGQAAAAAAAAAZAAAAGQAAAAVAAAAYAAAAAAAAAAAAAAADwAAACADAAAAAAAAAAAAAAEAAACgMgAAVgcAAKr4//8BAAAAf39/AAEAAABkAAAAAAAAABQAAABAHwAAAAAAACYAAAAAAAAAwOD//wAAAAAmAAAAZAAAABYAAABMAAAAAAAAAAAAAAAEAAAAAAAAAAEAAADu7OEKAAAAACgAAAAoAAAAZAAAAGQAAAAAAAAAzMzMAAAAAABQAAAAUAAAAGQAAABkAAAAAAAAABcAAAAUAAAAAAAAAAAAAAD/fwAA/38AAAAAAAAJAAAABAAAAAAAAAAMAAAAEAAAAAAAAAAAAAAAAAAAAAAAAAAeAAAAaAAAAAAAAAAAAAAAAAAAAAAAAAAAAAAAECcAABAnAAAAAAAAAAAAAAAAAAAAAAAAAAAAAAAAAAAAAAAAAAAAABQAAAAAAAAAwMD/AAAAAABkAAAAMgAAAAAAAABkAAAAAAAAAH9/fwAKAAAAHwAAAFQAAAD///8AAAAAAQAAAAAAAAAAAAAAAAAAAAAAAAAAAAAAAAAAAAAAAAAAAAAAAH9/fwAAAAADzMzMAMDA/wB/f38AAAAAAAAAAAAAAAAAAAAAAAAAAAAhAAAAGAAAABQAAAA1FQAAXSoAANwoAACSLQAAEAAAACYAAAAIAAAAPS8AAAAAAAA="/>
+                <pr:smNativeData xmlns="" xmlns:p14="http://schemas.microsoft.com/office/powerpoint/2010/main" xmlns:pr="smNativeData" val="SMDATA_13_47fkXxMAAAAlAAAAZAAAAA0AAAAAAAAAAAAAAAAAAAAAAAAAAAAAAAAAAAAAAAAAAAEAAABQAAAAAAAAAAAA4D8AAAAAAADgPwAAAAAAAOA/AAAAAAAA4D8AAAAAAADgPwAAAAAAAOA/AAAAAAAA4D8AAAAAAADgPwAAAAAAAOA/AAAAAAAA4D8CAAAAjAAAAAAAAAAAAAAA////AP///wgAAAAAAAAAAAAAAAAAAAAAAAAAAAAAAAAAAAAAeAAAAAEAAABAAAAAAAAAAAAAAABaAAAAAAAAAAAAAAAAAAAAAAAAAAAAAAAAAAAAAAAAAAAAAAAAAAAAAAAAAAAAAAAAAAAAAAAAAAAAAAAAAAAAAAAAAAAAAAAAAAAAFAAAADwAAAAAAAAAAAAAAAAAAAAPAAAAAQAAACMAAAAjAAAAIwAAAB4AAAAAAAAAZAAAAGQAAAAAAAAAZAAAAGQAAAAVAAAAYAAAAAAAAAAAAAAADwAAACADAAAAAAAAAAAAAAEAAACgMgAAVgcAAKr4//8BAAAAf39/AAEAAABkAAAAAAAAABQAAABAHwAAAAAAACYAAAAAAAAAwOD//wAAAAAmAAAAZAAAABYAAABMAAAAAAAAAAAAAAAEAAAAAAAAAAEAAADu7OEKAAAAACgAAAAoAAAAZAAAAGQAAAAAAAAAzMzMAAAAAABQAAAAUAAAAGQAAABkAAAAAAAAABcAAAAUAAAAAAAAAAAAAAD/fwAA/38AAAAAAAAJAAAABAAAAAAAAAAMAAAAEAAAAAAAAAAAAAAAAAAAAAAAAAAeAAAAaAAAAAAAAAAAAAAAAAAAAAAAAAAAAAAAECcAABAnAAAAAAAAAAAAAAAAAAAAAAAAAAAAAAAAAAAAAAAAAAAAABQAAAAAAAAAwMD/AAAAAABkAAAAMgAAAAAAAABkAAAAAAAAAH9/fwAKAAAAHwAAAFQAAAD///8AAAAAAQAAAAAAAAAAAAAAAAAAAAAAAAAAAAAAAAAAAAAAAAAAAAAAAH9/fwAAAAADzMzMAMDA/wB/f38AAAAAAAAAAAAAAAAAAAAAAAAAAAAhAAAAGAAAABQAAAA1FQAAXSoAANwoAACSLQAAEAAAACYAAAAIAAAAPS8AAAAAAAA="/>
               </a:ext>
             </a:extLst>
           </p:cNvSpPr>
@@ -4962,7 +4981,6 @@
           </a:bodyPr>
           <a:lstStyle/>
           <a:p>
-            <a:pPr/>
             <a:r>
               <a:rPr lang="en-us" sz="1400">
                 <a:solidFill>
@@ -4971,11 +4989,6 @@
               </a:rPr>
               <a:t>&lt;页脚&gt;</a:t>
             </a:r>
-            <a:endParaRPr lang="en-us" sz="1400">
-              <a:solidFill>
-                <a:srgbClr val="FFFFFF"/>
-              </a:solidFill>
-            </a:endParaRPr>
           </a:p>
         </p:txBody>
       </p:sp>
@@ -4986,7 +4999,7 @@
             <a:spLocks noGrp="1" noChangeArrowheads="1"/>
             <a:extLst>
               <a:ext uri="smNativeData">
-                <pr:smNativeData xmlns:pr="smNativeData" val="SMDATA_13_47fkXxMAAAAlAAAAZAAAAA0AAAAAAAAAAAAAAAAAAAAAAAAAAAAAAAAAAAAAAAAAAAEAAABQAAAAAAAAAAAA4D8AAAAAAADgPwAAAAAAAOA/AAAAAAAA4D8AAAAAAADgPwAAAAAAAOA/AAAAAAAA4D8AAAAAAADgPwAAAAAAAOA/AAAAAAAA4D8CAAAAjAAAAAAAAAAAAAAA////AP///wgAAAAAAAAAAAAAAAAAAAAAAAAAAAAAAAAAAAAAeAAAAAEAAABAAAAAAAAAAAAAAABaAAAAAAAAAAAAAAAAAAAAAAAAAAAAAAAAAAAAAAAAAAAAAAAAAAAAAAAAAAAAAAAAAAAAAAAAAAAAAAAAAAAAAAAAAAAAAAAAAAAAFAAAADwAAAAAAAAAAAAAAAAAAAAPAAAAAQAAACMAAAAjAAAAIwAAAB4AAAAAAAAAZAAAAGQAAAAAAAAAZAAAAGQAAAAVAAAAYAAAAAAAAAAAAAAADwAAACADAAAAAAAAAAAAAAEAAACgMgAAVgcAAKr4//8BAAAAf39/AAEAAABkAAAAAAAAABQAAABAHwAAAAAAACYAAAAAAAAAwOD//wAAAAAmAAAAZAAAABYAAABMAAAAAAAAAAAAAAAEAAAAAAAAAAEAAADu7OEKAAAAACgAAAAoAAAAZAAAAGQAAAAAAAAAzMzMAAAAAABQAAAAUAAAAGQAAABkAAAAAAAAABcAAAAUAAAAAAAAAAAAAAD/fwAA/38AAAAAAAAJAAAABAAAAPlb40sMAAAAEAAAAAAAAAAAAAAAAAAAAAAAAAAeAAAAaAAAAAAAAAAAAAAAAAAAAAAAAAAAAAAAECcAABAnAAAAAAAAAAAAAAAAAAAAAAAAAAAAAAAAAAAAAAAAAAAAABQAAAAAAAAAwMD/AAAAAABkAAAAMgAAAAAAAABkAAAAAAAAAH9/fwAKAAAAHwAAAFQAAAD///8AAAAAAQAAAAAAAAAAAAAAAAAAAAAAAAAAAAAAAAAAAAAAAAAAAAAAAH9/fwAAAAADzMzMAMDA/wB/f38AAAAAAAAAAAAAAAAAAAAAAAAAAAAhAAAAGAAAABQAAAB2LAAAXSoAAOg6AACSLQAAEAAAACYAAAAIAAAAPS8AAAAAAAA="/>
+                <pr:smNativeData xmlns="" xmlns:p14="http://schemas.microsoft.com/office/powerpoint/2010/main" xmlns:pr="smNativeData" val="SMDATA_13_47fkXxMAAAAlAAAAZAAAAA0AAAAAAAAAAAAAAAAAAAAAAAAAAAAAAAAAAAAAAAAAAAEAAABQAAAAAAAAAAAA4D8AAAAAAADgPwAAAAAAAOA/AAAAAAAA4D8AAAAAAADgPwAAAAAAAOA/AAAAAAAA4D8AAAAAAADgPwAAAAAAAOA/AAAAAAAA4D8CAAAAjAAAAAAAAAAAAAAA////AP///wgAAAAAAAAAAAAAAAAAAAAAAAAAAAAAAAAAAAAAeAAAAAEAAABAAAAAAAAAAAAAAABaAAAAAAAAAAAAAAAAAAAAAAAAAAAAAAAAAAAAAAAAAAAAAAAAAAAAAAAAAAAAAAAAAAAAAAAAAAAAAAAAAAAAAAAAAAAAAAAAAAAAFAAAADwAAAAAAAAAAAAAAAAAAAAPAAAAAQAAACMAAAAjAAAAIwAAAB4AAAAAAAAAZAAAAGQAAAAAAAAAZAAAAGQAAAAVAAAAYAAAAAAAAAAAAAAADwAAACADAAAAAAAAAAAAAAEAAACgMgAAVgcAAKr4//8BAAAAf39/AAEAAABkAAAAAAAAABQAAABAHwAAAAAAACYAAAAAAAAAwOD//wAAAAAmAAAAZAAAABYAAABMAAAAAAAAAAAAAAAEAAAAAAAAAAEAAADu7OEKAAAAACgAAAAoAAAAZAAAAGQAAAAAAAAAzMzMAAAAAABQAAAAUAAAAGQAAABkAAAAAAAAABcAAAAUAAAAAAAAAAAAAAD/fwAA/38AAAAAAAAJAAAABAAAAPlb40sMAAAAEAAAAAAAAAAAAAAAAAAAAAAAAAAeAAAAaAAAAAAAAAAAAAAAAAAAAAAAAAAAAAAAECcAABAnAAAAAAAAAAAAAAAAAAAAAAAAAAAAAAAAAAAAAAAAAAAAABQAAAAAAAAAwMD/AAAAAABkAAAAMgAAAAAAAABkAAAAAAAAAH9/fwAKAAAAHwAAAFQAAAD///8AAAAAAQAAAAAAAAAAAAAAAAAAAAAAAAAAAAAAAAAAAAAAAAAAAAAAAH9/fwAAAAADzMzMAMDA/wB/f38AAAAAAAAAAAAAAAAAAAAAAAAAAAAhAAAAGAAAABQAAAB2LAAAXSoAAOg6AACSLQAAEAAAACYAAAAIAAAAPS8AAAAAAAA="/>
               </a:ext>
             </a:extLst>
           </p:cNvSpPr>
@@ -5011,14 +5024,13 @@
           </a:bodyPr>
           <a:lstStyle/>
           <a:p>
-            <a:pPr/>
             <a:fld id="{05B8D563-2DE8-ED23-A600-DB769B4E508E}" type="slidenum">
               <a:rPr lang="en-us" sz="1400">
                 <a:solidFill>
                   <a:srgbClr val="FFFFFF"/>
                 </a:solidFill>
               </a:rPr>
-              <a:t/>
+              <a:t>‹#›</a:t>
             </a:fld>
             <a:endParaRPr lang="en-us" sz="1400">
               <a:solidFill>
@@ -5032,18 +5044,18 @@
   </p:cSld>
   <p:clrMap bg1="lt1" tx1="dk1" bg2="lt2" tx2="dk2" accent1="accent1" accent2="accent2" accent3="accent3" accent4="accent4" accent5="accent5" accent6="accent6" hlink="hlink" folHlink="folHlink"/>
   <p:sldLayoutIdLst>
-    <p:sldLayoutId id="2147483649" r:id="rId2"/>
-    <p:sldLayoutId id="2147483650" r:id="rId3"/>
-    <p:sldLayoutId id="2147483651" r:id="rId4"/>
-    <p:sldLayoutId id="2147483652" r:id="rId5"/>
-    <p:sldLayoutId id="2147483653" r:id="rId6"/>
-    <p:sldLayoutId id="2147483654" r:id="rId7"/>
-    <p:sldLayoutId id="2147483655" r:id="rId8"/>
-    <p:sldLayoutId id="2147483656" r:id="rId9"/>
-    <p:sldLayoutId id="2147483657" r:id="rId10"/>
-    <p:sldLayoutId id="2147483658" r:id="rId11"/>
-    <p:sldLayoutId id="2147483659" r:id="rId12"/>
-    <p:sldLayoutId id="2147483660" r:id="rId13"/>
+    <p:sldLayoutId id="2147483649" r:id="rId1"/>
+    <p:sldLayoutId id="2147483650" r:id="rId2"/>
+    <p:sldLayoutId id="2147483651" r:id="rId3"/>
+    <p:sldLayoutId id="2147483652" r:id="rId4"/>
+    <p:sldLayoutId id="2147483653" r:id="rId5"/>
+    <p:sldLayoutId id="2147483654" r:id="rId6"/>
+    <p:sldLayoutId id="2147483655" r:id="rId7"/>
+    <p:sldLayoutId id="2147483656" r:id="rId8"/>
+    <p:sldLayoutId id="2147483657" r:id="rId9"/>
+    <p:sldLayoutId id="2147483658" r:id="rId10"/>
+    <p:sldLayoutId id="2147483659" r:id="rId11"/>
+    <p:sldLayoutId id="2147483660" r:id="rId12"/>
   </p:sldLayoutIdLst>
   <p:hf sldNum="0" hdr="0" ftr="0" dt="0"/>
   <p:txStyles>
@@ -5084,7 +5096,7 @@
         </a:spcAft>
         <a:buClrTx/>
         <a:buSzPts val="885"/>
-        <a:buFont typeface="Wingdings" pitchFamily="0" charset="0"/>
+        <a:buFont typeface="Wingdings" charset="0"/>
         <a:buChar char=""/>
         <a:tabLst/>
         <a:defRPr lang="zh-cn" sz="1975" b="0" i="0" u="none" strike="noStrike" kern="1" spc="0" baseline="0">
@@ -5134,7 +5146,7 @@
         </a:spcAft>
         <a:buClrTx/>
         <a:buSzPts val="885"/>
-        <a:buFont typeface="Wingdings" pitchFamily="0" charset="0"/>
+        <a:buFont typeface="Wingdings" charset="0"/>
         <a:buChar char=""/>
         <a:tabLst/>
         <a:defRPr lang="zh-cn" sz="1975" b="0" i="0" u="none" strike="noStrike" kern="1" spc="0" baseline="0">
@@ -5184,7 +5196,7 @@
         </a:spcAft>
         <a:buClrTx/>
         <a:buSzPts val="885"/>
-        <a:buFont typeface="Wingdings" pitchFamily="0" charset="0"/>
+        <a:buFont typeface="Wingdings" charset="0"/>
         <a:buChar char=""/>
         <a:tabLst/>
         <a:defRPr lang="zh-cn" sz="1975" b="0" i="0" u="none" strike="noStrike" kern="1" spc="0" baseline="0">
@@ -5209,7 +5221,7 @@
         </a:spcAft>
         <a:buClrTx/>
         <a:buSzPts val="885"/>
-        <a:buFont typeface="Wingdings" pitchFamily="0" charset="0"/>
+        <a:buFont typeface="Wingdings" charset="0"/>
         <a:buChar char=""/>
         <a:tabLst/>
         <a:defRPr lang="zh-cn" sz="1975" b="0" i="0" u="none" strike="noStrike" kern="1" spc="0" baseline="0">
@@ -5234,7 +5246,7 @@
         </a:spcAft>
         <a:buClrTx/>
         <a:buSzPts val="885"/>
-        <a:buFont typeface="Wingdings" pitchFamily="0" charset="0"/>
+        <a:buFont typeface="Wingdings" charset="0"/>
         <a:buChar char=""/>
         <a:tabLst/>
         <a:defRPr lang="zh-cn" sz="1975" b="0" i="0" u="none" strike="noStrike" kern="1" spc="0" baseline="0">
@@ -5503,12 +5515,12 @@
 </file>
 
 <file path=ppt/slideMasters/slideMaster2.xml><?xml version="1.0" encoding="utf-8"?>
-<p:sldMaster xmlns:p="http://schemas.openxmlformats.org/presentationml/2006/main" xmlns:p14="http://schemas.microsoft.com/office/powerpoint/2010/main" xmlns:r="http://schemas.openxmlformats.org/officeDocument/2006/relationships" xmlns:a="http://schemas.openxmlformats.org/drawingml/2006/main">
+<p:sldMaster xmlns:a="http://schemas.openxmlformats.org/drawingml/2006/main" xmlns:r="http://schemas.openxmlformats.org/officeDocument/2006/relationships" xmlns:p="http://schemas.openxmlformats.org/presentationml/2006/main">
   <p:cSld>
     <p:bg>
       <p:bgPr>
         <a:blipFill>
-          <a:blip r:embed="rId1"/>
+          <a:blip r:embed="rId14"/>
           <a:srcRect/>
           <a:stretch/>
         </a:blipFill>
@@ -5536,7 +5548,7 @@
             <a:spLocks noGrp="1" noChangeArrowheads="1"/>
             <a:extLst>
               <a:ext uri="smNativeData">
-                <pr:smNativeData xmlns:pr="smNativeData" val="SMDATA_13_47fkXxMAAAAlAAAAZAAAAA0AAAAAAAAAAAAAAAAAAAAAAAAAAAAAAAABAAAAAAAAAAEAAABQAAAAAAAAAAAA4D8AAAAAAADgPwAAAAAAAOA/AAAAAAAA4D8AAAAAAADgPwAAAAAAAOA/AAAAAAAA4D8AAAAAAADgPwAAAAAAAOA/AAAAAAAA4D8CAAAAjAAAAAAAAAAAAAAA////AP///wgAAAAAAAAAAAAAAAAAAAAAAAAAAAAAAAAAAAAAeAAAAAEAAABAAAAAAAAAAAAAAABaAAAAAAAAAAAAAAAAAAAAAAAAAAAAAAAAAAAAAAAAAAAAAAAAAAAAAAAAAAAAAAAAAAAAAAAAAAAAAAAAAAAAAAAAAAAAAAAAAAAAFAAAADwAAAAAAAAAAAAAAAAAAAAPAAAAAQAAACMAAAAjAAAAIwAAAB4AAAAAAAAAZAAAAGQAAAAAAAAAZAAAAGQAAAAVAAAAYAAAAAAAAAAAAAAADwAAACADAAAAAAAAAAAAAAEAAACgMgAAVgcAAKr4//8BAAAAf39/AAEAAABkAAAAAAAAABQAAABAHwAAAAAAACYAAAAAAAAAwOD//wAAAAAmAAAAZAAAABYAAABMAAAAAAAAAAAAAAAEAAAAAAAAAAEAAADu7OEKAAAAACgAAAAoAAAAZAAAAGQAAAAAAAAAzMzMAAAAAABQAAAAUAAAAGQAAABkAAAAAAAAABcAAAAUAAAAAAAAAAAAAAD/fwAA/38AAAAAAAAJAAAABAAAAH2lceAMAAAAEAAAAAAAAAAAAAAAAAAAAAAAAAAeAAAAaAAAAAAAAAAAAAAAAAAAAAAAAAAAAAAAECcAABAnAAAAAAAAAAAAAAAAAAAAAAAAAAAAAAAAAAAAAAAAAAAAABQAAAAAAAAAwMD/AAAAAABkAAAAMgAAAAAAAABkAAAAAAAAAH9/fwAKAAAAHwAAAFQAAAD///8AAAAAAQAAAAAAAAAAAAAAAAAAAAAAAAAAAAAAAAAAAAAAAAAAAAAAAH9/fwAAAAADzMzMAMDA/wB/f38AAAAAAAAAAAAAAAAAAAAAAAAAAAAhAAAAGAAAABQAAAAaAwAA2wEAAOg6AACeCQAAEAAAACYAAAAIAAAAvS8AAAAAAAA="/>
+                <pr:smNativeData xmlns="" xmlns:p14="http://schemas.microsoft.com/office/powerpoint/2010/main" xmlns:pr="smNativeData" val="SMDATA_13_47fkXxMAAAAlAAAAZAAAAA0AAAAAAAAAAAAAAAAAAAAAAAAAAAAAAAABAAAAAAAAAAEAAABQAAAAAAAAAAAA4D8AAAAAAADgPwAAAAAAAOA/AAAAAAAA4D8AAAAAAADgPwAAAAAAAOA/AAAAAAAA4D8AAAAAAADgPwAAAAAAAOA/AAAAAAAA4D8CAAAAjAAAAAAAAAAAAAAA////AP///wgAAAAAAAAAAAAAAAAAAAAAAAAAAAAAAAAAAAAAeAAAAAEAAABAAAAAAAAAAAAAAABaAAAAAAAAAAAAAAAAAAAAAAAAAAAAAAAAAAAAAAAAAAAAAAAAAAAAAAAAAAAAAAAAAAAAAAAAAAAAAAAAAAAAAAAAAAAAAAAAAAAAFAAAADwAAAAAAAAAAAAAAAAAAAAPAAAAAQAAACMAAAAjAAAAIwAAAB4AAAAAAAAAZAAAAGQAAAAAAAAAZAAAAGQAAAAVAAAAYAAAAAAAAAAAAAAADwAAACADAAAAAAAAAAAAAAEAAACgMgAAVgcAAKr4//8BAAAAf39/AAEAAABkAAAAAAAAABQAAABAHwAAAAAAACYAAAAAAAAAwOD//wAAAAAmAAAAZAAAABYAAABMAAAAAAAAAAAAAAAEAAAAAAAAAAEAAADu7OEKAAAAACgAAAAoAAAAZAAAAGQAAAAAAAAAzMzMAAAAAABQAAAAUAAAAGQAAABkAAAAAAAAABcAAAAUAAAAAAAAAAAAAAD/fwAA/38AAAAAAAAJAAAABAAAAH2lceAMAAAAEAAAAAAAAAAAAAAAAAAAAAAAAAAeAAAAaAAAAAAAAAAAAAAAAAAAAAAAAAAAAAAAECcAABAnAAAAAAAAAAAAAAAAAAAAAAAAAAAAAAAAAAAAAAAAAAAAABQAAAAAAAAAwMD/AAAAAABkAAAAMgAAAAAAAABkAAAAAAAAAH9/fwAKAAAAHwAAAFQAAAD///8AAAAAAQAAAAAAAAAAAAAAAAAAAAAAAAAAAAAAAAAAAAAAAAAAAAAAAH9/fwAAAAADzMzMAMDA/wB/f38AAAAAAAAAAAAAAAAAAAAAAAAAAAAhAAAAGAAAABQAAAAaAwAA2wEAAOg6AACeCQAAEAAAACYAAAAIAAAAvS8AAAAAAAA="/>
               </a:ext>
             </a:extLst>
           </p:cNvSpPr>
@@ -5578,7 +5590,7 @@
             <a:spLocks noGrp="1" noChangeArrowheads="1"/>
             <a:extLst>
               <a:ext uri="smNativeData">
-                <pr:smNativeData xmlns:pr="smNativeData" val="SMDATA_13_47fkXxMAAAAlAAAAZAAAAA0AAAAAAAAAAAAAAAAAAAAAAAAAAAAAAAAAAAAAAAAAAAEAAABQAAAAAAAAAAAA4D8AAAAAAADgPwAAAAAAAOA/AAAAAAAA4D8AAAAAAADgPwAAAAAAAOA/AAAAAAAA4D8AAAAAAADgPwAAAAAAAOA/AAAAAAAA4D8CAAAAjAAAAAAAAAAAAAAA////AP///wgAAAAAAAAAAAAAAAAAAAAAAAAAAAAAAAAAAAAAeAAAAAEAAABAAAAAAAAAAAAAAABaAAAAAAAAAAAAAAAAAAAAAAAAAAAAAAAAAAAAAAAAAAAAAAAAAAAAAAAAAAAAAAAAAAAAAAAAAAAAAAAAAAAAAAAAAAAAAAAAAAAAFAAAADwAAAAAAAAAAAAAAAAAAAAPAAAAAQAAACMAAAAjAAAAIwAAAB4AAAAAAAAAZAAAAGQAAAAAAAAAZAAAAGQAAAAVAAAAYAAAAAAAAAAAAAAADwAAACADAAAAAAAAAAAAAAEAAACgMgAAVgcAAKr4//8BAAAAf39/AAEAAABkAAAAAAAAABQAAABAHwAAAAAAACYAAAAAAAAAwOD//wAAAAAmAAAAZAAAABYAAABMAAAAAAAAAAAAAAAEAAAAAAAAAAEAAADu7OEKAAAAACgAAAAoAAAAZAAAAGQAAAAAAAAAzMzMAAAAAABQAAAAUAAAAGQAAABkAAAAAAAAABcAAAAUAAAAAAAAAAAAAAD/fwAA/38AAAAAAAAJAAAABAAAAK+MHr0MAAAAEAAAAAAAAAAAAAAAAAAAAAAAAAAeAAAAaAAAAAAAAAAAAAAAAAAAAAAAAAAAAAAAECcAABAnAAAAAAAAAAAAAAAAAAAAAAAAAAAAAAAAAAAAAAAAAAAAABQAAAAAAAAAwMD/AAAAAABkAAAAMgAAAAAAAABkAAAAAAAAAH9/fwAKAAAAHwAAAFQAAAD///8AAAAAAQAAAAAAAAAAAAAAAAAAAAAAAAAAAAAAAAAAAAAAAAAAAAAAAH9/fwAAAAADzMzMAMDA/wB/f38AAAAAAAAAAAAAAAAAAAAAAAAAAAAhAAAAGAAAABQAAAAaAwAA4goAAOg6AADbJQAAEAAAACYAAAAIAAAAPS8AAAAAAAA="/>
+                <pr:smNativeData xmlns="" xmlns:p14="http://schemas.microsoft.com/office/powerpoint/2010/main" xmlns:pr="smNativeData" val="SMDATA_13_47fkXxMAAAAlAAAAZAAAAA0AAAAAAAAAAAAAAAAAAAAAAAAAAAAAAAAAAAAAAAAAAAEAAABQAAAAAAAAAAAA4D8AAAAAAADgPwAAAAAAAOA/AAAAAAAA4D8AAAAAAADgPwAAAAAAAOA/AAAAAAAA4D8AAAAAAADgPwAAAAAAAOA/AAAAAAAA4D8CAAAAjAAAAAAAAAAAAAAA////AP///wgAAAAAAAAAAAAAAAAAAAAAAAAAAAAAAAAAAAAAeAAAAAEAAABAAAAAAAAAAAAAAABaAAAAAAAAAAAAAAAAAAAAAAAAAAAAAAAAAAAAAAAAAAAAAAAAAAAAAAAAAAAAAAAAAAAAAAAAAAAAAAAAAAAAAAAAAAAAAAAAAAAAFAAAADwAAAAAAAAAAAAAAAAAAAAPAAAAAQAAACMAAAAjAAAAIwAAAB4AAAAAAAAAZAAAAGQAAAAAAAAAZAAAAGQAAAAVAAAAYAAAAAAAAAAAAAAADwAAACADAAAAAAAAAAAAAAEAAACgMgAAVgcAAKr4//8BAAAAf39/AAEAAABkAAAAAAAAABQAAABAHwAAAAAAACYAAAAAAAAAwOD//wAAAAAmAAAAZAAAABYAAABMAAAAAAAAAAAAAAAEAAAAAAAAAAEAAADu7OEKAAAAACgAAAAoAAAAZAAAAGQAAAAAAAAAzMzMAAAAAABQAAAAUAAAAGQAAABkAAAAAAAAABcAAAAUAAAAAAAAAAAAAAD/fwAA/38AAAAAAAAJAAAABAAAAK+MHr0MAAAAEAAAAAAAAAAAAAAAAAAAAAAAAAAeAAAAaAAAAAAAAAAAAAAAAAAAAAAAAAAAAAAAECcAABAnAAAAAAAAAAAAAAAAAAAAAAAAAAAAAAAAAAAAAAAAAAAAABQAAAAAAAAAwMD/AAAAAABkAAAAMgAAAAAAAABkAAAAAAAAAH9/fwAKAAAAHwAAAFQAAAD///8AAAAAAQAAAAAAAAAAAAAAAAAAAAAAAAAAAAAAAAAAAAAAAAAAAAAAAH9/fwAAAAADzMzMAMDA/wB/f38AAAAAAAAAAAAAAAAAAAAAAAAAAAAhAAAAGAAAABQAAAAaAwAA4goAAOg6AADbJQAAEAAAACYAAAAIAAAAPS8AAAAAAAA="/>
               </a:ext>
             </a:extLst>
           </p:cNvSpPr>
@@ -5674,7 +5686,7 @@
             <a:spLocks noGrp="1" noChangeArrowheads="1"/>
             <a:extLst>
               <a:ext uri="smNativeData">
-                <pr:smNativeData xmlns:pr="smNativeData" val="SMDATA_13_47fkXxMAAAAlAAAAZAAAAA0AAAAAAAAAAAAAAAAAAAAAAAAAAAAAAAAAAAAAAAAAAAEAAABQAAAAAAAAAAAA4D8AAAAAAADgPwAAAAAAAOA/AAAAAAAA4D8AAAAAAADgPwAAAAAAAOA/AAAAAAAA4D8AAAAAAADgPwAAAAAAAOA/AAAAAAAA4D8CAAAAjAAAAAAAAAAAAAAA////AP///wgAAAAAAAAAAAAAAAAAAAAAAAAAAAAAAAAAAAAAeAAAAAEAAABAAAAAAAAAAAAAAABaAAAAAAAAAAAAAAAAAAAAAAAAAAAAAAAAAAAAAAAAAAAAAAAAAAAAAAAAAAAAAAAAAAAAAAAAAAAAAAAAAAAAAAAAAAAAAAAAAAAAFAAAADwAAAAAAAAAAAAAAAAAAAAPAAAAAQAAACMAAAAjAAAAIwAAAB4AAAAAAAAAZAAAAGQAAAAAAAAAZAAAAGQAAAAVAAAAYAAAAAAAAAAAAAAADwAAACADAAAAAAAAAAAAAAEAAACgMgAAVgcAAKr4//8BAAAAf39/AAEAAABkAAAAAAAAABQAAABAHwAAAAAAACYAAAAAAAAAwOD//wAAAAAmAAAAZAAAABYAAABMAAAAAAAAAAAAAAAEAAAAAAAAAAEAAADu7OEKAAAAACgAAAAoAAAAZAAAAGQAAAAAAAAAzMzMAAAAAABQAAAAUAAAAGQAAABkAAAAAAAAABcAAAAUAAAAAAAAAAAAAAD/fwAA/38AAAAAAAAJAAAABAAAALetD/gMAAAAEAAAAAAAAAAAAAAAAAAAAAAAAAAeAAAAaAAAAAAAAAAAAAAAAAAAAAAAAAAAAAAAECcAABAnAAAAAAAAAAAAAAAAAAAAAAAAAAAAAAAAAAAAAAAAAAAAABQAAAAAAAAAwMD/AAAAAABkAAAAMgAAAAAAAABkAAAAAAAAAH9/fwAKAAAAHwAAAFQAAAD///8AAAAAAQAAAAAAAAAAAAAAAAAAAAAAAAAAAAAAAAAAAAAAAAAAAAAAAH9/fwAAAAADzMzMAMDA/wB/f38AAAAAAAAAAAAAAAAAAAAAAAAAAAAhAAAAGAAAABQAAAAaAwAAXioAAIwRAACTLQAAEAAAACYAAAAIAAAAPS8AAAAAAAA="/>
+                <pr:smNativeData xmlns="" xmlns:p14="http://schemas.microsoft.com/office/powerpoint/2010/main" xmlns:pr="smNativeData" val="SMDATA_13_47fkXxMAAAAlAAAAZAAAAA0AAAAAAAAAAAAAAAAAAAAAAAAAAAAAAAAAAAAAAAAAAAEAAABQAAAAAAAAAAAA4D8AAAAAAADgPwAAAAAAAOA/AAAAAAAA4D8AAAAAAADgPwAAAAAAAOA/AAAAAAAA4D8AAAAAAADgPwAAAAAAAOA/AAAAAAAA4D8CAAAAjAAAAAAAAAAAAAAA////AP///wgAAAAAAAAAAAAAAAAAAAAAAAAAAAAAAAAAAAAAeAAAAAEAAABAAAAAAAAAAAAAAABaAAAAAAAAAAAAAAAAAAAAAAAAAAAAAAAAAAAAAAAAAAAAAAAAAAAAAAAAAAAAAAAAAAAAAAAAAAAAAAAAAAAAAAAAAAAAAAAAAAAAFAAAADwAAAAAAAAAAAAAAAAAAAAPAAAAAQAAACMAAAAjAAAAIwAAAB4AAAAAAAAAZAAAAGQAAAAAAAAAZAAAAGQAAAAVAAAAYAAAAAAAAAAAAAAADwAAACADAAAAAAAAAAAAAAEAAACgMgAAVgcAAKr4//8BAAAAf39/AAEAAABkAAAAAAAAABQAAABAHwAAAAAAACYAAAAAAAAAwOD//wAAAAAmAAAAZAAAABYAAABMAAAAAAAAAAAAAAAEAAAAAAAAAAEAAADu7OEKAAAAACgAAAAoAAAAZAAAAGQAAAAAAAAAzMzMAAAAAABQAAAAUAAAAGQAAABkAAAAAAAAABcAAAAUAAAAAAAAAAAAAAD/fwAA/38AAAAAAAAJAAAABAAAALetD/gMAAAAEAAAAAAAAAAAAAAAAAAAAAAAAAAeAAAAaAAAAAAAAAAAAAAAAAAAAAAAAAAAAAAAECcAABAnAAAAAAAAAAAAAAAAAAAAAAAAAAAAAAAAAAAAAAAAAAAAABQAAAAAAAAAwMD/AAAAAABkAAAAMgAAAAAAAABkAAAAAAAAAH9/fwAKAAAAHwAAAFQAAAD///8AAAAAAQAAAAAAAAAAAAAAAAAAAAAAAAAAAAAAAAAAAAAAAAAAAAAAAH9/fwAAAAADzMzMAMDA/wB/f38AAAAAAAAAAAAAAAAAAAAAAAAAAAAhAAAAGAAAABQAAAAaAwAAXioAAIwRAACTLQAAEAAAACYAAAAIAAAAPS8AAAAAAAA="/>
               </a:ext>
             </a:extLst>
           </p:cNvSpPr>
@@ -5699,12 +5711,10 @@
           </a:bodyPr>
           <a:lstStyle/>
           <a:p>
-            <a:pPr/>
             <a:r>
               <a:rPr lang="en-us" sz="1400"/>
               <a:t>&lt;日期/时间&gt;</a:t>
             </a:r>
-            <a:endParaRPr lang="en-us" sz="1400"/>
           </a:p>
         </p:txBody>
       </p:sp>
@@ -5715,7 +5725,7 @@
             <a:spLocks noGrp="1" noChangeArrowheads="1"/>
             <a:extLst>
               <a:ext uri="smNativeData">
-                <pr:smNativeData xmlns:pr="smNativeData" val="SMDATA_13_47fkXxMAAAAlAAAAZAAAAA0AAAAAAAAAAAAAAAAAAAAAAAAAAAAAAAAAAAAAAAAAAAEAAABQAAAAAAAAAAAA4D8AAAAAAADgPwAAAAAAAOA/AAAAAAAA4D8AAAAAAADgPwAAAAAAAOA/AAAAAAAA4D8AAAAAAADgPwAAAAAAAOA/AAAAAAAA4D8CAAAAjAAAAAAAAAAAAAAA////AP///wgAAAAAAAAAAAAAAAAAAAAAAAAAAAAAAAAAAAAAeAAAAAEAAABAAAAAAAAAAAAAAABaAAAAAAAAAAAAAAAAAAAAAAAAAAAAAAAAAAAAAAAAAAAAAAAAAAAAAAAAAAAAAAAAAAAAAAAAAAAAAAAAAAAAAAAAAAAAAAAAAAAAFAAAADwAAAAAAAAAAAAAAAAAAAAPAAAAAQAAACMAAAAjAAAAIwAAAB4AAAAAAAAAZAAAAGQAAAAAAAAAZAAAAGQAAAAVAAAAYAAAAAAAAAAAAAAADwAAACADAAAAAAAAAAAAAAEAAACgMgAAVgcAAKr4//8BAAAAf39/AAEAAABkAAAAAAAAABQAAABAHwAAAAAAACYAAAAAAAAAwOD//wAAAAAmAAAAZAAAABYAAABMAAAAAAAAAAAAAAAEAAAAAAAAAAEAAADu7OEKAAAAACgAAAAoAAAAZAAAAGQAAAAAAAAAzMzMAAAAAABQAAAAUAAAAGQAAABkAAAAAAAAABcAAAAUAAAAAAAAAAAAAAD/fwAA/38AAAAAAAAJAAAABAAAAAAAAAAMAAAAEAAAAAAAAAAAAAAAAAAAAAAAAAAeAAAAaAAAAAAAAAAAAAAAAAAAAAAAAAAAAAAAECcAABAnAAAAAAAAAAAAAAAAAAAAAAAAAAAAAAAAAAAAAAAAAAAAABQAAAAAAAAAwMD/AAAAAABkAAAAMgAAAAAAAABkAAAAAAAAAH9/fwAKAAAAHwAAAFQAAAD///8AAAAAAQAAAAAAAAAAAAAAAAAAAAAAAAAAAAAAAAAAAAAAAAAAAAAAAH9/fwAAAAADzMzMAMDA/wB/f38AAAAAAAAAAAAAAAAAAAAAAAAAAAAhAAAAGAAAABQAAAA1FQAAXioAANwoAACTLQAAEAAAACYAAAAIAAAAPS8AAAAAAAA="/>
+                <pr:smNativeData xmlns="" xmlns:p14="http://schemas.microsoft.com/office/powerpoint/2010/main" xmlns:pr="smNativeData" val="SMDATA_13_47fkXxMAAAAlAAAAZAAAAA0AAAAAAAAAAAAAAAAAAAAAAAAAAAAAAAAAAAAAAAAAAAEAAABQAAAAAAAAAAAA4D8AAAAAAADgPwAAAAAAAOA/AAAAAAAA4D8AAAAAAADgPwAAAAAAAOA/AAAAAAAA4D8AAAAAAADgPwAAAAAAAOA/AAAAAAAA4D8CAAAAjAAAAAAAAAAAAAAA////AP///wgAAAAAAAAAAAAAAAAAAAAAAAAAAAAAAAAAAAAAeAAAAAEAAABAAAAAAAAAAAAAAABaAAAAAAAAAAAAAAAAAAAAAAAAAAAAAAAAAAAAAAAAAAAAAAAAAAAAAAAAAAAAAAAAAAAAAAAAAAAAAAAAAAAAAAAAAAAAAAAAAAAAFAAAADwAAAAAAAAAAAAAAAAAAAAPAAAAAQAAACMAAAAjAAAAIwAAAB4AAAAAAAAAZAAAAGQAAAAAAAAAZAAAAGQAAAAVAAAAYAAAAAAAAAAAAAAADwAAACADAAAAAAAAAAAAAAEAAACgMgAAVgcAAKr4//8BAAAAf39/AAEAAABkAAAAAAAAABQAAABAHwAAAAAAACYAAAAAAAAAwOD//wAAAAAmAAAAZAAAABYAAABMAAAAAAAAAAAAAAAEAAAAAAAAAAEAAADu7OEKAAAAACgAAAAoAAAAZAAAAGQAAAAAAAAAzMzMAAAAAABQAAAAUAAAAGQAAABkAAAAAAAAABcAAAAUAAAAAAAAAAAAAAD/fwAA/38AAAAAAAAJAAAABAAAAAAAAAAMAAAAEAAAAAAAAAAAAAAAAAAAAAAAAAAeAAAAaAAAAAAAAAAAAAAAAAAAAAAAAAAAAAAAECcAABAnAAAAAAAAAAAAAAAAAAAAAAAAAAAAAAAAAAAAAAAAAAAAABQAAAAAAAAAwMD/AAAAAABkAAAAMgAAAAAAAABkAAAAAAAAAH9/fwAKAAAAHwAAAFQAAAD///8AAAAAAQAAAAAAAAAAAAAAAAAAAAAAAAAAAAAAAAAAAAAAAAAAAAAAAH9/fwAAAAADzMzMAMDA/wB/f38AAAAAAAAAAAAAAAAAAAAAAAAAAAAhAAAAGAAAABQAAAA1FQAAXioAANwoAACTLQAAEAAAACYAAAAIAAAAPS8AAAAAAAA="/>
               </a:ext>
             </a:extLst>
           </p:cNvSpPr>
@@ -5740,12 +5750,10 @@
           </a:bodyPr>
           <a:lstStyle/>
           <a:p>
-            <a:pPr/>
             <a:r>
               <a:rPr lang="en-us" sz="1400"/>
               <a:t>&lt;页脚&gt;</a:t>
             </a:r>
-            <a:endParaRPr lang="en-us" sz="1400"/>
           </a:p>
         </p:txBody>
       </p:sp>
@@ -5756,7 +5764,7 @@
             <a:spLocks noGrp="1" noChangeArrowheads="1"/>
             <a:extLst>
               <a:ext uri="smNativeData">
-                <pr:smNativeData xmlns:pr="smNativeData" val="SMDATA_13_47fkXxMAAAAlAAAAZAAAAA0AAAAAAAAAAAAAAAAAAAAAAAAAAAAAAAAAAAAAAAAAAAEAAABQAAAAAAAAAAAA4D8AAAAAAADgPwAAAAAAAOA/AAAAAAAA4D8AAAAAAADgPwAAAAAAAOA/AAAAAAAA4D8AAAAAAADgPwAAAAAAAOA/AAAAAAAA4D8CAAAAjAAAAAAAAAAAAAAA////AP///wgAAAAAAAAAAAAAAAAAAAAAAAAAAAAAAAAAAAAAeAAAAAEAAABAAAAAAAAAAAAAAABaAAAAAAAAAAAAAAAAAAAAAAAAAAAAAAAAAAAAAAAAAAAAAAAAAAAAAAAAAAAAAAAAAAAAAAAAAAAAAAAAAAAAAAAAAAAAAAAAAAAAFAAAADwAAAAAAAAAAAAAAAAAAAAPAAAAAQAAACMAAAAjAAAAIwAAAB4AAAAAAAAAZAAAAGQAAAAAAAAAZAAAAGQAAAAVAAAAYAAAAAAAAAAAAAAADwAAACADAAAAAAAAAAAAAAEAAACgMgAAVgcAAKr4//8BAAAAf39/AAEAAABkAAAAAAAAABQAAABAHwAAAAAAACYAAAAAAAAAwOD//wAAAAAmAAAAZAAAABYAAABMAAAAAAAAAAAAAAAEAAAAAAAAAAEAAADu7OEKAAAAACgAAAAoAAAAZAAAAGQAAAAAAAAAzMzMAAAAAABQAAAAUAAAAGQAAABkAAAAAAAAABcAAAAUAAAAAAAAAAAAAAD/fwAA/38AAAAAAAAJAAAABAAAADSIpDQMAAAAEAAAAAAAAAAAAAAAAAAAAAAAAAAeAAAAaAAAAAAAAAAAAAAAAAAAAAAAAAAAAAAAECcAABAnAAAAAAAAAAAAAAAAAAAAAAAAAAAAAAAAAAAAAAAAAAAAABQAAAAAAAAAwMD/AAAAAABkAAAAMgAAAAAAAABkAAAAAAAAAH9/fwAKAAAAHwAAAFQAAAD///8AAAAAAQAAAAAAAAAAAAAAAAAAAAAAAAAAAAAAAAAAAAAAAAAAAAAAAH9/fwAAAAADzMzMAMDA/wB/f38AAAAAAAAAAAAAAAAAAAAAAAAAAAAhAAAAGAAAABQAAAB2LAAAXioAAOg6AACTLQAAEAAAACYAAAAIAAAAPS8AAAAAAAA="/>
+                <pr:smNativeData xmlns="" xmlns:p14="http://schemas.microsoft.com/office/powerpoint/2010/main" xmlns:pr="smNativeData" val="SMDATA_13_47fkXxMAAAAlAAAAZAAAAA0AAAAAAAAAAAAAAAAAAAAAAAAAAAAAAAAAAAAAAAAAAAEAAABQAAAAAAAAAAAA4D8AAAAAAADgPwAAAAAAAOA/AAAAAAAA4D8AAAAAAADgPwAAAAAAAOA/AAAAAAAA4D8AAAAAAADgPwAAAAAAAOA/AAAAAAAA4D8CAAAAjAAAAAAAAAAAAAAA////AP///wgAAAAAAAAAAAAAAAAAAAAAAAAAAAAAAAAAAAAAeAAAAAEAAABAAAAAAAAAAAAAAABaAAAAAAAAAAAAAAAAAAAAAAAAAAAAAAAAAAAAAAAAAAAAAAAAAAAAAAAAAAAAAAAAAAAAAAAAAAAAAAAAAAAAAAAAAAAAAAAAAAAAFAAAADwAAAAAAAAAAAAAAAAAAAAPAAAAAQAAACMAAAAjAAAAIwAAAB4AAAAAAAAAZAAAAGQAAAAAAAAAZAAAAGQAAAAVAAAAYAAAAAAAAAAAAAAADwAAACADAAAAAAAAAAAAAAEAAACgMgAAVgcAAKr4//8BAAAAf39/AAEAAABkAAAAAAAAABQAAABAHwAAAAAAACYAAAAAAAAAwOD//wAAAAAmAAAAZAAAABYAAABMAAAAAAAAAAAAAAAEAAAAAAAAAAEAAADu7OEKAAAAACgAAAAoAAAAZAAAAGQAAAAAAAAAzMzMAAAAAABQAAAAUAAAAGQAAABkAAAAAAAAABcAAAAUAAAAAAAAAAAAAAD/fwAA/38AAAAAAAAJAAAABAAAADSIpDQMAAAAEAAAAAAAAAAAAAAAAAAAAAAAAAAeAAAAaAAAAAAAAAAAAAAAAAAAAAAAAAAAAAAAECcAABAnAAAAAAAAAAAAAAAAAAAAAAAAAAAAAAAAAAAAAAAAAAAAABQAAAAAAAAAwMD/AAAAAABkAAAAMgAAAAAAAABkAAAAAAAAAH9/fwAKAAAAHwAAAFQAAAD///8AAAAAAQAAAAAAAAAAAAAAAAAAAAAAAAAAAAAAAAAAAAAAAAAAAAAAAH9/fwAAAAADzMzMAMDA/wB/f38AAAAAAAAAAAAAAAAAAAAAAAAAAAAhAAAAGAAAABQAAAB2LAAAXioAAOg6AACTLQAAEAAAACYAAAAIAAAAPS8AAAAAAAA="/>
               </a:ext>
             </a:extLst>
           </p:cNvSpPr>
@@ -5781,10 +5789,9 @@
           </a:bodyPr>
           <a:lstStyle/>
           <a:p>
-            <a:pPr/>
             <a:fld id="{5E91B626-68B3-C440-FD29-9E15F8670BCB}" type="slidenum">
               <a:rPr lang="en-us" sz="1400"/>
-              <a:t/>
+              <a:t>‹#›</a:t>
             </a:fld>
             <a:endParaRPr lang="en-us" sz="1400"/>
           </a:p>
@@ -5794,18 +5801,18 @@
   </p:cSld>
   <p:clrMap bg1="lt1" tx1="dk1" bg2="lt2" tx2="dk2" accent1="accent1" accent2="accent2" accent3="accent3" accent4="accent4" accent5="accent5" accent6="accent6" hlink="hlink" folHlink="folHlink"/>
   <p:sldLayoutIdLst>
-    <p:sldLayoutId id="2147483662" r:id="rId2"/>
-    <p:sldLayoutId id="2147483663" r:id="rId3"/>
-    <p:sldLayoutId id="2147483664" r:id="rId4"/>
-    <p:sldLayoutId id="2147483665" r:id="rId5"/>
-    <p:sldLayoutId id="2147483666" r:id="rId6"/>
-    <p:sldLayoutId id="2147483667" r:id="rId7"/>
-    <p:sldLayoutId id="2147483668" r:id="rId8"/>
-    <p:sldLayoutId id="2147483669" r:id="rId9"/>
-    <p:sldLayoutId id="2147483670" r:id="rId10"/>
-    <p:sldLayoutId id="2147483671" r:id="rId11"/>
-    <p:sldLayoutId id="2147483672" r:id="rId12"/>
-    <p:sldLayoutId id="2147483673" r:id="rId13"/>
+    <p:sldLayoutId id="2147483662" r:id="rId1"/>
+    <p:sldLayoutId id="2147483663" r:id="rId2"/>
+    <p:sldLayoutId id="2147483664" r:id="rId3"/>
+    <p:sldLayoutId id="2147483665" r:id="rId4"/>
+    <p:sldLayoutId id="2147483666" r:id="rId5"/>
+    <p:sldLayoutId id="2147483667" r:id="rId6"/>
+    <p:sldLayoutId id="2147483668" r:id="rId7"/>
+    <p:sldLayoutId id="2147483669" r:id="rId8"/>
+    <p:sldLayoutId id="2147483670" r:id="rId9"/>
+    <p:sldLayoutId id="2147483671" r:id="rId10"/>
+    <p:sldLayoutId id="2147483672" r:id="rId11"/>
+    <p:sldLayoutId id="2147483673" r:id="rId12"/>
   </p:sldLayoutIdLst>
   <p:hf sldNum="0" hdr="0" ftr="0" dt="0"/>
   <p:txStyles>
@@ -5848,7 +5855,7 @@
           <a:srgbClr val="000000"/>
         </a:buClr>
         <a:buSzPts val="1440"/>
-        <a:buFont typeface="Wingdings" pitchFamily="0" charset="0"/>
+        <a:buFont typeface="Wingdings" charset="0"/>
         <a:buChar char=""/>
         <a:tabLst/>
         <a:defRPr lang="zh-cn" sz="3200" b="0" i="0" u="none" strike="noStrike" kern="1" spc="0" baseline="0">
@@ -5902,7 +5909,7 @@
           <a:srgbClr val="000000"/>
         </a:buClr>
         <a:buSzPts val="1080"/>
-        <a:buFont typeface="Wingdings" pitchFamily="0" charset="0"/>
+        <a:buFont typeface="Wingdings" charset="0"/>
         <a:buChar char=""/>
         <a:tabLst/>
         <a:defRPr lang="zh-cn" sz="2400" b="0" i="0" u="none" strike="noStrike" kern="1" spc="0" baseline="0">
@@ -5956,7 +5963,7 @@
           <a:srgbClr val="000000"/>
         </a:buClr>
         <a:buSzPts val="900"/>
-        <a:buFont typeface="Wingdings" pitchFamily="0" charset="0"/>
+        <a:buFont typeface="Wingdings" charset="0"/>
         <a:buChar char=""/>
         <a:tabLst/>
         <a:defRPr lang="zh-cn" sz="2000" b="0" i="0" u="none" strike="noStrike" kern="1" spc="0" baseline="0">
@@ -5983,7 +5990,7 @@
           <a:srgbClr val="000000"/>
         </a:buClr>
         <a:buSzPts val="900"/>
-        <a:buFont typeface="Wingdings" pitchFamily="0" charset="0"/>
+        <a:buFont typeface="Wingdings" charset="0"/>
         <a:buChar char=""/>
         <a:tabLst/>
         <a:defRPr lang="zh-cn" sz="2000" b="0" i="0" u="none" strike="noStrike" kern="1" spc="0" baseline="0">
@@ -6010,7 +6017,7 @@
           <a:srgbClr val="000000"/>
         </a:buClr>
         <a:buSzPts val="900"/>
-        <a:buFont typeface="Wingdings" pitchFamily="0" charset="0"/>
+        <a:buFont typeface="Wingdings" charset="0"/>
         <a:buChar char=""/>
         <a:tabLst/>
         <a:defRPr lang="zh-cn" sz="2000" b="0" i="0" u="none" strike="noStrike" kern="1" spc="0" baseline="0">
@@ -6279,7 +6286,7 @@
 </file>
 
 <file path=ppt/slides/slide1.xml><?xml version="1.0" encoding="utf-8"?>
-<p:sld xmlns:p="http://schemas.openxmlformats.org/presentationml/2006/main" xmlns:p14="http://schemas.microsoft.com/office/powerpoint/2010/main" xmlns:r="http://schemas.openxmlformats.org/officeDocument/2006/relationships" xmlns:a="http://schemas.openxmlformats.org/drawingml/2006/main">
+<p:sld xmlns:a="http://schemas.openxmlformats.org/drawingml/2006/main" xmlns:r="http://schemas.openxmlformats.org/officeDocument/2006/relationships" xmlns:p="http://schemas.openxmlformats.org/presentationml/2006/main">
   <p:cSld>
     <p:spTree>
       <p:nvGrpSpPr>
@@ -6301,7 +6308,7 @@
           <p:cNvSpPr>
             <a:extLst>
               <a:ext uri="smNativeData">
-                <pr:smNativeData xmlns:pr="smNativeData" val="SMDATA_13_47fkXxMAAAAlAAAAZAAAAA0AAAAAAAAAAAAAAAAAAAAAAAAAAAAAAAABAAAAAAAAAAEAAABQAAAAAAAAAAAA4D8AAAAAAADgPwAAAAAAAOA/AAAAAAAA4D8AAAAAAADgPwAAAAAAAOA/AAAAAAAA4D8AAAAAAADgPwAAAAAAAOA/AAAAAAAA4D8CAAAAjAAAAAAAAAAAAAAAT4G9DP///wgAAAAAAAAAAAAAAAAAAAAAAAAAAAAAAAAAAAAAZAAAAAEAAABAAAAAAAAAAAAAAAAAAAAAAAAAAAAAAAAAAAAAAAAAAAAAAAAAAAAAAAAAAAAAAAAAAAAAAAAAAAAAAAAAAAAAAAAAAAAAAAAAAAAAAAAAAAAAAAAAAAAAFAAAADwAAAAAAAAAAAAAAAAAAAkUAAAAAQAAABQAAAAUAAAAFAAAAAEAAAAAAAAAZAAAAGQAAAAAAAAAZAAAAGQAAAAVAAAAYAAAAAAAAAAAAAAADwAAACADAAAAAAAAAAAAAAEAAACgMgAAVgcAAKr4//8BAAAAf39/AAEAAABkAAAAAAAAABQAAABAHwAAAAAAACYAAAAAAAAAwOD//wAAAAAmAAAAZAAAABYAAABMAAAAAAAAAAAAAAAEAAAAAAAAAAEAAADu7OEKAAAAACgAAAAoAAAAZAAAAGQAAAAAAAAAzMzMAAAAAABQAAAAUAAAAGQAAABkAAAAAAAAABcAAAAUAAAAAAAAAAAAAAD/fwAA/38AAAAAAAAJAAAABAAAAAnyt1sMAAAAEAAAAAAAAAAAAAAAAAAAAAAAAAAeAAAAaAAAAAAAAAAAAAAAAAAAAAAAAAAAAAAAECcAABAnAAAAAAAAAAAAAAAAAAAAAAAAAAAAAAAAAAAAAAAAAAAAABQAAAAAAAAAwMD/AAAAAABkAAAAMgAAAAAAAABkAAAAAAAAAH9/fwAKAAAAHwAAAFQAAABPgb0F////AQAAAAAAAAAAAAAAAAAAAAAAAAAAAAAAAAAAAAAAAAAAAAAAAn9/fwDu7OEDzMzMAMDA/wB/f38AAAAAAAAAAAAAAAAAAAAAAAAAAAAhAAAAGAAAABQAAAAaAwAApQYAAOg6AABGEQAAAAAAACYAAAAIAAAA//////////8="/>
+                <pr:smNativeData xmlns="" xmlns:p14="http://schemas.microsoft.com/office/powerpoint/2010/main" xmlns:pr="smNativeData" val="SMDATA_13_47fkXxMAAAAlAAAAZAAAAA0AAAAAAAAAAAAAAAAAAAAAAAAAAAAAAAABAAAAAAAAAAEAAABQAAAAAAAAAAAA4D8AAAAAAADgPwAAAAAAAOA/AAAAAAAA4D8AAAAAAADgPwAAAAAAAOA/AAAAAAAA4D8AAAAAAADgPwAAAAAAAOA/AAAAAAAA4D8CAAAAjAAAAAAAAAAAAAAAT4G9DP///wgAAAAAAAAAAAAAAAAAAAAAAAAAAAAAAAAAAAAAZAAAAAEAAABAAAAAAAAAAAAAAAAAAAAAAAAAAAAAAAAAAAAAAAAAAAAAAAAAAAAAAAAAAAAAAAAAAAAAAAAAAAAAAAAAAAAAAAAAAAAAAAAAAAAAAAAAAAAAAAAAAAAAFAAAADwAAAAAAAAAAAAAAAAAAAkUAAAAAQAAABQAAAAUAAAAFAAAAAEAAAAAAAAAZAAAAGQAAAAAAAAAZAAAAGQAAAAVAAAAYAAAAAAAAAAAAAAADwAAACADAAAAAAAAAAAAAAEAAACgMgAAVgcAAKr4//8BAAAAf39/AAEAAABkAAAAAAAAABQAAABAHwAAAAAAACYAAAAAAAAAwOD//wAAAAAmAAAAZAAAABYAAABMAAAAAAAAAAAAAAAEAAAAAAAAAAEAAADu7OEKAAAAACgAAAAoAAAAZAAAAGQAAAAAAAAAzMzMAAAAAABQAAAAUAAAAGQAAABkAAAAAAAAABcAAAAUAAAAAAAAAAAAAAD/fwAA/38AAAAAAAAJAAAABAAAAAnyt1sMAAAAEAAAAAAAAAAAAAAAAAAAAAAAAAAeAAAAaAAAAAAAAAAAAAAAAAAAAAAAAAAAAAAAECcAABAnAAAAAAAAAAAAAAAAAAAAAAAAAAAAAAAAAAAAAAAAAAAAABQAAAAAAAAAwMD/AAAAAABkAAAAMgAAAAAAAABkAAAAAAAAAH9/fwAKAAAAHwAAAFQAAABPgb0F////AQAAAAAAAAAAAAAAAAAAAAAAAAAAAAAAAAAAAAAAAAAAAAAAAn9/fwDu7OEDzMzMAMDA/wB/f38AAAAAAAAAAAAAAAAAAAAAAAAAAAAhAAAAGAAAABQAAAAaAwAApQYAAOg6AABGEQAAAAAAACYAAAAIAAAA//////////8="/>
               </a:ext>
             </a:extLst>
           </p:cNvSpPr>
@@ -6347,11 +6354,6 @@
               </a:rPr>
               <a:t>基于 OpenGL 的 3D 魔方</a:t>
             </a:r>
-            <a:endParaRPr lang="en-us">
-              <a:solidFill>
-                <a:srgbClr val="FFFFFF"/>
-              </a:solidFill>
-            </a:endParaRPr>
           </a:p>
         </p:txBody>
       </p:sp>
@@ -6361,7 +6363,7 @@
           <p:cNvSpPr>
             <a:extLst>
               <a:ext uri="smNativeData">
-                <pr:smNativeData xmlns:pr="smNativeData" val="SMDATA_13_47fkXxMAAAAlAAAAZAAAAA0AAAAAAAAAAAAAAAAAAAAAAAAAAAAAAAABAAAAAAAAAAEAAABQAAAAAAAAAAAA4D8AAAAAAADgPwAAAAAAAOA/AAAAAAAA4D8AAAAAAADgPwAAAAAAAOA/AAAAAAAA4D8AAAAAAADgPwAAAAAAAOA/AAAAAAAA4D8CAAAAjAAAAAAAAAAAAAAAT4G9DP///wgAAAAAAAAAAAAAAAAAAAAAAAAAAAAAAAAAAAAAZAAAAAEAAABAAAAAAAAAAAAAAAAAAAAAAAAAAAAAAAAAAAAAAAAAAAAAAAAAAAAAAAAAAAAAAAAAAAAAAAAAAAAAAAAAAAAAAAAAAAAAAAAAAAAAAAAAAAAAAAAAAAAAFAAAADwAAAAAAAAAAAAAAAAAAAkUAAAAAQAAABQAAAAUAAAAFAAAAAEAAAAAAAAAZAAAAGQAAAAAAAAAZAAAAGQAAAAVAAAAYAAAAAAAAAAAAAAADwAAACADAAAAAAAAAAAAAAEAAACgMgAAVgcAAKr4//8BAAAAf39/AAEAAABkAAAAAAAAABQAAABAHwAAAAAAACYAAAAAAAAAwOD//wAAAAAmAAAAZAAAABYAAABMAAAAAAAAAAAAAAAEAAAAAAAAAAEAAADu7OEKAAAAACgAAAAoAAAAZAAAAGQAAAAAAAAAzMzMAAAAAABQAAAAUAAAAGQAAABkAAAAAAAAABcAAAAUAAAAAAAAAAAAAAD/fwAA/38AAAAAAAAJAAAABAAAABJytC4MAAAAEAAAAAAAAAAAAAAAAAAAAAAAAAAeAAAAaAAAAAAAAAAAAAAAAAAAAAAAAAAAAAAAECcAABAnAAAAAAAAAAAAAAAAAAAAAAAAAAAAAAAAAAAAAAAAAAAAABQAAAAAAAAAwMD/AAAAAABkAAAAMgAAAAAAAABkAAAAAAAAAH9/fwAKAAAAHwAAAFQAAABPgb0F////AQAAAAAAAAAAAAAAAAAAAAAAAAAAAAAAAAAAAAAAAAAAAAAAAn9/fwDu7OEDzMzMAMDA/wB/f38AAAAAAAAAAAAAAAAAAAAAAAAAAAAhAAAAGAAAABQAAAB9/v//5A8AAEs2AAB7JgAAAAAAACYAAAAIAAAA//////////8="/>
+                <pr:smNativeData xmlns="" xmlns:p14="http://schemas.microsoft.com/office/powerpoint/2010/main" xmlns:pr="smNativeData" val="SMDATA_13_47fkXxMAAAAlAAAAZAAAAA0AAAAAAAAAAAAAAAAAAAAAAAAAAAAAAAABAAAAAAAAAAEAAABQAAAAAAAAAAAA4D8AAAAAAADgPwAAAAAAAOA/AAAAAAAA4D8AAAAAAADgPwAAAAAAAOA/AAAAAAAA4D8AAAAAAADgPwAAAAAAAOA/AAAAAAAA4D8CAAAAjAAAAAAAAAAAAAAAT4G9DP///wgAAAAAAAAAAAAAAAAAAAAAAAAAAAAAAAAAAAAAZAAAAAEAAABAAAAAAAAAAAAAAAAAAAAAAAAAAAAAAAAAAAAAAAAAAAAAAAAAAAAAAAAAAAAAAAAAAAAAAAAAAAAAAAAAAAAAAAAAAAAAAAAAAAAAAAAAAAAAAAAAAAAAFAAAADwAAAAAAAAAAAAAAAAAAAkUAAAAAQAAABQAAAAUAAAAFAAAAAEAAAAAAAAAZAAAAGQAAAAAAAAAZAAAAGQAAAAVAAAAYAAAAAAAAAAAAAAADwAAACADAAAAAAAAAAAAAAEAAACgMgAAVgcAAKr4//8BAAAAf39/AAEAAABkAAAAAAAAABQAAABAHwAAAAAAACYAAAAAAAAAwOD//wAAAAAmAAAAZAAAABYAAABMAAAAAAAAAAAAAAAEAAAAAAAAAAEAAADu7OEKAAAAACgAAAAoAAAAZAAAAGQAAAAAAAAAzMzMAAAAAABQAAAAUAAAAGQAAABkAAAAAAAAABcAAAAUAAAAAAAAAAAAAAD/fwAA/38AAAAAAAAJAAAABAAAABJytC4MAAAAEAAAAAAAAAAAAAAAAAAAAAAAAAAeAAAAaAAAAAAAAAAAAAAAAAAAAAAAAAAAAAAAECcAABAnAAAAAAAAAAAAAAAAAAAAAAAAAAAAAAAAAAAAAAAAAAAAABQAAAAAAAAAwMD/AAAAAABkAAAAMgAAAAAAAABkAAAAAAAAAH9/fwAKAAAAHwAAAFQAAABPgb0F////AQAAAAAAAAAAAAAAAAAAAAAAAAAAAAAAAAAAAAAAAAAAAAAAAn9/fwDu7OEDzMzMAMDA/wB/f38AAAAAAAAAAAAAAAAAAAAAAAAAAAAhAAAAGAAAABQAAAB9/v//5A8AAEs2AAB7JgAAAAAAACYAAAAIAAAA//////////8="/>
               </a:ext>
             </a:extLst>
           </p:cNvSpPr>
@@ -6400,14 +6402,30 @@
               </a:defRPr>
             </a:pPr>
             <a:r>
-              <a:rPr lang="en-us" sz="3200">
+              <a:rPr lang="en-us" sz="3200" dirty="0">
                 <a:solidFill>
                   <a:srgbClr val="FFFFFF"/>
                 </a:solidFill>
               </a:rPr>
-              <a:t>—— 课程设计报告</a:t>
-            </a:r>
-            <a:endParaRPr lang="en-us" sz="3200">
+              <a:t>—— </a:t>
+            </a:r>
+            <a:r>
+              <a:rPr lang="en-us" sz="3200" dirty="0" err="1">
+                <a:solidFill>
+                  <a:srgbClr val="FFFFFF"/>
+                </a:solidFill>
+              </a:rPr>
+              <a:t>课程设计</a:t>
+            </a:r>
+            <a:r>
+              <a:rPr lang="zh-Hans-CN" altLang="en-US" sz="3200" dirty="0">
+                <a:solidFill>
+                  <a:srgbClr val="FFFFFF"/>
+                </a:solidFill>
+              </a:rPr>
+              <a:t>答辩</a:t>
+            </a:r>
+            <a:endParaRPr lang="en-us" sz="3200" dirty="0">
               <a:solidFill>
                 <a:srgbClr val="FFFFFF"/>
               </a:solidFill>
@@ -6431,6 +6449,11 @@
                 <a:cs typeface="Noto Sans CJK SC Thin" pitchFamily="1" charset="0"/>
               </a:defRPr>
             </a:pPr>
+            <a:endParaRPr lang="en-us" sz="3200" dirty="0">
+              <a:solidFill>
+                <a:srgbClr val="FFFFFF"/>
+              </a:solidFill>
+            </a:endParaRPr>
           </a:p>
           <a:p>
             <a:pPr algn="r">
@@ -6451,8 +6474,78 @@
               </a:defRPr>
             </a:pPr>
             <a:r>
-              <a:t>组员：刘思辰、王鹏凯</a:t>
-            </a:r>
+              <a:rPr dirty="0"/>
+              <a:t>组</a:t>
+            </a:r>
+            <a:r>
+              <a:rPr lang="zh-Hans-CN" altLang="en-US" dirty="0"/>
+              <a:t>长</a:t>
+            </a:r>
+            <a:r>
+              <a:rPr dirty="0"/>
+              <a:t>：</a:t>
+            </a:r>
+            <a:r>
+              <a:rPr lang="zh-Hans-CN" altLang="en-US" dirty="0"/>
+              <a:t>光电</a:t>
+            </a:r>
+            <a:r>
+              <a:rPr lang="LID4096" dirty="0"/>
+              <a:t>2015</a:t>
+            </a:r>
+            <a:r>
+              <a:rPr lang="zh-Hans-CN" altLang="en-US" dirty="0"/>
+              <a:t>班</a:t>
+            </a:r>
+            <a:r>
+              <a:rPr lang="zh-CN" altLang="en-US" dirty="0"/>
+              <a:t> </a:t>
+            </a:r>
+            <a:r>
+              <a:rPr dirty="0" err="1"/>
+              <a:t>刘思辰</a:t>
+            </a:r>
+            <a:endParaRPr lang="en-US" dirty="0"/>
+          </a:p>
+          <a:p>
+            <a:pPr algn="r">
+              <a:defRPr lang="en-us" sz="3200">
+                <a:solidFill>
+                  <a:srgbClr val="FFFFFF"/>
+                </a:solidFill>
+                <a:effectLst>
+                  <a:outerShdw dist="63500" dir="3600000" algn="tl" rotWithShape="0">
+                    <a:srgbClr val="000000">
+                      <a:alpha val="40000"/>
+                    </a:srgbClr>
+                  </a:outerShdw>
+                </a:effectLst>
+                <a:latin typeface="Noto Sans CJK SC Thin" pitchFamily="1" charset="0"/>
+                <a:ea typeface="Noto Sans CJK SC Thin" pitchFamily="1" charset="0"/>
+                <a:cs typeface="Noto Sans CJK SC Thin" pitchFamily="1" charset="0"/>
+              </a:defRPr>
+            </a:pPr>
+            <a:r>
+              <a:rPr lang="zh-Hans-CN" altLang="en-US" dirty="0"/>
+              <a:t>组员：光电</a:t>
+            </a:r>
+            <a:r>
+              <a:rPr lang="LID4096" altLang="zh-CN" dirty="0"/>
+              <a:t>2015</a:t>
+            </a:r>
+            <a:r>
+              <a:rPr lang="zh-Hans-CN" altLang="en-US" dirty="0"/>
+              <a:t>班</a:t>
+            </a:r>
+            <a:r>
+              <a:rPr lang="zh-CN" altLang="en-US" dirty="0"/>
+              <a:t> </a:t>
+            </a:r>
+            <a:r>
+              <a:rPr dirty="0" err="1"/>
+              <a:t>王鹏凯</a:t>
+            </a:r>
+            <a:endParaRPr dirty="0"/>
           </a:p>
         </p:txBody>
       </p:sp>
@@ -6461,18 +6554,11 @@
   <p:clrMapOvr>
     <a:masterClrMapping/>
   </p:clrMapOvr>
-  <p:timing>
-    <p:tnLst>
-      <p:par>
-        <p:cTn id="1" dur="indefinite" restart="never" nodeType="tmRoot"/>
-      </p:par>
-    </p:tnLst>
-  </p:timing>
 </p:sld>
 </file>
 
-<file path=ppt/slides/slide2.xml><?xml version="1.0" encoding="utf-8"?>
-<p:sld xmlns:p="http://schemas.openxmlformats.org/presentationml/2006/main" xmlns:p14="http://schemas.microsoft.com/office/powerpoint/2010/main" xmlns:r="http://schemas.openxmlformats.org/officeDocument/2006/relationships" xmlns:a="http://schemas.openxmlformats.org/drawingml/2006/main">
+<file path=ppt/slides/slide10.xml><?xml version="1.0" encoding="utf-8"?>
+<p:sld xmlns:a="http://schemas.openxmlformats.org/drawingml/2006/main" xmlns:r="http://schemas.openxmlformats.org/officeDocument/2006/relationships" xmlns:p="http://schemas.openxmlformats.org/presentationml/2006/main">
   <p:cSld>
     <p:spTree>
       <p:nvGrpSpPr>
@@ -6494,7 +6580,7 @@
           <p:cNvSpPr>
             <a:extLst>
               <a:ext uri="smNativeData">
-                <pr:smNativeData xmlns:pr="smNativeData" val="SMDATA_13_47fkXxMAAAAlAAAAZAAAAA0AAAAAAAAAAAAAAAAAAAAAAAAAAAAAAAABAAAAAAAAAAEAAABQAAAAAAAAAAAA4D8AAAAAAADgPwAAAAAAAOA/AAAAAAAA4D8AAAAAAADgPwAAAAAAAOA/AAAAAAAA4D8AAAAAAADgPwAAAAAAAOA/AAAAAAAA4D8CAAAAjAAAAAAAAAAAAAAAT4G9DP///wgAAAAAAAAAAAAAAAAAAAAAAAAAAAAAAAAAAAAAZAAAAAEAAABAAAAAAAAAAAAAAAAAAAAAAAAAAAAAAAAAAAAAAAAAAAAAAAAAAAAAAAAAAAAAAAAAAAAAAAAAAAAAAAAAAAAAAAAAAAAAAAAAAAAAAAAAAAAAAAAAAAAAFAAAADwAAAAAAAAAAAAAAAAAAAkUAAAAAQAAABQAAAAUAAAAFAAAAAEAAAAAAAAAZAAAAGQAAAAAAAAAZAAAAGQAAAAVAAAAYAAAAAAAAAAAAAAADwAAACADAAAAAAAAAAAAAAEAAACgMgAAVgcAAKr4//8BAAAAf39/AAEAAABkAAAAAAAAABQAAABAHwAAAAAAACYAAAAAAAAAwOD//wAAAAAmAAAAZAAAABYAAABMAAAAAAAAAAAAAAAEAAAAAAAAAAEAAADu7OEKAAAAACgAAAAoAAAAZAAAAGQAAAAAAAAAzMzMAAAAAABQAAAAUAAAAGQAAABkAAAAAAAAABcAAAAUAAAAAAAAAAAAAAD/fwAA/38AAAAAAAAJAAAABAAAAJoRAAAMAAAAEAAAAAAAAAAAAAAAAAAAAAAAAAAeAAAAaAAAAAAAAAAAAAAAAAAAAAAAAAAAAAAAECcAABAnAAAAAAAAAAAAAAAAAAAAAAAAAAAAAAAAAAAAAAAAAAAAABQAAAAAAAAAwMD/AAAAAABkAAAAMgAAAAAAAABkAAAAAAAAAH9/fwAKAAAAHwAAAFQAAABPgb0F////AQAAAAAAAAAAAAAAAAAAAAAAAAAAAAAAAAAAAAAAAAAAAAAAAn9/fwDu7OEDzMzMAMDA/wB/f38AAAAAAAAAAAAAAAAAAAAAAAAAAAAhAAAAGAAAABQAAAAaAwAA2wEAAOg6AACeCQAAAAAAACYAAAAIAAAA//////////8="/>
+                <pr:smNativeData xmlns="" xmlns:p14="http://schemas.microsoft.com/office/powerpoint/2010/main" xmlns:pr="smNativeData" val="SMDATA_13_47fkXxMAAAAlAAAAZAAAAA0AAAAAAAAAAAAAAAAAAAAAAAAAAAAAAAABAAAAAAAAAAEAAABQAAAAAAAAAAAA4D8AAAAAAADgPwAAAAAAAOA/AAAAAAAA4D8AAAAAAADgPwAAAAAAAOA/AAAAAAAA4D8AAAAAAADgPwAAAAAAAOA/AAAAAAAA4D8CAAAAjAAAAAAAAAAAAAAAT4G9DP///wgAAAAAAAAAAAAAAAAAAAAAAAAAAAAAAAAAAAAAZAAAAAEAAABAAAAAAAAAAAAAAAAAAAAAAAAAAAAAAAAAAAAAAAAAAAAAAAAAAAAAAAAAAAAAAAAAAAAAAAAAAAAAAAAAAAAAAAAAAAAAAAAAAAAAAAAAAAAAAAAAAAAAFAAAADwAAAAAAAAAAAAAAAAAAAkUAAAAAQAAABQAAAAUAAAAFAAAAAEAAAAAAAAAZAAAAGQAAAAAAAAAZAAAAGQAAAAVAAAAYAAAAAAAAAAAAAAADwAAACADAAAAAAAAAAAAAAEAAACgMgAAVgcAAKr4//8BAAAAf39/AAEAAABkAAAAAAAAABQAAABAHwAAAAAAACYAAAAAAAAAwOD//wAAAAAmAAAAZAAAABYAAABMAAAAAAAAAAAAAAAEAAAAAAAAAAEAAADu7OEKAAAAACgAAAAoAAAAZAAAAGQAAAAAAAAAzMzMAAAAAABQAAAAUAAAAGQAAABkAAAAAAAAABcAAAAUAAAAAAAAAAAAAAD/fwAA/38AAAAAAAAJAAAABAAAAIQWAAAMAAAAEAAAAAAAAAAAAAAAAAAAAAAAAAAeAAAAaAAAAAAAAAAAAAAAAAAAAAAAAAAAAAAAECcAABAnAAAAAAAAAAAAAAAAAAAAAAAAAAAAAAAAAAAAAAAAAAAAABQAAAAAAAAAwMD/AAAAAABkAAAAMgAAAAAAAABkAAAAAAAAAH9/fwAKAAAAHwAAAFQAAABPgb0F////AQAAAAAAAAAAAAAAAAAAAAAAAAAAAAAAAAAAAAAAAAAAAAAAAn9/fwDu7OEDzMzMAMDA/wB/f38AAAAAAAAAAAAAAAAAAAAAAAAAAAAhAAAAGAAAABQAAACeDgAAfRMAAOg6AABBGwAAEAAAACYAAAAIAAAA//////////8="/>
               </a:ext>
             </a:extLst>
           </p:cNvSpPr>
@@ -6502,8 +6588,8 @@
         </p:nvSpPr>
         <p:spPr>
           <a:xfrm>
-            <a:off x="504190" y="301625"/>
-            <a:ext cx="9071610" cy="1261745"/>
+            <a:off x="2376170" y="3168015"/>
+            <a:ext cx="7199630" cy="1262380"/>
           </a:xfrm>
           <a:prstGeom prst="rect">
             <a:avLst/>
@@ -6518,41 +6604,45 @@
           <a:bodyPr vert="horz" wrap="square" lIns="0" tIns="0" rIns="0" bIns="0" numCol="1" spcCol="215900" anchor="ctr"/>
           <a:lstStyle/>
           <a:p>
-            <a:pPr algn="ctr">
-              <a:defRPr>
-                <a:effectLst>
-                  <a:outerShdw dist="63500" dir="3600000" algn="tl" rotWithShape="0">
-                    <a:srgbClr val="000000">
-                      <a:alpha val="40000"/>
-                    </a:srgbClr>
-                  </a:outerShdw>
-                </a:effectLst>
-              </a:defRPr>
-            </a:pPr>
-            <a:r>
-              <a:rPr lang="en-us" sz="4400"/>
-              <a:t>需	求	分	析</a:t>
-            </a:r>
-            <a:endParaRPr lang="en-us" sz="4400"/>
-          </a:p>
-        </p:txBody>
-      </p:sp>
-      <p:sp>
-        <p:nvSpPr>
-          <p:cNvPr id="3" name="TextShape 2"/>
-          <p:cNvSpPr>
-            <a:extLst>
-              <a:ext uri="smNativeData">
-                <pr:smNativeData xmlns:pr="smNativeData" val="SMDATA_13_47fkXxMAAAAlAAAAZAAAAA0AAAAAAAAAAAAAAAAAAAAAAAAAAAAAAAAAAAAAAAAAAAEAAABQAAAAAAAAAAAA4D8AAAAAAADgPwAAAAAAAOA/AAAAAAAA4D8AAAAAAADgPwAAAAAAAOA/AAAAAAAA4D8AAAAAAADgPwAAAAAAAOA/AAAAAAAA4D8CAAAAjAAAAAAAAAAAAAAAT4G9DP///wgAAAAAAAAAAAAAAAAAAAAAAAAAAAAAAAAAAAAAZAAAAAEAAABAAAAAAAAAAAAAAAAAAAAAAAAAAAAAAAAAAAAAAAAAAAAAAAAAAAAAAAAAAAAAAAAAAAAAAAAAAAAAAAAAAAAAAAAAAAAAAAAAAAAAAAAAAAAAAAAAAAAAFAAAADwAAAAAAAAAAAAAAAAAAAkUAAAAAQAAABQAAAAUAAAAFAAAAAEAAAAAAAAAZAAAAGQAAAAAAAAAZAAAAGQAAAAVAAAAYAAAAAAAAAAAAAAADwAAACADAAAAAAAAAAAAAAEAAACgMgAAVgcAAKr4//8BAAAAf39/AAEAAABkAAAAAAAAABQAAABAHwAAAAAAACYAAAAAAAAAwOD//wAAAAAmAAAAZAAAABYAAABMAAAAAAAAAAAAAAAEAAAAAAAAAAEAAADu7OEKAAAAACgAAAAoAAAAZAAAAGQAAAAAAAAAzMzMAAAAAABQAAAAUAAAAGQAAABkAAAAAAAAABcAAAAUAAAAAAAAAAAAAAD/fwAA/38AAAAAAAAJAAAABAAAAFwHAAAMAAAAEAAAAAAAAAAAAAAAAAAAAAAAAAAeAAAAaAAAAAAAAAAAAAAAAAAAAAAAAAAAAAAAECcAABAnAAAAAAAAAAAAAAAAAAAAAAAAAAAAAAAAAAAAAAAAAAAAABQAAAAAAAAAwMD/AAAAAABkAAAAMgAAAAAAAABkAAAAAAAAAH9/fwAKAAAAHwAAAFQAAABPgb0F////AQAAAAAAAAAAAAAAAAAAAAAAAAAAAAAAAAAAAAAAAAAAAAAAAn9/fwDu7OEDzMzMAMDA/wB/f38AAAAAAAAAAAAAAAAAAAAAAAAAAAAhAAAAGAAAABQAAAAaAwAA4goAAOg6AADbJQAAAAAAACYAAAAIAAAA//////////8="/>
-              </a:ext>
-            </a:extLst>
-          </p:cNvSpPr>
+            <a:pPr algn="ctr"/>
+            <a:r>
+              <a:rPr lang="zh-Hans-CN" altLang="en-US" sz="6000" b="1" dirty="0">
+                <a:solidFill>
+                  <a:srgbClr val="FFFFFF"/>
+                </a:solidFill>
+              </a:rPr>
+              <a:t>谢谢！</a:t>
+            </a:r>
+            <a:endParaRPr lang="en-US" sz="6000" b="1" dirty="0">
+              <a:solidFill>
+                <a:srgbClr val="FFFFFF"/>
+              </a:solidFill>
+            </a:endParaRPr>
+          </a:p>
+        </p:txBody>
+      </p:sp>
+      <p:pic>
+        <p:nvPicPr>
+          <p:cNvPr id="3" name="图片1"/>
+          <p:cNvPicPr>
+            <a:extLst>
+              <a:ext uri="smNativeData">
+                <pr:smNativeData xmlns="" xmlns:p14="http://schemas.microsoft.com/office/powerpoint/2010/main" xmlns:pr="smNativeData" val="SMDATA_15_47fkXxMAAAAlAAAAEQAAAA0AAAAAkAAAAEgAAACQAAAASAAAAAAAAAAAAAAAAAAAAAEAAABQAAAAAAAAAAAA4D8AAAAAAADgPwAAAAAAAOA/AAAAAAAA4D8AAAAAAADgPwAAAAAAAOA/AAAAAAAA4D8AAAAAAADgPwAAAAAAAOA/AAAAAAAA4D8CAAAAjAAAAAAAAAAAAAAAT4G9DP///wgAAAAAAAAAAAAAAAAAAAAAAAAAAAAAAAAAAAAAZAAAAAEAAABAAAAAAAAAAAAAAAAAAAAAAAAAAAAAAAAAAAAAAAAAAAAAAAAAAAAAAAAAAAAAAAAAAAAAAAAAAAAAAAAAAAAAAAAAAAAAAAAAAAAAAAAAAAAAAAAAAAAAFAAAADwAAAAAAAAAAAAAAAAAAAkUAAAAAQAAABQAAAAUAAAAFAAAAAEAAAAAAAAAZAAAAGQAAAAAAAAAZAAAAGQAAAAVAAAAYAAAAAAAAAAAAAAADwAAACADAAAAAAAAAAAAAAEAAACgMgAAVgcAAKr4//8BAAAAf39/AAEAAABkAAAAAAAAABQAAABAHwAAAAAAACYAAAAAAAAAwOD//wAAAAAmAAAAZAAAABYAAABMAAAAAAAAAAAAAAAEAAAAAAAAAAEAAADu7OEKAAAAACgAAAAoAAAAZAAAAGQAAAAAAAAAzMzMAAAAAABQAAAAUAAAAGQAAABkAAAAAAAAAAcAAAA4AAAAAAAAAAAAAAAAAAAA////AAAAAAAAAAAAAAAAAAAAAAAAAAAAAAAAAAAAAABkAAAAZAAAAAAAAAAjAAAABAAAAGQAAAAXAAAAFAAAAAAAAAAAAAAA/38AAP9/AAAAAAAACQAAAAQAAAAAAAAADAAAABAAAAAAAAAAAAAAAAAAAAAAAAAAHgAAAGgAAAAAAAAAAAAAAAAAAAAAAAAAAAAAABAnAAAQJwAAAAAAAAAAAAAAAAAAAAAAAAAAAAAAAAAAAAAAAAAAAAAUAAAAAAAAAMDA/wAAAAAAZAAAADIAAAAAAAAAZAAAAAAAAAB/f38ACgAAAB8AAABUAAAAT4G9Bf///wEAAAAAAAAAAAAAAAAAAAAAAAAAAAAAAAAAAAAAAAAAAAAAAAJ/f38A7uzhA8zMzADAwP8Af39/AAAAAAAAAAAAAAAAAP///wAAAAAAIQAAABgAAAAUAAAABQUAAEcWAADYDAAACBkAABAAAAAmAAAACAAAAP//////////"/>
+              </a:ext>
+            </a:extLst>
+          </p:cNvPicPr>
           <p:nvPr/>
-        </p:nvSpPr>
-        <p:spPr>
-          <a:xfrm>
-            <a:off x="504190" y="1769110"/>
-            <a:ext cx="9071610" cy="4384675"/>
+        </p:nvPicPr>
+        <p:blipFill>
+          <a:blip r:embed="rId2"/>
+          <a:stretch>
+            <a:fillRect/>
+          </a:stretch>
+        </p:blipFill>
+        <p:spPr>
+          <a:xfrm>
+            <a:off x="1740217" y="6640830"/>
+            <a:ext cx="1271905" cy="447675"/>
           </a:xfrm>
           <a:prstGeom prst="rect">
             <a:avLst/>
@@ -6563,60 +6653,17 @@
           </a:ln>
           <a:effectLst/>
         </p:spPr>
-        <p:txBody>
-          <a:bodyPr vert="horz" wrap="square" lIns="0" tIns="0" rIns="0" bIns="0" numCol="1" spcCol="215900" anchor="t"/>
-          <a:lstStyle/>
-          <a:p>
-            <a:pPr/>
-            <a:r>
-              <a:rPr lang="en-us" sz="3200"/>
-              <a:t>	1. 使用OpenGL绘制3阶魔方</a:t>
-            </a:r>
-            <a:endParaRPr lang="en-us" sz="3200"/>
-          </a:p>
-          <a:p>
-            <a:pPr>
-              <a:defRPr lang="en-us" sz="3200"/>
-            </a:pPr>
-            <a:r>
-              <a:t>	2. 控制魔方各部分定向旋转</a:t>
-            </a:r>
-          </a:p>
-          <a:p>
-            <a:pPr>
-              <a:defRPr lang="en-us" sz="3200"/>
-            </a:pPr>
-            <a:r>
-              <a:t>	3. </a:t>
-            </a:r>
-          </a:p>
-          <a:p>
-            <a:pPr/>
-            <a:r>
-              <a:rPr lang="en-us" sz="3200"/>
-              <a:t>	4. 为魔方加载纹理(Texture)</a:t>
-            </a:r>
-            <a:endParaRPr lang="en-us" sz="3200"/>
-          </a:p>
-        </p:txBody>
-      </p:sp>
+      </p:pic>
     </p:spTree>
   </p:cSld>
   <p:clrMapOvr>
     <a:masterClrMapping/>
   </p:clrMapOvr>
-  <p:timing>
-    <p:tnLst>
-      <p:par>
-        <p:cTn id="1" dur="indefinite" restart="never" nodeType="tmRoot"/>
-      </p:par>
-    </p:tnLst>
-  </p:timing>
 </p:sld>
 </file>
 
-<file path=ppt/slides/slide3.xml><?xml version="1.0" encoding="utf-8"?>
-<p:sld xmlns:p="http://schemas.openxmlformats.org/presentationml/2006/main" xmlns:p14="http://schemas.microsoft.com/office/powerpoint/2010/main" xmlns:r="http://schemas.openxmlformats.org/officeDocument/2006/relationships" xmlns:a="http://schemas.openxmlformats.org/drawingml/2006/main">
+<file path=ppt/slides/slide2.xml><?xml version="1.0" encoding="utf-8"?>
+<p:sld xmlns:a="http://schemas.openxmlformats.org/drawingml/2006/main" xmlns:r="http://schemas.openxmlformats.org/officeDocument/2006/relationships" xmlns:p="http://schemas.openxmlformats.org/presentationml/2006/main">
   <p:cSld>
     <p:spTree>
       <p:nvGrpSpPr>
@@ -6634,81 +6681,313 @@
       </p:grpSpPr>
       <p:sp>
         <p:nvSpPr>
-          <p:cNvPr id="2" name="幻灯片标题1"/>
-          <p:cNvSpPr>
-            <a:spLocks noGrp="1" noChangeArrowheads="1"/>
-            <a:extLst>
-              <a:ext uri="smNativeData">
-                <pr:smNativeData xmlns:pr="smNativeData" val="SMDATA_13_47fkXxMAAAAlAAAAZAAAAA0AAAAAAAAAAAAAAAAAAAAAAAAAAAAAAAABAAAAAAAAAAEAAABQAAAAAAAAAAAA4D8AAAAAAADgPwAAAAAAAOA/AAAAAAAA4D8AAAAAAADgPwAAAAAAAOA/AAAAAAAA4D8AAAAAAADgPwAAAAAAAOA/AAAAAAAA4D8CAAAAjAAAAAAAAAAAAAAAT4G9DP///wgAAAAAAAAAAAAAAAAAAAAAAAAAAAAAAAAAAAAAZAAAAAEAAABAAAAAAAAAAAAAAAAAAAAAAAAAAAAAAAAAAAAAAAAAAAAAAAAAAAAAAAAAAAAAAAAAAAAAAAAAAAAAAAAAAAAAAAAAAAAAAAAAAAAAAAAAAAAAAAAAAAAAFAAAADwAAAAAAAAAAAAAAAAAAAkUAAAAAQAAABQAAAAUAAAAFAAAAAEAAAAAAAAAZAAAAGQAAAAAAAAAZAAAAGQAAAAVAAAAYAAAAAAAAAAAAAAADwAAACADAAAAAAAAAAAAAAEAAACgMgAAVgcAAKr4//8BAAAAf39/AAEAAABkAAAAAAAAABQAAABAHwAAAAAAACYAAAAAAAAAwOD//wAAAAAmAAAAZAAAABYAAABMAAAAAAAAAAAAAAAEAAAAAAAAAAEAAADu7OEKAAAAACgAAAAoAAAAZAAAAGQAAAAAAAAAzMzMAAAAAABQAAAAUAAAAGQAAABkAAAAAAAAABcAAAAUAAAAAAAAAAAAAAD/fwAA/38AAAAAAAAJAAAABAAAAEAaAAAMAAAAEAAAAAAAAAAAAAAAAAAAAAAAAAAeAAAAaAAAAAAAAAAAAAAAAAAAAAAAAAAAAAAAECcAABAnAAAAAAAAAAAAAAAAAAAAAAAAAAAAAAAAAAAAAAAAAAAAABQAAAAAAAAAwMD/AAAAAABkAAAAMgAAAAAAAABkAAAAAAAAAH9/fwAKAAAAHwAAAFQAAABPgb0F////AQAAAAAAAAAAAAAAAAAAAAAAAAAAAAAAAAAAAAAAAAAAAAAAAn9/fwDu7OEDzMzMAMDA/wB/f38AAAAAAAAAAAAAAAAAAAAAAAAAAAAhAAAAGAAAABQAAAAaAwAApQYAAOg6AABGEQAAEAAAACYAAAAIAAAAPCAAAAAAAAA="/>
-              </a:ext>
-            </a:extLst>
-          </p:cNvSpPr>
-          <p:nvPr>
-            <p:ph type="title"/>
-          </p:nvPr>
-        </p:nvSpPr>
-        <p:spPr/>
-        <p:txBody>
-          <a:bodyPr vert="horz" wrap="square" lIns="0" tIns="0" rIns="0" bIns="0" numCol="1" spcCol="215900" anchor="ctr">
-            <a:prstTxWarp prst="textNoShape">
-              <a:avLst/>
-            </a:prstTxWarp>
-          </a:bodyPr>
+          <p:cNvPr id="2" name="TextShape 1"/>
+          <p:cNvSpPr>
+            <a:extLst>
+              <a:ext uri="smNativeData">
+                <pr:smNativeData xmlns:pr="smNativeData" xmlns:p14="http://schemas.microsoft.com/office/powerpoint/2010/main" xmlns="" val="SMDATA_13_47fkXxMAAAAlAAAAZAAAAA0AAAAAAAAAAAAAAAAAAAAAAAAAAAAAAAABAAAAAAAAAAEAAABQAAAAAAAAAAAA4D8AAAAAAADgPwAAAAAAAOA/AAAAAAAA4D8AAAAAAADgPwAAAAAAAOA/AAAAAAAA4D8AAAAAAADgPwAAAAAAAOA/AAAAAAAA4D8CAAAAjAAAAAAAAAAAAAAAT4G9DP///wgAAAAAAAAAAAAAAAAAAAAAAAAAAAAAAAAAAAAAZAAAAAEAAABAAAAAAAAAAAAAAAAAAAAAAAAAAAAAAAAAAAAAAAAAAAAAAAAAAAAAAAAAAAAAAAAAAAAAAAAAAAAAAAAAAAAAAAAAAAAAAAAAAAAAAAAAAAAAAAAAAAAAFAAAADwAAAAAAAAAAAAAAAAAAAkUAAAAAQAAABQAAAAUAAAAFAAAAAEAAAAAAAAAZAAAAGQAAAAAAAAAZAAAAGQAAAAVAAAAYAAAAAAAAAAAAAAADwAAACADAAAAAAAAAAAAAAEAAACgMgAAVgcAAKr4//8BAAAAf39/AAEAAABkAAAAAAAAABQAAABAHwAAAAAAACYAAAAAAAAAwOD//wAAAAAmAAAAZAAAABYAAABMAAAAAAAAAAAAAAAEAAAAAAAAAAEAAADu7OEKAAAAACgAAAAoAAAAZAAAAGQAAAAAAAAAzMzMAAAAAABQAAAAUAAAAGQAAABkAAAAAAAAABcAAAAUAAAAAAAAAAAAAAD/fwAA/38AAAAAAAAJAAAABAAAAJoRAAAMAAAAEAAAAAAAAAAAAAAAAAAAAAAAAAAeAAAAaAAAAAAAAAAAAAAAAAAAAAAAAAAAAAAAECcAABAnAAAAAAAAAAAAAAAAAAAAAAAAAAAAAAAAAAAAAAAAAAAAABQAAAAAAAAAwMD/AAAAAABkAAAAMgAAAAAAAABkAAAAAAAAAH9/fwAKAAAAHwAAAFQAAABPgb0F////AQAAAAAAAAAAAAAAAAAAAAAAAAAAAAAAAAAAAAAAAAAAAAAAAn9/fwDu7OEDzMzMAMDA/wB/f38AAAAAAAAAAAAAAAAAAAAAAAAAAAAhAAAAGAAAABQAAAAaAwAA2wEAAOg6AACeCQAAAAAAACYAAAAIAAAA//////////8="/>
+              </a:ext>
+            </a:extLst>
+          </p:cNvSpPr>
+          <p:nvPr/>
+        </p:nvSpPr>
+        <p:spPr>
+          <a:xfrm>
+            <a:off x="504190" y="301625"/>
+            <a:ext cx="9071610" cy="1261745"/>
+          </a:xfrm>
+          <a:prstGeom prst="rect">
+            <a:avLst/>
+          </a:prstGeom>
+          <a:noFill/>
+          <a:ln>
+            <a:noFill/>
+          </a:ln>
+          <a:effectLst/>
+        </p:spPr>
+        <p:txBody>
+          <a:bodyPr vert="horz" wrap="square" lIns="0" tIns="0" rIns="0" bIns="0" numCol="1" spcCol="215900" anchor="ctr"/>
           <a:lstStyle/>
           <a:p>
-            <a:pPr>
-              <a:defRPr lang="zh-cn"/>
-            </a:pPr>
-          </a:p>
-        </p:txBody>
-      </p:sp>
-      <p:sp>
-        <p:nvSpPr>
-          <p:cNvPr id="3" name="幻灯片文本1"/>
-          <p:cNvSpPr>
-            <a:spLocks noGrp="1" noChangeArrowheads="1"/>
-            <a:extLst>
-              <a:ext uri="smNativeData">
-                <pr:smNativeData xmlns:pr="smNativeData" val="SMDATA_13_47fkXxMAAAAlAAAAZAAAAA0AAAAAAAAAAAAAAAAAAAAAAAAAAAAAAAAAAAAAAAAAAAEAAABQAAAAAAAAAAAA4D8AAAAAAADgPwAAAAAAAOA/AAAAAAAA4D8AAAAAAADgPwAAAAAAAOA/AAAAAAAA4D8AAAAAAADgPwAAAAAAAOA/AAAAAAAA4D8CAAAAjAAAAAAAAAAAAAAAT4G9DP///wgAAAAAAAAAAAAAAAAAAAAAAAAAAAAAAAAAAAAAZAAAAAEAAABAAAAAAAAAAAAAAAAAAAAAAAAAAAAAAAAAAAAAAAAAAAAAAAAAAAAAAAAAAAAAAAAAAAAAAAAAAAAAAAAAAAAAAAAAAAAAAAAAAAAAAAAAAAAAAAAAAAAAFAAAADwAAAAAAAAAAAAAAAAAAAkUAAAAAQAAABQAAAAUAAAAFAAAAAEAAAAAAAAAZAAAAGQAAAAAAAAAZAAAAGQAAAAVAAAAYAAAAAAAAAAAAAAADwAAACADAAAAAAAAAAAAAAEAAACgMgAAVgcAAKr4//8BAAAAf39/AAEAAABkAAAAAAAAABQAAABAHwAAAAAAACYAAAAAAAAAwOD//wAAAAAmAAAAZAAAABYAAABMAAAAAAAAAAAAAAAEAAAAAAAAAAEAAADu7OEKAAAAACgAAAAoAAAAZAAAAGQAAAAAAAAAzMzMAAAAAABQAAAAUAAAAGQAAABkAAAAAAAAABcAAAAUAAAAAAAAAAAAAAD/fwAA/38AAAAAAAAJAAAABAAAAAAAAAAMAAAAEAAAAAAAAAAAAAAAAAAAAAAAAAAeAAAAaAAAAAAAAAAAAAAAAAAAAAAAAAAAAAAAECcAABAnAAAAAAAAAAAAAAAAAAAAAAAAAAAAAAAAAAAAAAAAAAAAABQAAAAAAAAAwMD/AAAAAABkAAAAMgAAAAAAAABkAAAAAAAAAH9/fwAKAAAAHwAAAFQAAABPgb0F////AQAAAAAAAAAAAAAAAAAAAAAAAAAAAAAAAAAAAAAAAAAAAAAAAn9/fwDu7OEDzMzMAMDA/wB/f38AAAAAAAAAAAAAAAAAAAAAAAAAAAAhAAAAGAAAABQAAAAaAwAAfRMAAOg6AAAUKgAAEAAAACYAAAAIAAAAPCAAAAAAAAA="/>
-              </a:ext>
-            </a:extLst>
-          </p:cNvSpPr>
-          <p:nvPr>
-            <p:ph type="body" idx="1"/>
-          </p:nvPr>
-        </p:nvSpPr>
-        <p:spPr/>
-        <p:txBody>
-          <a:bodyPr vert="horz" wrap="square" lIns="0" tIns="0" rIns="0" bIns="0" numCol="1" spcCol="215900" anchor="t">
-            <a:prstTxWarp prst="textNoShape">
-              <a:avLst/>
-            </a:prstTxWarp>
-          </a:bodyPr>
+            <a:pPr algn="ctr">
+              <a:defRPr>
+                <a:effectLst>
+                  <a:outerShdw dist="63500" dir="3600000" algn="tl" rotWithShape="0">
+                    <a:srgbClr val="000000">
+                      <a:alpha val="40000"/>
+                    </a:srgbClr>
+                  </a:outerShdw>
+                </a:effectLst>
+              </a:defRPr>
+            </a:pPr>
+            <a:r>
+              <a:rPr lang="zh-Hans-CN" altLang="en-US" sz="4400" dirty="0"/>
+              <a:t>背</a:t>
+            </a:r>
+            <a:r>
+              <a:rPr lang="en-US" altLang="zh-CN" sz="4400" dirty="0"/>
+              <a:t>	</a:t>
+            </a:r>
+            <a:r>
+              <a:rPr lang="zh-Hans-CN" altLang="en-US" sz="4400" dirty="0"/>
+              <a:t>景</a:t>
+            </a:r>
+            <a:endParaRPr lang="en-us" sz="4400" dirty="0"/>
+          </a:p>
+        </p:txBody>
+      </p:sp>
+      <p:sp>
+        <p:nvSpPr>
+          <p:cNvPr id="3" name="TextShape 2"/>
+          <p:cNvSpPr>
+            <a:extLst>
+              <a:ext uri="smNativeData">
+                <pr:smNativeData xmlns:pr="smNativeData" xmlns:p14="http://schemas.microsoft.com/office/powerpoint/2010/main" xmlns="" val="SMDATA_13_47fkXxMAAAAlAAAAZAAAAA0AAAAAAAAAAAAAAAAAAAAAAAAAAAAAAAAAAAAAAAAAAAEAAABQAAAAAAAAAAAA4D8AAAAAAADgPwAAAAAAAOA/AAAAAAAA4D8AAAAAAADgPwAAAAAAAOA/AAAAAAAA4D8AAAAAAADgPwAAAAAAAOA/AAAAAAAA4D8CAAAAjAAAAAAAAAAAAAAAT4G9DP///wgAAAAAAAAAAAAAAAAAAAAAAAAAAAAAAAAAAAAAZAAAAAEAAABAAAAAAAAAAAAAAAAAAAAAAAAAAAAAAAAAAAAAAAAAAAAAAAAAAAAAAAAAAAAAAAAAAAAAAAAAAAAAAAAAAAAAAAAAAAAAAAAAAAAAAAAAAAAAAAAAAAAAFAAAADwAAAAAAAAAAAAAAAAAAAkUAAAAAQAAABQAAAAUAAAAFAAAAAEAAAAAAAAAZAAAAGQAAAAAAAAAZAAAAGQAAAAVAAAAYAAAAAAAAAAAAAAADwAAACADAAAAAAAAAAAAAAEAAACgMgAAVgcAAKr4//8BAAAAf39/AAEAAABkAAAAAAAAABQAAABAHwAAAAAAACYAAAAAAAAAwOD//wAAAAAmAAAAZAAAABYAAABMAAAAAAAAAAAAAAAEAAAAAAAAAAEAAADu7OEKAAAAACgAAAAoAAAAZAAAAGQAAAAAAAAAzMzMAAAAAABQAAAAUAAAAGQAAABkAAAAAAAAABcAAAAUAAAAAAAAAAAAAAD/fwAA/38AAAAAAAAJAAAABAAAAFwHAAAMAAAAEAAAAAAAAAAAAAAAAAAAAAAAAAAeAAAAaAAAAAAAAAAAAAAAAAAAAAAAAAAAAAAAECcAABAnAAAAAAAAAAAAAAAAAAAAAAAAAAAAAAAAAAAAAAAAAAAAABQAAAAAAAAAwMD/AAAAAABkAAAAMgAAAAAAAABkAAAAAAAAAH9/fwAKAAAAHwAAAFQAAABPgb0F////AQAAAAAAAAAAAAAAAAAAAAAAAAAAAAAAAAAAAAAAAAAAAAAAAn9/fwDu7OEDzMzMAMDA/wB/f38AAAAAAAAAAAAAAAAAAAAAAAAAAAAhAAAAGAAAABQAAAAaAwAA4goAAOg6AADbJQAAAAAAACYAAAAIAAAA//////////8="/>
+              </a:ext>
+            </a:extLst>
+          </p:cNvSpPr>
+          <p:nvPr/>
+        </p:nvSpPr>
+        <p:spPr>
+          <a:xfrm>
+            <a:off x="504190" y="1563370"/>
+            <a:ext cx="9071610" cy="4384675"/>
+          </a:xfrm>
+          <a:prstGeom prst="rect">
+            <a:avLst/>
+          </a:prstGeom>
+          <a:noFill/>
+          <a:ln>
+            <a:noFill/>
+          </a:ln>
+          <a:effectLst/>
+        </p:spPr>
+        <p:txBody>
+          <a:bodyPr vert="horz" wrap="square" lIns="0" tIns="0" rIns="0" bIns="0" numCol="1" spcCol="215900" anchor="t"/>
           <a:lstStyle/>
           <a:p>
-            <a:pPr>
-              <a:defRPr lang="zh-cn"/>
-            </a:pPr>
+            <a:r>
+              <a:rPr lang="en-us" sz="3200" dirty="0"/>
+              <a:t>	</a:t>
+            </a:r>
+            <a:r>
+              <a:rPr lang="zh-CN" altLang="en-US" sz="3200" b="0" i="0" dirty="0">
+                <a:solidFill>
+                  <a:srgbClr val="222222"/>
+                </a:solidFill>
+                <a:effectLst/>
+                <a:latin typeface="Microsoft Yahei" panose="020B0503020204020204" pitchFamily="34" charset="-122"/>
+                <a:ea typeface="Microsoft Yahei" panose="020B0503020204020204" pitchFamily="34" charset="-122"/>
+              </a:rPr>
+              <a:t>早期的</a:t>
+            </a:r>
+            <a:r>
+              <a:rPr lang="en-US" altLang="zh-CN" sz="3200" b="0" i="0" dirty="0">
+                <a:solidFill>
+                  <a:srgbClr val="222222"/>
+                </a:solidFill>
+                <a:effectLst/>
+                <a:latin typeface="Microsoft Yahei" panose="020B0503020204020204" pitchFamily="34" charset="-122"/>
+                <a:ea typeface="Microsoft Yahei" panose="020B0503020204020204" pitchFamily="34" charset="-122"/>
+              </a:rPr>
+              <a:t>OpenGL</a:t>
+            </a:r>
+            <a:r>
+              <a:rPr lang="zh-CN" altLang="en-US" sz="3200" b="0" i="0" dirty="0">
+                <a:solidFill>
+                  <a:srgbClr val="222222"/>
+                </a:solidFill>
+                <a:effectLst/>
+                <a:latin typeface="Microsoft Yahei" panose="020B0503020204020204" pitchFamily="34" charset="-122"/>
+                <a:ea typeface="Microsoft Yahei" panose="020B0503020204020204" pitchFamily="34" charset="-122"/>
+              </a:rPr>
+              <a:t>使用</a:t>
+            </a:r>
+            <a:r>
+              <a:rPr lang="zh-CN" altLang="en-US" sz="3200" dirty="0"/>
+              <a:t>立即渲染模式</a:t>
+            </a:r>
+            <a:r>
+              <a:rPr lang="zh-CN" altLang="en-US" sz="3200" b="0" i="0" dirty="0">
+                <a:solidFill>
+                  <a:srgbClr val="222222"/>
+                </a:solidFill>
+                <a:effectLst/>
+                <a:latin typeface="Microsoft Yahei" panose="020B0503020204020204" pitchFamily="34" charset="-122"/>
+                <a:ea typeface="Microsoft Yahei" panose="020B0503020204020204" pitchFamily="34" charset="-122"/>
+              </a:rPr>
+              <a:t>（</a:t>
+            </a:r>
+            <a:r>
+              <a:rPr lang="en-US" altLang="zh-CN" sz="3200" b="0" i="0" dirty="0">
+                <a:solidFill>
+                  <a:srgbClr val="222222"/>
+                </a:solidFill>
+                <a:effectLst/>
+                <a:latin typeface="Microsoft Yahei" panose="020B0503020204020204" pitchFamily="34" charset="-122"/>
+                <a:ea typeface="Microsoft Yahei" panose="020B0503020204020204" pitchFamily="34" charset="-122"/>
+              </a:rPr>
+              <a:t>Immediate mode</a:t>
+            </a:r>
+            <a:r>
+              <a:rPr lang="zh-CN" altLang="en-US" sz="3200" b="0" i="0" dirty="0">
+                <a:solidFill>
+                  <a:srgbClr val="222222"/>
+                </a:solidFill>
+                <a:effectLst/>
+                <a:latin typeface="Microsoft Yahei" panose="020B0503020204020204" pitchFamily="34" charset="-122"/>
+                <a:ea typeface="Microsoft Yahei" panose="020B0503020204020204" pitchFamily="34" charset="-122"/>
+              </a:rPr>
+              <a:t>，也就是</a:t>
+            </a:r>
+            <a:r>
+              <a:rPr lang="zh-CN" altLang="en-US" sz="3200" dirty="0"/>
+              <a:t>固定渲染管线</a:t>
+            </a:r>
+            <a:r>
+              <a:rPr lang="zh-CN" altLang="en-US" sz="3200" b="0" i="0" dirty="0">
+                <a:solidFill>
+                  <a:srgbClr val="222222"/>
+                </a:solidFill>
+                <a:effectLst/>
+                <a:latin typeface="Microsoft Yahei" panose="020B0503020204020204" pitchFamily="34" charset="-122"/>
+                <a:ea typeface="Microsoft Yahei" panose="020B0503020204020204" pitchFamily="34" charset="-122"/>
+              </a:rPr>
+              <a:t>），这个模式下绘制图形很方便。</a:t>
+            </a:r>
+            <a:r>
+              <a:rPr lang="en-US" altLang="zh-CN" sz="3200" b="0" i="0" dirty="0">
+                <a:solidFill>
+                  <a:srgbClr val="222222"/>
+                </a:solidFill>
+                <a:effectLst/>
+                <a:latin typeface="Microsoft Yahei" panose="020B0503020204020204" pitchFamily="34" charset="-122"/>
+                <a:ea typeface="Microsoft Yahei" panose="020B0503020204020204" pitchFamily="34" charset="-122"/>
+              </a:rPr>
+              <a:t>OpenGL</a:t>
+            </a:r>
+            <a:r>
+              <a:rPr lang="zh-CN" altLang="en-US" sz="3200" b="0" i="0" dirty="0">
+                <a:solidFill>
+                  <a:srgbClr val="222222"/>
+                </a:solidFill>
+                <a:effectLst/>
+                <a:latin typeface="Microsoft Yahei" panose="020B0503020204020204" pitchFamily="34" charset="-122"/>
+                <a:ea typeface="Microsoft Yahei" panose="020B0503020204020204" pitchFamily="34" charset="-122"/>
+              </a:rPr>
+              <a:t>的大多数功能都被库隐藏起来，开发者很少有控制</a:t>
+            </a:r>
+            <a:r>
+              <a:rPr lang="en-US" altLang="zh-CN" sz="3200" b="0" i="0" dirty="0">
+                <a:solidFill>
+                  <a:srgbClr val="222222"/>
+                </a:solidFill>
+                <a:effectLst/>
+                <a:latin typeface="Microsoft Yahei" panose="020B0503020204020204" pitchFamily="34" charset="-122"/>
+                <a:ea typeface="Microsoft Yahei" panose="020B0503020204020204" pitchFamily="34" charset="-122"/>
+              </a:rPr>
+              <a:t>OpenGL</a:t>
+            </a:r>
+            <a:r>
+              <a:rPr lang="zh-CN" altLang="en-US" sz="3200" b="0" i="0" dirty="0">
+                <a:solidFill>
+                  <a:srgbClr val="222222"/>
+                </a:solidFill>
+                <a:effectLst/>
+                <a:latin typeface="Microsoft Yahei" panose="020B0503020204020204" pitchFamily="34" charset="-122"/>
+                <a:ea typeface="Microsoft Yahei" panose="020B0503020204020204" pitchFamily="34" charset="-122"/>
+              </a:rPr>
+              <a:t>如何进行计算的自由。而开发者迫切希望能有更多的灵活性。随着时间推移，规范越来越灵活，开发者对绘图细节有了更多的掌控。立即渲染模式确实容易使用和理解，但是效率太低。因此从</a:t>
+            </a:r>
+            <a:r>
+              <a:rPr lang="en-US" altLang="zh-CN" sz="3200" b="0" i="0" dirty="0">
+                <a:solidFill>
+                  <a:srgbClr val="222222"/>
+                </a:solidFill>
+                <a:effectLst/>
+                <a:latin typeface="Microsoft Yahei" panose="020B0503020204020204" pitchFamily="34" charset="-122"/>
+                <a:ea typeface="Microsoft Yahei" panose="020B0503020204020204" pitchFamily="34" charset="-122"/>
+              </a:rPr>
+              <a:t>OpenGL3.2</a:t>
+            </a:r>
+            <a:r>
+              <a:rPr lang="zh-CN" altLang="en-US" sz="3200" b="0" i="0" dirty="0">
+                <a:solidFill>
+                  <a:srgbClr val="222222"/>
+                </a:solidFill>
+                <a:effectLst/>
+                <a:latin typeface="Microsoft Yahei" panose="020B0503020204020204" pitchFamily="34" charset="-122"/>
+                <a:ea typeface="Microsoft Yahei" panose="020B0503020204020204" pitchFamily="34" charset="-122"/>
+              </a:rPr>
+              <a:t>开始，规范文档开始废弃立即渲染模式，并鼓励开发者在</a:t>
+            </a:r>
+            <a:r>
+              <a:rPr lang="en-US" altLang="zh-CN" sz="3200" b="0" i="0" dirty="0">
+                <a:solidFill>
+                  <a:srgbClr val="222222"/>
+                </a:solidFill>
+                <a:effectLst/>
+                <a:latin typeface="Microsoft Yahei" panose="020B0503020204020204" pitchFamily="34" charset="-122"/>
+                <a:ea typeface="Microsoft Yahei" panose="020B0503020204020204" pitchFamily="34" charset="-122"/>
+              </a:rPr>
+              <a:t>OpenGL</a:t>
+            </a:r>
+            <a:r>
+              <a:rPr lang="zh-CN" altLang="en-US" sz="3200" b="0" i="0" dirty="0">
+                <a:solidFill>
+                  <a:srgbClr val="222222"/>
+                </a:solidFill>
+                <a:effectLst/>
+                <a:latin typeface="Microsoft Yahei" panose="020B0503020204020204" pitchFamily="34" charset="-122"/>
+                <a:ea typeface="Microsoft Yahei" panose="020B0503020204020204" pitchFamily="34" charset="-122"/>
+              </a:rPr>
+              <a:t>的</a:t>
+            </a:r>
+            <a:r>
+              <a:rPr lang="zh-CN" altLang="en-US" sz="3200" dirty="0"/>
+              <a:t>核心模式</a:t>
+            </a:r>
+            <a:r>
+              <a:rPr lang="en-US" altLang="zh-CN" sz="3200" b="0" i="0" dirty="0">
+                <a:solidFill>
+                  <a:srgbClr val="222222"/>
+                </a:solidFill>
+                <a:effectLst/>
+                <a:latin typeface="Microsoft Yahei" panose="020B0503020204020204" pitchFamily="34" charset="-122"/>
+                <a:ea typeface="Microsoft Yahei" panose="020B0503020204020204" pitchFamily="34" charset="-122"/>
+              </a:rPr>
+              <a:t>(Core-profile)</a:t>
+            </a:r>
+            <a:r>
+              <a:rPr lang="zh-CN" altLang="en-US" sz="3200" b="0" i="0" dirty="0">
+                <a:solidFill>
+                  <a:srgbClr val="222222"/>
+                </a:solidFill>
+                <a:effectLst/>
+                <a:latin typeface="Microsoft Yahei" panose="020B0503020204020204" pitchFamily="34" charset="-122"/>
+                <a:ea typeface="Microsoft Yahei" panose="020B0503020204020204" pitchFamily="34" charset="-122"/>
+              </a:rPr>
+              <a:t>下进行开发，这个分支的规范完全移除了旧的特性。</a:t>
+            </a:r>
+            <a:endParaRPr lang="en-us" sz="3200" dirty="0"/>
           </a:p>
         </p:txBody>
       </p:sp>
     </p:spTree>
+    <p:extLst>
+      <p:ext uri="{BB962C8B-B14F-4D97-AF65-F5344CB8AC3E}">
+        <p14:creationId xmlns:p14="http://schemas.microsoft.com/office/powerpoint/2010/main" val="3414125732"/>
+      </p:ext>
+    </p:extLst>
   </p:cSld>
   <p:clrMapOvr>
     <a:masterClrMapping/>
   </p:clrMapOvr>
-  <p:timing>
-    <p:tnLst>
-      <p:par>
-        <p:cTn id="1" dur="indefinite" restart="never" nodeType="tmRoot"/>
-      </p:par>
-    </p:tnLst>
-  </p:timing>
 </p:sld>
 </file>
 
-<file path=ppt/slides/slide4.xml><?xml version="1.0" encoding="utf-8"?>
-<p:sld xmlns:p="http://schemas.openxmlformats.org/presentationml/2006/main" xmlns:p14="http://schemas.microsoft.com/office/powerpoint/2010/main" xmlns:r="http://schemas.openxmlformats.org/officeDocument/2006/relationships" xmlns:a="http://schemas.openxmlformats.org/drawingml/2006/main">
+<file path=ppt/slides/slide3.xml><?xml version="1.0" encoding="utf-8"?>
+<p:sld xmlns:a="http://schemas.openxmlformats.org/drawingml/2006/main" xmlns:r="http://schemas.openxmlformats.org/officeDocument/2006/relationships" xmlns:p="http://schemas.openxmlformats.org/presentationml/2006/main">
   <p:cSld>
     <p:spTree>
       <p:nvGrpSpPr>
@@ -6730,7 +7009,7 @@
           <p:cNvSpPr>
             <a:extLst>
               <a:ext uri="smNativeData">
-                <pr:smNativeData xmlns:pr="smNativeData" val="SMDATA_13_47fkXxMAAAAlAAAAZAAAAA0AAAAAAAAAAAAAAAAAAAAAAAAAAAAAAAABAAAAAAAAAAEAAABQAAAAAAAAAAAA4D8AAAAAAADgPwAAAAAAAOA/AAAAAAAA4D8AAAAAAADgPwAAAAAAAOA/AAAAAAAA4D8AAAAAAADgPwAAAAAAAOA/AAAAAAAA4D8CAAAAjAAAAAAAAAAAAAAAT4G9DP///wgAAAAAAAAAAAAAAAAAAAAAAAAAAAAAAAAAAAAAZAAAAAEAAABAAAAAAAAAAAAAAAAAAAAAAAAAAAAAAAAAAAAAAAAAAAAAAAAAAAAAAAAAAAAAAAAAAAAAAAAAAAAAAAAAAAAAAAAAAAAAAAAAAAAAAAAAAAAAAAAAAAAAFAAAADwAAAAAAAAAAAAAAAAAAAkUAAAAAQAAABQAAAAUAAAAFAAAAAEAAAAAAAAAZAAAAGQAAAAAAAAAZAAAAGQAAAAVAAAAYAAAAAAAAAAAAAAADwAAACADAAAAAAAAAAAAAAEAAACgMgAAVgcAAKr4//8BAAAAf39/AAEAAABkAAAAAAAAABQAAABAHwAAAAAAACYAAAAAAAAAwOD//wAAAAAmAAAAZAAAABYAAABMAAAAAAAAAAAAAAAEAAAAAAAAAAEAAADu7OEKAAAAACgAAAAoAAAAZAAAAGQAAAAAAAAAzMzMAAAAAABQAAAAUAAAAGQAAABkAAAAAAAAABcAAAAUAAAAAAAAAAAAAAD/fwAA/38AAAAAAAAJAAAABAAAAIQWAAAMAAAAEAAAAAAAAAAAAAAAAAAAAAAAAAAeAAAAaAAAAAAAAAAAAAAAAAAAAAAAAAAAAAAAECcAABAnAAAAAAAAAAAAAAAAAAAAAAAAAAAAAAAAAAAAAAAAAAAAABQAAAAAAAAAwMD/AAAAAABkAAAAMgAAAAAAAABkAAAAAAAAAH9/fwAKAAAAHwAAAFQAAABPgb0F////AQAAAAAAAAAAAAAAAAAAAAAAAAAAAAAAAAAAAAAAAAAAAAAAAn9/fwDu7OEDzMzMAMDA/wB/f38AAAAAAAAAAAAAAAAAAAAAAAAAAAAhAAAAGAAAABQAAACeDgAAfRMAAOg6AABBGwAAEAAAACYAAAAIAAAA//////////8="/>
+                <pr:smNativeData xmlns="" xmlns:p14="http://schemas.microsoft.com/office/powerpoint/2010/main" xmlns:pr="smNativeData" val="SMDATA_13_47fkXxMAAAAlAAAAZAAAAA0AAAAAAAAAAAAAAAAAAAAAAAAAAAAAAAABAAAAAAAAAAEAAABQAAAAAAAAAAAA4D8AAAAAAADgPwAAAAAAAOA/AAAAAAAA4D8AAAAAAADgPwAAAAAAAOA/AAAAAAAA4D8AAAAAAADgPwAAAAAAAOA/AAAAAAAA4D8CAAAAjAAAAAAAAAAAAAAAT4G9DP///wgAAAAAAAAAAAAAAAAAAAAAAAAAAAAAAAAAAAAAZAAAAAEAAABAAAAAAAAAAAAAAAAAAAAAAAAAAAAAAAAAAAAAAAAAAAAAAAAAAAAAAAAAAAAAAAAAAAAAAAAAAAAAAAAAAAAAAAAAAAAAAAAAAAAAAAAAAAAAAAAAAAAAFAAAADwAAAAAAAAAAAAAAAAAAAkUAAAAAQAAABQAAAAUAAAAFAAAAAEAAAAAAAAAZAAAAGQAAAAAAAAAZAAAAGQAAAAVAAAAYAAAAAAAAAAAAAAADwAAACADAAAAAAAAAAAAAAEAAACgMgAAVgcAAKr4//8BAAAAf39/AAEAAABkAAAAAAAAABQAAABAHwAAAAAAACYAAAAAAAAAwOD//wAAAAAmAAAAZAAAABYAAABMAAAAAAAAAAAAAAAEAAAAAAAAAAEAAADu7OEKAAAAACgAAAAoAAAAZAAAAGQAAAAAAAAAzMzMAAAAAABQAAAAUAAAAGQAAABkAAAAAAAAABcAAAAUAAAAAAAAAAAAAAD/fwAA/38AAAAAAAAJAAAABAAAAJoRAAAMAAAAEAAAAAAAAAAAAAAAAAAAAAAAAAAeAAAAaAAAAAAAAAAAAAAAAAAAAAAAAAAAAAAAECcAABAnAAAAAAAAAAAAAAAAAAAAAAAAAAAAAAAAAAAAAAAAAAAAABQAAAAAAAAAwMD/AAAAAABkAAAAMgAAAAAAAABkAAAAAAAAAH9/fwAKAAAAHwAAAFQAAABPgb0F////AQAAAAAAAAAAAAAAAAAAAAAAAAAAAAAAAAAAAAAAAAAAAAAAAn9/fwDu7OEDzMzMAMDA/wB/f38AAAAAAAAAAAAAAAAAAAAAAAAAAAAhAAAAGAAAABQAAAAaAwAA2wEAAOg6AACeCQAAAAAAACYAAAAIAAAA//////////8="/>
               </a:ext>
             </a:extLst>
           </p:cNvSpPr>
@@ -6738,8 +7017,8 @@
         </p:nvSpPr>
         <p:spPr>
           <a:xfrm>
-            <a:off x="2376170" y="3168015"/>
-            <a:ext cx="7199630" cy="1262380"/>
+            <a:off x="504190" y="301625"/>
+            <a:ext cx="9071610" cy="1261745"/>
           </a:xfrm>
           <a:prstGeom prst="rect">
             <a:avLst/>
@@ -6754,41 +7033,546 @@
           <a:bodyPr vert="horz" wrap="square" lIns="0" tIns="0" rIns="0" bIns="0" numCol="1" spcCol="215900" anchor="ctr"/>
           <a:lstStyle/>
           <a:p>
-            <a:pPr algn="ctr"/>
-            <a:r>
-              <a:rPr lang="en-us" sz="2200">
-                <a:solidFill>
-                  <a:srgbClr val="FFFFFF"/>
-                </a:solidFill>
-              </a:rPr>
-              <a:t>This work is licensed under a Creative Commons Attribution-ShareAlike 3.0 Unported License.</a:t>
-            </a:r>
-            <a:br/>
-            <a:r>
-              <a:rPr lang="en-us" sz="2200">
-                <a:solidFill>
-                  <a:srgbClr val="FFFFFF"/>
-                </a:solidFill>
-              </a:rPr>
-              <a:t>It makes use of the works of Mateus Machado Luna.</a:t>
-            </a:r>
-            <a:endParaRPr lang="en-us" sz="2200">
-              <a:solidFill>
-                <a:srgbClr val="FFFFFF"/>
-              </a:solidFill>
-            </a:endParaRPr>
+            <a:pPr algn="ctr">
+              <a:defRPr>
+                <a:effectLst>
+                  <a:outerShdw dist="63500" dir="3600000" algn="tl" rotWithShape="0">
+                    <a:srgbClr val="000000">
+                      <a:alpha val="40000"/>
+                    </a:srgbClr>
+                  </a:outerShdw>
+                </a:effectLst>
+              </a:defRPr>
+            </a:pPr>
+            <a:r>
+              <a:rPr lang="en-us" sz="4400" dirty="0"/>
+              <a:t>需	求	分	析</a:t>
+            </a:r>
+          </a:p>
+        </p:txBody>
+      </p:sp>
+      <p:sp>
+        <p:nvSpPr>
+          <p:cNvPr id="3" name="TextShape 2"/>
+          <p:cNvSpPr>
+            <a:extLst>
+              <a:ext uri="smNativeData">
+                <pr:smNativeData xmlns="" xmlns:p14="http://schemas.microsoft.com/office/powerpoint/2010/main" xmlns:pr="smNativeData" val="SMDATA_13_47fkXxMAAAAlAAAAZAAAAA0AAAAAAAAAAAAAAAAAAAAAAAAAAAAAAAAAAAAAAAAAAAEAAABQAAAAAAAAAAAA4D8AAAAAAADgPwAAAAAAAOA/AAAAAAAA4D8AAAAAAADgPwAAAAAAAOA/AAAAAAAA4D8AAAAAAADgPwAAAAAAAOA/AAAAAAAA4D8CAAAAjAAAAAAAAAAAAAAAT4G9DP///wgAAAAAAAAAAAAAAAAAAAAAAAAAAAAAAAAAAAAAZAAAAAEAAABAAAAAAAAAAAAAAAAAAAAAAAAAAAAAAAAAAAAAAAAAAAAAAAAAAAAAAAAAAAAAAAAAAAAAAAAAAAAAAAAAAAAAAAAAAAAAAAAAAAAAAAAAAAAAAAAAAAAAFAAAADwAAAAAAAAAAAAAAAAAAAkUAAAAAQAAABQAAAAUAAAAFAAAAAEAAAAAAAAAZAAAAGQAAAAAAAAAZAAAAGQAAAAVAAAAYAAAAAAAAAAAAAAADwAAACADAAAAAAAAAAAAAAEAAACgMgAAVgcAAKr4//8BAAAAf39/AAEAAABkAAAAAAAAABQAAABAHwAAAAAAACYAAAAAAAAAwOD//wAAAAAmAAAAZAAAABYAAABMAAAAAAAAAAAAAAAEAAAAAAAAAAEAAADu7OEKAAAAACgAAAAoAAAAZAAAAGQAAAAAAAAAzMzMAAAAAABQAAAAUAAAAGQAAABkAAAAAAAAABcAAAAUAAAAAAAAAAAAAAD/fwAA/38AAAAAAAAJAAAABAAAAFwHAAAMAAAAEAAAAAAAAAAAAAAAAAAAAAAAAAAeAAAAaAAAAAAAAAAAAAAAAAAAAAAAAAAAAAAAECcAABAnAAAAAAAAAAAAAAAAAAAAAAAAAAAAAAAAAAAAAAAAAAAAABQAAAAAAAAAwMD/AAAAAABkAAAAMgAAAAAAAABkAAAAAAAAAH9/fwAKAAAAHwAAAFQAAABPgb0F////AQAAAAAAAAAAAAAAAAAAAAAAAAAAAAAAAAAAAAAAAAAAAAAAAn9/fwDu7OEDzMzMAMDA/wB/f38AAAAAAAAAAAAAAAAAAAAAAAAAAAAhAAAAGAAAABQAAAAaAwAA4goAAOg6AADbJQAAAAAAACYAAAAIAAAA//////////8="/>
+              </a:ext>
+            </a:extLst>
+          </p:cNvSpPr>
+          <p:nvPr/>
+        </p:nvSpPr>
+        <p:spPr>
+          <a:xfrm>
+            <a:off x="504190" y="1769110"/>
+            <a:ext cx="9071610" cy="4384675"/>
+          </a:xfrm>
+          <a:prstGeom prst="rect">
+            <a:avLst/>
+          </a:prstGeom>
+          <a:noFill/>
+          <a:ln>
+            <a:noFill/>
+          </a:ln>
+          <a:effectLst/>
+        </p:spPr>
+        <p:txBody>
+          <a:bodyPr vert="horz" wrap="square" lIns="0" tIns="0" rIns="0" bIns="0" numCol="1" spcCol="215900" anchor="t"/>
+          <a:lstStyle/>
+          <a:p>
+            <a:r>
+              <a:rPr lang="en-us" sz="3200" dirty="0"/>
+              <a:t>	</a:t>
+            </a:r>
+            <a:r>
+              <a:rPr lang="LID4096" sz="3200" dirty="0"/>
+              <a:t>1.</a:t>
+            </a:r>
+            <a:r>
+              <a:rPr lang="zh-CN" altLang="en-US" sz="3200" dirty="0"/>
+              <a:t> </a:t>
+            </a:r>
+            <a:r>
+              <a:rPr lang="zh-Hans-CN" altLang="en-US" sz="3200" dirty="0"/>
+              <a:t>基本输入处理与控制</a:t>
+            </a:r>
+            <a:endParaRPr lang="en-US" sz="3200" dirty="0"/>
+          </a:p>
+          <a:p>
+            <a:r>
+              <a:rPr lang="en-US" sz="3200" dirty="0"/>
+              <a:t>	</a:t>
+            </a:r>
+            <a:r>
+              <a:rPr lang="en-US" altLang="zh-CN" sz="3200" dirty="0"/>
+              <a:t>2</a:t>
+            </a:r>
+            <a:r>
+              <a:rPr lang="en-us" sz="3200" dirty="0"/>
+              <a:t>. 使用OpenGL绘制3阶魔方</a:t>
+            </a:r>
+          </a:p>
+          <a:p>
+            <a:pPr>
+              <a:defRPr lang="en-us" sz="3200"/>
+            </a:pPr>
+            <a:r>
+              <a:rPr dirty="0"/>
+              <a:t>	</a:t>
+            </a:r>
+            <a:r>
+              <a:rPr lang="en-US" altLang="zh-CN" dirty="0"/>
+              <a:t>3</a:t>
+            </a:r>
+            <a:r>
+              <a:rPr dirty="0"/>
+              <a:t>. </a:t>
+            </a:r>
+            <a:r>
+              <a:rPr dirty="0" err="1"/>
+              <a:t>控制魔方各部分定向旋转</a:t>
+            </a:r>
+            <a:endParaRPr lang="en-US" dirty="0"/>
+          </a:p>
+          <a:p>
+            <a:pPr>
+              <a:defRPr lang="en-us" sz="3200"/>
+            </a:pPr>
+            <a:r>
+              <a:rPr lang="en-US" altLang="zh-CN" sz="3200" dirty="0"/>
+              <a:t>	4</a:t>
+            </a:r>
+            <a:r>
+              <a:rPr lang="en-us" altLang="zh-CN" sz="3200" dirty="0"/>
+              <a:t>. </a:t>
+            </a:r>
+            <a:r>
+              <a:rPr lang="en-us" altLang="zh-CN" sz="3200" dirty="0" err="1"/>
+              <a:t>为魔方加载纹理</a:t>
+            </a:r>
+            <a:r>
+              <a:rPr lang="en-us" altLang="zh-CN" sz="3200" dirty="0"/>
+              <a:t>(Texture)</a:t>
+            </a:r>
+            <a:endParaRPr dirty="0"/>
+          </a:p>
+          <a:p>
+            <a:pPr>
+              <a:defRPr lang="en-us" sz="3200"/>
+            </a:pPr>
+            <a:r>
+              <a:rPr dirty="0"/>
+              <a:t>	</a:t>
+            </a:r>
+            <a:r>
+              <a:rPr lang="en-US" altLang="zh-CN" dirty="0"/>
+              <a:t>5</a:t>
+            </a:r>
+            <a:r>
+              <a:rPr dirty="0"/>
+              <a:t>. </a:t>
+            </a:r>
+            <a:r>
+              <a:rPr lang="zh-Hans-CN" altLang="en-US" dirty="0"/>
+              <a:t>在窗口中显示信息</a:t>
+            </a:r>
+            <a:endParaRPr lang="en-US" altLang="zh-CN" dirty="0"/>
+          </a:p>
+          <a:p>
+            <a:pPr>
+              <a:defRPr lang="en-us" sz="3200"/>
+            </a:pPr>
+            <a:r>
+              <a:rPr lang="en-US" dirty="0"/>
+              <a:t>	</a:t>
+            </a:r>
+            <a:r>
+              <a:rPr lang="en-US" altLang="zh-CN" dirty="0"/>
+              <a:t>6.</a:t>
+            </a:r>
+            <a:r>
+              <a:rPr lang="zh-CN" altLang="en-US" dirty="0"/>
+              <a:t> </a:t>
+            </a:r>
+            <a:r>
+              <a:rPr lang="zh-Hans-CN" altLang="en-US" dirty="0"/>
+              <a:t>控制摄像机</a:t>
+            </a:r>
+            <a:endParaRPr lang="LID4096" altLang="zh-CN" dirty="0"/>
+          </a:p>
+          <a:p>
+            <a:pPr>
+              <a:defRPr lang="en-us" sz="3200"/>
+            </a:pPr>
+            <a:r>
+              <a:rPr lang="LID4096" altLang="zh-CN" dirty="0"/>
+              <a:t>	</a:t>
+            </a:r>
+            <a:r>
+              <a:rPr lang="en-US" altLang="zh-CN" dirty="0"/>
+              <a:t>7</a:t>
+            </a:r>
+            <a:r>
+              <a:rPr lang="LID4096" altLang="zh-CN" dirty="0"/>
+              <a:t>. </a:t>
+            </a:r>
+            <a:r>
+              <a:rPr lang="zh-Hans-CN" altLang="en-US" dirty="0"/>
+              <a:t>随机旋转</a:t>
+            </a:r>
+            <a:endParaRPr lang="en-US" altLang="zh-CN" dirty="0"/>
+          </a:p>
+          <a:p>
+            <a:pPr>
+              <a:defRPr lang="en-us" sz="3200"/>
+            </a:pPr>
+            <a:endParaRPr dirty="0"/>
+          </a:p>
+          <a:p>
+            <a:r>
+              <a:rPr lang="en-us" sz="3200" dirty="0"/>
+              <a:t>	</a:t>
+            </a:r>
+          </a:p>
+        </p:txBody>
+      </p:sp>
+    </p:spTree>
+  </p:cSld>
+  <p:clrMapOvr>
+    <a:masterClrMapping/>
+  </p:clrMapOvr>
+</p:sld>
+</file>
+
+<file path=ppt/slides/slide4.xml><?xml version="1.0" encoding="utf-8"?>
+<p:sld xmlns:a="http://schemas.openxmlformats.org/drawingml/2006/main" xmlns:r="http://schemas.openxmlformats.org/officeDocument/2006/relationships" xmlns:p="http://schemas.openxmlformats.org/presentationml/2006/main">
+  <p:cSld>
+    <p:spTree>
+      <p:nvGrpSpPr>
+        <p:cNvPr id="1" name=""/>
+        <p:cNvGrpSpPr/>
+        <p:nvPr/>
+      </p:nvGrpSpPr>
+      <p:grpSpPr>
+        <a:xfrm>
+          <a:off x="0" y="0"/>
+          <a:ext cx="0" cy="0"/>
+          <a:chOff x="0" y="0"/>
+          <a:chExt cx="0" cy="0"/>
+        </a:xfrm>
+      </p:grpSpPr>
+      <p:sp>
+        <p:nvSpPr>
+          <p:cNvPr id="2" name="TextShape 1"/>
+          <p:cNvSpPr>
+            <a:extLst>
+              <a:ext uri="smNativeData">
+                <pr:smNativeData xmlns="" xmlns:p14="http://schemas.microsoft.com/office/powerpoint/2010/main" xmlns:pr="smNativeData" val="SMDATA_13_47fkXxMAAAAlAAAAZAAAAA0AAAAAAAAAAAAAAAAAAAAAAAAAAAAAAAABAAAAAAAAAAEAAABQAAAAAAAAAAAA4D8AAAAAAADgPwAAAAAAAOA/AAAAAAAA4D8AAAAAAADgPwAAAAAAAOA/AAAAAAAA4D8AAAAAAADgPwAAAAAAAOA/AAAAAAAA4D8CAAAAjAAAAAAAAAAAAAAAT4G9DP///wgAAAAAAAAAAAAAAAAAAAAAAAAAAAAAAAAAAAAAZAAAAAEAAABAAAAAAAAAAAAAAAAAAAAAAAAAAAAAAAAAAAAAAAAAAAAAAAAAAAAAAAAAAAAAAAAAAAAAAAAAAAAAAAAAAAAAAAAAAAAAAAAAAAAAAAAAAAAAAAAAAAAAFAAAADwAAAAAAAAAAAAAAAAAAAkUAAAAAQAAABQAAAAUAAAAFAAAAAEAAAAAAAAAZAAAAGQAAAAAAAAAZAAAAGQAAAAVAAAAYAAAAAAAAAAAAAAADwAAACADAAAAAAAAAAAAAAEAAACgMgAAVgcAAKr4//8BAAAAf39/AAEAAABkAAAAAAAAABQAAABAHwAAAAAAACYAAAAAAAAAwOD//wAAAAAmAAAAZAAAABYAAABMAAAAAAAAAAAAAAAEAAAAAAAAAAEAAADu7OEKAAAAACgAAAAoAAAAZAAAAGQAAAAAAAAAzMzMAAAAAABQAAAAUAAAAGQAAABkAAAAAAAAABcAAAAUAAAAAAAAAAAAAAD/fwAA/38AAAAAAAAJAAAABAAAAJoRAAAMAAAAEAAAAAAAAAAAAAAAAAAAAAAAAAAeAAAAaAAAAAAAAAAAAAAAAAAAAAAAAAAAAAAAECcAABAnAAAAAAAAAAAAAAAAAAAAAAAAAAAAAAAAAAAAAAAAAAAAABQAAAAAAAAAwMD/AAAAAABkAAAAMgAAAAAAAABkAAAAAAAAAH9/fwAKAAAAHwAAAFQAAABPgb0F////AQAAAAAAAAAAAAAAAAAAAAAAAAAAAAAAAAAAAAAAAAAAAAAAAn9/fwDu7OEDzMzMAMDA/wB/f38AAAAAAAAAAAAAAAAAAAAAAAAAAAAhAAAAGAAAABQAAAAaAwAA2wEAAOg6AACeCQAAAAAAACYAAAAIAAAA//////////8="/>
+              </a:ext>
+            </a:extLst>
+          </p:cNvSpPr>
+          <p:nvPr/>
+        </p:nvSpPr>
+        <p:spPr>
+          <a:xfrm>
+            <a:off x="504190" y="301625"/>
+            <a:ext cx="9071610" cy="1261745"/>
+          </a:xfrm>
+          <a:prstGeom prst="rect">
+            <a:avLst/>
+          </a:prstGeom>
+          <a:noFill/>
+          <a:ln>
+            <a:noFill/>
+          </a:ln>
+          <a:effectLst/>
+        </p:spPr>
+        <p:txBody>
+          <a:bodyPr vert="horz" wrap="square" lIns="0" tIns="0" rIns="0" bIns="0" numCol="1" spcCol="215900" anchor="ctr"/>
+          <a:lstStyle/>
+          <a:p>
+            <a:pPr algn="ctr">
+              <a:defRPr>
+                <a:effectLst>
+                  <a:outerShdw dist="63500" dir="3600000" algn="tl" rotWithShape="0">
+                    <a:srgbClr val="000000">
+                      <a:alpha val="40000"/>
+                    </a:srgbClr>
+                  </a:outerShdw>
+                </a:effectLst>
+              </a:defRPr>
+            </a:pPr>
+            <a:r>
+              <a:rPr lang="zh-Hans-CN" altLang="en-US" sz="4400" dirty="0"/>
+              <a:t>基</a:t>
+            </a:r>
+            <a:r>
+              <a:rPr lang="en-US" altLang="zh-CN" sz="4400" dirty="0"/>
+              <a:t>	</a:t>
+            </a:r>
+            <a:r>
+              <a:rPr lang="zh-Hans-CN" altLang="en-US" sz="4400" dirty="0"/>
+              <a:t>本</a:t>
+            </a:r>
+            <a:r>
+              <a:rPr lang="en-US" altLang="zh-CN" sz="4400" dirty="0"/>
+              <a:t>	</a:t>
+            </a:r>
+            <a:r>
+              <a:rPr lang="zh-Hans-CN" altLang="en-US" sz="4400" dirty="0"/>
+              <a:t>输</a:t>
+            </a:r>
+            <a:r>
+              <a:rPr lang="en-US" altLang="zh-CN" sz="4400" dirty="0"/>
+              <a:t>	</a:t>
+            </a:r>
+            <a:r>
+              <a:rPr lang="zh-Hans-CN" altLang="en-US" sz="4400" dirty="0"/>
+              <a:t>入</a:t>
+            </a:r>
+            <a:endParaRPr lang="en-us" sz="4400" dirty="0"/>
+          </a:p>
+        </p:txBody>
+      </p:sp>
+      <p:sp>
+        <p:nvSpPr>
+          <p:cNvPr id="3" name="TextShape 2"/>
+          <p:cNvSpPr>
+            <a:extLst>
+              <a:ext uri="smNativeData">
+                <pr:smNativeData xmlns="" xmlns:p14="http://schemas.microsoft.com/office/powerpoint/2010/main" xmlns:pr="smNativeData" val="SMDATA_13_47fkXxMAAAAlAAAAZAAAAA0AAAAAAAAAAAAAAAAAAAAAAAAAAAAAAAAAAAAAAAAAAAEAAABQAAAAAAAAAAAA4D8AAAAAAADgPwAAAAAAAOA/AAAAAAAA4D8AAAAAAADgPwAAAAAAAOA/AAAAAAAA4D8AAAAAAADgPwAAAAAAAOA/AAAAAAAA4D8CAAAAjAAAAAAAAAAAAAAAT4G9DP///wgAAAAAAAAAAAAAAAAAAAAAAAAAAAAAAAAAAAAAZAAAAAEAAABAAAAAAAAAAAAAAAAAAAAAAAAAAAAAAAAAAAAAAAAAAAAAAAAAAAAAAAAAAAAAAAAAAAAAAAAAAAAAAAAAAAAAAAAAAAAAAAAAAAAAAAAAAAAAAAAAAAAAFAAAADwAAAAAAAAAAAAAAAAAAAkUAAAAAQAAABQAAAAUAAAAFAAAAAEAAAAAAAAAZAAAAGQAAAAAAAAAZAAAAGQAAAAVAAAAYAAAAAAAAAAAAAAADwAAACADAAAAAAAAAAAAAAEAAACgMgAAVgcAAKr4//8BAAAAf39/AAEAAABkAAAAAAAAABQAAABAHwAAAAAAACYAAAAAAAAAwOD//wAAAAAmAAAAZAAAABYAAABMAAAAAAAAAAAAAAAEAAAAAAAAAAEAAADu7OEKAAAAACgAAAAoAAAAZAAAAGQAAAAAAAAAzMzMAAAAAABQAAAAUAAAAGQAAABkAAAAAAAAABcAAAAUAAAAAAAAAAAAAAD/fwAA/38AAAAAAAAJAAAABAAAAFwHAAAMAAAAEAAAAAAAAAAAAAAAAAAAAAAAAAAeAAAAaAAAAAAAAAAAAAAAAAAAAAAAAAAAAAAAECcAABAnAAAAAAAAAAAAAAAAAAAAAAAAAAAAAAAAAAAAAAAAAAAAABQAAAAAAAAAwMD/AAAAAABkAAAAMgAAAAAAAABkAAAAAAAAAH9/fwAKAAAAHwAAAFQAAABPgb0F////AQAAAAAAAAAAAAAAAAAAAAAAAAAAAAAAAAAAAAAAAAAAAAAAAn9/fwDu7OEDzMzMAMDA/wB/f38AAAAAAAAAAAAAAAAAAAAAAAAAAAAhAAAAGAAAABQAAAAaAwAA4goAAOg6AADbJQAAAAAAACYAAAAIAAAA//////////8="/>
+              </a:ext>
+            </a:extLst>
+          </p:cNvSpPr>
+          <p:nvPr/>
+        </p:nvSpPr>
+        <p:spPr>
+          <a:xfrm>
+            <a:off x="504190" y="1769110"/>
+            <a:ext cx="9071610" cy="4384675"/>
+          </a:xfrm>
+          <a:prstGeom prst="rect">
+            <a:avLst/>
+          </a:prstGeom>
+          <a:noFill/>
+          <a:ln>
+            <a:noFill/>
+          </a:ln>
+          <a:effectLst/>
+        </p:spPr>
+        <p:txBody>
+          <a:bodyPr vert="horz" wrap="square" lIns="0" tIns="0" rIns="0" bIns="0" numCol="1" spcCol="215900" anchor="t"/>
+          <a:lstStyle/>
+          <a:p>
+            <a:r>
+              <a:rPr lang="en-us" sz="3200" dirty="0"/>
+              <a:t>	</a:t>
+            </a:r>
+            <a:r>
+              <a:rPr lang="LID4096" sz="3200" dirty="0"/>
+              <a:t>1. </a:t>
+            </a:r>
+            <a:r>
+              <a:rPr lang="zh-Hans-CN" altLang="en-US" sz="3200" dirty="0"/>
+              <a:t>使用回调函数在输入更新状态</a:t>
+            </a:r>
+            <a:endParaRPr lang="LID4096" altLang="zh-CN" sz="3200" dirty="0"/>
+          </a:p>
+          <a:p>
+            <a:r>
+              <a:rPr lang="LID4096" sz="3200" dirty="0"/>
+              <a:t>	2. </a:t>
+            </a:r>
+            <a:r>
+              <a:rPr lang="zh-Hans-CN" altLang="en-US" sz="3200" dirty="0"/>
+              <a:t>轮询按键</a:t>
+            </a:r>
+            <a:endParaRPr lang="en-us" sz="3200" dirty="0"/>
+          </a:p>
+        </p:txBody>
+      </p:sp>
+    </p:spTree>
+    <p:extLst>
+      <p:ext uri="{BB962C8B-B14F-4D97-AF65-F5344CB8AC3E}">
+        <p14:creationId xmlns:p14="http://schemas.microsoft.com/office/powerpoint/2010/main" val="1644189596"/>
+      </p:ext>
+    </p:extLst>
+  </p:cSld>
+  <p:clrMapOvr>
+    <a:masterClrMapping/>
+  </p:clrMapOvr>
+</p:sld>
+</file>
+
+<file path=ppt/slides/slide5.xml><?xml version="1.0" encoding="utf-8"?>
+<p:sld xmlns:a="http://schemas.openxmlformats.org/drawingml/2006/main" xmlns:r="http://schemas.openxmlformats.org/officeDocument/2006/relationships" xmlns:p="http://schemas.openxmlformats.org/presentationml/2006/main">
+  <p:cSld>
+    <p:spTree>
+      <p:nvGrpSpPr>
+        <p:cNvPr id="1" name=""/>
+        <p:cNvGrpSpPr/>
+        <p:nvPr/>
+      </p:nvGrpSpPr>
+      <p:grpSpPr>
+        <a:xfrm>
+          <a:off x="0" y="0"/>
+          <a:ext cx="0" cy="0"/>
+          <a:chOff x="0" y="0"/>
+          <a:chExt cx="0" cy="0"/>
+        </a:xfrm>
+      </p:grpSpPr>
+      <p:sp>
+        <p:nvSpPr>
+          <p:cNvPr id="2" name="TextShape 1"/>
+          <p:cNvSpPr>
+            <a:extLst>
+              <a:ext uri="smNativeData">
+                <pr:smNativeData xmlns:pr="smNativeData" xmlns:p14="http://schemas.microsoft.com/office/powerpoint/2010/main" xmlns="" val="SMDATA_13_47fkXxMAAAAlAAAAZAAAAA0AAAAAAAAAAAAAAAAAAAAAAAAAAAAAAAABAAAAAAAAAAEAAABQAAAAAAAAAAAA4D8AAAAAAADgPwAAAAAAAOA/AAAAAAAA4D8AAAAAAADgPwAAAAAAAOA/AAAAAAAA4D8AAAAAAADgPwAAAAAAAOA/AAAAAAAA4D8CAAAAjAAAAAAAAAAAAAAAT4G9DP///wgAAAAAAAAAAAAAAAAAAAAAAAAAAAAAAAAAAAAAZAAAAAEAAABAAAAAAAAAAAAAAAAAAAAAAAAAAAAAAAAAAAAAAAAAAAAAAAAAAAAAAAAAAAAAAAAAAAAAAAAAAAAAAAAAAAAAAAAAAAAAAAAAAAAAAAAAAAAAAAAAAAAAFAAAADwAAAAAAAAAAAAAAAAAAAkUAAAAAQAAABQAAAAUAAAAFAAAAAEAAAAAAAAAZAAAAGQAAAAAAAAAZAAAAGQAAAAVAAAAYAAAAAAAAAAAAAAADwAAACADAAAAAAAAAAAAAAEAAACgMgAAVgcAAKr4//8BAAAAf39/AAEAAABkAAAAAAAAABQAAABAHwAAAAAAACYAAAAAAAAAwOD//wAAAAAmAAAAZAAAABYAAABMAAAAAAAAAAAAAAAEAAAAAAAAAAEAAADu7OEKAAAAACgAAAAoAAAAZAAAAGQAAAAAAAAAzMzMAAAAAABQAAAAUAAAAGQAAABkAAAAAAAAABcAAAAUAAAAAAAAAAAAAAD/fwAA/38AAAAAAAAJAAAABAAAAJoRAAAMAAAAEAAAAAAAAAAAAAAAAAAAAAAAAAAeAAAAaAAAAAAAAAAAAAAAAAAAAAAAAAAAAAAAECcAABAnAAAAAAAAAAAAAAAAAAAAAAAAAAAAAAAAAAAAAAAAAAAAABQAAAAAAAAAwMD/AAAAAABkAAAAMgAAAAAAAABkAAAAAAAAAH9/fwAKAAAAHwAAAFQAAABPgb0F////AQAAAAAAAAAAAAAAAAAAAAAAAAAAAAAAAAAAAAAAAAAAAAAAAn9/fwDu7OEDzMzMAMDA/wB/f38AAAAAAAAAAAAAAAAAAAAAAAAAAAAhAAAAGAAAABQAAAAaAwAA2wEAAOg6AACeCQAAAAAAACYAAAAIAAAA//////////8="/>
+              </a:ext>
+            </a:extLst>
+          </p:cNvSpPr>
+          <p:nvPr/>
+        </p:nvSpPr>
+        <p:spPr>
+          <a:xfrm>
+            <a:off x="504190" y="301625"/>
+            <a:ext cx="9071610" cy="1261745"/>
+          </a:xfrm>
+          <a:prstGeom prst="rect">
+            <a:avLst/>
+          </a:prstGeom>
+          <a:noFill/>
+          <a:ln>
+            <a:noFill/>
+          </a:ln>
+          <a:effectLst/>
+        </p:spPr>
+        <p:txBody>
+          <a:bodyPr vert="horz" wrap="square" lIns="0" tIns="0" rIns="0" bIns="0" numCol="1" spcCol="215900" anchor="ctr"/>
+          <a:lstStyle/>
+          <a:p>
+            <a:pPr algn="ctr">
+              <a:defRPr>
+                <a:effectLst>
+                  <a:outerShdw dist="63500" dir="3600000" algn="tl" rotWithShape="0">
+                    <a:srgbClr val="000000">
+                      <a:alpha val="40000"/>
+                    </a:srgbClr>
+                  </a:outerShdw>
+                </a:effectLst>
+              </a:defRPr>
+            </a:pPr>
+            <a:r>
+              <a:rPr lang="en-us" altLang="zh-CN" sz="4400" dirty="0"/>
+              <a:t>绘</a:t>
+            </a:r>
+            <a:r>
+              <a:rPr lang="en-US" altLang="zh-CN" sz="4400" dirty="0"/>
+              <a:t>	</a:t>
+            </a:r>
+            <a:r>
+              <a:rPr lang="en-us" altLang="zh-CN" sz="4400" dirty="0"/>
+              <a:t>制</a:t>
+            </a:r>
+            <a:r>
+              <a:rPr lang="en-US" altLang="zh-CN" sz="4400" dirty="0"/>
+              <a:t>	</a:t>
+            </a:r>
+            <a:r>
+              <a:rPr lang="en-us" altLang="zh-CN" sz="4400" dirty="0"/>
+              <a:t>魔</a:t>
+            </a:r>
+            <a:r>
+              <a:rPr lang="en-US" altLang="zh-CN" sz="4400" dirty="0"/>
+              <a:t>	</a:t>
+            </a:r>
+            <a:r>
+              <a:rPr lang="en-us" altLang="zh-CN" sz="4400" dirty="0"/>
+              <a:t>方</a:t>
+            </a:r>
+            <a:endParaRPr lang="en-us" sz="4400" dirty="0"/>
+          </a:p>
+        </p:txBody>
+      </p:sp>
+      <p:sp>
+        <p:nvSpPr>
+          <p:cNvPr id="3" name="TextShape 2"/>
+          <p:cNvSpPr>
+            <a:extLst>
+              <a:ext uri="smNativeData">
+                <pr:smNativeData xmlns:pr="smNativeData" xmlns:p14="http://schemas.microsoft.com/office/powerpoint/2010/main" xmlns="" val="SMDATA_13_47fkXxMAAAAlAAAAZAAAAA0AAAAAAAAAAAAAAAAAAAAAAAAAAAAAAAAAAAAAAAAAAAEAAABQAAAAAAAAAAAA4D8AAAAAAADgPwAAAAAAAOA/AAAAAAAA4D8AAAAAAADgPwAAAAAAAOA/AAAAAAAA4D8AAAAAAADgPwAAAAAAAOA/AAAAAAAA4D8CAAAAjAAAAAAAAAAAAAAAT4G9DP///wgAAAAAAAAAAAAAAAAAAAAAAAAAAAAAAAAAAAAAZAAAAAEAAABAAAAAAAAAAAAAAAAAAAAAAAAAAAAAAAAAAAAAAAAAAAAAAAAAAAAAAAAAAAAAAAAAAAAAAAAAAAAAAAAAAAAAAAAAAAAAAAAAAAAAAAAAAAAAAAAAAAAAFAAAADwAAAAAAAAAAAAAAAAAAAkUAAAAAQAAABQAAAAUAAAAFAAAAAEAAAAAAAAAZAAAAGQAAAAAAAAAZAAAAGQAAAAVAAAAYAAAAAAAAAAAAAAADwAAACADAAAAAAAAAAAAAAEAAACgMgAAVgcAAKr4//8BAAAAf39/AAEAAABkAAAAAAAAABQAAABAHwAAAAAAACYAAAAAAAAAwOD//wAAAAAmAAAAZAAAABYAAABMAAAAAAAAAAAAAAAEAAAAAAAAAAEAAADu7OEKAAAAACgAAAAoAAAAZAAAAGQAAAAAAAAAzMzMAAAAAABQAAAAUAAAAGQAAABkAAAAAAAAABcAAAAUAAAAAAAAAAAAAAD/fwAA/38AAAAAAAAJAAAABAAAAFwHAAAMAAAAEAAAAAAAAAAAAAAAAAAAAAAAAAAeAAAAaAAAAAAAAAAAAAAAAAAAAAAAAAAAAAAAECcAABAnAAAAAAAAAAAAAAAAAAAAAAAAAAAAAAAAAAAAAAAAAAAAABQAAAAAAAAAwMD/AAAAAABkAAAAMgAAAAAAAABkAAAAAAAAAH9/fwAKAAAAHwAAAFQAAABPgb0F////AQAAAAAAAAAAAAAAAAAAAAAAAAAAAAAAAAAAAAAAAAAAAAAAAn9/fwDu7OEDzMzMAMDA/wB/f38AAAAAAAAAAAAAAAAAAAAAAAAAAAAhAAAAGAAAABQAAAAaAwAA4goAAOg6AADbJQAAAAAAACYAAAAIAAAA//////////8="/>
+              </a:ext>
+            </a:extLst>
+          </p:cNvSpPr>
+          <p:nvPr/>
+        </p:nvSpPr>
+        <p:spPr>
+          <a:xfrm>
+            <a:off x="504190" y="1769110"/>
+            <a:ext cx="9071610" cy="4384675"/>
+          </a:xfrm>
+          <a:prstGeom prst="rect">
+            <a:avLst/>
+          </a:prstGeom>
+          <a:noFill/>
+          <a:ln>
+            <a:noFill/>
+          </a:ln>
+          <a:effectLst/>
+        </p:spPr>
+        <p:txBody>
+          <a:bodyPr vert="horz" wrap="square" lIns="0" tIns="0" rIns="0" bIns="0" numCol="1" spcCol="215900" anchor="t"/>
+          <a:lstStyle/>
+          <a:p>
+            <a:r>
+              <a:rPr lang="en-us" sz="3200" dirty="0"/>
+              <a:t>	</a:t>
+            </a:r>
+            <a:r>
+              <a:rPr lang="zh-Hans-CN" altLang="en-US" sz="3200" dirty="0"/>
+              <a:t>绘制魔方流程图</a:t>
+            </a:r>
+            <a:endParaRPr lang="en-US" altLang="zh-CN" sz="3200" dirty="0"/>
+          </a:p>
+          <a:p>
+            <a:r>
+              <a:rPr lang="en-US" altLang="zh-CN" sz="3200" dirty="0"/>
+              <a:t>	</a:t>
+            </a:r>
+            <a:r>
+              <a:rPr lang="zh-Hans-CN" altLang="en-US" sz="3200" dirty="0"/>
+              <a:t>可编程管线</a:t>
+            </a:r>
+            <a:r>
+              <a:rPr lang="en-US" altLang="zh-CN" sz="3200" dirty="0"/>
+              <a:t>	&amp;	</a:t>
+            </a:r>
+            <a:r>
+              <a:rPr lang="zh-Hans-CN" altLang="en-US" sz="3200" dirty="0"/>
+              <a:t>坐标变换</a:t>
+            </a:r>
+            <a:endParaRPr lang="zh-CN" altLang="en-US" dirty="0"/>
+          </a:p>
+          <a:p>
+            <a:r>
+              <a:rPr lang="en-us" sz="3200" dirty="0"/>
+              <a:t>	</a:t>
+            </a:r>
           </a:p>
         </p:txBody>
       </p:sp>
       <p:pic>
         <p:nvPicPr>
-          <p:cNvPr id="3" name="图片1"/>
+          <p:cNvPr id="4" name="图片 3">
+            <a:extLst>
+              <a:ext uri="{FF2B5EF4-FFF2-40B4-BE49-F238E27FC236}">
+                <a16:creationId xmlns:a16="http://schemas.microsoft.com/office/drawing/2014/main" id="{6862175D-AE4B-403F-A40D-623AB73BDF3E}"/>
+              </a:ext>
+            </a:extLst>
+          </p:cNvPr>
           <p:cNvPicPr>
-            <a:extLst>
-              <a:ext uri="smNativeData">
-                <pr:smNativeData xmlns:pr="smNativeData" val="SMDATA_15_47fkXxMAAAAlAAAAEQAAAA0AAAAAkAAAAEgAAACQAAAASAAAAAAAAAAAAAAAAAAAAAEAAABQAAAAAAAAAAAA4D8AAAAAAADgPwAAAAAAAOA/AAAAAAAA4D8AAAAAAADgPwAAAAAAAOA/AAAAAAAA4D8AAAAAAADgPwAAAAAAAOA/AAAAAAAA4D8CAAAAjAAAAAAAAAAAAAAAT4G9DP///wgAAAAAAAAAAAAAAAAAAAAAAAAAAAAAAAAAAAAAZAAAAAEAAABAAAAAAAAAAAAAAAAAAAAAAAAAAAAAAAAAAAAAAAAAAAAAAAAAAAAAAAAAAAAAAAAAAAAAAAAAAAAAAAAAAAAAAAAAAAAAAAAAAAAAAAAAAAAAAAAAAAAAFAAAADwAAAAAAAAAAAAAAAAAAAkUAAAAAQAAABQAAAAUAAAAFAAAAAEAAAAAAAAAZAAAAGQAAAAAAAAAZAAAAGQAAAAVAAAAYAAAAAAAAAAAAAAADwAAACADAAAAAAAAAAAAAAEAAACgMgAAVgcAAKr4//8BAAAAf39/AAEAAABkAAAAAAAAABQAAABAHwAAAAAAACYAAAAAAAAAwOD//wAAAAAmAAAAZAAAABYAAABMAAAAAAAAAAAAAAAEAAAAAAAAAAEAAADu7OEKAAAAACgAAAAoAAAAZAAAAGQAAAAAAAAAzMzMAAAAAABQAAAAUAAAAGQAAABkAAAAAAAAAAcAAAA4AAAAAAAAAAAAAAAAAAAA////AAAAAAAAAAAAAAAAAAAAAAAAAAAAAAAAAAAAAABkAAAAZAAAAAAAAAAjAAAABAAAAGQAAAAXAAAAFAAAAAAAAAAAAAAA/38AAP9/AAAAAAAACQAAAAQAAAAAAAAADAAAABAAAAAAAAAAAAAAAAAAAAAAAAAAHgAAAGgAAAAAAAAAAAAAAAAAAAAAAAAAAAAAABAnAAAQJwAAAAAAAAAAAAAAAAAAAAAAAAAAAAAAAAAAAAAAAAAAAAAUAAAAAAAAAMDA/wAAAAAAZAAAADIAAAAAAAAAZAAAAAAAAAB/f38ACgAAAB8AAABUAAAAT4G9Bf///wEAAAAAAAAAAAAAAAAAAAAAAAAAAAAAAAAAAAAAAAAAAAAAAAJ/f38A7uzhA8zMzADAwP8Af39/AAAAAAAAAAAAAAAAAP///wAAAAAAIQAAABgAAAAUAAAABQUAAEcWAADYDAAACBkAABAAAAAmAAAACAAAAP//////////"/>
-              </a:ext>
-            </a:extLst>
+            <a:picLocks noChangeAspect="1"/>
           </p:cNvPicPr>
           <p:nvPr/>
         </p:nvPicPr>
@@ -6800,8 +7584,90 @@
         </p:blipFill>
         <p:spPr>
           <a:xfrm>
-            <a:off x="815975" y="3621405"/>
-            <a:ext cx="1271905" cy="447675"/>
+            <a:off x="728075" y="2899557"/>
+            <a:ext cx="3715132" cy="2123777"/>
+          </a:xfrm>
+          <a:prstGeom prst="rect">
+            <a:avLst/>
+          </a:prstGeom>
+        </p:spPr>
+      </p:pic>
+      <p:pic>
+        <p:nvPicPr>
+          <p:cNvPr id="5" name="图片 4">
+            <a:extLst>
+              <a:ext uri="{FF2B5EF4-FFF2-40B4-BE49-F238E27FC236}">
+                <a16:creationId xmlns:a16="http://schemas.microsoft.com/office/drawing/2014/main" id="{2E29B029-9AAA-4906-A888-C10E161AF95F}"/>
+              </a:ext>
+            </a:extLst>
+          </p:cNvPr>
+          <p:cNvPicPr>
+            <a:picLocks noChangeAspect="1"/>
+          </p:cNvPicPr>
+          <p:nvPr/>
+        </p:nvPicPr>
+        <p:blipFill>
+          <a:blip r:embed="rId3"/>
+          <a:stretch>
+            <a:fillRect/>
+          </a:stretch>
+        </p:blipFill>
+        <p:spPr>
+          <a:xfrm>
+            <a:off x="5040312" y="2899558"/>
+            <a:ext cx="4312238" cy="2123777"/>
+          </a:xfrm>
+          <a:prstGeom prst="rect">
+            <a:avLst/>
+          </a:prstGeom>
+        </p:spPr>
+      </p:pic>
+    </p:spTree>
+    <p:extLst>
+      <p:ext uri="{BB962C8B-B14F-4D97-AF65-F5344CB8AC3E}">
+        <p14:creationId xmlns:p14="http://schemas.microsoft.com/office/powerpoint/2010/main" val="3076095452"/>
+      </p:ext>
+    </p:extLst>
+  </p:cSld>
+  <p:clrMapOvr>
+    <a:masterClrMapping/>
+  </p:clrMapOvr>
+</p:sld>
+</file>
+
+<file path=ppt/slides/slide6.xml><?xml version="1.0" encoding="utf-8"?>
+<p:sld xmlns:a="http://schemas.openxmlformats.org/drawingml/2006/main" xmlns:r="http://schemas.openxmlformats.org/officeDocument/2006/relationships" xmlns:p="http://schemas.openxmlformats.org/presentationml/2006/main">
+  <p:cSld>
+    <p:spTree>
+      <p:nvGrpSpPr>
+        <p:cNvPr id="1" name=""/>
+        <p:cNvGrpSpPr/>
+        <p:nvPr/>
+      </p:nvGrpSpPr>
+      <p:grpSpPr>
+        <a:xfrm>
+          <a:off x="0" y="0"/>
+          <a:ext cx="0" cy="0"/>
+          <a:chOff x="0" y="0"/>
+          <a:chExt cx="0" cy="0"/>
+        </a:xfrm>
+      </p:grpSpPr>
+      <p:sp>
+        <p:nvSpPr>
+          <p:cNvPr id="2" name="TextShape 1"/>
+          <p:cNvSpPr>
+            <a:extLst>
+              <a:ext uri="smNativeData">
+                <pr:smNativeData xmlns="" xmlns:p14="http://schemas.microsoft.com/office/powerpoint/2010/main" xmlns:pr="smNativeData" val="SMDATA_13_47fkXxMAAAAlAAAAZAAAAA0AAAAAAAAAAAAAAAAAAAAAAAAAAAAAAAABAAAAAAAAAAEAAABQAAAAAAAAAAAA4D8AAAAAAADgPwAAAAAAAOA/AAAAAAAA4D8AAAAAAADgPwAAAAAAAOA/AAAAAAAA4D8AAAAAAADgPwAAAAAAAOA/AAAAAAAA4D8CAAAAjAAAAAAAAAAAAAAAT4G9DP///wgAAAAAAAAAAAAAAAAAAAAAAAAAAAAAAAAAAAAAZAAAAAEAAABAAAAAAAAAAAAAAAAAAAAAAAAAAAAAAAAAAAAAAAAAAAAAAAAAAAAAAAAAAAAAAAAAAAAAAAAAAAAAAAAAAAAAAAAAAAAAAAAAAAAAAAAAAAAAAAAAAAAAFAAAADwAAAAAAAAAAAAAAAAAAAkUAAAAAQAAABQAAAAUAAAAFAAAAAEAAAAAAAAAZAAAAGQAAAAAAAAAZAAAAGQAAAAVAAAAYAAAAAAAAAAAAAAADwAAACADAAAAAAAAAAAAAAEAAACgMgAAVgcAAKr4//8BAAAAf39/AAEAAABkAAAAAAAAABQAAABAHwAAAAAAACYAAAAAAAAAwOD//wAAAAAmAAAAZAAAABYAAABMAAAAAAAAAAAAAAAEAAAAAAAAAAEAAADu7OEKAAAAACgAAAAoAAAAZAAAAGQAAAAAAAAAzMzMAAAAAABQAAAAUAAAAGQAAABkAAAAAAAAABcAAAAUAAAAAAAAAAAAAAD/fwAA/38AAAAAAAAJAAAABAAAAJoRAAAMAAAAEAAAAAAAAAAAAAAAAAAAAAAAAAAeAAAAaAAAAAAAAAAAAAAAAAAAAAAAAAAAAAAAECcAABAnAAAAAAAAAAAAAAAAAAAAAAAAAAAAAAAAAAAAAAAAAAAAABQAAAAAAAAAwMD/AAAAAABkAAAAMgAAAAAAAABkAAAAAAAAAH9/fwAKAAAAHwAAAFQAAABPgb0F////AQAAAAAAAAAAAAAAAAAAAAAAAAAAAAAAAAAAAAAAAAAAAAAAAn9/fwDu7OEDzMzMAMDA/wB/f38AAAAAAAAAAAAAAAAAAAAAAAAAAAAhAAAAGAAAABQAAAAaAwAA2wEAAOg6AACeCQAAAAAAACYAAAAIAAAA//////////8="/>
+              </a:ext>
+            </a:extLst>
+          </p:cNvSpPr>
+          <p:nvPr/>
+        </p:nvSpPr>
+        <p:spPr>
+          <a:xfrm>
+            <a:off x="504190" y="301625"/>
+            <a:ext cx="9071610" cy="1261745"/>
           </a:xfrm>
           <a:prstGeom prst="rect">
             <a:avLst/>
@@ -6812,19 +7678,594 @@
           </a:ln>
           <a:effectLst/>
         </p:spPr>
-      </p:pic>
+        <p:txBody>
+          <a:bodyPr vert="horz" wrap="square" lIns="0" tIns="0" rIns="0" bIns="0" numCol="1" spcCol="215900" anchor="ctr"/>
+          <a:lstStyle/>
+          <a:p>
+            <a:pPr algn="ctr">
+              <a:defRPr>
+                <a:effectLst>
+                  <a:outerShdw dist="63500" dir="3600000" algn="tl" rotWithShape="0">
+                    <a:srgbClr val="000000">
+                      <a:alpha val="40000"/>
+                    </a:srgbClr>
+                  </a:outerShdw>
+                </a:effectLst>
+              </a:defRPr>
+            </a:pPr>
+            <a:r>
+              <a:rPr lang="zh-CN" altLang="en-US" sz="4400" dirty="0"/>
+              <a:t>控</a:t>
+            </a:r>
+            <a:r>
+              <a:rPr lang="en-US" altLang="zh-CN" sz="4400" dirty="0"/>
+              <a:t>	</a:t>
+            </a:r>
+            <a:r>
+              <a:rPr lang="zh-CN" altLang="en-US" sz="4400" dirty="0"/>
+              <a:t>制</a:t>
+            </a:r>
+            <a:r>
+              <a:rPr lang="en-US" altLang="zh-CN" sz="4400" dirty="0"/>
+              <a:t>	</a:t>
+            </a:r>
+            <a:r>
+              <a:rPr lang="zh-CN" altLang="en-US" sz="4400" dirty="0"/>
+              <a:t>定</a:t>
+            </a:r>
+            <a:r>
+              <a:rPr lang="en-US" altLang="zh-CN" sz="4400" dirty="0"/>
+              <a:t>	</a:t>
+            </a:r>
+            <a:r>
+              <a:rPr lang="zh-CN" altLang="en-US" sz="4400" dirty="0"/>
+              <a:t>向</a:t>
+            </a:r>
+            <a:r>
+              <a:rPr lang="en-US" altLang="zh-CN" sz="4400" dirty="0"/>
+              <a:t>	</a:t>
+            </a:r>
+            <a:r>
+              <a:rPr lang="zh-CN" altLang="en-US" sz="4400" dirty="0"/>
+              <a:t>旋</a:t>
+            </a:r>
+            <a:r>
+              <a:rPr lang="en-US" altLang="zh-CN" sz="4400" dirty="0"/>
+              <a:t>	</a:t>
+            </a:r>
+            <a:r>
+              <a:rPr lang="zh-CN" altLang="en-US" sz="4400" dirty="0"/>
+              <a:t>转</a:t>
+            </a:r>
+            <a:endParaRPr lang="en-us" sz="4400" dirty="0"/>
+          </a:p>
+        </p:txBody>
+      </p:sp>
+      <p:sp>
+        <p:nvSpPr>
+          <p:cNvPr id="3" name="TextShape 2"/>
+          <p:cNvSpPr>
+            <a:extLst>
+              <a:ext uri="smNativeData">
+                <pr:smNativeData xmlns="" xmlns:p14="http://schemas.microsoft.com/office/powerpoint/2010/main" xmlns:pr="smNativeData" val="SMDATA_13_47fkXxMAAAAlAAAAZAAAAA0AAAAAAAAAAAAAAAAAAAAAAAAAAAAAAAAAAAAAAAAAAAEAAABQAAAAAAAAAAAA4D8AAAAAAADgPwAAAAAAAOA/AAAAAAAA4D8AAAAAAADgPwAAAAAAAOA/AAAAAAAA4D8AAAAAAADgPwAAAAAAAOA/AAAAAAAA4D8CAAAAjAAAAAAAAAAAAAAAT4G9DP///wgAAAAAAAAAAAAAAAAAAAAAAAAAAAAAAAAAAAAAZAAAAAEAAABAAAAAAAAAAAAAAAAAAAAAAAAAAAAAAAAAAAAAAAAAAAAAAAAAAAAAAAAAAAAAAAAAAAAAAAAAAAAAAAAAAAAAAAAAAAAAAAAAAAAAAAAAAAAAAAAAAAAAFAAAADwAAAAAAAAAAAAAAAAAAAkUAAAAAQAAABQAAAAUAAAAFAAAAAEAAAAAAAAAZAAAAGQAAAAAAAAAZAAAAGQAAAAVAAAAYAAAAAAAAAAAAAAADwAAACADAAAAAAAAAAAAAAEAAACgMgAAVgcAAKr4//8BAAAAf39/AAEAAABkAAAAAAAAABQAAABAHwAAAAAAACYAAAAAAAAAwOD//wAAAAAmAAAAZAAAABYAAABMAAAAAAAAAAAAAAAEAAAAAAAAAAEAAADu7OEKAAAAACgAAAAoAAAAZAAAAGQAAAAAAAAAzMzMAAAAAABQAAAAUAAAAGQAAABkAAAAAAAAABcAAAAUAAAAAAAAAAAAAAD/fwAA/38AAAAAAAAJAAAABAAAAFwHAAAMAAAAEAAAAAAAAAAAAAAAAAAAAAAAAAAeAAAAaAAAAAAAAAAAAAAAAAAAAAAAAAAAAAAAECcAABAnAAAAAAAAAAAAAAAAAAAAAAAAAAAAAAAAAAAAAAAAAAAAABQAAAAAAAAAwMD/AAAAAABkAAAAMgAAAAAAAABkAAAAAAAAAH9/fwAKAAAAHwAAAFQAAABPgb0F////AQAAAAAAAAAAAAAAAAAAAAAAAAAAAAAAAAAAAAAAAAAAAAAAAn9/fwDu7OEDzMzMAMDA/wB/f38AAAAAAAAAAAAAAAAAAAAAAAAAAAAhAAAAGAAAABQAAAAaAwAA4goAAOg6AADbJQAAAAAAACYAAAAIAAAA//////////8="/>
+              </a:ext>
+            </a:extLst>
+          </p:cNvSpPr>
+          <p:nvPr/>
+        </p:nvSpPr>
+        <p:spPr>
+          <a:xfrm>
+            <a:off x="504190" y="1769110"/>
+            <a:ext cx="9071610" cy="4384675"/>
+          </a:xfrm>
+          <a:prstGeom prst="rect">
+            <a:avLst/>
+          </a:prstGeom>
+          <a:noFill/>
+          <a:ln>
+            <a:noFill/>
+          </a:ln>
+          <a:effectLst/>
+        </p:spPr>
+        <p:txBody>
+          <a:bodyPr vert="horz" wrap="square" lIns="0" tIns="0" rIns="0" bIns="0" numCol="1" spcCol="215900" anchor="t"/>
+          <a:lstStyle/>
+          <a:p>
+            <a:r>
+              <a:rPr lang="en-us" sz="3200" dirty="0"/>
+              <a:t>	</a:t>
+            </a:r>
+            <a:r>
+              <a:rPr lang="zh-Hans-CN" altLang="en-US" sz="3200" dirty="0"/>
+              <a:t>运用索引，记录各个位置的小方块编号</a:t>
+            </a:r>
+            <a:endParaRPr lang="LID4096" altLang="zh-CN" sz="3200" dirty="0"/>
+          </a:p>
+          <a:p>
+            <a:r>
+              <a:rPr lang="en-us" sz="3200" dirty="0"/>
+              <a:t>	</a:t>
+            </a:r>
+            <a:r>
+              <a:rPr lang="zh-Hans-CN" altLang="en-US" sz="3200" dirty="0"/>
+              <a:t>根据目前旋转区块与方向更新索引</a:t>
+            </a:r>
+            <a:endParaRPr lang="en-us" sz="3200" dirty="0"/>
+          </a:p>
+        </p:txBody>
+      </p:sp>
+    </p:spTree>
+    <p:extLst>
+      <p:ext uri="{BB962C8B-B14F-4D97-AF65-F5344CB8AC3E}">
+        <p14:creationId xmlns:p14="http://schemas.microsoft.com/office/powerpoint/2010/main" val="2301236134"/>
+      </p:ext>
+    </p:extLst>
+  </p:cSld>
+  <p:clrMapOvr>
+    <a:masterClrMapping/>
+  </p:clrMapOvr>
+</p:sld>
+</file>
+
+<file path=ppt/slides/slide7.xml><?xml version="1.0" encoding="utf-8"?>
+<p:sld xmlns:a="http://schemas.openxmlformats.org/drawingml/2006/main" xmlns:r="http://schemas.openxmlformats.org/officeDocument/2006/relationships" xmlns:p="http://schemas.openxmlformats.org/presentationml/2006/main">
+  <p:cSld>
+    <p:spTree>
+      <p:nvGrpSpPr>
+        <p:cNvPr id="1" name=""/>
+        <p:cNvGrpSpPr/>
+        <p:nvPr/>
+      </p:nvGrpSpPr>
+      <p:grpSpPr>
+        <a:xfrm>
+          <a:off x="0" y="0"/>
+          <a:ext cx="0" cy="0"/>
+          <a:chOff x="0" y="0"/>
+          <a:chExt cx="0" cy="0"/>
+        </a:xfrm>
+      </p:grpSpPr>
+      <p:sp>
+        <p:nvSpPr>
+          <p:cNvPr id="2" name="TextShape 1"/>
+          <p:cNvSpPr>
+            <a:extLst>
+              <a:ext uri="smNativeData">
+                <pr:smNativeData xmlns:pr="smNativeData" xmlns:p14="http://schemas.microsoft.com/office/powerpoint/2010/main" xmlns="" val="SMDATA_13_47fkXxMAAAAlAAAAZAAAAA0AAAAAAAAAAAAAAAAAAAAAAAAAAAAAAAABAAAAAAAAAAEAAABQAAAAAAAAAAAA4D8AAAAAAADgPwAAAAAAAOA/AAAAAAAA4D8AAAAAAADgPwAAAAAAAOA/AAAAAAAA4D8AAAAAAADgPwAAAAAAAOA/AAAAAAAA4D8CAAAAjAAAAAAAAAAAAAAAT4G9DP///wgAAAAAAAAAAAAAAAAAAAAAAAAAAAAAAAAAAAAAZAAAAAEAAABAAAAAAAAAAAAAAAAAAAAAAAAAAAAAAAAAAAAAAAAAAAAAAAAAAAAAAAAAAAAAAAAAAAAAAAAAAAAAAAAAAAAAAAAAAAAAAAAAAAAAAAAAAAAAAAAAAAAAFAAAADwAAAAAAAAAAAAAAAAAAAkUAAAAAQAAABQAAAAUAAAAFAAAAAEAAAAAAAAAZAAAAGQAAAAAAAAAZAAAAGQAAAAVAAAAYAAAAAAAAAAAAAAADwAAACADAAAAAAAAAAAAAAEAAACgMgAAVgcAAKr4//8BAAAAf39/AAEAAABkAAAAAAAAABQAAABAHwAAAAAAACYAAAAAAAAAwOD//wAAAAAmAAAAZAAAABYAAABMAAAAAAAAAAAAAAAEAAAAAAAAAAEAAADu7OEKAAAAACgAAAAoAAAAZAAAAGQAAAAAAAAAzMzMAAAAAABQAAAAUAAAAGQAAABkAAAAAAAAABcAAAAUAAAAAAAAAAAAAAD/fwAA/38AAAAAAAAJAAAABAAAAJoRAAAMAAAAEAAAAAAAAAAAAAAAAAAAAAAAAAAeAAAAaAAAAAAAAAAAAAAAAAAAAAAAAAAAAAAAECcAABAnAAAAAAAAAAAAAAAAAAAAAAAAAAAAAAAAAAAAAAAAAAAAABQAAAAAAAAAwMD/AAAAAABkAAAAMgAAAAAAAABkAAAAAAAAAH9/fwAKAAAAHwAAAFQAAABPgb0F////AQAAAAAAAAAAAAAAAAAAAAAAAAAAAAAAAAAAAAAAAAAAAAAAAn9/fwDu7OEDzMzMAMDA/wB/f38AAAAAAAAAAAAAAAAAAAAAAAAAAAAhAAAAGAAAABQAAAAaAwAA2wEAAOg6AACeCQAAAAAAACYAAAAIAAAA//////////8="/>
+              </a:ext>
+            </a:extLst>
+          </p:cNvSpPr>
+          <p:nvPr/>
+        </p:nvSpPr>
+        <p:spPr>
+          <a:xfrm>
+            <a:off x="504190" y="301625"/>
+            <a:ext cx="9071610" cy="1261745"/>
+          </a:xfrm>
+          <a:prstGeom prst="rect">
+            <a:avLst/>
+          </a:prstGeom>
+          <a:noFill/>
+          <a:ln>
+            <a:noFill/>
+          </a:ln>
+          <a:effectLst/>
+        </p:spPr>
+        <p:txBody>
+          <a:bodyPr vert="horz" wrap="square" lIns="0" tIns="0" rIns="0" bIns="0" numCol="1" spcCol="215900" anchor="ctr"/>
+          <a:lstStyle/>
+          <a:p>
+            <a:pPr algn="ctr">
+              <a:defRPr>
+                <a:effectLst>
+                  <a:outerShdw dist="63500" dir="3600000" algn="tl" rotWithShape="0">
+                    <a:srgbClr val="000000">
+                      <a:alpha val="40000"/>
+                    </a:srgbClr>
+                  </a:outerShdw>
+                </a:effectLst>
+              </a:defRPr>
+            </a:pPr>
+            <a:r>
+              <a:rPr lang="en-us" altLang="zh-CN" sz="4400" dirty="0"/>
+              <a:t>加</a:t>
+            </a:r>
+            <a:r>
+              <a:rPr lang="en-US" altLang="zh-CN" sz="4400" dirty="0"/>
+              <a:t>	</a:t>
+            </a:r>
+            <a:r>
+              <a:rPr lang="en-us" altLang="zh-CN" sz="4400" dirty="0"/>
+              <a:t>载</a:t>
+            </a:r>
+            <a:r>
+              <a:rPr lang="en-US" altLang="zh-CN" sz="4400" dirty="0"/>
+              <a:t>	</a:t>
+            </a:r>
+            <a:r>
+              <a:rPr lang="en-us" altLang="zh-CN" sz="4400" dirty="0"/>
+              <a:t>纹</a:t>
+            </a:r>
+            <a:r>
+              <a:rPr lang="en-US" altLang="zh-CN" sz="4400" dirty="0"/>
+              <a:t>	</a:t>
+            </a:r>
+            <a:r>
+              <a:rPr lang="en-us" altLang="zh-CN" sz="4400" dirty="0"/>
+              <a:t>理</a:t>
+            </a:r>
+            <a:endParaRPr lang="en-us" sz="4400" dirty="0"/>
+          </a:p>
+        </p:txBody>
+      </p:sp>
+      <p:sp>
+        <p:nvSpPr>
+          <p:cNvPr id="3" name="TextShape 2"/>
+          <p:cNvSpPr>
+            <a:extLst>
+              <a:ext uri="smNativeData">
+                <pr:smNativeData xmlns:pr="smNativeData" xmlns:p14="http://schemas.microsoft.com/office/powerpoint/2010/main" xmlns="" val="SMDATA_13_47fkXxMAAAAlAAAAZAAAAA0AAAAAAAAAAAAAAAAAAAAAAAAAAAAAAAAAAAAAAAAAAAEAAABQAAAAAAAAAAAA4D8AAAAAAADgPwAAAAAAAOA/AAAAAAAA4D8AAAAAAADgPwAAAAAAAOA/AAAAAAAA4D8AAAAAAADgPwAAAAAAAOA/AAAAAAAA4D8CAAAAjAAAAAAAAAAAAAAAT4G9DP///wgAAAAAAAAAAAAAAAAAAAAAAAAAAAAAAAAAAAAAZAAAAAEAAABAAAAAAAAAAAAAAAAAAAAAAAAAAAAAAAAAAAAAAAAAAAAAAAAAAAAAAAAAAAAAAAAAAAAAAAAAAAAAAAAAAAAAAAAAAAAAAAAAAAAAAAAAAAAAAAAAAAAAFAAAADwAAAAAAAAAAAAAAAAAAAkUAAAAAQAAABQAAAAUAAAAFAAAAAEAAAAAAAAAZAAAAGQAAAAAAAAAZAAAAGQAAAAVAAAAYAAAAAAAAAAAAAAADwAAACADAAAAAAAAAAAAAAEAAACgMgAAVgcAAKr4//8BAAAAf39/AAEAAABkAAAAAAAAABQAAABAHwAAAAAAACYAAAAAAAAAwOD//wAAAAAmAAAAZAAAABYAAABMAAAAAAAAAAAAAAAEAAAAAAAAAAEAAADu7OEKAAAAACgAAAAoAAAAZAAAAGQAAAAAAAAAzMzMAAAAAABQAAAAUAAAAGQAAABkAAAAAAAAABcAAAAUAAAAAAAAAAAAAAD/fwAA/38AAAAAAAAJAAAABAAAAFwHAAAMAAAAEAAAAAAAAAAAAAAAAAAAAAAAAAAeAAAAaAAAAAAAAAAAAAAAAAAAAAAAAAAAAAAAECcAABAnAAAAAAAAAAAAAAAAAAAAAAAAAAAAAAAAAAAAAAAAAAAAABQAAAAAAAAAwMD/AAAAAABkAAAAMgAAAAAAAABkAAAAAAAAAH9/fwAKAAAAHwAAAFQAAABPgb0F////AQAAAAAAAAAAAAAAAAAAAAAAAAAAAAAAAAAAAAAAAAAAAAAAAn9/fwDu7OEDzMzMAMDA/wB/f38AAAAAAAAAAAAAAAAAAAAAAAAAAAAhAAAAGAAAABQAAAAaAwAA4goAAOg6AADbJQAAAAAAACYAAAAIAAAA//////////8="/>
+              </a:ext>
+            </a:extLst>
+          </p:cNvSpPr>
+          <p:nvPr/>
+        </p:nvSpPr>
+        <p:spPr>
+          <a:xfrm>
+            <a:off x="504190" y="1769110"/>
+            <a:ext cx="9071610" cy="4384675"/>
+          </a:xfrm>
+          <a:prstGeom prst="rect">
+            <a:avLst/>
+          </a:prstGeom>
+          <a:noFill/>
+          <a:ln>
+            <a:noFill/>
+          </a:ln>
+          <a:effectLst/>
+        </p:spPr>
+        <p:txBody>
+          <a:bodyPr vert="horz" wrap="square" lIns="0" tIns="0" rIns="0" bIns="0" numCol="1" spcCol="215900" anchor="t"/>
+          <a:lstStyle/>
+          <a:p>
+            <a:r>
+              <a:rPr lang="en-US" sz="3200" dirty="0"/>
+              <a:t>	</a:t>
+            </a:r>
+            <a:r>
+              <a:rPr lang="zh-Hans-CN" altLang="en-US" sz="3200" dirty="0"/>
+              <a:t>用</a:t>
+            </a:r>
+            <a:r>
+              <a:rPr lang="en-US" altLang="zh-CN" sz="3200" dirty="0" err="1"/>
+              <a:t>stb</a:t>
+            </a:r>
+            <a:r>
+              <a:rPr lang="zh-Hans-CN" altLang="en-US" sz="3200" dirty="0"/>
+              <a:t>库加载图片，并实现切分到各个小立方体的各面，再分别合并为各小立方体的纹理图，并将纹理图载入</a:t>
+            </a:r>
+            <a:r>
+              <a:rPr lang="en-US" altLang="zh-CN" sz="3200" dirty="0"/>
+              <a:t>GPU</a:t>
+            </a:r>
+            <a:r>
+              <a:rPr lang="zh-Hans-CN" altLang="en-US" sz="3200" dirty="0"/>
+              <a:t>显存中的缓冲区。</a:t>
+            </a:r>
+            <a:endParaRPr lang="en-US" altLang="zh-CN" sz="3200" dirty="0"/>
+          </a:p>
+          <a:p>
+            <a:r>
+              <a:rPr lang="en-US" sz="3200" dirty="0"/>
+              <a:t>	</a:t>
+            </a:r>
+            <a:r>
+              <a:rPr lang="zh-Hans-CN" altLang="en-US" sz="3200" dirty="0"/>
+              <a:t>在绘制中，片段着色器渲染面时通过模型中定义的</a:t>
+            </a:r>
+            <a:r>
+              <a:rPr lang="en-US" altLang="zh-CN" sz="3200" dirty="0" err="1"/>
+              <a:t>uv</a:t>
+            </a:r>
+            <a:r>
+              <a:rPr lang="zh-Hans-CN" altLang="en-US" sz="3200" dirty="0"/>
+              <a:t>坐标值在纹理图上取样，并与光照信息混合，最终渲染出像素颜色。</a:t>
+            </a:r>
+            <a:endParaRPr lang="en-US" sz="3200" dirty="0"/>
+          </a:p>
+          <a:p>
+            <a:r>
+              <a:rPr lang="en-us" sz="3200" dirty="0"/>
+              <a:t>	</a:t>
+            </a:r>
+            <a:endParaRPr lang="LID4096" sz="3200" dirty="0"/>
+          </a:p>
+          <a:p>
+            <a:endParaRPr lang="en-us" sz="3200" dirty="0"/>
+          </a:p>
+        </p:txBody>
+      </p:sp>
+    </p:spTree>
+    <p:extLst>
+      <p:ext uri="{BB962C8B-B14F-4D97-AF65-F5344CB8AC3E}">
+        <p14:creationId xmlns:p14="http://schemas.microsoft.com/office/powerpoint/2010/main" val="2909662845"/>
+      </p:ext>
+    </p:extLst>
+  </p:cSld>
+  <p:clrMapOvr>
+    <a:masterClrMapping/>
+  </p:clrMapOvr>
+</p:sld>
+</file>
+
+<file path=ppt/slides/slide8.xml><?xml version="1.0" encoding="utf-8"?>
+<p:sld xmlns:a="http://schemas.openxmlformats.org/drawingml/2006/main" xmlns:r="http://schemas.openxmlformats.org/officeDocument/2006/relationships" xmlns:p="http://schemas.openxmlformats.org/presentationml/2006/main">
+  <p:cSld>
+    <p:spTree>
+      <p:nvGrpSpPr>
+        <p:cNvPr id="1" name=""/>
+        <p:cNvGrpSpPr/>
+        <p:nvPr/>
+      </p:nvGrpSpPr>
+      <p:grpSpPr>
+        <a:xfrm>
+          <a:off x="0" y="0"/>
+          <a:ext cx="0" cy="0"/>
+          <a:chOff x="0" y="0"/>
+          <a:chExt cx="0" cy="0"/>
+        </a:xfrm>
+      </p:grpSpPr>
+      <p:sp>
+        <p:nvSpPr>
+          <p:cNvPr id="2" name="TextShape 1"/>
+          <p:cNvSpPr>
+            <a:extLst>
+              <a:ext uri="smNativeData">
+                <pr:smNativeData xmlns="" xmlns:p14="http://schemas.microsoft.com/office/powerpoint/2010/main" xmlns:pr="smNativeData" val="SMDATA_13_47fkXxMAAAAlAAAAZAAAAA0AAAAAAAAAAAAAAAAAAAAAAAAAAAAAAAABAAAAAAAAAAEAAABQAAAAAAAAAAAA4D8AAAAAAADgPwAAAAAAAOA/AAAAAAAA4D8AAAAAAADgPwAAAAAAAOA/AAAAAAAA4D8AAAAAAADgPwAAAAAAAOA/AAAAAAAA4D8CAAAAjAAAAAAAAAAAAAAAT4G9DP///wgAAAAAAAAAAAAAAAAAAAAAAAAAAAAAAAAAAAAAZAAAAAEAAABAAAAAAAAAAAAAAAAAAAAAAAAAAAAAAAAAAAAAAAAAAAAAAAAAAAAAAAAAAAAAAAAAAAAAAAAAAAAAAAAAAAAAAAAAAAAAAAAAAAAAAAAAAAAAAAAAAAAAFAAAADwAAAAAAAAAAAAAAAAAAAkUAAAAAQAAABQAAAAUAAAAFAAAAAEAAAAAAAAAZAAAAGQAAAAAAAAAZAAAAGQAAAAVAAAAYAAAAAAAAAAAAAAADwAAACADAAAAAAAAAAAAAAEAAACgMgAAVgcAAKr4//8BAAAAf39/AAEAAABkAAAAAAAAABQAAABAHwAAAAAAACYAAAAAAAAAwOD//wAAAAAmAAAAZAAAABYAAABMAAAAAAAAAAAAAAAEAAAAAAAAAAEAAADu7OEKAAAAACgAAAAoAAAAZAAAAGQAAAAAAAAAzMzMAAAAAABQAAAAUAAAAGQAAABkAAAAAAAAABcAAAAUAAAAAAAAAAAAAAD/fwAA/38AAAAAAAAJAAAABAAAAJoRAAAMAAAAEAAAAAAAAAAAAAAAAAAAAAAAAAAeAAAAaAAAAAAAAAAAAAAAAAAAAAAAAAAAAAAAECcAABAnAAAAAAAAAAAAAAAAAAAAAAAAAAAAAAAAAAAAAAAAAAAAABQAAAAAAAAAwMD/AAAAAABkAAAAMgAAAAAAAABkAAAAAAAAAH9/fwAKAAAAHwAAAFQAAABPgb0F////AQAAAAAAAAAAAAAAAAAAAAAAAAAAAAAAAAAAAAAAAAAAAAAAAn9/fwDu7OEDzMzMAMDA/wB/f38AAAAAAAAAAAAAAAAAAAAAAAAAAAAhAAAAGAAAABQAAAAaAwAA2wEAAOg6AACeCQAAAAAAACYAAAAIAAAA//////////8="/>
+              </a:ext>
+            </a:extLst>
+          </p:cNvSpPr>
+          <p:nvPr/>
+        </p:nvSpPr>
+        <p:spPr>
+          <a:xfrm>
+            <a:off x="504190" y="301625"/>
+            <a:ext cx="9071610" cy="1261745"/>
+          </a:xfrm>
+          <a:prstGeom prst="rect">
+            <a:avLst/>
+          </a:prstGeom>
+          <a:noFill/>
+          <a:ln>
+            <a:noFill/>
+          </a:ln>
+          <a:effectLst/>
+        </p:spPr>
+        <p:txBody>
+          <a:bodyPr vert="horz" wrap="square" lIns="0" tIns="0" rIns="0" bIns="0" numCol="1" spcCol="215900" anchor="ctr"/>
+          <a:lstStyle/>
+          <a:p>
+            <a:pPr algn="ctr">
+              <a:defRPr>
+                <a:effectLst>
+                  <a:outerShdw dist="63500" dir="3600000" algn="tl" rotWithShape="0">
+                    <a:srgbClr val="000000">
+                      <a:alpha val="40000"/>
+                    </a:srgbClr>
+                  </a:outerShdw>
+                </a:effectLst>
+              </a:defRPr>
+            </a:pPr>
+            <a:r>
+              <a:rPr lang="zh-Hans-CN" altLang="en-US" sz="4400" dirty="0"/>
+              <a:t>显</a:t>
+            </a:r>
+            <a:r>
+              <a:rPr lang="en-US" altLang="zh-CN" sz="4400" dirty="0"/>
+              <a:t>	</a:t>
+            </a:r>
+            <a:r>
+              <a:rPr lang="zh-Hans-CN" altLang="en-US" sz="4400" dirty="0"/>
+              <a:t>示</a:t>
+            </a:r>
+            <a:r>
+              <a:rPr lang="en-US" altLang="zh-CN" sz="4400" dirty="0"/>
+              <a:t>	</a:t>
+            </a:r>
+            <a:r>
+              <a:rPr lang="zh-Hans-CN" altLang="en-US" sz="4400" dirty="0"/>
+              <a:t>信</a:t>
+            </a:r>
+            <a:r>
+              <a:rPr lang="en-US" altLang="zh-CN" sz="4400" dirty="0"/>
+              <a:t>	</a:t>
+            </a:r>
+            <a:r>
+              <a:rPr lang="zh-Hans-CN" altLang="en-US" sz="4400" dirty="0"/>
+              <a:t>息</a:t>
+            </a:r>
+            <a:endParaRPr lang="en-us" sz="4400" dirty="0"/>
+          </a:p>
+        </p:txBody>
+      </p:sp>
+      <p:sp>
+        <p:nvSpPr>
+          <p:cNvPr id="3" name="TextShape 2"/>
+          <p:cNvSpPr>
+            <a:extLst>
+              <a:ext uri="smNativeData">
+                <pr:smNativeData xmlns="" xmlns:p14="http://schemas.microsoft.com/office/powerpoint/2010/main" xmlns:pr="smNativeData" val="SMDATA_13_47fkXxMAAAAlAAAAZAAAAA0AAAAAAAAAAAAAAAAAAAAAAAAAAAAAAAAAAAAAAAAAAAEAAABQAAAAAAAAAAAA4D8AAAAAAADgPwAAAAAAAOA/AAAAAAAA4D8AAAAAAADgPwAAAAAAAOA/AAAAAAAA4D8AAAAAAADgPwAAAAAAAOA/AAAAAAAA4D8CAAAAjAAAAAAAAAAAAAAAT4G9DP///wgAAAAAAAAAAAAAAAAAAAAAAAAAAAAAAAAAAAAAZAAAAAEAAABAAAAAAAAAAAAAAAAAAAAAAAAAAAAAAAAAAAAAAAAAAAAAAAAAAAAAAAAAAAAAAAAAAAAAAAAAAAAAAAAAAAAAAAAAAAAAAAAAAAAAAAAAAAAAAAAAAAAAFAAAADwAAAAAAAAAAAAAAAAAAAkUAAAAAQAAABQAAAAUAAAAFAAAAAEAAAAAAAAAZAAAAGQAAAAAAAAAZAAAAGQAAAAVAAAAYAAAAAAAAAAAAAAADwAAACADAAAAAAAAAAAAAAEAAACgMgAAVgcAAKr4//8BAAAAf39/AAEAAABkAAAAAAAAABQAAABAHwAAAAAAACYAAAAAAAAAwOD//wAAAAAmAAAAZAAAABYAAABMAAAAAAAAAAAAAAAEAAAAAAAAAAEAAADu7OEKAAAAACgAAAAoAAAAZAAAAGQAAAAAAAAAzMzMAAAAAABQAAAAUAAAAGQAAABkAAAAAAAAABcAAAAUAAAAAAAAAAAAAAD/fwAA/38AAAAAAAAJAAAABAAAAFwHAAAMAAAAEAAAAAAAAAAAAAAAAAAAAAAAAAAeAAAAaAAAAAAAAAAAAAAAAAAAAAAAAAAAAAAAECcAABAnAAAAAAAAAAAAAAAAAAAAAAAAAAAAAAAAAAAAAAAAAAAAABQAAAAAAAAAwMD/AAAAAABkAAAAMgAAAAAAAABkAAAAAAAAAH9/fwAKAAAAHwAAAFQAAABPgb0F////AQAAAAAAAAAAAAAAAAAAAAAAAAAAAAAAAAAAAAAAAAAAAAAAAn9/fwDu7OEDzMzMAMDA/wB/f38AAAAAAAAAAAAAAAAAAAAAAAAAAAAhAAAAGAAAABQAAAAaAwAA4goAAOg6AADbJQAAAAAAACYAAAAIAAAA//////////8="/>
+              </a:ext>
+            </a:extLst>
+          </p:cNvSpPr>
+          <p:nvPr/>
+        </p:nvSpPr>
+        <p:spPr>
+          <a:xfrm>
+            <a:off x="504190" y="1769110"/>
+            <a:ext cx="9071610" cy="4384675"/>
+          </a:xfrm>
+          <a:prstGeom prst="rect">
+            <a:avLst/>
+          </a:prstGeom>
+          <a:noFill/>
+          <a:ln>
+            <a:noFill/>
+          </a:ln>
+          <a:effectLst/>
+        </p:spPr>
+        <p:txBody>
+          <a:bodyPr vert="horz" wrap="square" lIns="0" tIns="0" rIns="0" bIns="0" numCol="1" spcCol="215900" anchor="t"/>
+          <a:lstStyle/>
+          <a:p>
+            <a:r>
+              <a:rPr lang="en-us" sz="3200" dirty="0">
+                <a:latin typeface="Fira Code" panose="020B0809050000020004" pitchFamily="49" charset="0"/>
+                <a:ea typeface="Fira Code" panose="020B0809050000020004" pitchFamily="49" charset="0"/>
+                <a:cs typeface="Fira Code" panose="020B0809050000020004" pitchFamily="49" charset="0"/>
+              </a:rPr>
+              <a:t>	</a:t>
+            </a:r>
+            <a:r>
+              <a:rPr lang="zh-Hans-CN" altLang="en-US" sz="3200" dirty="0"/>
+              <a:t>用</a:t>
+            </a:r>
+            <a:r>
+              <a:rPr lang="LID4096" altLang="zh-CN" sz="3200" dirty="0"/>
+              <a:t>Freetype</a:t>
+            </a:r>
+            <a:r>
+              <a:rPr lang="zh-Hans-CN" altLang="en-US" sz="3200" dirty="0"/>
+              <a:t>库渲染字体中的矢量字形图为位</a:t>
+            </a:r>
+            <a:endParaRPr lang="en-US" altLang="zh-CN" sz="3200" dirty="0"/>
+          </a:p>
+          <a:p>
+            <a:r>
+              <a:rPr lang="zh-Hans-CN" altLang="en-US" sz="3200" dirty="0"/>
+              <a:t>图，将其作为纹理信息载入</a:t>
+            </a:r>
+            <a:r>
+              <a:rPr lang="en-US" altLang="zh-CN" sz="3200" dirty="0"/>
+              <a:t>GPU</a:t>
+            </a:r>
+            <a:r>
+              <a:rPr lang="zh-Hans-CN" altLang="en-US" sz="3200" dirty="0"/>
+              <a:t>缓冲区。</a:t>
+            </a:r>
+            <a:endParaRPr lang="en-US" altLang="zh-CN" sz="3200" dirty="0"/>
+          </a:p>
+          <a:p>
+            <a:r>
+              <a:rPr lang="en-US" altLang="zh-CN" sz="3200" dirty="0"/>
+              <a:t>	</a:t>
+            </a:r>
+            <a:r>
+              <a:rPr lang="zh-Hans-CN" altLang="en-US" sz="3200" dirty="0"/>
+              <a:t>在渲染时将纹理渲染至屏幕。</a:t>
+            </a:r>
+            <a:endParaRPr lang="zh-CN" altLang="en-US" sz="3200" dirty="0"/>
+          </a:p>
+        </p:txBody>
+      </p:sp>
+    </p:spTree>
+    <p:extLst>
+      <p:ext uri="{BB962C8B-B14F-4D97-AF65-F5344CB8AC3E}">
+        <p14:creationId xmlns:p14="http://schemas.microsoft.com/office/powerpoint/2010/main" val="3389793975"/>
+      </p:ext>
+    </p:extLst>
+  </p:cSld>
+  <p:clrMapOvr>
+    <a:masterClrMapping/>
+  </p:clrMapOvr>
+</p:sld>
+</file>
+
+<file path=ppt/slides/slide9.xml><?xml version="1.0" encoding="utf-8"?>
+<p:sld xmlns:a="http://schemas.openxmlformats.org/drawingml/2006/main" xmlns:r="http://schemas.openxmlformats.org/officeDocument/2006/relationships" xmlns:p="http://schemas.openxmlformats.org/presentationml/2006/main">
+  <p:cSld>
+    <p:spTree>
+      <p:nvGrpSpPr>
+        <p:cNvPr id="1" name=""/>
+        <p:cNvGrpSpPr/>
+        <p:nvPr/>
+      </p:nvGrpSpPr>
+      <p:grpSpPr>
+        <a:xfrm>
+          <a:off x="0" y="0"/>
+          <a:ext cx="0" cy="0"/>
+          <a:chOff x="0" y="0"/>
+          <a:chExt cx="0" cy="0"/>
+        </a:xfrm>
+      </p:grpSpPr>
+      <p:sp>
+        <p:nvSpPr>
+          <p:cNvPr id="2" name="幻灯片标题1"/>
+          <p:cNvSpPr>
+            <a:spLocks noGrp="1" noChangeArrowheads="1"/>
+            <a:extLst>
+              <a:ext uri="smNativeData">
+                <pr:smNativeData xmlns="" xmlns:p14="http://schemas.microsoft.com/office/powerpoint/2010/main" xmlns:pr="smNativeData" val="SMDATA_13_47fkXxMAAAAlAAAAZAAAAA0AAAAAAAAAAAAAAAAAAAAAAAAAAAAAAAABAAAAAAAAAAEAAABQAAAAAAAAAAAA4D8AAAAAAADgPwAAAAAAAOA/AAAAAAAA4D8AAAAAAADgPwAAAAAAAOA/AAAAAAAA4D8AAAAAAADgPwAAAAAAAOA/AAAAAAAA4D8CAAAAjAAAAAAAAAAAAAAAT4G9DP///wgAAAAAAAAAAAAAAAAAAAAAAAAAAAAAAAAAAAAAZAAAAAEAAABAAAAAAAAAAAAAAAAAAAAAAAAAAAAAAAAAAAAAAAAAAAAAAAAAAAAAAAAAAAAAAAAAAAAAAAAAAAAAAAAAAAAAAAAAAAAAAAAAAAAAAAAAAAAAAAAAAAAAFAAAADwAAAAAAAAAAAAAAAAAAAkUAAAAAQAAABQAAAAUAAAAFAAAAAEAAAAAAAAAZAAAAGQAAAAAAAAAZAAAAGQAAAAVAAAAYAAAAAAAAAAAAAAADwAAACADAAAAAAAAAAAAAAEAAACgMgAAVgcAAKr4//8BAAAAf39/AAEAAABkAAAAAAAAABQAAABAHwAAAAAAACYAAAAAAAAAwOD//wAAAAAmAAAAZAAAABYAAABMAAAAAAAAAAAAAAAEAAAAAAAAAAEAAADu7OEKAAAAACgAAAAoAAAAZAAAAGQAAAAAAAAAzMzMAAAAAABQAAAAUAAAAGQAAABkAAAAAAAAABcAAAAUAAAAAAAAAAAAAAD/fwAA/38AAAAAAAAJAAAABAAAAEAaAAAMAAAAEAAAAAAAAAAAAAAAAAAAAAAAAAAeAAAAaAAAAAAAAAAAAAAAAAAAAAAAAAAAAAAAECcAABAnAAAAAAAAAAAAAAAAAAAAAAAAAAAAAAAAAAAAAAAAAAAAABQAAAAAAAAAwMD/AAAAAABkAAAAMgAAAAAAAABkAAAAAAAAAH9/fwAKAAAAHwAAAFQAAABPgb0F////AQAAAAAAAAAAAAAAAAAAAAAAAAAAAAAAAAAAAAAAAAAAAAAAAn9/fwDu7OEDzMzMAMDA/wB/f38AAAAAAAAAAAAAAAAAAAAAAAAAAAAhAAAAGAAAABQAAAAaAwAApQYAAOg6AABGEQAAEAAAACYAAAAIAAAAPCAAAAAAAAA="/>
+              </a:ext>
+            </a:extLst>
+          </p:cNvSpPr>
+          <p:nvPr>
+            <p:ph type="title"/>
+          </p:nvPr>
+        </p:nvSpPr>
+        <p:spPr>
+          <a:xfrm>
+            <a:off x="504507" y="2604135"/>
+            <a:ext cx="9071610" cy="1727835"/>
+          </a:xfrm>
+        </p:spPr>
+        <p:txBody>
+          <a:bodyPr vert="horz" wrap="square" lIns="0" tIns="0" rIns="0" bIns="0" numCol="1" spcCol="215900" anchor="ctr">
+            <a:prstTxWarp prst="textNoShape">
+              <a:avLst/>
+            </a:prstTxWarp>
+          </a:bodyPr>
+          <a:lstStyle/>
+          <a:p>
+            <a:pPr>
+              <a:defRPr lang="zh-cn"/>
+            </a:pPr>
+            <a:r>
+              <a:rPr lang="zh-Hans-CN" altLang="en-US" sz="5400" b="1" dirty="0"/>
+              <a:t>具</a:t>
+            </a:r>
+            <a:r>
+              <a:rPr lang="en-US" altLang="zh-CN" sz="5400" b="1" dirty="0"/>
+              <a:t>	</a:t>
+            </a:r>
+            <a:r>
+              <a:rPr lang="zh-Hans-CN" altLang="en-US" sz="5400" b="1" dirty="0"/>
+              <a:t>体</a:t>
+            </a:r>
+            <a:r>
+              <a:rPr lang="en-US" altLang="zh-CN" sz="5400" b="1" dirty="0"/>
+              <a:t>	</a:t>
+            </a:r>
+            <a:r>
+              <a:rPr lang="zh-Hans-CN" altLang="en-US" sz="5400" b="1" dirty="0"/>
+              <a:t>演</a:t>
+            </a:r>
+            <a:r>
+              <a:rPr lang="en-US" altLang="zh-CN" sz="5400" b="1" dirty="0"/>
+              <a:t>	</a:t>
+            </a:r>
+            <a:r>
+              <a:rPr lang="zh-Hans-CN" altLang="en-US" sz="5400" b="1" dirty="0"/>
+              <a:t>示</a:t>
+            </a:r>
+            <a:endParaRPr sz="5400" b="1" dirty="0"/>
+          </a:p>
+        </p:txBody>
+      </p:sp>
     </p:spTree>
   </p:cSld>
   <p:clrMapOvr>
     <a:masterClrMapping/>
   </p:clrMapOvr>
-  <p:timing>
-    <p:tnLst>
-      <p:par>
-        <p:cTn id="1" dur="indefinite" restart="never" nodeType="tmRoot"/>
-      </p:par>
-    </p:tnLst>
-  </p:timing>
 </p:sld>
 </file>
 

</xml_diff>